<commit_message>
Update Model Component class diagram
</commit_message>
<xml_diff>
--- a/docs/diagrams/ModelComponentClassDiagram.pptx
+++ b/docs/diagrams/ModelComponentClassDiagram.pptx
@@ -107,6 +107,22 @@
       </a:defRPr>
     </a:lvl9pPr>
   </p:defaultTextStyle>
+  <p:extLst>
+    <p:ext uri="{EFAFB233-063F-42B5-8137-9DF3F51BA10A}">
+      <p15:sldGuideLst xmlns:p15="http://schemas.microsoft.com/office/powerpoint/2012/main">
+        <p15:guide id="1" orient="horz" pos="1488">
+          <p15:clr>
+            <a:srgbClr val="A4A3A4"/>
+          </p15:clr>
+        </p15:guide>
+        <p15:guide id="2" pos="2880">
+          <p15:clr>
+            <a:srgbClr val="A4A3A4"/>
+          </p15:clr>
+        </p15:guide>
+      </p15:sldGuideLst>
+    </p:ext>
+  </p:extLst>
 </p:presentation>
 </file>
 
@@ -192,7 +208,7 @@
           <a:p>
             <a:fld id="{F5CC4B3F-88C1-4FFA-B1B6-F41C21DC6924}" type="datetimeFigureOut">
               <a:rPr lang="en-US" smtClean="0"/>
-              <a:t>11/19/2016</a:t>
+              <a:t>3/7/2017</a:t>
             </a:fld>
             <a:endParaRPr lang="en-US"/>
           </a:p>
@@ -256,38 +272,37 @@
           <a:p>
             <a:pPr lvl="0"/>
             <a:r>
-              <a:rPr lang="en-US" smtClean="0"/>
+              <a:rPr lang="en-US"/>
               <a:t>Click to edit Master text styles</a:t>
             </a:r>
           </a:p>
           <a:p>
             <a:pPr lvl="1"/>
             <a:r>
-              <a:rPr lang="en-US" smtClean="0"/>
+              <a:rPr lang="en-US"/>
               <a:t>Second level</a:t>
             </a:r>
           </a:p>
           <a:p>
             <a:pPr lvl="2"/>
             <a:r>
-              <a:rPr lang="en-US" smtClean="0"/>
+              <a:rPr lang="en-US"/>
               <a:t>Third level</a:t>
             </a:r>
           </a:p>
           <a:p>
             <a:pPr lvl="3"/>
             <a:r>
-              <a:rPr lang="en-US" smtClean="0"/>
+              <a:rPr lang="en-US"/>
               <a:t>Fourth level</a:t>
             </a:r>
           </a:p>
           <a:p>
             <a:pPr lvl="4"/>
             <a:r>
-              <a:rPr lang="en-US" smtClean="0"/>
+              <a:rPr lang="en-US"/>
               <a:t>Fifth level</a:t>
             </a:r>
-            <a:endParaRPr lang="en-US"/>
           </a:p>
         </p:txBody>
       </p:sp>
@@ -498,10 +513,9 @@
           <a:lstStyle/>
           <a:p>
             <a:r>
-              <a:rPr lang="en-US" smtClean="0"/>
+              <a:rPr lang="en-US"/>
               <a:t>Click to edit Master title style</a:t>
             </a:r>
-            <a:endParaRPr lang="en-US"/>
           </a:p>
         </p:txBody>
       </p:sp>
@@ -617,10 +631,9 @@
           </a:lstStyle>
           <a:p>
             <a:r>
-              <a:rPr lang="en-US" smtClean="0"/>
+              <a:rPr lang="en-US"/>
               <a:t>Click to edit Master subtitle style</a:t>
             </a:r>
-            <a:endParaRPr lang="en-US"/>
           </a:p>
         </p:txBody>
       </p:sp>
@@ -641,7 +654,7 @@
           <a:p>
             <a:fld id="{78C97017-6FC3-485B-9764-EAC9E56C1D49}" type="datetimeFigureOut">
               <a:rPr lang="en-US" smtClean="0"/>
-              <a:t>11/19/2016</a:t>
+              <a:t>3/7/2017</a:t>
             </a:fld>
             <a:endParaRPr lang="en-US"/>
           </a:p>
@@ -735,10 +748,9 @@
           <a:lstStyle/>
           <a:p>
             <a:r>
-              <a:rPr lang="en-US" smtClean="0"/>
+              <a:rPr lang="en-US"/>
               <a:t>Click to edit Master title style</a:t>
             </a:r>
-            <a:endParaRPr lang="en-US"/>
           </a:p>
         </p:txBody>
       </p:sp>
@@ -759,38 +771,37 @@
           <a:p>
             <a:pPr lvl="0"/>
             <a:r>
-              <a:rPr lang="en-US" smtClean="0"/>
+              <a:rPr lang="en-US"/>
               <a:t>Click to edit Master text styles</a:t>
             </a:r>
           </a:p>
           <a:p>
             <a:pPr lvl="1"/>
             <a:r>
-              <a:rPr lang="en-US" smtClean="0"/>
+              <a:rPr lang="en-US"/>
               <a:t>Second level</a:t>
             </a:r>
           </a:p>
           <a:p>
             <a:pPr lvl="2"/>
             <a:r>
-              <a:rPr lang="en-US" smtClean="0"/>
+              <a:rPr lang="en-US"/>
               <a:t>Third level</a:t>
             </a:r>
           </a:p>
           <a:p>
             <a:pPr lvl="3"/>
             <a:r>
-              <a:rPr lang="en-US" smtClean="0"/>
+              <a:rPr lang="en-US"/>
               <a:t>Fourth level</a:t>
             </a:r>
           </a:p>
           <a:p>
             <a:pPr lvl="4"/>
             <a:r>
-              <a:rPr lang="en-US" smtClean="0"/>
+              <a:rPr lang="en-US"/>
               <a:t>Fifth level</a:t>
             </a:r>
-            <a:endParaRPr lang="en-US"/>
           </a:p>
         </p:txBody>
       </p:sp>
@@ -811,7 +822,7 @@
           <a:p>
             <a:fld id="{78C97017-6FC3-485B-9764-EAC9E56C1D49}" type="datetimeFigureOut">
               <a:rPr lang="en-US" smtClean="0"/>
-              <a:t>11/19/2016</a:t>
+              <a:t>3/7/2017</a:t>
             </a:fld>
             <a:endParaRPr lang="en-US"/>
           </a:p>
@@ -910,10 +921,9 @@
           <a:lstStyle/>
           <a:p>
             <a:r>
-              <a:rPr lang="en-US" smtClean="0"/>
+              <a:rPr lang="en-US"/>
               <a:t>Click to edit Master title style</a:t>
             </a:r>
-            <a:endParaRPr lang="en-US"/>
           </a:p>
         </p:txBody>
       </p:sp>
@@ -939,38 +949,37 @@
           <a:p>
             <a:pPr lvl="0"/>
             <a:r>
-              <a:rPr lang="en-US" smtClean="0"/>
+              <a:rPr lang="en-US"/>
               <a:t>Click to edit Master text styles</a:t>
             </a:r>
           </a:p>
           <a:p>
             <a:pPr lvl="1"/>
             <a:r>
-              <a:rPr lang="en-US" smtClean="0"/>
+              <a:rPr lang="en-US"/>
               <a:t>Second level</a:t>
             </a:r>
           </a:p>
           <a:p>
             <a:pPr lvl="2"/>
             <a:r>
-              <a:rPr lang="en-US" smtClean="0"/>
+              <a:rPr lang="en-US"/>
               <a:t>Third level</a:t>
             </a:r>
           </a:p>
           <a:p>
             <a:pPr lvl="3"/>
             <a:r>
-              <a:rPr lang="en-US" smtClean="0"/>
+              <a:rPr lang="en-US"/>
               <a:t>Fourth level</a:t>
             </a:r>
           </a:p>
           <a:p>
             <a:pPr lvl="4"/>
             <a:r>
-              <a:rPr lang="en-US" smtClean="0"/>
+              <a:rPr lang="en-US"/>
               <a:t>Fifth level</a:t>
             </a:r>
-            <a:endParaRPr lang="en-US"/>
           </a:p>
         </p:txBody>
       </p:sp>
@@ -991,7 +1000,7 @@
           <a:p>
             <a:fld id="{78C97017-6FC3-485B-9764-EAC9E56C1D49}" type="datetimeFigureOut">
               <a:rPr lang="en-US" smtClean="0"/>
-              <a:t>11/19/2016</a:t>
+              <a:t>3/7/2017</a:t>
             </a:fld>
             <a:endParaRPr lang="en-US"/>
           </a:p>
@@ -1085,10 +1094,9 @@
           <a:lstStyle/>
           <a:p>
             <a:r>
-              <a:rPr lang="en-US" smtClean="0"/>
+              <a:rPr lang="en-US"/>
               <a:t>Click to edit Master title style</a:t>
             </a:r>
-            <a:endParaRPr lang="en-US"/>
           </a:p>
         </p:txBody>
       </p:sp>
@@ -1109,38 +1117,37 @@
           <a:p>
             <a:pPr lvl="0"/>
             <a:r>
-              <a:rPr lang="en-US" smtClean="0"/>
+              <a:rPr lang="en-US"/>
               <a:t>Click to edit Master text styles</a:t>
             </a:r>
           </a:p>
           <a:p>
             <a:pPr lvl="1"/>
             <a:r>
-              <a:rPr lang="en-US" smtClean="0"/>
+              <a:rPr lang="en-US"/>
               <a:t>Second level</a:t>
             </a:r>
           </a:p>
           <a:p>
             <a:pPr lvl="2"/>
             <a:r>
-              <a:rPr lang="en-US" smtClean="0"/>
+              <a:rPr lang="en-US"/>
               <a:t>Third level</a:t>
             </a:r>
           </a:p>
           <a:p>
             <a:pPr lvl="3"/>
             <a:r>
-              <a:rPr lang="en-US" smtClean="0"/>
+              <a:rPr lang="en-US"/>
               <a:t>Fourth level</a:t>
             </a:r>
           </a:p>
           <a:p>
             <a:pPr lvl="4"/>
             <a:r>
-              <a:rPr lang="en-US" smtClean="0"/>
+              <a:rPr lang="en-US"/>
               <a:t>Fifth level</a:t>
             </a:r>
-            <a:endParaRPr lang="en-US"/>
           </a:p>
         </p:txBody>
       </p:sp>
@@ -1161,7 +1168,7 @@
           <a:p>
             <a:fld id="{78C97017-6FC3-485B-9764-EAC9E56C1D49}" type="datetimeFigureOut">
               <a:rPr lang="en-US" smtClean="0"/>
-              <a:t>11/19/2016</a:t>
+              <a:t>3/7/2017</a:t>
             </a:fld>
             <a:endParaRPr lang="en-US"/>
           </a:p>
@@ -1264,10 +1271,9 @@
           </a:lstStyle>
           <a:p>
             <a:r>
-              <a:rPr lang="en-US" smtClean="0"/>
+              <a:rPr lang="en-US"/>
               <a:t>Click to edit Master title style</a:t>
             </a:r>
-            <a:endParaRPr lang="en-US"/>
           </a:p>
         </p:txBody>
       </p:sp>
@@ -1384,7 +1390,7 @@
           <a:p>
             <a:pPr lvl="0"/>
             <a:r>
-              <a:rPr lang="en-US" smtClean="0"/>
+              <a:rPr lang="en-US"/>
               <a:t>Click to edit Master text styles</a:t>
             </a:r>
           </a:p>
@@ -1407,7 +1413,7 @@
           <a:p>
             <a:fld id="{78C97017-6FC3-485B-9764-EAC9E56C1D49}" type="datetimeFigureOut">
               <a:rPr lang="en-US" smtClean="0"/>
-              <a:t>11/19/2016</a:t>
+              <a:t>3/7/2017</a:t>
             </a:fld>
             <a:endParaRPr lang="en-US"/>
           </a:p>
@@ -1501,10 +1507,9 @@
           <a:lstStyle/>
           <a:p>
             <a:r>
-              <a:rPr lang="en-US" smtClean="0"/>
+              <a:rPr lang="en-US"/>
               <a:t>Click to edit Master title style</a:t>
             </a:r>
-            <a:endParaRPr lang="en-US"/>
           </a:p>
         </p:txBody>
       </p:sp>
@@ -1558,38 +1563,37 @@
           <a:p>
             <a:pPr lvl="0"/>
             <a:r>
-              <a:rPr lang="en-US" smtClean="0"/>
+              <a:rPr lang="en-US"/>
               <a:t>Click to edit Master text styles</a:t>
             </a:r>
           </a:p>
           <a:p>
             <a:pPr lvl="1"/>
             <a:r>
-              <a:rPr lang="en-US" smtClean="0"/>
+              <a:rPr lang="en-US"/>
               <a:t>Second level</a:t>
             </a:r>
           </a:p>
           <a:p>
             <a:pPr lvl="2"/>
             <a:r>
-              <a:rPr lang="en-US" smtClean="0"/>
+              <a:rPr lang="en-US"/>
               <a:t>Third level</a:t>
             </a:r>
           </a:p>
           <a:p>
             <a:pPr lvl="3"/>
             <a:r>
-              <a:rPr lang="en-US" smtClean="0"/>
+              <a:rPr lang="en-US"/>
               <a:t>Fourth level</a:t>
             </a:r>
           </a:p>
           <a:p>
             <a:pPr lvl="4"/>
             <a:r>
-              <a:rPr lang="en-US" smtClean="0"/>
+              <a:rPr lang="en-US"/>
               <a:t>Fifth level</a:t>
             </a:r>
-            <a:endParaRPr lang="en-US"/>
           </a:p>
         </p:txBody>
       </p:sp>
@@ -1643,38 +1647,37 @@
           <a:p>
             <a:pPr lvl="0"/>
             <a:r>
-              <a:rPr lang="en-US" smtClean="0"/>
+              <a:rPr lang="en-US"/>
               <a:t>Click to edit Master text styles</a:t>
             </a:r>
           </a:p>
           <a:p>
             <a:pPr lvl="1"/>
             <a:r>
-              <a:rPr lang="en-US" smtClean="0"/>
+              <a:rPr lang="en-US"/>
               <a:t>Second level</a:t>
             </a:r>
           </a:p>
           <a:p>
             <a:pPr lvl="2"/>
             <a:r>
-              <a:rPr lang="en-US" smtClean="0"/>
+              <a:rPr lang="en-US"/>
               <a:t>Third level</a:t>
             </a:r>
           </a:p>
           <a:p>
             <a:pPr lvl="3"/>
             <a:r>
-              <a:rPr lang="en-US" smtClean="0"/>
+              <a:rPr lang="en-US"/>
               <a:t>Fourth level</a:t>
             </a:r>
           </a:p>
           <a:p>
             <a:pPr lvl="4"/>
             <a:r>
-              <a:rPr lang="en-US" smtClean="0"/>
+              <a:rPr lang="en-US"/>
               <a:t>Fifth level</a:t>
             </a:r>
-            <a:endParaRPr lang="en-US"/>
           </a:p>
         </p:txBody>
       </p:sp>
@@ -1695,7 +1698,7 @@
           <a:p>
             <a:fld id="{78C97017-6FC3-485B-9764-EAC9E56C1D49}" type="datetimeFigureOut">
               <a:rPr lang="en-US" smtClean="0"/>
-              <a:t>11/19/2016</a:t>
+              <a:t>3/7/2017</a:t>
             </a:fld>
             <a:endParaRPr lang="en-US"/>
           </a:p>
@@ -1793,10 +1796,9 @@
           </a:lstStyle>
           <a:p>
             <a:r>
-              <a:rPr lang="en-US" smtClean="0"/>
+              <a:rPr lang="en-US"/>
               <a:t>Click to edit Master title style</a:t>
             </a:r>
-            <a:endParaRPr lang="en-US"/>
           </a:p>
         </p:txBody>
       </p:sp>
@@ -1859,7 +1861,7 @@
           <a:p>
             <a:pPr lvl="0"/>
             <a:r>
-              <a:rPr lang="en-US" smtClean="0"/>
+              <a:rPr lang="en-US"/>
               <a:t>Click to edit Master text styles</a:t>
             </a:r>
           </a:p>
@@ -1915,38 +1917,37 @@
           <a:p>
             <a:pPr lvl="0"/>
             <a:r>
-              <a:rPr lang="en-US" smtClean="0"/>
+              <a:rPr lang="en-US"/>
               <a:t>Click to edit Master text styles</a:t>
             </a:r>
           </a:p>
           <a:p>
             <a:pPr lvl="1"/>
             <a:r>
-              <a:rPr lang="en-US" smtClean="0"/>
+              <a:rPr lang="en-US"/>
               <a:t>Second level</a:t>
             </a:r>
           </a:p>
           <a:p>
             <a:pPr lvl="2"/>
             <a:r>
-              <a:rPr lang="en-US" smtClean="0"/>
+              <a:rPr lang="en-US"/>
               <a:t>Third level</a:t>
             </a:r>
           </a:p>
           <a:p>
             <a:pPr lvl="3"/>
             <a:r>
-              <a:rPr lang="en-US" smtClean="0"/>
+              <a:rPr lang="en-US"/>
               <a:t>Fourth level</a:t>
             </a:r>
           </a:p>
           <a:p>
             <a:pPr lvl="4"/>
             <a:r>
-              <a:rPr lang="en-US" smtClean="0"/>
+              <a:rPr lang="en-US"/>
               <a:t>Fifth level</a:t>
             </a:r>
-            <a:endParaRPr lang="en-US"/>
           </a:p>
         </p:txBody>
       </p:sp>
@@ -2009,7 +2010,7 @@
           <a:p>
             <a:pPr lvl="0"/>
             <a:r>
-              <a:rPr lang="en-US" smtClean="0"/>
+              <a:rPr lang="en-US"/>
               <a:t>Click to edit Master text styles</a:t>
             </a:r>
           </a:p>
@@ -2065,38 +2066,37 @@
           <a:p>
             <a:pPr lvl="0"/>
             <a:r>
-              <a:rPr lang="en-US" smtClean="0"/>
+              <a:rPr lang="en-US"/>
               <a:t>Click to edit Master text styles</a:t>
             </a:r>
           </a:p>
           <a:p>
             <a:pPr lvl="1"/>
             <a:r>
-              <a:rPr lang="en-US" smtClean="0"/>
+              <a:rPr lang="en-US"/>
               <a:t>Second level</a:t>
             </a:r>
           </a:p>
           <a:p>
             <a:pPr lvl="2"/>
             <a:r>
-              <a:rPr lang="en-US" smtClean="0"/>
+              <a:rPr lang="en-US"/>
               <a:t>Third level</a:t>
             </a:r>
           </a:p>
           <a:p>
             <a:pPr lvl="3"/>
             <a:r>
-              <a:rPr lang="en-US" smtClean="0"/>
+              <a:rPr lang="en-US"/>
               <a:t>Fourth level</a:t>
             </a:r>
           </a:p>
           <a:p>
             <a:pPr lvl="4"/>
             <a:r>
-              <a:rPr lang="en-US" smtClean="0"/>
+              <a:rPr lang="en-US"/>
               <a:t>Fifth level</a:t>
             </a:r>
-            <a:endParaRPr lang="en-US"/>
           </a:p>
         </p:txBody>
       </p:sp>
@@ -2117,7 +2117,7 @@
           <a:p>
             <a:fld id="{78C97017-6FC3-485B-9764-EAC9E56C1D49}" type="datetimeFigureOut">
               <a:rPr lang="en-US" smtClean="0"/>
-              <a:t>11/19/2016</a:t>
+              <a:t>3/7/2017</a:t>
             </a:fld>
             <a:endParaRPr lang="en-US"/>
           </a:p>
@@ -2211,10 +2211,9 @@
           <a:lstStyle/>
           <a:p>
             <a:r>
-              <a:rPr lang="en-US" smtClean="0"/>
+              <a:rPr lang="en-US"/>
               <a:t>Click to edit Master title style</a:t>
             </a:r>
-            <a:endParaRPr lang="en-US"/>
           </a:p>
         </p:txBody>
       </p:sp>
@@ -2235,7 +2234,7 @@
           <a:p>
             <a:fld id="{78C97017-6FC3-485B-9764-EAC9E56C1D49}" type="datetimeFigureOut">
               <a:rPr lang="en-US" smtClean="0"/>
-              <a:t>11/19/2016</a:t>
+              <a:t>3/7/2017</a:t>
             </a:fld>
             <a:endParaRPr lang="en-US"/>
           </a:p>
@@ -2330,7 +2329,7 @@
           <a:p>
             <a:fld id="{78C97017-6FC3-485B-9764-EAC9E56C1D49}" type="datetimeFigureOut">
               <a:rPr lang="en-US" smtClean="0"/>
-              <a:t>11/19/2016</a:t>
+              <a:t>3/7/2017</a:t>
             </a:fld>
             <a:endParaRPr lang="en-US"/>
           </a:p>
@@ -2433,10 +2432,9 @@
           </a:lstStyle>
           <a:p>
             <a:r>
-              <a:rPr lang="en-US" smtClean="0"/>
+              <a:rPr lang="en-US"/>
               <a:t>Click to edit Master title style</a:t>
             </a:r>
-            <a:endParaRPr lang="en-US"/>
           </a:p>
         </p:txBody>
       </p:sp>
@@ -2490,38 +2488,37 @@
           <a:p>
             <a:pPr lvl="0"/>
             <a:r>
-              <a:rPr lang="en-US" smtClean="0"/>
+              <a:rPr lang="en-US"/>
               <a:t>Click to edit Master text styles</a:t>
             </a:r>
           </a:p>
           <a:p>
             <a:pPr lvl="1"/>
             <a:r>
-              <a:rPr lang="en-US" smtClean="0"/>
+              <a:rPr lang="en-US"/>
               <a:t>Second level</a:t>
             </a:r>
           </a:p>
           <a:p>
             <a:pPr lvl="2"/>
             <a:r>
-              <a:rPr lang="en-US" smtClean="0"/>
+              <a:rPr lang="en-US"/>
               <a:t>Third level</a:t>
             </a:r>
           </a:p>
           <a:p>
             <a:pPr lvl="3"/>
             <a:r>
-              <a:rPr lang="en-US" smtClean="0"/>
+              <a:rPr lang="en-US"/>
               <a:t>Fourth level</a:t>
             </a:r>
           </a:p>
           <a:p>
             <a:pPr lvl="4"/>
             <a:r>
-              <a:rPr lang="en-US" smtClean="0"/>
+              <a:rPr lang="en-US"/>
               <a:t>Fifth level</a:t>
             </a:r>
-            <a:endParaRPr lang="en-US"/>
           </a:p>
         </p:txBody>
       </p:sp>
@@ -2584,7 +2581,7 @@
           <a:p>
             <a:pPr lvl="0"/>
             <a:r>
-              <a:rPr lang="en-US" smtClean="0"/>
+              <a:rPr lang="en-US"/>
               <a:t>Click to edit Master text styles</a:t>
             </a:r>
           </a:p>
@@ -2607,7 +2604,7 @@
           <a:p>
             <a:fld id="{78C97017-6FC3-485B-9764-EAC9E56C1D49}" type="datetimeFigureOut">
               <a:rPr lang="en-US" smtClean="0"/>
-              <a:t>11/19/2016</a:t>
+              <a:t>3/7/2017</a:t>
             </a:fld>
             <a:endParaRPr lang="en-US"/>
           </a:p>
@@ -2710,10 +2707,9 @@
           </a:lstStyle>
           <a:p>
             <a:r>
-              <a:rPr lang="en-US" smtClean="0"/>
+              <a:rPr lang="en-US"/>
               <a:t>Click to edit Master title style</a:t>
             </a:r>
-            <a:endParaRPr lang="en-US"/>
           </a:p>
         </p:txBody>
       </p:sp>
@@ -2837,7 +2833,7 @@
           <a:p>
             <a:pPr lvl="0"/>
             <a:r>
-              <a:rPr lang="en-US" smtClean="0"/>
+              <a:rPr lang="en-US"/>
               <a:t>Click to edit Master text styles</a:t>
             </a:r>
           </a:p>
@@ -2860,7 +2856,7 @@
           <a:p>
             <a:fld id="{78C97017-6FC3-485B-9764-EAC9E56C1D49}" type="datetimeFigureOut">
               <a:rPr lang="en-US" smtClean="0"/>
-              <a:t>11/19/2016</a:t>
+              <a:t>3/7/2017</a:t>
             </a:fld>
             <a:endParaRPr lang="en-US"/>
           </a:p>
@@ -2925,9 +2921,14 @@
 <p:sldMaster xmlns:a="http://schemas.openxmlformats.org/drawingml/2006/main" xmlns:r="http://schemas.openxmlformats.org/officeDocument/2006/relationships" xmlns:p="http://schemas.openxmlformats.org/presentationml/2006/main">
   <p:cSld>
     <p:bg>
-      <p:bgRef idx="1001">
-        <a:schemeClr val="bg1"/>
-      </p:bgRef>
+      <p:bgPr>
+        <a:solidFill>
+          <a:schemeClr val="bg1">
+            <a:alpha val="0"/>
+          </a:schemeClr>
+        </a:solidFill>
+        <a:effectLst/>
+      </p:bgPr>
     </p:bg>
     <p:spTree>
       <p:nvGrpSpPr>
@@ -2969,10 +2970,9 @@
           <a:lstStyle/>
           <a:p>
             <a:r>
-              <a:rPr lang="en-US" smtClean="0"/>
+              <a:rPr lang="en-US"/>
               <a:t>Click to edit Master title style</a:t>
             </a:r>
-            <a:endParaRPr lang="en-US"/>
           </a:p>
         </p:txBody>
       </p:sp>
@@ -3003,38 +3003,37 @@
           <a:p>
             <a:pPr lvl="0"/>
             <a:r>
-              <a:rPr lang="en-US" smtClean="0"/>
+              <a:rPr lang="en-US"/>
               <a:t>Click to edit Master text styles</a:t>
             </a:r>
           </a:p>
           <a:p>
             <a:pPr lvl="1"/>
             <a:r>
-              <a:rPr lang="en-US" smtClean="0"/>
+              <a:rPr lang="en-US"/>
               <a:t>Second level</a:t>
             </a:r>
           </a:p>
           <a:p>
             <a:pPr lvl="2"/>
             <a:r>
-              <a:rPr lang="en-US" smtClean="0"/>
+              <a:rPr lang="en-US"/>
               <a:t>Third level</a:t>
             </a:r>
           </a:p>
           <a:p>
             <a:pPr lvl="3"/>
             <a:r>
-              <a:rPr lang="en-US" smtClean="0"/>
+              <a:rPr lang="en-US"/>
               <a:t>Fourth level</a:t>
             </a:r>
           </a:p>
           <a:p>
             <a:pPr lvl="4"/>
             <a:r>
-              <a:rPr lang="en-US" smtClean="0"/>
+              <a:rPr lang="en-US"/>
               <a:t>Fifth level</a:t>
             </a:r>
-            <a:endParaRPr lang="en-US"/>
           </a:p>
         </p:txBody>
       </p:sp>
@@ -3073,7 +3072,7 @@
           <a:p>
             <a:fld id="{78C97017-6FC3-485B-9764-EAC9E56C1D49}" type="datetimeFigureOut">
               <a:rPr lang="en-US" smtClean="0"/>
-              <a:t>11/19/2016</a:t>
+              <a:t>3/7/2017</a:t>
             </a:fld>
             <a:endParaRPr lang="en-US"/>
           </a:p>
@@ -3494,7 +3493,7 @@
           <a:lstStyle/>
           <a:p>
             <a:r>
-              <a:rPr lang="en-US" sz="1200" b="1" dirty="0" smtClean="0">
+              <a:rPr lang="en-US" sz="1200" b="1" dirty="0">
                 <a:solidFill>
                   <a:srgbClr val="7030A0"/>
                 </a:solidFill>
@@ -3553,7 +3552,7 @@
           <a:p>
             <a:pPr algn="ctr"/>
             <a:r>
-              <a:rPr lang="en-US" sz="1050" dirty="0" err="1" smtClean="0">
+              <a:rPr lang="en-US" sz="1050" dirty="0" err="1">
                 <a:solidFill>
                   <a:schemeClr val="bg1"/>
                 </a:solidFill>
@@ -3612,7 +3611,7 @@
           <a:p>
             <a:pPr algn="ctr"/>
             <a:r>
-              <a:rPr lang="en-US" sz="1050" dirty="0" err="1" smtClean="0">
+              <a:rPr lang="en-US" sz="1050" dirty="0" err="1">
                 <a:solidFill>
                   <a:schemeClr val="bg1"/>
                 </a:solidFill>
@@ -3767,7 +3766,7 @@
           <a:p>
             <a:pPr algn="ctr"/>
             <a:r>
-              <a:rPr lang="en-US" sz="1050" dirty="0" smtClean="0">
+              <a:rPr lang="en-US" sz="1050" dirty="0">
                 <a:solidFill>
                   <a:schemeClr val="bg1"/>
                 </a:solidFill>
@@ -4091,12 +4090,12 @@
           <a:p>
             <a:pPr algn="ctr"/>
             <a:r>
-              <a:rPr lang="en-US" sz="1050" dirty="0" err="1" smtClean="0">
+              <a:rPr lang="en-US" sz="1050" dirty="0" err="1">
                 <a:solidFill>
                   <a:srgbClr val="7030A0"/>
                 </a:solidFill>
               </a:rPr>
-              <a:t>AddressBook</a:t>
+              <a:t>TaskManager</a:t>
             </a:r>
             <a:endParaRPr lang="en-SG" sz="1050" dirty="0">
               <a:solidFill>
@@ -4233,12 +4232,12 @@
           <a:p>
             <a:pPr algn="ctr"/>
             <a:r>
-              <a:rPr lang="en-US" sz="1050" dirty="0" err="1" smtClean="0">
+              <a:rPr lang="en-US" sz="1050" dirty="0" err="1">
                 <a:solidFill>
                   <a:srgbClr val="7030A0"/>
                 </a:solidFill>
               </a:rPr>
-              <a:t>UniquePersonList</a:t>
+              <a:t>UniqueTaskList</a:t>
             </a:r>
             <a:endParaRPr lang="en-SG" sz="1050" dirty="0">
               <a:solidFill>
@@ -4377,7 +4376,7 @@
           <a:p>
             <a:pPr algn="ctr"/>
             <a:r>
-              <a:rPr lang="en-US" sz="1050" dirty="0" err="1" smtClean="0">
+              <a:rPr lang="en-US" sz="1050" dirty="0" err="1">
                 <a:solidFill>
                   <a:srgbClr val="7030A0"/>
                 </a:solidFill>
@@ -4476,12 +4475,12 @@
           <a:p>
             <a:pPr algn="ctr"/>
             <a:r>
-              <a:rPr lang="en-US" sz="1050" dirty="0" smtClean="0">
+              <a:rPr lang="en-US" sz="1050" dirty="0">
                 <a:solidFill>
                   <a:srgbClr val="7030A0"/>
                 </a:solidFill>
               </a:rPr>
-              <a:t>Person</a:t>
+              <a:t>Task</a:t>
             </a:r>
             <a:endParaRPr lang="en-SG" sz="1050" dirty="0">
               <a:solidFill>
@@ -4618,7 +4617,7 @@
           <a:p>
             <a:pPr algn="ctr"/>
             <a:r>
-              <a:rPr lang="en-US" sz="1050" dirty="0" smtClean="0">
+              <a:rPr lang="en-US" sz="1050" dirty="0">
                 <a:solidFill>
                   <a:srgbClr val="7030A0"/>
                 </a:solidFill>
@@ -4760,7 +4759,7 @@
           <a:p>
             <a:pPr algn="ctr"/>
             <a:r>
-              <a:rPr lang="en-US" sz="1050" dirty="0" smtClean="0">
+              <a:rPr lang="en-US" sz="1050" dirty="0">
                 <a:solidFill>
                   <a:srgbClr val="7030A0"/>
                 </a:solidFill>
@@ -4768,19 +4767,19 @@
               <a:t>&lt;&lt;interface&gt;&gt;</a:t>
             </a:r>
             <a:br>
-              <a:rPr lang="en-US" sz="1050" dirty="0" smtClean="0">
+              <a:rPr lang="en-US" sz="1050" dirty="0">
                 <a:solidFill>
                   <a:srgbClr val="7030A0"/>
                 </a:solidFill>
               </a:rPr>
             </a:br>
             <a:r>
-              <a:rPr lang="en-US" sz="1050" dirty="0" err="1" smtClean="0">
+              <a:rPr lang="en-US" sz="1050" dirty="0" err="1">
                 <a:solidFill>
                   <a:srgbClr val="7030A0"/>
                 </a:solidFill>
               </a:rPr>
-              <a:t>ReadOnlyPerson</a:t>
+              <a:t>ReadOnlyTask</a:t>
             </a:r>
             <a:endParaRPr lang="en-SG" sz="1050" dirty="0">
               <a:solidFill>
@@ -4831,7 +4830,7 @@
           <a:p>
             <a:pPr algn="ctr"/>
             <a:r>
-              <a:rPr lang="en-US" sz="1050" dirty="0" smtClean="0">
+              <a:rPr lang="en-US" sz="1050" dirty="0">
                 <a:solidFill>
                   <a:srgbClr val="7030A0"/>
                 </a:solidFill>
@@ -4975,12 +4974,12 @@
           <a:p>
             <a:pPr algn="ctr"/>
             <a:r>
-              <a:rPr lang="en-US" sz="1050" dirty="0" smtClean="0">
+              <a:rPr lang="en-US" sz="1050" dirty="0">
                 <a:solidFill>
                   <a:srgbClr val="7030A0"/>
                 </a:solidFill>
               </a:rPr>
-              <a:t>Phone</a:t>
+              <a:t>Note</a:t>
             </a:r>
             <a:endParaRPr lang="en-SG" sz="1050" dirty="0">
               <a:solidFill>
@@ -5072,12 +5071,12 @@
           <a:p>
             <a:pPr algn="ctr"/>
             <a:r>
-              <a:rPr lang="en-US" sz="1050" dirty="0" smtClean="0">
+              <a:rPr lang="en-US" sz="1050" dirty="0">
                 <a:solidFill>
                   <a:srgbClr val="7030A0"/>
                 </a:solidFill>
               </a:rPr>
-              <a:t>Email</a:t>
+              <a:t>Priority</a:t>
             </a:r>
             <a:endParaRPr lang="en-SG" sz="1050" dirty="0">
               <a:solidFill>
@@ -5169,12 +5168,12 @@
           <a:p>
             <a:pPr algn="ctr"/>
             <a:r>
-              <a:rPr lang="en-US" sz="1050" dirty="0" smtClean="0">
+              <a:rPr lang="en-US" sz="1050" dirty="0">
                 <a:solidFill>
                   <a:srgbClr val="7030A0"/>
                 </a:solidFill>
               </a:rPr>
-              <a:t>Address</a:t>
+              <a:t>Status</a:t>
             </a:r>
             <a:endParaRPr lang="en-SG" sz="1050" dirty="0">
               <a:solidFill>
@@ -5357,7 +5356,7 @@
           <a:p>
             <a:pPr algn="ctr"/>
             <a:r>
-              <a:rPr lang="en-US" sz="1050" dirty="0" smtClean="0">
+              <a:rPr lang="en-US" sz="1050" dirty="0">
                 <a:solidFill>
                   <a:srgbClr val="7030A0"/>
                 </a:solidFill>
@@ -5365,19 +5364,19 @@
               <a:t>&lt;&lt;interface&gt;&gt;</a:t>
             </a:r>
             <a:br>
-              <a:rPr lang="en-US" sz="1050" dirty="0" smtClean="0">
+              <a:rPr lang="en-US" sz="1050" dirty="0">
                 <a:solidFill>
                   <a:srgbClr val="7030A0"/>
                 </a:solidFill>
               </a:rPr>
             </a:br>
             <a:r>
-              <a:rPr lang="en-US" sz="1050" dirty="0" err="1" smtClean="0">
+              <a:rPr lang="en-US" sz="1050" dirty="0" err="1">
                 <a:solidFill>
                   <a:srgbClr val="7030A0"/>
                 </a:solidFill>
               </a:rPr>
-              <a:t>ReadOnlyAddressBook</a:t>
+              <a:t>ReadOnlyTaskManager</a:t>
             </a:r>
             <a:endParaRPr lang="en-SG" sz="1050" dirty="0">
               <a:solidFill>
@@ -5411,7 +5410,7 @@
           <a:p>
             <a:pPr algn="r"/>
             <a:r>
-              <a:rPr lang="en-US" sz="1100" dirty="0" smtClean="0">
+              <a:rPr lang="en-US" sz="1100" dirty="0">
                 <a:solidFill>
                   <a:srgbClr val="7030A0"/>
                 </a:solidFill>
@@ -5467,20 +5466,12 @@
           <a:p>
             <a:pPr algn="ctr"/>
             <a:r>
-              <a:rPr lang="en-US" sz="1050" dirty="0" smtClean="0">
+              <a:rPr lang="en-US" sz="1050" dirty="0">
                 <a:solidFill>
                   <a:srgbClr val="7030A0"/>
                 </a:solidFill>
               </a:rPr>
               <a:t>&lt;&lt;interface&gt;&gt;</a:t>
-            </a:r>
-            <a:r>
-              <a:rPr lang="en-US" sz="1050" dirty="0">
-                <a:solidFill>
-                  <a:srgbClr val="7030A0"/>
-                </a:solidFill>
-              </a:rPr>
-              <a:t/>
             </a:r>
             <a:br>
               <a:rPr lang="en-US" sz="1050" dirty="0">
@@ -5490,7 +5481,7 @@
               </a:rPr>
             </a:br>
             <a:r>
-              <a:rPr lang="en-US" sz="1050" dirty="0" err="1" smtClean="0">
+              <a:rPr lang="en-US" sz="1050" dirty="0" err="1">
                 <a:solidFill>
                   <a:srgbClr val="7030A0"/>
                 </a:solidFill>
@@ -5612,7 +5603,7 @@
           <a:p>
             <a:pPr algn="ctr"/>
             <a:r>
-              <a:rPr lang="en-US" sz="1100" dirty="0" smtClean="0">
+              <a:rPr lang="en-US" sz="1100" dirty="0">
                 <a:solidFill>
                   <a:srgbClr val="7030A0"/>
                 </a:solidFill>
@@ -5651,7 +5642,7 @@
           <a:p>
             <a:pPr algn="ctr"/>
             <a:r>
-              <a:rPr lang="en-US" sz="1100" dirty="0" smtClean="0">
+              <a:rPr lang="en-US" sz="1100" dirty="0">
                 <a:solidFill>
                   <a:srgbClr val="7030A0"/>
                 </a:solidFill>
@@ -5690,7 +5681,7 @@
           <a:p>
             <a:pPr algn="ctr"/>
             <a:r>
-              <a:rPr lang="en-US" sz="1100" dirty="0" smtClean="0">
+              <a:rPr lang="en-US" sz="1100" dirty="0">
                 <a:solidFill>
                   <a:srgbClr val="7030A0"/>
                 </a:solidFill>
@@ -5729,7 +5720,7 @@
           <a:p>
             <a:pPr algn="ctr"/>
             <a:r>
-              <a:rPr lang="en-US" sz="1100" dirty="0" smtClean="0">
+              <a:rPr lang="en-US" sz="1100" dirty="0">
                 <a:solidFill>
                   <a:srgbClr val="7030A0"/>
                 </a:solidFill>
@@ -5768,7 +5759,7 @@
           <a:p>
             <a:pPr algn="ctr"/>
             <a:r>
-              <a:rPr lang="en-US" sz="1100" dirty="0" smtClean="0">
+              <a:rPr lang="en-US" sz="1100" dirty="0">
                 <a:solidFill>
                   <a:srgbClr val="7030A0"/>
                 </a:solidFill>
@@ -5807,7 +5798,7 @@
           <a:p>
             <a:pPr algn="ctr"/>
             <a:r>
-              <a:rPr lang="en-US" sz="1100" dirty="0" smtClean="0">
+              <a:rPr lang="en-US" sz="1100" dirty="0">
                 <a:solidFill>
                   <a:srgbClr val="7030A0"/>
                 </a:solidFill>
@@ -5846,7 +5837,7 @@
           <a:p>
             <a:pPr algn="ctr"/>
             <a:r>
-              <a:rPr lang="en-US" sz="1100" dirty="0" smtClean="0">
+              <a:rPr lang="en-US" sz="1100" dirty="0">
                 <a:solidFill>
                   <a:srgbClr val="7030A0"/>
                 </a:solidFill>
@@ -5885,7 +5876,7 @@
           <a:p>
             <a:pPr algn="ctr"/>
             <a:r>
-              <a:rPr lang="en-US" sz="1100" dirty="0" smtClean="0">
+              <a:rPr lang="en-US" sz="1100" dirty="0">
                 <a:solidFill>
                   <a:srgbClr val="7030A0"/>
                 </a:solidFill>
@@ -5910,13 +5901,6 @@
   <p:clrMapOvr>
     <a:masterClrMapping/>
   </p:clrMapOvr>
-  <p:timing>
-    <p:tnLst>
-      <p:par>
-        <p:cTn id="1" dur="indefinite" restart="never" nodeType="tmRoot"/>
-      </p:par>
-    </p:tnLst>
-  </p:timing>
 </p:sld>
 </file>
 

</xml_diff>

<commit_message>
update Storage component design
</commit_message>
<xml_diff>
--- a/docs/diagrams/ModelComponentClassDiagram.pptx
+++ b/docs/diagrams/ModelComponentClassDiagram.pptx
@@ -107,6 +107,22 @@
       </a:defRPr>
     </a:lvl9pPr>
   </p:defaultTextStyle>
+  <p:extLst>
+    <p:ext uri="{EFAFB233-063F-42B5-8137-9DF3F51BA10A}">
+      <p15:sldGuideLst xmlns:p15="http://schemas.microsoft.com/office/powerpoint/2012/main">
+        <p15:guide id="1" orient="horz" pos="1488">
+          <p15:clr>
+            <a:srgbClr val="A4A3A4"/>
+          </p15:clr>
+        </p15:guide>
+        <p15:guide id="2" pos="2880">
+          <p15:clr>
+            <a:srgbClr val="A4A3A4"/>
+          </p15:clr>
+        </p15:guide>
+      </p15:sldGuideLst>
+    </p:ext>
+  </p:extLst>
 </p:presentation>
 </file>
 
@@ -192,7 +208,7 @@
           <a:p>
             <a:fld id="{F5CC4B3F-88C1-4FFA-B1B6-F41C21DC6924}" type="datetimeFigureOut">
               <a:rPr lang="en-US" smtClean="0"/>
-              <a:t>11/19/2016</a:t>
+              <a:t>3/15/2017</a:t>
             </a:fld>
             <a:endParaRPr lang="en-US"/>
           </a:p>
@@ -641,7 +657,7 @@
           <a:p>
             <a:fld id="{78C97017-6FC3-485B-9764-EAC9E56C1D49}" type="datetimeFigureOut">
               <a:rPr lang="en-US" smtClean="0"/>
-              <a:t>11/19/2016</a:t>
+              <a:t>3/15/2017</a:t>
             </a:fld>
             <a:endParaRPr lang="en-US"/>
           </a:p>
@@ -811,7 +827,7 @@
           <a:p>
             <a:fld id="{78C97017-6FC3-485B-9764-EAC9E56C1D49}" type="datetimeFigureOut">
               <a:rPr lang="en-US" smtClean="0"/>
-              <a:t>11/19/2016</a:t>
+              <a:t>3/15/2017</a:t>
             </a:fld>
             <a:endParaRPr lang="en-US"/>
           </a:p>
@@ -991,7 +1007,7 @@
           <a:p>
             <a:fld id="{78C97017-6FC3-485B-9764-EAC9E56C1D49}" type="datetimeFigureOut">
               <a:rPr lang="en-US" smtClean="0"/>
-              <a:t>11/19/2016</a:t>
+              <a:t>3/15/2017</a:t>
             </a:fld>
             <a:endParaRPr lang="en-US"/>
           </a:p>
@@ -1161,7 +1177,7 @@
           <a:p>
             <a:fld id="{78C97017-6FC3-485B-9764-EAC9E56C1D49}" type="datetimeFigureOut">
               <a:rPr lang="en-US" smtClean="0"/>
-              <a:t>11/19/2016</a:t>
+              <a:t>3/15/2017</a:t>
             </a:fld>
             <a:endParaRPr lang="en-US"/>
           </a:p>
@@ -1407,7 +1423,7 @@
           <a:p>
             <a:fld id="{78C97017-6FC3-485B-9764-EAC9E56C1D49}" type="datetimeFigureOut">
               <a:rPr lang="en-US" smtClean="0"/>
-              <a:t>11/19/2016</a:t>
+              <a:t>3/15/2017</a:t>
             </a:fld>
             <a:endParaRPr lang="en-US"/>
           </a:p>
@@ -1695,7 +1711,7 @@
           <a:p>
             <a:fld id="{78C97017-6FC3-485B-9764-EAC9E56C1D49}" type="datetimeFigureOut">
               <a:rPr lang="en-US" smtClean="0"/>
-              <a:t>11/19/2016</a:t>
+              <a:t>3/15/2017</a:t>
             </a:fld>
             <a:endParaRPr lang="en-US"/>
           </a:p>
@@ -2117,7 +2133,7 @@
           <a:p>
             <a:fld id="{78C97017-6FC3-485B-9764-EAC9E56C1D49}" type="datetimeFigureOut">
               <a:rPr lang="en-US" smtClean="0"/>
-              <a:t>11/19/2016</a:t>
+              <a:t>3/15/2017</a:t>
             </a:fld>
             <a:endParaRPr lang="en-US"/>
           </a:p>
@@ -2235,7 +2251,7 @@
           <a:p>
             <a:fld id="{78C97017-6FC3-485B-9764-EAC9E56C1D49}" type="datetimeFigureOut">
               <a:rPr lang="en-US" smtClean="0"/>
-              <a:t>11/19/2016</a:t>
+              <a:t>3/15/2017</a:t>
             </a:fld>
             <a:endParaRPr lang="en-US"/>
           </a:p>
@@ -2330,7 +2346,7 @@
           <a:p>
             <a:fld id="{78C97017-6FC3-485B-9764-EAC9E56C1D49}" type="datetimeFigureOut">
               <a:rPr lang="en-US" smtClean="0"/>
-              <a:t>11/19/2016</a:t>
+              <a:t>3/15/2017</a:t>
             </a:fld>
             <a:endParaRPr lang="en-US"/>
           </a:p>
@@ -2607,7 +2623,7 @@
           <a:p>
             <a:fld id="{78C97017-6FC3-485B-9764-EAC9E56C1D49}" type="datetimeFigureOut">
               <a:rPr lang="en-US" smtClean="0"/>
-              <a:t>11/19/2016</a:t>
+              <a:t>3/15/2017</a:t>
             </a:fld>
             <a:endParaRPr lang="en-US"/>
           </a:p>
@@ -2860,7 +2876,7 @@
           <a:p>
             <a:fld id="{78C97017-6FC3-485B-9764-EAC9E56C1D49}" type="datetimeFigureOut">
               <a:rPr lang="en-US" smtClean="0"/>
-              <a:t>11/19/2016</a:t>
+              <a:t>3/15/2017</a:t>
             </a:fld>
             <a:endParaRPr lang="en-US"/>
           </a:p>
@@ -3073,7 +3089,7 @@
           <a:p>
             <a:fld id="{78C97017-6FC3-485B-9764-EAC9E56C1D49}" type="datetimeFigureOut">
               <a:rPr lang="en-US" smtClean="0"/>
-              <a:t>11/19/2016</a:t>
+              <a:t>3/15/2017</a:t>
             </a:fld>
             <a:endParaRPr lang="en-US"/>
           </a:p>
@@ -3457,7 +3473,7 @@
         <p:spPr>
           <a:xfrm>
             <a:off x="1119865" y="1727200"/>
-            <a:ext cx="7490735" cy="2997200"/>
+            <a:ext cx="7719335" cy="2997200"/>
           </a:xfrm>
           <a:prstGeom prst="roundRect">
             <a:avLst>
@@ -4096,7 +4112,15 @@
                   <a:srgbClr val="7030A0"/>
                 </a:solidFill>
               </a:rPr>
-              <a:t>AddressBook</a:t>
+              <a:t>T</a:t>
+            </a:r>
+            <a:r>
+              <a:rPr lang="en-US" altLang="zh-CN" sz="1050" dirty="0" err="1" smtClean="0">
+                <a:solidFill>
+                  <a:srgbClr val="7030A0"/>
+                </a:solidFill>
+              </a:rPr>
+              <a:t>odoList</a:t>
             </a:r>
             <a:endParaRPr lang="en-SG" sz="1050" dirty="0">
               <a:solidFill>
@@ -4238,7 +4262,7 @@
                   <a:srgbClr val="7030A0"/>
                 </a:solidFill>
               </a:rPr>
-              <a:t>UniquePersonList</a:t>
+              <a:t>UniqueTaskList</a:t>
             </a:r>
             <a:endParaRPr lang="en-SG" sz="1050" dirty="0">
               <a:solidFill>
@@ -4481,7 +4505,7 @@
                   <a:srgbClr val="7030A0"/>
                 </a:solidFill>
               </a:rPr>
-              <a:t>Person</a:t>
+              <a:t>Task</a:t>
             </a:r>
             <a:endParaRPr lang="en-SG" sz="1050" dirty="0">
               <a:solidFill>
@@ -4780,7 +4804,7 @@
                   <a:srgbClr val="7030A0"/>
                 </a:solidFill>
               </a:rPr>
-              <a:t>ReadOnlyPerson</a:t>
+              <a:t>ReadOnlyTask</a:t>
             </a:r>
             <a:endParaRPr lang="en-SG" sz="1050" dirty="0">
               <a:solidFill>
@@ -4798,8 +4822,8 @@
         </p:nvSpPr>
         <p:spPr>
           <a:xfrm>
-            <a:off x="7712397" y="2564238"/>
-            <a:ext cx="708186" cy="285783"/>
+            <a:off x="7712396" y="2564238"/>
+            <a:ext cx="855459" cy="285783"/>
           </a:xfrm>
           <a:prstGeom prst="rect">
             <a:avLst/>
@@ -4836,7 +4860,7 @@
                   <a:srgbClr val="7030A0"/>
                 </a:solidFill>
               </a:rPr>
-              <a:t>Name</a:t>
+              <a:t>Description</a:t>
             </a:r>
             <a:endParaRPr lang="en-SG" sz="1050" dirty="0">
               <a:solidFill>
@@ -4905,7 +4929,7 @@
         <p:spPr>
           <a:xfrm flipV="1">
             <a:off x="7277995" y="2707130"/>
-            <a:ext cx="434402" cy="327761"/>
+            <a:ext cx="434401" cy="327761"/>
           </a:xfrm>
           <a:prstGeom prst="bentConnector3">
             <a:avLst/>
@@ -4942,8 +4966,8 @@
         </p:nvSpPr>
         <p:spPr>
           <a:xfrm>
-            <a:off x="7712397" y="2887216"/>
-            <a:ext cx="708186" cy="285783"/>
+            <a:off x="7712396" y="2887216"/>
+            <a:ext cx="855459" cy="285783"/>
           </a:xfrm>
           <a:prstGeom prst="rect">
             <a:avLst/>
@@ -4980,7 +5004,7 @@
                   <a:srgbClr val="7030A0"/>
                 </a:solidFill>
               </a:rPr>
-              <a:t>Phone</a:t>
+              <a:t>Priority</a:t>
             </a:r>
             <a:endParaRPr lang="en-SG" sz="1050" dirty="0">
               <a:solidFill>
@@ -5002,7 +5026,7 @@
         <p:spPr>
           <a:xfrm flipV="1">
             <a:off x="7277995" y="3030108"/>
-            <a:ext cx="434402" cy="4783"/>
+            <a:ext cx="434401" cy="4783"/>
           </a:xfrm>
           <a:prstGeom prst="bentConnector3">
             <a:avLst/>
@@ -5039,8 +5063,8 @@
         </p:nvSpPr>
         <p:spPr>
           <a:xfrm>
-            <a:off x="7712397" y="3210194"/>
-            <a:ext cx="708186" cy="285783"/>
+            <a:off x="7712396" y="3210194"/>
+            <a:ext cx="855459" cy="285783"/>
           </a:xfrm>
           <a:prstGeom prst="rect">
             <a:avLst/>
@@ -5072,12 +5096,12 @@
           <a:p>
             <a:pPr algn="ctr"/>
             <a:r>
-              <a:rPr lang="en-US" sz="1050" dirty="0" smtClean="0">
+              <a:rPr lang="en-US" sz="1050" dirty="0" err="1" smtClean="0">
                 <a:solidFill>
                   <a:srgbClr val="7030A0"/>
                 </a:solidFill>
               </a:rPr>
-              <a:t>Email</a:t>
+              <a:t>FinishStatus</a:t>
             </a:r>
             <a:endParaRPr lang="en-SG" sz="1050" dirty="0">
               <a:solidFill>
@@ -5099,104 +5123,7 @@
         <p:spPr>
           <a:xfrm>
             <a:off x="7277995" y="3034891"/>
-            <a:ext cx="434402" cy="318195"/>
-          </a:xfrm>
-          <a:prstGeom prst="bentConnector3">
-            <a:avLst/>
-          </a:prstGeom>
-          <a:ln w="19050">
-            <a:solidFill>
-              <a:srgbClr val="7030A0"/>
-            </a:solidFill>
-            <a:headEnd type="none" w="med" len="med"/>
-            <a:tailEnd type="arrow" w="med" len="med"/>
-          </a:ln>
-          <a:effectLst/>
-        </p:spPr>
-        <p:style>
-          <a:lnRef idx="1">
-            <a:schemeClr val="accent2"/>
-          </a:lnRef>
-          <a:fillRef idx="2">
-            <a:schemeClr val="accent2"/>
-          </a:fillRef>
-          <a:effectRef idx="1">
-            <a:schemeClr val="accent2"/>
-          </a:effectRef>
-          <a:fontRef idx="minor">
-            <a:schemeClr val="dk1"/>
-          </a:fontRef>
-        </p:style>
-      </p:cxnSp>
-      <p:sp>
-        <p:nvSpPr>
-          <p:cNvPr id="85" name="Rectangle 8"/>
-          <p:cNvSpPr/>
-          <p:nvPr/>
-        </p:nvSpPr>
-        <p:spPr>
-          <a:xfrm>
-            <a:off x="7712397" y="3533171"/>
-            <a:ext cx="708186" cy="285783"/>
-          </a:xfrm>
-          <a:prstGeom prst="rect">
-            <a:avLst/>
-          </a:prstGeom>
-          <a:ln w="19050">
-            <a:solidFill>
-              <a:srgbClr val="7030A0"/>
-            </a:solidFill>
-          </a:ln>
-          <a:effectLst/>
-        </p:spPr>
-        <p:style>
-          <a:lnRef idx="1">
-            <a:schemeClr val="accent4"/>
-          </a:lnRef>
-          <a:fillRef idx="2">
-            <a:schemeClr val="accent4"/>
-          </a:fillRef>
-          <a:effectRef idx="1">
-            <a:schemeClr val="accent4"/>
-          </a:effectRef>
-          <a:fontRef idx="minor">
-            <a:schemeClr val="dk1"/>
-          </a:fontRef>
-        </p:style>
-        <p:txBody>
-          <a:bodyPr rtlCol="0" anchor="ctr"/>
-          <a:lstStyle/>
-          <a:p>
-            <a:pPr algn="ctr"/>
-            <a:r>
-              <a:rPr lang="en-US" sz="1050" dirty="0" smtClean="0">
-                <a:solidFill>
-                  <a:srgbClr val="7030A0"/>
-                </a:solidFill>
-              </a:rPr>
-              <a:t>Address</a:t>
-            </a:r>
-            <a:endParaRPr lang="en-SG" sz="1050" dirty="0">
-              <a:solidFill>
-                <a:srgbClr val="7030A0"/>
-              </a:solidFill>
-            </a:endParaRPr>
-          </a:p>
-        </p:txBody>
-      </p:sp>
-      <p:cxnSp>
-        <p:nvCxnSpPr>
-          <p:cNvPr id="86" name="Elbow Connector 85"/>
-          <p:cNvCxnSpPr>
-            <a:stCxn id="78" idx="3"/>
-            <a:endCxn id="85" idx="1"/>
-          </p:cNvCxnSpPr>
-          <p:nvPr/>
-        </p:nvCxnSpPr>
-        <p:spPr>
-          <a:xfrm>
-            <a:off x="7277995" y="3034891"/>
-            <a:ext cx="434402" cy="641172"/>
+            <a:ext cx="434401" cy="318195"/>
           </a:xfrm>
           <a:prstGeom prst="bentConnector3">
             <a:avLst/>
@@ -5377,7 +5304,7 @@
                   <a:srgbClr val="7030A0"/>
                 </a:solidFill>
               </a:rPr>
-              <a:t>ReadOnlyAddressBook</a:t>
+              <a:t>ReadOnlyTodoList</a:t>
             </a:r>
             <a:endParaRPr lang="en-SG" sz="1050" dirty="0">
               <a:solidFill>

</xml_diff>

<commit_message>
Updated model class diagarm with History and DateTime
</commit_message>
<xml_diff>
--- a/docs/diagrams/ModelComponentClassDiagram.pptx
+++ b/docs/diagrams/ModelComponentClassDiagram.pptx
@@ -208,7 +208,7 @@
           <a:p>
             <a:fld id="{F5CC4B3F-88C1-4FFA-B1B6-F41C21DC6924}" type="datetimeFigureOut">
               <a:rPr lang="en-US" smtClean="0"/>
-              <a:t>3/16/17</a:t>
+              <a:t>3/23/2017</a:t>
             </a:fld>
             <a:endParaRPr lang="en-US"/>
           </a:p>
@@ -654,7 +654,7 @@
           <a:p>
             <a:fld id="{78C97017-6FC3-485B-9764-EAC9E56C1D49}" type="datetimeFigureOut">
               <a:rPr lang="en-US" smtClean="0"/>
-              <a:t>3/16/17</a:t>
+              <a:t>3/23/2017</a:t>
             </a:fld>
             <a:endParaRPr lang="en-US"/>
           </a:p>
@@ -822,7 +822,7 @@
           <a:p>
             <a:fld id="{78C97017-6FC3-485B-9764-EAC9E56C1D49}" type="datetimeFigureOut">
               <a:rPr lang="en-US" smtClean="0"/>
-              <a:t>3/16/17</a:t>
+              <a:t>3/23/2017</a:t>
             </a:fld>
             <a:endParaRPr lang="en-US"/>
           </a:p>
@@ -1000,7 +1000,7 @@
           <a:p>
             <a:fld id="{78C97017-6FC3-485B-9764-EAC9E56C1D49}" type="datetimeFigureOut">
               <a:rPr lang="en-US" smtClean="0"/>
-              <a:t>3/16/17</a:t>
+              <a:t>3/23/2017</a:t>
             </a:fld>
             <a:endParaRPr lang="en-US"/>
           </a:p>
@@ -1168,7 +1168,7 @@
           <a:p>
             <a:fld id="{78C97017-6FC3-485B-9764-EAC9E56C1D49}" type="datetimeFigureOut">
               <a:rPr lang="en-US" smtClean="0"/>
-              <a:t>3/16/17</a:t>
+              <a:t>3/23/2017</a:t>
             </a:fld>
             <a:endParaRPr lang="en-US"/>
           </a:p>
@@ -1413,7 +1413,7 @@
           <a:p>
             <a:fld id="{78C97017-6FC3-485B-9764-EAC9E56C1D49}" type="datetimeFigureOut">
               <a:rPr lang="en-US" smtClean="0"/>
-              <a:t>3/16/17</a:t>
+              <a:t>3/23/2017</a:t>
             </a:fld>
             <a:endParaRPr lang="en-US"/>
           </a:p>
@@ -1698,7 +1698,7 @@
           <a:p>
             <a:fld id="{78C97017-6FC3-485B-9764-EAC9E56C1D49}" type="datetimeFigureOut">
               <a:rPr lang="en-US" smtClean="0"/>
-              <a:t>3/16/17</a:t>
+              <a:t>3/23/2017</a:t>
             </a:fld>
             <a:endParaRPr lang="en-US"/>
           </a:p>
@@ -2117,7 +2117,7 @@
           <a:p>
             <a:fld id="{78C97017-6FC3-485B-9764-EAC9E56C1D49}" type="datetimeFigureOut">
               <a:rPr lang="en-US" smtClean="0"/>
-              <a:t>3/16/17</a:t>
+              <a:t>3/23/2017</a:t>
             </a:fld>
             <a:endParaRPr lang="en-US"/>
           </a:p>
@@ -2234,7 +2234,7 @@
           <a:p>
             <a:fld id="{78C97017-6FC3-485B-9764-EAC9E56C1D49}" type="datetimeFigureOut">
               <a:rPr lang="en-US" smtClean="0"/>
-              <a:t>3/16/17</a:t>
+              <a:t>3/23/2017</a:t>
             </a:fld>
             <a:endParaRPr lang="en-US"/>
           </a:p>
@@ -2329,7 +2329,7 @@
           <a:p>
             <a:fld id="{78C97017-6FC3-485B-9764-EAC9E56C1D49}" type="datetimeFigureOut">
               <a:rPr lang="en-US" smtClean="0"/>
-              <a:t>3/16/17</a:t>
+              <a:t>3/23/2017</a:t>
             </a:fld>
             <a:endParaRPr lang="en-US"/>
           </a:p>
@@ -2604,7 +2604,7 @@
           <a:p>
             <a:fld id="{78C97017-6FC3-485B-9764-EAC9E56C1D49}" type="datetimeFigureOut">
               <a:rPr lang="en-US" smtClean="0"/>
-              <a:t>3/16/17</a:t>
+              <a:t>3/23/2017</a:t>
             </a:fld>
             <a:endParaRPr lang="en-US"/>
           </a:p>
@@ -2856,7 +2856,7 @@
           <a:p>
             <a:fld id="{78C97017-6FC3-485B-9764-EAC9E56C1D49}" type="datetimeFigureOut">
               <a:rPr lang="en-US" smtClean="0"/>
-              <a:t>3/16/17</a:t>
+              <a:t>3/23/2017</a:t>
             </a:fld>
             <a:endParaRPr lang="en-US"/>
           </a:p>
@@ -3072,7 +3072,7 @@
           <a:p>
             <a:fld id="{78C97017-6FC3-485B-9764-EAC9E56C1D49}" type="datetimeFigureOut">
               <a:rPr lang="en-US" smtClean="0"/>
-              <a:t>3/16/17</a:t>
+              <a:t>3/23/2017</a:t>
             </a:fld>
             <a:endParaRPr lang="en-US"/>
           </a:p>
@@ -3455,8 +3455,8 @@
         </p:nvSpPr>
         <p:spPr>
           <a:xfrm>
-            <a:off x="1119865" y="1727200"/>
-            <a:ext cx="7490735" cy="2997200"/>
+            <a:off x="775254" y="1676399"/>
+            <a:ext cx="7848600" cy="3436557"/>
           </a:xfrm>
           <a:prstGeom prst="roundRect">
             <a:avLst>
@@ -3516,7 +3516,7 @@
         </p:nvSpPr>
         <p:spPr>
           <a:xfrm>
-            <a:off x="2877180" y="3158440"/>
+            <a:off x="2877180" y="3838076"/>
             <a:ext cx="1093635" cy="346760"/>
           </a:xfrm>
           <a:prstGeom prst="rect">
@@ -3575,8 +3575,8 @@
         </p:nvSpPr>
         <p:spPr>
           <a:xfrm rot="16200000">
-            <a:off x="1683963" y="2868687"/>
-            <a:ext cx="1093635" cy="346760"/>
+            <a:off x="1170456" y="3206875"/>
+            <a:ext cx="1773889" cy="346760"/>
           </a:xfrm>
           <a:prstGeom prst="rect">
             <a:avLst/>
@@ -3671,19 +3671,20 @@
         <p:nvCxnSpPr>
           <p:cNvPr id="107" name="Elbow Connector 106"/>
           <p:cNvCxnSpPr>
+            <a:cxnSpLocks/>
             <a:stCxn id="9" idx="1"/>
+            <a:endCxn id="62" idx="2"/>
           </p:cNvCxnSpPr>
           <p:nvPr/>
         </p:nvCxnSpPr>
         <p:spPr>
           <a:xfrm rot="5400000" flipH="1" flipV="1">
-            <a:off x="4360065" y="1080909"/>
-            <a:ext cx="378691" cy="4637261"/>
-          </a:xfrm>
-          <a:prstGeom prst="bentConnector4">
+            <a:off x="3831398" y="1430828"/>
+            <a:ext cx="1062374" cy="4610369"/>
+          </a:xfrm>
+          <a:prstGeom prst="bentConnector3">
             <a:avLst>
-              <a:gd name="adj1" fmla="val -101829"/>
-              <a:gd name="adj2" fmla="val 99976"/>
+              <a:gd name="adj1" fmla="val -17560"/>
             </a:avLst>
           </a:prstGeom>
           <a:ln w="19050">
@@ -3719,7 +3720,7 @@
         </p:nvSpPr>
         <p:spPr>
           <a:xfrm rot="16200000">
-            <a:off x="956202" y="2861202"/>
+            <a:off x="827220" y="2861202"/>
             <a:ext cx="1093635" cy="346760"/>
           </a:xfrm>
           <a:prstGeom prst="rect">
@@ -3789,7 +3790,7 @@
         </p:nvSpPr>
         <p:spPr>
           <a:xfrm rot="16200000">
-            <a:off x="1626910" y="2952291"/>
+            <a:off x="1518640" y="2952291"/>
             <a:ext cx="270504" cy="175523"/>
           </a:xfrm>
           <a:prstGeom prst="triangle">
@@ -3839,8 +3840,8 @@
         </p:nvCxnSpPr>
         <p:spPr>
           <a:xfrm>
-            <a:off x="2656370" y="3326536"/>
-            <a:ext cx="220810" cy="5284"/>
+            <a:off x="2470722" y="4003873"/>
+            <a:ext cx="406458" cy="7583"/>
           </a:xfrm>
           <a:prstGeom prst="straightConnector1">
             <a:avLst/>
@@ -3923,13 +3924,16 @@
       <p:cxnSp>
         <p:nvCxnSpPr>
           <p:cNvPr id="75" name="Elbow Connector 122"/>
-          <p:cNvCxnSpPr/>
+          <p:cNvCxnSpPr>
+            <a:cxnSpLocks/>
+            <a:endCxn id="119" idx="0"/>
+          </p:cNvCxnSpPr>
           <p:nvPr/>
         </p:nvCxnSpPr>
         <p:spPr>
-          <a:xfrm>
-            <a:off x="910091" y="3040053"/>
-            <a:ext cx="419548" cy="2860"/>
+          <a:xfrm flipV="1">
+            <a:off x="741917" y="3034582"/>
+            <a:ext cx="458741" cy="5471"/>
           </a:xfrm>
           <a:prstGeom prst="bentConnector3">
             <a:avLst>
@@ -3967,14 +3971,15 @@
         <p:nvCxnSpPr>
           <p:cNvPr id="21" name="Straight Connector 20"/>
           <p:cNvCxnSpPr>
+            <a:cxnSpLocks/>
             <a:stCxn id="120" idx="3"/>
           </p:cNvCxnSpPr>
           <p:nvPr/>
         </p:nvCxnSpPr>
         <p:spPr>
-          <a:xfrm flipV="1">
-            <a:off x="1849924" y="3040052"/>
-            <a:ext cx="216105" cy="1"/>
+          <a:xfrm>
+            <a:off x="1741654" y="3040053"/>
+            <a:ext cx="212845" cy="0"/>
           </a:xfrm>
           <a:prstGeom prst="line">
             <a:avLst/>
@@ -4012,7 +4017,7 @@
         </p:nvSpPr>
         <p:spPr>
           <a:xfrm>
-            <a:off x="2420322" y="3239846"/>
+            <a:off x="2234674" y="3917183"/>
             <a:ext cx="236048" cy="173380"/>
           </a:xfrm>
           <a:prstGeom prst="flowChartDecision">
@@ -4109,15 +4114,16 @@
         <p:nvCxnSpPr>
           <p:cNvPr id="47" name="Straight Arrow Connector 46"/>
           <p:cNvCxnSpPr>
+            <a:cxnSpLocks/>
             <a:stCxn id="48" idx="3"/>
             <a:endCxn id="46" idx="1"/>
           </p:cNvCxnSpPr>
           <p:nvPr/>
         </p:nvCxnSpPr>
         <p:spPr>
-          <a:xfrm>
-            <a:off x="2658680" y="2795516"/>
-            <a:ext cx="220810" cy="5284"/>
+          <a:xfrm flipV="1">
+            <a:off x="2470722" y="2800800"/>
+            <a:ext cx="408768" cy="2527"/>
           </a:xfrm>
           <a:prstGeom prst="straightConnector1">
             <a:avLst/>
@@ -4154,7 +4160,7 @@
         </p:nvSpPr>
         <p:spPr>
           <a:xfrm>
-            <a:off x="2422632" y="2708826"/>
+            <a:off x="2234674" y="2716637"/>
             <a:ext cx="236048" cy="173380"/>
           </a:xfrm>
           <a:prstGeom prst="flowChartDecision">
@@ -4797,8 +4803,8 @@
         </p:nvSpPr>
         <p:spPr>
           <a:xfrm>
-            <a:off x="7712397" y="2243052"/>
-            <a:ext cx="708186" cy="285783"/>
+            <a:off x="7712396" y="2243052"/>
+            <a:ext cx="745803" cy="285783"/>
           </a:xfrm>
           <a:prstGeom prst="rect">
             <a:avLst/>
@@ -4896,6 +4902,7 @@
         <p:nvCxnSpPr>
           <p:cNvPr id="79" name="Elbow Connector 78"/>
           <p:cNvCxnSpPr>
+            <a:cxnSpLocks/>
             <a:stCxn id="78" idx="3"/>
             <a:endCxn id="76" idx="1"/>
           </p:cNvCxnSpPr>
@@ -4904,7 +4911,7 @@
         <p:spPr>
           <a:xfrm flipV="1">
             <a:off x="7277995" y="2385944"/>
-            <a:ext cx="434402" cy="648947"/>
+            <a:ext cx="434401" cy="648947"/>
           </a:xfrm>
           <a:prstGeom prst="bentConnector3">
             <a:avLst/>
@@ -4941,8 +4948,8 @@
         </p:nvSpPr>
         <p:spPr>
           <a:xfrm>
-            <a:off x="7712397" y="2566030"/>
-            <a:ext cx="708186" cy="285783"/>
+            <a:off x="7712396" y="2566030"/>
+            <a:ext cx="745803" cy="285783"/>
           </a:xfrm>
           <a:prstGeom prst="rect">
             <a:avLst/>
@@ -4993,6 +5000,7 @@
         <p:nvCxnSpPr>
           <p:cNvPr id="81" name="Elbow Connector 80"/>
           <p:cNvCxnSpPr>
+            <a:cxnSpLocks/>
             <a:stCxn id="78" idx="3"/>
             <a:endCxn id="80" idx="1"/>
           </p:cNvCxnSpPr>
@@ -5001,7 +5009,7 @@
         <p:spPr>
           <a:xfrm flipV="1">
             <a:off x="7277995" y="2708922"/>
-            <a:ext cx="434402" cy="325969"/>
+            <a:ext cx="434401" cy="325969"/>
           </a:xfrm>
           <a:prstGeom prst="bentConnector3">
             <a:avLst/>
@@ -5038,8 +5046,8 @@
         </p:nvSpPr>
         <p:spPr>
           <a:xfrm>
-            <a:off x="7712397" y="2889008"/>
-            <a:ext cx="708186" cy="285783"/>
+            <a:off x="7712396" y="2889008"/>
+            <a:ext cx="745803" cy="285783"/>
           </a:xfrm>
           <a:prstGeom prst="rect">
             <a:avLst/>
@@ -5090,6 +5098,7 @@
         <p:nvCxnSpPr>
           <p:cNvPr id="84" name="Elbow Connector 83"/>
           <p:cNvCxnSpPr>
+            <a:cxnSpLocks/>
             <a:stCxn id="78" idx="3"/>
             <a:endCxn id="83" idx="1"/>
           </p:cNvCxnSpPr>
@@ -5098,7 +5107,7 @@
         <p:spPr>
           <a:xfrm flipV="1">
             <a:off x="7277995" y="3031900"/>
-            <a:ext cx="434402" cy="2991"/>
+            <a:ext cx="434401" cy="2991"/>
           </a:xfrm>
           <a:prstGeom prst="bentConnector3">
             <a:avLst/>
@@ -5135,8 +5144,8 @@
         </p:nvSpPr>
         <p:spPr>
           <a:xfrm>
-            <a:off x="7712397" y="3211985"/>
-            <a:ext cx="708186" cy="285783"/>
+            <a:off x="7712396" y="3211985"/>
+            <a:ext cx="745803" cy="285783"/>
           </a:xfrm>
           <a:prstGeom prst="rect">
             <a:avLst/>
@@ -5187,6 +5196,7 @@
         <p:nvCxnSpPr>
           <p:cNvPr id="86" name="Elbow Connector 85"/>
           <p:cNvCxnSpPr>
+            <a:cxnSpLocks/>
             <a:stCxn id="78" idx="3"/>
             <a:endCxn id="85" idx="1"/>
           </p:cNvCxnSpPr>
@@ -5195,7 +5205,7 @@
         <p:spPr>
           <a:xfrm>
             <a:off x="7277995" y="3034891"/>
-            <a:ext cx="434402" cy="319986"/>
+            <a:ext cx="434401" cy="319986"/>
           </a:xfrm>
           <a:prstGeom prst="bentConnector3">
             <a:avLst/>
@@ -5228,14 +5238,16 @@
         <p:nvCxnSpPr>
           <p:cNvPr id="97" name="Elbow Connector 63"/>
           <p:cNvCxnSpPr>
+            <a:cxnSpLocks/>
             <a:stCxn id="99" idx="3"/>
+            <a:endCxn id="46" idx="2"/>
           </p:cNvCxnSpPr>
           <p:nvPr/>
         </p:nvCxnSpPr>
         <p:spPr>
-          <a:xfrm rot="16200000" flipH="1">
-            <a:off x="3279321" y="2485431"/>
-            <a:ext cx="293825" cy="1"/>
+          <a:xfrm rot="5400000" flipH="1" flipV="1">
+            <a:off x="3337835" y="3059733"/>
+            <a:ext cx="174025" cy="2921"/>
           </a:xfrm>
           <a:prstGeom prst="bentConnector3">
             <a:avLst>
@@ -5274,8 +5286,8 @@
           <p:nvPr/>
         </p:nvSpPr>
         <p:spPr>
-          <a:xfrm rot="10800000" flipV="1">
-            <a:off x="3290981" y="2162997"/>
+          <a:xfrm flipV="1">
+            <a:off x="3288135" y="3148205"/>
             <a:ext cx="270504" cy="175523"/>
           </a:xfrm>
           <a:prstGeom prst="triangle">
@@ -5323,8 +5335,8 @@
         </p:nvSpPr>
         <p:spPr>
           <a:xfrm>
-            <a:off x="2660303" y="1806470"/>
-            <a:ext cx="1539926" cy="346760"/>
+            <a:off x="2703466" y="3321511"/>
+            <a:ext cx="1439840" cy="346760"/>
           </a:xfrm>
           <a:prstGeom prst="rect">
             <a:avLst/>
@@ -5433,7 +5445,7 @@
         </p:nvSpPr>
         <p:spPr>
           <a:xfrm>
-            <a:off x="2057400" y="4239491"/>
+            <a:off x="2025856" y="4612375"/>
             <a:ext cx="1775949" cy="346760"/>
           </a:xfrm>
           <a:prstGeom prst="rect">
@@ -5500,6 +5512,7 @@
         <p:nvCxnSpPr>
           <p:cNvPr id="124" name="Elbow Connector 122"/>
           <p:cNvCxnSpPr>
+            <a:cxnSpLocks/>
             <a:stCxn id="119" idx="1"/>
             <a:endCxn id="122" idx="1"/>
           </p:cNvCxnSpPr>
@@ -5507,8 +5520,8 @@
         </p:nvCxnSpPr>
         <p:spPr>
           <a:xfrm rot="16200000" flipH="1">
-            <a:off x="1364475" y="3719945"/>
-            <a:ext cx="831471" cy="554380"/>
+            <a:off x="1097770" y="3857668"/>
+            <a:ext cx="1204355" cy="651818"/>
           </a:xfrm>
           <a:prstGeom prst="bentConnector2">
             <a:avLst/>
@@ -5821,7 +5834,7 @@
         </p:nvSpPr>
         <p:spPr>
           <a:xfrm>
-            <a:off x="2656370" y="3386050"/>
+            <a:off x="2656370" y="4065686"/>
             <a:ext cx="189257" cy="178683"/>
           </a:xfrm>
           <a:prstGeom prst="rect">
@@ -5900,7 +5913,7 @@
         <p:spPr>
           <a:xfrm>
             <a:off x="7716762" y="3541389"/>
-            <a:ext cx="708186" cy="285783"/>
+            <a:ext cx="741438" cy="285783"/>
           </a:xfrm>
           <a:prstGeom prst="rect">
             <a:avLst/>
@@ -5932,12 +5945,12 @@
           <a:p>
             <a:pPr algn="ctr"/>
             <a:r>
-              <a:rPr lang="en-US" sz="1050" dirty="0" err="1" smtClean="0">
+              <a:rPr lang="en-US" sz="1050" dirty="0" err="1">
                 <a:solidFill>
                   <a:srgbClr val="7030A0"/>
                 </a:solidFill>
               </a:rPr>
-              <a:t>EndTime</a:t>
+              <a:t>DateTime</a:t>
             </a:r>
             <a:endParaRPr lang="en-SG" sz="1050" dirty="0">
               <a:solidFill>
@@ -5947,16 +5960,97 @@
           </a:p>
         </p:txBody>
       </p:sp>
-      <p:sp>
-        <p:nvSpPr>
-          <p:cNvPr id="73" name="Rectangle 8"/>
+      <p:cxnSp>
+        <p:nvCxnSpPr>
+          <p:cNvPr id="74" name="Elbow Connector 73"/>
+          <p:cNvCxnSpPr>
+            <a:cxnSpLocks/>
+            <a:stCxn id="78" idx="3"/>
+            <a:endCxn id="55" idx="1"/>
+          </p:cNvCxnSpPr>
+          <p:nvPr/>
+        </p:nvCxnSpPr>
+        <p:spPr>
+          <a:xfrm>
+            <a:off x="7277995" y="3034891"/>
+            <a:ext cx="438767" cy="649390"/>
+          </a:xfrm>
+          <a:prstGeom prst="bentConnector3">
+            <a:avLst/>
+          </a:prstGeom>
+          <a:ln w="19050">
+            <a:solidFill>
+              <a:srgbClr val="7030A0"/>
+            </a:solidFill>
+            <a:headEnd type="none" w="med" len="med"/>
+            <a:tailEnd type="arrow" w="med" len="med"/>
+          </a:ln>
+          <a:effectLst/>
+        </p:spPr>
+        <p:style>
+          <a:lnRef idx="1">
+            <a:schemeClr val="accent2"/>
+          </a:lnRef>
+          <a:fillRef idx="2">
+            <a:schemeClr val="accent2"/>
+          </a:fillRef>
+          <a:effectRef idx="1">
+            <a:schemeClr val="accent2"/>
+          </a:effectRef>
+          <a:fontRef idx="minor">
+            <a:schemeClr val="dk1"/>
+          </a:fontRef>
+        </p:style>
+      </p:cxnSp>
+      <p:sp>
+        <p:nvSpPr>
+          <p:cNvPr id="77" name="TextBox 76"/>
+          <p:cNvSpPr txBox="1"/>
+          <p:nvPr/>
+        </p:nvSpPr>
+        <p:spPr>
+          <a:xfrm>
+            <a:off x="7523139" y="3721483"/>
+            <a:ext cx="189257" cy="178683"/>
+          </a:xfrm>
+          <a:prstGeom prst="rect">
+            <a:avLst/>
+          </a:prstGeom>
+          <a:noFill/>
+        </p:spPr>
+        <p:txBody>
+          <a:bodyPr wrap="square" lIns="0" tIns="0" rIns="0" bIns="0" rtlCol="0">
+            <a:noAutofit/>
+          </a:bodyPr>
+          <a:lstStyle/>
+          <a:p>
+            <a:pPr algn="ctr"/>
+            <a:r>
+              <a:rPr lang="en-US" sz="1100" dirty="0">
+                <a:solidFill>
+                  <a:srgbClr val="7030A0"/>
+                </a:solidFill>
+              </a:rPr>
+              <a:t>2</a:t>
+            </a:r>
+            <a:endParaRPr lang="en-SG" sz="1100" dirty="0">
+              <a:solidFill>
+                <a:srgbClr val="7030A0"/>
+              </a:solidFill>
+            </a:endParaRPr>
+          </a:p>
+        </p:txBody>
+      </p:sp>
+      <p:sp>
+        <p:nvSpPr>
+          <p:cNvPr id="87" name="Rectangle 8"/>
           <p:cNvSpPr/>
           <p:nvPr/>
         </p:nvSpPr>
         <p:spPr>
           <a:xfrm>
-            <a:off x="7718469" y="3868558"/>
-            <a:ext cx="708186" cy="285783"/>
+            <a:off x="2365564" y="1809332"/>
+            <a:ext cx="627468" cy="346760"/>
           </a:xfrm>
           <a:prstGeom prst="rect">
             <a:avLst/>
@@ -5988,14 +6082,14 @@
           <a:p>
             <a:pPr algn="ctr"/>
             <a:r>
-              <a:rPr lang="en-US" sz="1000" dirty="0" err="1" smtClean="0">
+              <a:rPr lang="en-US" sz="1050" dirty="0">
                 <a:solidFill>
                   <a:srgbClr val="7030A0"/>
                 </a:solidFill>
               </a:rPr>
-              <a:t>StartTime</a:t>
-            </a:r>
-            <a:endParaRPr lang="en-SG" sz="1000" dirty="0">
+              <a:t>History</a:t>
+            </a:r>
+            <a:endParaRPr lang="en-SG" sz="1050" dirty="0">
               <a:solidFill>
                 <a:srgbClr val="7030A0"/>
               </a:solidFill>
@@ -6003,21 +6097,106 @@
           </a:p>
         </p:txBody>
       </p:sp>
+      <p:sp>
+        <p:nvSpPr>
+          <p:cNvPr id="89" name="TextBox 88"/>
+          <p:cNvSpPr txBox="1"/>
+          <p:nvPr/>
+        </p:nvSpPr>
+        <p:spPr>
+          <a:xfrm>
+            <a:off x="2155839" y="2041480"/>
+            <a:ext cx="189257" cy="178683"/>
+          </a:xfrm>
+          <a:prstGeom prst="rect">
+            <a:avLst/>
+          </a:prstGeom>
+          <a:noFill/>
+        </p:spPr>
+        <p:txBody>
+          <a:bodyPr wrap="square" lIns="0" tIns="0" rIns="0" bIns="0" rtlCol="0">
+            <a:noAutofit/>
+          </a:bodyPr>
+          <a:lstStyle/>
+          <a:p>
+            <a:pPr algn="ctr"/>
+            <a:r>
+              <a:rPr lang="en-US" sz="1100" dirty="0">
+                <a:solidFill>
+                  <a:srgbClr val="7030A0"/>
+                </a:solidFill>
+              </a:rPr>
+              <a:t>1</a:t>
+            </a:r>
+            <a:endParaRPr lang="en-SG" sz="1100" dirty="0">
+              <a:solidFill>
+                <a:srgbClr val="7030A0"/>
+              </a:solidFill>
+            </a:endParaRPr>
+          </a:p>
+        </p:txBody>
+      </p:sp>
+      <p:sp>
+        <p:nvSpPr>
+          <p:cNvPr id="93" name="Flowchart: Decision 96"/>
+          <p:cNvSpPr/>
+          <p:nvPr/>
+        </p:nvSpPr>
+        <p:spPr>
+          <a:xfrm>
+            <a:off x="2998834" y="1895833"/>
+            <a:ext cx="236048" cy="173380"/>
+          </a:xfrm>
+          <a:prstGeom prst="flowChartDecision">
+            <a:avLst/>
+          </a:prstGeom>
+          <a:noFill/>
+          <a:ln w="19050">
+            <a:solidFill>
+              <a:srgbClr val="7030A0"/>
+            </a:solidFill>
+          </a:ln>
+          <a:effectLst/>
+        </p:spPr>
+        <p:style>
+          <a:lnRef idx="1">
+            <a:schemeClr val="accent6"/>
+          </a:lnRef>
+          <a:fillRef idx="2">
+            <a:schemeClr val="accent6"/>
+          </a:fillRef>
+          <a:effectRef idx="1">
+            <a:schemeClr val="accent6"/>
+          </a:effectRef>
+          <a:fontRef idx="minor">
+            <a:schemeClr val="dk1"/>
+          </a:fontRef>
+        </p:style>
+        <p:txBody>
+          <a:bodyPr rtlCol="0" anchor="ctr"/>
+          <a:lstStyle/>
+          <a:p>
+            <a:pPr algn="ctr"/>
+            <a:endParaRPr lang="en-US" sz="1050"/>
+          </a:p>
+        </p:txBody>
+      </p:sp>
       <p:cxnSp>
         <p:nvCxnSpPr>
-          <p:cNvPr id="74" name="Elbow Connector 73"/>
+          <p:cNvPr id="95" name="Elbow Connector 49"/>
           <p:cNvCxnSpPr>
-            <a:stCxn id="78" idx="3"/>
-            <a:endCxn id="55" idx="1"/>
+            <a:cxnSpLocks/>
+            <a:stCxn id="9" idx="3"/>
+            <a:endCxn id="87" idx="1"/>
           </p:cNvCxnSpPr>
           <p:nvPr/>
         </p:nvCxnSpPr>
         <p:spPr>
-          <a:xfrm>
-            <a:off x="7277995" y="3034891"/>
-            <a:ext cx="438767" cy="649390"/>
-          </a:xfrm>
-          <a:prstGeom prst="bentConnector3">
+          <a:xfrm rot="5400000" flipH="1" flipV="1">
+            <a:off x="1956183" y="2083931"/>
+            <a:ext cx="510599" cy="308163"/>
+          </a:xfrm>
+          <a:prstGeom prst="bentConnector2">
             <a:avLst/>
           </a:prstGeom>
           <a:ln w="19050">
@@ -6046,22 +6225,20 @@
       </p:cxnSp>
       <p:cxnSp>
         <p:nvCxnSpPr>
-          <p:cNvPr id="82" name="Elbow Connector 81"/>
+          <p:cNvPr id="98" name="Elbow Connector 49"/>
           <p:cNvCxnSpPr>
-            <a:stCxn id="78" idx="3"/>
-            <a:endCxn id="73" idx="1"/>
+            <a:cxnSpLocks/>
+            <a:stCxn id="93" idx="3"/>
           </p:cNvCxnSpPr>
           <p:nvPr/>
         </p:nvCxnSpPr>
         <p:spPr>
           <a:xfrm>
-            <a:off x="7277995" y="3034891"/>
-            <a:ext cx="440474" cy="976559"/>
-          </a:xfrm>
-          <a:prstGeom prst="bentConnector3">
-            <a:avLst>
-              <a:gd name="adj1" fmla="val 50000"/>
-            </a:avLst>
+            <a:off x="3234882" y="1982523"/>
+            <a:ext cx="192551" cy="647037"/>
+          </a:xfrm>
+          <a:prstGeom prst="bentConnector2">
+            <a:avLst/>
           </a:prstGeom>
           <a:ln w="19050">
             <a:solidFill>
@@ -6087,6 +6264,45 @@
           </a:fontRef>
         </p:style>
       </p:cxnSp>
+      <p:sp>
+        <p:nvSpPr>
+          <p:cNvPr id="121" name="TextBox 120"/>
+          <p:cNvSpPr txBox="1"/>
+          <p:nvPr/>
+        </p:nvSpPr>
+        <p:spPr>
+          <a:xfrm>
+            <a:off x="3205106" y="2451066"/>
+            <a:ext cx="189257" cy="178683"/>
+          </a:xfrm>
+          <a:prstGeom prst="rect">
+            <a:avLst/>
+          </a:prstGeom>
+          <a:noFill/>
+        </p:spPr>
+        <p:txBody>
+          <a:bodyPr wrap="square" lIns="0" tIns="0" rIns="0" bIns="0" rtlCol="0">
+            <a:noAutofit/>
+          </a:bodyPr>
+          <a:lstStyle/>
+          <a:p>
+            <a:pPr algn="ctr"/>
+            <a:r>
+              <a:rPr lang="en-US" sz="1100" dirty="0">
+                <a:solidFill>
+                  <a:srgbClr val="7030A0"/>
+                </a:solidFill>
+              </a:rPr>
+              <a:t>*</a:t>
+            </a:r>
+            <a:endParaRPr lang="en-SG" sz="1100" dirty="0">
+              <a:solidFill>
+                <a:srgbClr val="7030A0"/>
+              </a:solidFill>
+            </a:endParaRPr>
+          </a:p>
+        </p:txBody>
+      </p:sp>
     </p:spTree>
     <p:extLst>
       <p:ext uri="{BB962C8B-B14F-4D97-AF65-F5344CB8AC3E}">

</xml_diff>

<commit_message>
Upload .ppt for model, storage and UI
</commit_message>
<xml_diff>
--- a/docs/diagrams/ModelComponentClassDiagram.pptx
+++ b/docs/diagrams/ModelComponentClassDiagram.pptx
@@ -107,6 +107,22 @@
       </a:defRPr>
     </a:lvl9pPr>
   </p:defaultTextStyle>
+  <p:extLst>
+    <p:ext uri="{EFAFB233-063F-42B5-8137-9DF3F51BA10A}">
+      <p15:sldGuideLst xmlns:p15="http://schemas.microsoft.com/office/powerpoint/2012/main">
+        <p15:guide id="1" orient="horz" pos="1488">
+          <p15:clr>
+            <a:srgbClr val="A4A3A4"/>
+          </p15:clr>
+        </p15:guide>
+        <p15:guide id="2" pos="2880">
+          <p15:clr>
+            <a:srgbClr val="A4A3A4"/>
+          </p15:clr>
+        </p15:guide>
+      </p15:sldGuideLst>
+    </p:ext>
+  </p:extLst>
 </p:presentation>
 </file>
 
@@ -192,7 +208,7 @@
           <a:p>
             <a:fld id="{F5CC4B3F-88C1-4FFA-B1B6-F41C21DC6924}" type="datetimeFigureOut">
               <a:rPr lang="en-US" smtClean="0"/>
-              <a:t>11/19/2016</a:t>
+              <a:t>3/23/2017</a:t>
             </a:fld>
             <a:endParaRPr lang="en-US"/>
           </a:p>
@@ -256,38 +272,37 @@
           <a:p>
             <a:pPr lvl="0"/>
             <a:r>
-              <a:rPr lang="en-US" smtClean="0"/>
+              <a:rPr lang="en-US"/>
               <a:t>Click to edit Master text styles</a:t>
             </a:r>
           </a:p>
           <a:p>
             <a:pPr lvl="1"/>
             <a:r>
-              <a:rPr lang="en-US" smtClean="0"/>
+              <a:rPr lang="en-US"/>
               <a:t>Second level</a:t>
             </a:r>
           </a:p>
           <a:p>
             <a:pPr lvl="2"/>
             <a:r>
-              <a:rPr lang="en-US" smtClean="0"/>
+              <a:rPr lang="en-US"/>
               <a:t>Third level</a:t>
             </a:r>
           </a:p>
           <a:p>
             <a:pPr lvl="3"/>
             <a:r>
-              <a:rPr lang="en-US" smtClean="0"/>
+              <a:rPr lang="en-US"/>
               <a:t>Fourth level</a:t>
             </a:r>
           </a:p>
           <a:p>
             <a:pPr lvl="4"/>
             <a:r>
-              <a:rPr lang="en-US" smtClean="0"/>
+              <a:rPr lang="en-US"/>
               <a:t>Fifth level</a:t>
             </a:r>
-            <a:endParaRPr lang="en-US"/>
           </a:p>
         </p:txBody>
       </p:sp>
@@ -498,10 +513,9 @@
           <a:lstStyle/>
           <a:p>
             <a:r>
-              <a:rPr lang="en-US" smtClean="0"/>
+              <a:rPr lang="en-US"/>
               <a:t>Click to edit Master title style</a:t>
             </a:r>
-            <a:endParaRPr lang="en-US"/>
           </a:p>
         </p:txBody>
       </p:sp>
@@ -617,10 +631,9 @@
           </a:lstStyle>
           <a:p>
             <a:r>
-              <a:rPr lang="en-US" smtClean="0"/>
+              <a:rPr lang="en-US"/>
               <a:t>Click to edit Master subtitle style</a:t>
             </a:r>
-            <a:endParaRPr lang="en-US"/>
           </a:p>
         </p:txBody>
       </p:sp>
@@ -641,7 +654,7 @@
           <a:p>
             <a:fld id="{78C97017-6FC3-485B-9764-EAC9E56C1D49}" type="datetimeFigureOut">
               <a:rPr lang="en-US" smtClean="0"/>
-              <a:t>11/19/2016</a:t>
+              <a:t>3/23/2017</a:t>
             </a:fld>
             <a:endParaRPr lang="en-US"/>
           </a:p>
@@ -735,10 +748,9 @@
           <a:lstStyle/>
           <a:p>
             <a:r>
-              <a:rPr lang="en-US" smtClean="0"/>
+              <a:rPr lang="en-US"/>
               <a:t>Click to edit Master title style</a:t>
             </a:r>
-            <a:endParaRPr lang="en-US"/>
           </a:p>
         </p:txBody>
       </p:sp>
@@ -759,38 +771,37 @@
           <a:p>
             <a:pPr lvl="0"/>
             <a:r>
-              <a:rPr lang="en-US" smtClean="0"/>
+              <a:rPr lang="en-US"/>
               <a:t>Click to edit Master text styles</a:t>
             </a:r>
           </a:p>
           <a:p>
             <a:pPr lvl="1"/>
             <a:r>
-              <a:rPr lang="en-US" smtClean="0"/>
+              <a:rPr lang="en-US"/>
               <a:t>Second level</a:t>
             </a:r>
           </a:p>
           <a:p>
             <a:pPr lvl="2"/>
             <a:r>
-              <a:rPr lang="en-US" smtClean="0"/>
+              <a:rPr lang="en-US"/>
               <a:t>Third level</a:t>
             </a:r>
           </a:p>
           <a:p>
             <a:pPr lvl="3"/>
             <a:r>
-              <a:rPr lang="en-US" smtClean="0"/>
+              <a:rPr lang="en-US"/>
               <a:t>Fourth level</a:t>
             </a:r>
           </a:p>
           <a:p>
             <a:pPr lvl="4"/>
             <a:r>
-              <a:rPr lang="en-US" smtClean="0"/>
+              <a:rPr lang="en-US"/>
               <a:t>Fifth level</a:t>
             </a:r>
-            <a:endParaRPr lang="en-US"/>
           </a:p>
         </p:txBody>
       </p:sp>
@@ -811,7 +822,7 @@
           <a:p>
             <a:fld id="{78C97017-6FC3-485B-9764-EAC9E56C1D49}" type="datetimeFigureOut">
               <a:rPr lang="en-US" smtClean="0"/>
-              <a:t>11/19/2016</a:t>
+              <a:t>3/23/2017</a:t>
             </a:fld>
             <a:endParaRPr lang="en-US"/>
           </a:p>
@@ -910,10 +921,9 @@
           <a:lstStyle/>
           <a:p>
             <a:r>
-              <a:rPr lang="en-US" smtClean="0"/>
+              <a:rPr lang="en-US"/>
               <a:t>Click to edit Master title style</a:t>
             </a:r>
-            <a:endParaRPr lang="en-US"/>
           </a:p>
         </p:txBody>
       </p:sp>
@@ -939,38 +949,37 @@
           <a:p>
             <a:pPr lvl="0"/>
             <a:r>
-              <a:rPr lang="en-US" smtClean="0"/>
+              <a:rPr lang="en-US"/>
               <a:t>Click to edit Master text styles</a:t>
             </a:r>
           </a:p>
           <a:p>
             <a:pPr lvl="1"/>
             <a:r>
-              <a:rPr lang="en-US" smtClean="0"/>
+              <a:rPr lang="en-US"/>
               <a:t>Second level</a:t>
             </a:r>
           </a:p>
           <a:p>
             <a:pPr lvl="2"/>
             <a:r>
-              <a:rPr lang="en-US" smtClean="0"/>
+              <a:rPr lang="en-US"/>
               <a:t>Third level</a:t>
             </a:r>
           </a:p>
           <a:p>
             <a:pPr lvl="3"/>
             <a:r>
-              <a:rPr lang="en-US" smtClean="0"/>
+              <a:rPr lang="en-US"/>
               <a:t>Fourth level</a:t>
             </a:r>
           </a:p>
           <a:p>
             <a:pPr lvl="4"/>
             <a:r>
-              <a:rPr lang="en-US" smtClean="0"/>
+              <a:rPr lang="en-US"/>
               <a:t>Fifth level</a:t>
             </a:r>
-            <a:endParaRPr lang="en-US"/>
           </a:p>
         </p:txBody>
       </p:sp>
@@ -991,7 +1000,7 @@
           <a:p>
             <a:fld id="{78C97017-6FC3-485B-9764-EAC9E56C1D49}" type="datetimeFigureOut">
               <a:rPr lang="en-US" smtClean="0"/>
-              <a:t>11/19/2016</a:t>
+              <a:t>3/23/2017</a:t>
             </a:fld>
             <a:endParaRPr lang="en-US"/>
           </a:p>
@@ -1085,10 +1094,9 @@
           <a:lstStyle/>
           <a:p>
             <a:r>
-              <a:rPr lang="en-US" smtClean="0"/>
+              <a:rPr lang="en-US"/>
               <a:t>Click to edit Master title style</a:t>
             </a:r>
-            <a:endParaRPr lang="en-US"/>
           </a:p>
         </p:txBody>
       </p:sp>
@@ -1109,38 +1117,37 @@
           <a:p>
             <a:pPr lvl="0"/>
             <a:r>
-              <a:rPr lang="en-US" smtClean="0"/>
+              <a:rPr lang="en-US"/>
               <a:t>Click to edit Master text styles</a:t>
             </a:r>
           </a:p>
           <a:p>
             <a:pPr lvl="1"/>
             <a:r>
-              <a:rPr lang="en-US" smtClean="0"/>
+              <a:rPr lang="en-US"/>
               <a:t>Second level</a:t>
             </a:r>
           </a:p>
           <a:p>
             <a:pPr lvl="2"/>
             <a:r>
-              <a:rPr lang="en-US" smtClean="0"/>
+              <a:rPr lang="en-US"/>
               <a:t>Third level</a:t>
             </a:r>
           </a:p>
           <a:p>
             <a:pPr lvl="3"/>
             <a:r>
-              <a:rPr lang="en-US" smtClean="0"/>
+              <a:rPr lang="en-US"/>
               <a:t>Fourth level</a:t>
             </a:r>
           </a:p>
           <a:p>
             <a:pPr lvl="4"/>
             <a:r>
-              <a:rPr lang="en-US" smtClean="0"/>
+              <a:rPr lang="en-US"/>
               <a:t>Fifth level</a:t>
             </a:r>
-            <a:endParaRPr lang="en-US"/>
           </a:p>
         </p:txBody>
       </p:sp>
@@ -1161,7 +1168,7 @@
           <a:p>
             <a:fld id="{78C97017-6FC3-485B-9764-EAC9E56C1D49}" type="datetimeFigureOut">
               <a:rPr lang="en-US" smtClean="0"/>
-              <a:t>11/19/2016</a:t>
+              <a:t>3/23/2017</a:t>
             </a:fld>
             <a:endParaRPr lang="en-US"/>
           </a:p>
@@ -1264,10 +1271,9 @@
           </a:lstStyle>
           <a:p>
             <a:r>
-              <a:rPr lang="en-US" smtClean="0"/>
+              <a:rPr lang="en-US"/>
               <a:t>Click to edit Master title style</a:t>
             </a:r>
-            <a:endParaRPr lang="en-US"/>
           </a:p>
         </p:txBody>
       </p:sp>
@@ -1384,7 +1390,7 @@
           <a:p>
             <a:pPr lvl="0"/>
             <a:r>
-              <a:rPr lang="en-US" smtClean="0"/>
+              <a:rPr lang="en-US"/>
               <a:t>Click to edit Master text styles</a:t>
             </a:r>
           </a:p>
@@ -1407,7 +1413,7 @@
           <a:p>
             <a:fld id="{78C97017-6FC3-485B-9764-EAC9E56C1D49}" type="datetimeFigureOut">
               <a:rPr lang="en-US" smtClean="0"/>
-              <a:t>11/19/2016</a:t>
+              <a:t>3/23/2017</a:t>
             </a:fld>
             <a:endParaRPr lang="en-US"/>
           </a:p>
@@ -1501,10 +1507,9 @@
           <a:lstStyle/>
           <a:p>
             <a:r>
-              <a:rPr lang="en-US" smtClean="0"/>
+              <a:rPr lang="en-US"/>
               <a:t>Click to edit Master title style</a:t>
             </a:r>
-            <a:endParaRPr lang="en-US"/>
           </a:p>
         </p:txBody>
       </p:sp>
@@ -1558,38 +1563,37 @@
           <a:p>
             <a:pPr lvl="0"/>
             <a:r>
-              <a:rPr lang="en-US" smtClean="0"/>
+              <a:rPr lang="en-US"/>
               <a:t>Click to edit Master text styles</a:t>
             </a:r>
           </a:p>
           <a:p>
             <a:pPr lvl="1"/>
             <a:r>
-              <a:rPr lang="en-US" smtClean="0"/>
+              <a:rPr lang="en-US"/>
               <a:t>Second level</a:t>
             </a:r>
           </a:p>
           <a:p>
             <a:pPr lvl="2"/>
             <a:r>
-              <a:rPr lang="en-US" smtClean="0"/>
+              <a:rPr lang="en-US"/>
               <a:t>Third level</a:t>
             </a:r>
           </a:p>
           <a:p>
             <a:pPr lvl="3"/>
             <a:r>
-              <a:rPr lang="en-US" smtClean="0"/>
+              <a:rPr lang="en-US"/>
               <a:t>Fourth level</a:t>
             </a:r>
           </a:p>
           <a:p>
             <a:pPr lvl="4"/>
             <a:r>
-              <a:rPr lang="en-US" smtClean="0"/>
+              <a:rPr lang="en-US"/>
               <a:t>Fifth level</a:t>
             </a:r>
-            <a:endParaRPr lang="en-US"/>
           </a:p>
         </p:txBody>
       </p:sp>
@@ -1643,38 +1647,37 @@
           <a:p>
             <a:pPr lvl="0"/>
             <a:r>
-              <a:rPr lang="en-US" smtClean="0"/>
+              <a:rPr lang="en-US"/>
               <a:t>Click to edit Master text styles</a:t>
             </a:r>
           </a:p>
           <a:p>
             <a:pPr lvl="1"/>
             <a:r>
-              <a:rPr lang="en-US" smtClean="0"/>
+              <a:rPr lang="en-US"/>
               <a:t>Second level</a:t>
             </a:r>
           </a:p>
           <a:p>
             <a:pPr lvl="2"/>
             <a:r>
-              <a:rPr lang="en-US" smtClean="0"/>
+              <a:rPr lang="en-US"/>
               <a:t>Third level</a:t>
             </a:r>
           </a:p>
           <a:p>
             <a:pPr lvl="3"/>
             <a:r>
-              <a:rPr lang="en-US" smtClean="0"/>
+              <a:rPr lang="en-US"/>
               <a:t>Fourth level</a:t>
             </a:r>
           </a:p>
           <a:p>
             <a:pPr lvl="4"/>
             <a:r>
-              <a:rPr lang="en-US" smtClean="0"/>
+              <a:rPr lang="en-US"/>
               <a:t>Fifth level</a:t>
             </a:r>
-            <a:endParaRPr lang="en-US"/>
           </a:p>
         </p:txBody>
       </p:sp>
@@ -1695,7 +1698,7 @@
           <a:p>
             <a:fld id="{78C97017-6FC3-485B-9764-EAC9E56C1D49}" type="datetimeFigureOut">
               <a:rPr lang="en-US" smtClean="0"/>
-              <a:t>11/19/2016</a:t>
+              <a:t>3/23/2017</a:t>
             </a:fld>
             <a:endParaRPr lang="en-US"/>
           </a:p>
@@ -1793,10 +1796,9 @@
           </a:lstStyle>
           <a:p>
             <a:r>
-              <a:rPr lang="en-US" smtClean="0"/>
+              <a:rPr lang="en-US"/>
               <a:t>Click to edit Master title style</a:t>
             </a:r>
-            <a:endParaRPr lang="en-US"/>
           </a:p>
         </p:txBody>
       </p:sp>
@@ -1859,7 +1861,7 @@
           <a:p>
             <a:pPr lvl="0"/>
             <a:r>
-              <a:rPr lang="en-US" smtClean="0"/>
+              <a:rPr lang="en-US"/>
               <a:t>Click to edit Master text styles</a:t>
             </a:r>
           </a:p>
@@ -1915,38 +1917,37 @@
           <a:p>
             <a:pPr lvl="0"/>
             <a:r>
-              <a:rPr lang="en-US" smtClean="0"/>
+              <a:rPr lang="en-US"/>
               <a:t>Click to edit Master text styles</a:t>
             </a:r>
           </a:p>
           <a:p>
             <a:pPr lvl="1"/>
             <a:r>
-              <a:rPr lang="en-US" smtClean="0"/>
+              <a:rPr lang="en-US"/>
               <a:t>Second level</a:t>
             </a:r>
           </a:p>
           <a:p>
             <a:pPr lvl="2"/>
             <a:r>
-              <a:rPr lang="en-US" smtClean="0"/>
+              <a:rPr lang="en-US"/>
               <a:t>Third level</a:t>
             </a:r>
           </a:p>
           <a:p>
             <a:pPr lvl="3"/>
             <a:r>
-              <a:rPr lang="en-US" smtClean="0"/>
+              <a:rPr lang="en-US"/>
               <a:t>Fourth level</a:t>
             </a:r>
           </a:p>
           <a:p>
             <a:pPr lvl="4"/>
             <a:r>
-              <a:rPr lang="en-US" smtClean="0"/>
+              <a:rPr lang="en-US"/>
               <a:t>Fifth level</a:t>
             </a:r>
-            <a:endParaRPr lang="en-US"/>
           </a:p>
         </p:txBody>
       </p:sp>
@@ -2009,7 +2010,7 @@
           <a:p>
             <a:pPr lvl="0"/>
             <a:r>
-              <a:rPr lang="en-US" smtClean="0"/>
+              <a:rPr lang="en-US"/>
               <a:t>Click to edit Master text styles</a:t>
             </a:r>
           </a:p>
@@ -2065,38 +2066,37 @@
           <a:p>
             <a:pPr lvl="0"/>
             <a:r>
-              <a:rPr lang="en-US" smtClean="0"/>
+              <a:rPr lang="en-US"/>
               <a:t>Click to edit Master text styles</a:t>
             </a:r>
           </a:p>
           <a:p>
             <a:pPr lvl="1"/>
             <a:r>
-              <a:rPr lang="en-US" smtClean="0"/>
+              <a:rPr lang="en-US"/>
               <a:t>Second level</a:t>
             </a:r>
           </a:p>
           <a:p>
             <a:pPr lvl="2"/>
             <a:r>
-              <a:rPr lang="en-US" smtClean="0"/>
+              <a:rPr lang="en-US"/>
               <a:t>Third level</a:t>
             </a:r>
           </a:p>
           <a:p>
             <a:pPr lvl="3"/>
             <a:r>
-              <a:rPr lang="en-US" smtClean="0"/>
+              <a:rPr lang="en-US"/>
               <a:t>Fourth level</a:t>
             </a:r>
           </a:p>
           <a:p>
             <a:pPr lvl="4"/>
             <a:r>
-              <a:rPr lang="en-US" smtClean="0"/>
+              <a:rPr lang="en-US"/>
               <a:t>Fifth level</a:t>
             </a:r>
-            <a:endParaRPr lang="en-US"/>
           </a:p>
         </p:txBody>
       </p:sp>
@@ -2117,7 +2117,7 @@
           <a:p>
             <a:fld id="{78C97017-6FC3-485B-9764-EAC9E56C1D49}" type="datetimeFigureOut">
               <a:rPr lang="en-US" smtClean="0"/>
-              <a:t>11/19/2016</a:t>
+              <a:t>3/23/2017</a:t>
             </a:fld>
             <a:endParaRPr lang="en-US"/>
           </a:p>
@@ -2211,10 +2211,9 @@
           <a:lstStyle/>
           <a:p>
             <a:r>
-              <a:rPr lang="en-US" smtClean="0"/>
+              <a:rPr lang="en-US"/>
               <a:t>Click to edit Master title style</a:t>
             </a:r>
-            <a:endParaRPr lang="en-US"/>
           </a:p>
         </p:txBody>
       </p:sp>
@@ -2235,7 +2234,7 @@
           <a:p>
             <a:fld id="{78C97017-6FC3-485B-9764-EAC9E56C1D49}" type="datetimeFigureOut">
               <a:rPr lang="en-US" smtClean="0"/>
-              <a:t>11/19/2016</a:t>
+              <a:t>3/23/2017</a:t>
             </a:fld>
             <a:endParaRPr lang="en-US"/>
           </a:p>
@@ -2330,7 +2329,7 @@
           <a:p>
             <a:fld id="{78C97017-6FC3-485B-9764-EAC9E56C1D49}" type="datetimeFigureOut">
               <a:rPr lang="en-US" smtClean="0"/>
-              <a:t>11/19/2016</a:t>
+              <a:t>3/23/2017</a:t>
             </a:fld>
             <a:endParaRPr lang="en-US"/>
           </a:p>
@@ -2433,10 +2432,9 @@
           </a:lstStyle>
           <a:p>
             <a:r>
-              <a:rPr lang="en-US" smtClean="0"/>
+              <a:rPr lang="en-US"/>
               <a:t>Click to edit Master title style</a:t>
             </a:r>
-            <a:endParaRPr lang="en-US"/>
           </a:p>
         </p:txBody>
       </p:sp>
@@ -2490,38 +2488,37 @@
           <a:p>
             <a:pPr lvl="0"/>
             <a:r>
-              <a:rPr lang="en-US" smtClean="0"/>
+              <a:rPr lang="en-US"/>
               <a:t>Click to edit Master text styles</a:t>
             </a:r>
           </a:p>
           <a:p>
             <a:pPr lvl="1"/>
             <a:r>
-              <a:rPr lang="en-US" smtClean="0"/>
+              <a:rPr lang="en-US"/>
               <a:t>Second level</a:t>
             </a:r>
           </a:p>
           <a:p>
             <a:pPr lvl="2"/>
             <a:r>
-              <a:rPr lang="en-US" smtClean="0"/>
+              <a:rPr lang="en-US"/>
               <a:t>Third level</a:t>
             </a:r>
           </a:p>
           <a:p>
             <a:pPr lvl="3"/>
             <a:r>
-              <a:rPr lang="en-US" smtClean="0"/>
+              <a:rPr lang="en-US"/>
               <a:t>Fourth level</a:t>
             </a:r>
           </a:p>
           <a:p>
             <a:pPr lvl="4"/>
             <a:r>
-              <a:rPr lang="en-US" smtClean="0"/>
+              <a:rPr lang="en-US"/>
               <a:t>Fifth level</a:t>
             </a:r>
-            <a:endParaRPr lang="en-US"/>
           </a:p>
         </p:txBody>
       </p:sp>
@@ -2584,7 +2581,7 @@
           <a:p>
             <a:pPr lvl="0"/>
             <a:r>
-              <a:rPr lang="en-US" smtClean="0"/>
+              <a:rPr lang="en-US"/>
               <a:t>Click to edit Master text styles</a:t>
             </a:r>
           </a:p>
@@ -2607,7 +2604,7 @@
           <a:p>
             <a:fld id="{78C97017-6FC3-485B-9764-EAC9E56C1D49}" type="datetimeFigureOut">
               <a:rPr lang="en-US" smtClean="0"/>
-              <a:t>11/19/2016</a:t>
+              <a:t>3/23/2017</a:t>
             </a:fld>
             <a:endParaRPr lang="en-US"/>
           </a:p>
@@ -2710,10 +2707,9 @@
           </a:lstStyle>
           <a:p>
             <a:r>
-              <a:rPr lang="en-US" smtClean="0"/>
+              <a:rPr lang="en-US"/>
               <a:t>Click to edit Master title style</a:t>
             </a:r>
-            <a:endParaRPr lang="en-US"/>
           </a:p>
         </p:txBody>
       </p:sp>
@@ -2837,7 +2833,7 @@
           <a:p>
             <a:pPr lvl="0"/>
             <a:r>
-              <a:rPr lang="en-US" smtClean="0"/>
+              <a:rPr lang="en-US"/>
               <a:t>Click to edit Master text styles</a:t>
             </a:r>
           </a:p>
@@ -2860,7 +2856,7 @@
           <a:p>
             <a:fld id="{78C97017-6FC3-485B-9764-EAC9E56C1D49}" type="datetimeFigureOut">
               <a:rPr lang="en-US" smtClean="0"/>
-              <a:t>11/19/2016</a:t>
+              <a:t>3/23/2017</a:t>
             </a:fld>
             <a:endParaRPr lang="en-US"/>
           </a:p>
@@ -2969,10 +2965,9 @@
           <a:lstStyle/>
           <a:p>
             <a:r>
-              <a:rPr lang="en-US" smtClean="0"/>
+              <a:rPr lang="en-US"/>
               <a:t>Click to edit Master title style</a:t>
             </a:r>
-            <a:endParaRPr lang="en-US"/>
           </a:p>
         </p:txBody>
       </p:sp>
@@ -3003,38 +2998,37 @@
           <a:p>
             <a:pPr lvl="0"/>
             <a:r>
-              <a:rPr lang="en-US" smtClean="0"/>
+              <a:rPr lang="en-US"/>
               <a:t>Click to edit Master text styles</a:t>
             </a:r>
           </a:p>
           <a:p>
             <a:pPr lvl="1"/>
             <a:r>
-              <a:rPr lang="en-US" smtClean="0"/>
+              <a:rPr lang="en-US"/>
               <a:t>Second level</a:t>
             </a:r>
           </a:p>
           <a:p>
             <a:pPr lvl="2"/>
             <a:r>
-              <a:rPr lang="en-US" smtClean="0"/>
+              <a:rPr lang="en-US"/>
               <a:t>Third level</a:t>
             </a:r>
           </a:p>
           <a:p>
             <a:pPr lvl="3"/>
             <a:r>
-              <a:rPr lang="en-US" smtClean="0"/>
+              <a:rPr lang="en-US"/>
               <a:t>Fourth level</a:t>
             </a:r>
           </a:p>
           <a:p>
             <a:pPr lvl="4"/>
             <a:r>
-              <a:rPr lang="en-US" smtClean="0"/>
+              <a:rPr lang="en-US"/>
               <a:t>Fifth level</a:t>
             </a:r>
-            <a:endParaRPr lang="en-US"/>
           </a:p>
         </p:txBody>
       </p:sp>
@@ -3073,7 +3067,7 @@
           <a:p>
             <a:fld id="{78C97017-6FC3-485B-9764-EAC9E56C1D49}" type="datetimeFigureOut">
               <a:rPr lang="en-US" smtClean="0"/>
-              <a:t>11/19/2016</a:t>
+              <a:t>3/23/2017</a:t>
             </a:fld>
             <a:endParaRPr lang="en-US"/>
           </a:p>
@@ -3456,8 +3450,8 @@
         </p:nvSpPr>
         <p:spPr>
           <a:xfrm>
-            <a:off x="1119865" y="1727200"/>
-            <a:ext cx="7490735" cy="2997200"/>
+            <a:off x="304800" y="155163"/>
+            <a:ext cx="8763000" cy="4555277"/>
           </a:xfrm>
           <a:prstGeom prst="roundRect">
             <a:avLst>
@@ -3494,7 +3488,7 @@
           <a:lstStyle/>
           <a:p>
             <a:r>
-              <a:rPr lang="en-US" sz="1200" b="1" dirty="0" smtClean="0">
+              <a:rPr lang="en-US" sz="1200" b="1" dirty="0">
                 <a:solidFill>
                   <a:srgbClr val="7030A0"/>
                 </a:solidFill>
@@ -3517,7 +3511,7 @@
         </p:nvSpPr>
         <p:spPr>
           <a:xfrm>
-            <a:off x="2877180" y="3158440"/>
+            <a:off x="2198077" y="2434515"/>
             <a:ext cx="1093635" cy="346760"/>
           </a:xfrm>
           <a:prstGeom prst="rect">
@@ -3553,7 +3547,7 @@
           <a:p>
             <a:pPr algn="ctr"/>
             <a:r>
-              <a:rPr lang="en-US" sz="1050" dirty="0" err="1" smtClean="0">
+              <a:rPr lang="en-US" sz="1050" dirty="0" err="1">
                 <a:solidFill>
                   <a:schemeClr val="bg1"/>
                 </a:solidFill>
@@ -3576,7 +3570,7 @@
         </p:nvSpPr>
         <p:spPr>
           <a:xfrm rot="16200000">
-            <a:off x="1683963" y="2868687"/>
+            <a:off x="1004860" y="2144762"/>
             <a:ext cx="1093635" cy="346760"/>
           </a:xfrm>
           <a:prstGeom prst="rect">
@@ -3612,7 +3606,7 @@
           <a:p>
             <a:pPr algn="ctr"/>
             <a:r>
-              <a:rPr lang="en-US" sz="1050" dirty="0" err="1" smtClean="0">
+              <a:rPr lang="en-US" sz="1050" dirty="0" err="1">
                 <a:solidFill>
                   <a:schemeClr val="bg1"/>
                 </a:solidFill>
@@ -3631,17 +3625,19 @@
         <p:nvCxnSpPr>
           <p:cNvPr id="53" name="Elbow Connector 63"/>
           <p:cNvCxnSpPr>
-            <a:stCxn id="71" idx="3"/>
+            <a:cxnSpLocks/>
           </p:cNvCxnSpPr>
           <p:nvPr/>
         </p:nvCxnSpPr>
         <p:spPr>
-          <a:xfrm flipV="1">
-            <a:off x="6477000" y="3194131"/>
-            <a:ext cx="95385" cy="416514"/>
-          </a:xfrm>
-          <a:prstGeom prst="bentConnector2">
-            <a:avLst/>
+          <a:xfrm rot="5400000">
+            <a:off x="5888081" y="1605651"/>
+            <a:ext cx="449451" cy="1285"/>
+          </a:xfrm>
+          <a:prstGeom prst="bentConnector3">
+            <a:avLst>
+              <a:gd name="adj1" fmla="val 50000"/>
+            </a:avLst>
           </a:prstGeom>
           <a:ln w="19050">
             <a:solidFill>
@@ -3672,19 +3668,20 @@
         <p:nvCxnSpPr>
           <p:cNvPr id="107" name="Elbow Connector 106"/>
           <p:cNvCxnSpPr>
+            <a:cxnSpLocks/>
             <a:stCxn id="9" idx="1"/>
+            <a:endCxn id="89" idx="2"/>
           </p:cNvCxnSpPr>
           <p:nvPr/>
         </p:nvCxnSpPr>
         <p:spPr>
-          <a:xfrm rot="5400000" flipH="1" flipV="1">
-            <a:off x="4360065" y="1080909"/>
-            <a:ext cx="378691" cy="4637261"/>
-          </a:xfrm>
-          <a:prstGeom prst="bentConnector4">
+          <a:xfrm rot="16200000" flipH="1">
+            <a:off x="3701538" y="715099"/>
+            <a:ext cx="137269" cy="4436989"/>
+          </a:xfrm>
+          <a:prstGeom prst="bentConnector3">
             <a:avLst>
-              <a:gd name="adj1" fmla="val -101829"/>
-              <a:gd name="adj2" fmla="val 99976"/>
+              <a:gd name="adj1" fmla="val 340550"/>
             </a:avLst>
           </a:prstGeom>
           <a:ln w="19050">
@@ -3720,7 +3717,7 @@
         </p:nvSpPr>
         <p:spPr>
           <a:xfrm rot="16200000">
-            <a:off x="956202" y="2861202"/>
+            <a:off x="277099" y="2137277"/>
             <a:ext cx="1093635" cy="346760"/>
           </a:xfrm>
           <a:prstGeom prst="rect">
@@ -3767,7 +3764,7 @@
           <a:p>
             <a:pPr algn="ctr"/>
             <a:r>
-              <a:rPr lang="en-US" sz="1050" dirty="0" smtClean="0">
+              <a:rPr lang="en-US" sz="1050" dirty="0">
                 <a:solidFill>
                   <a:schemeClr val="bg1"/>
                 </a:solidFill>
@@ -3790,7 +3787,7 @@
         </p:nvSpPr>
         <p:spPr>
           <a:xfrm rot="16200000">
-            <a:off x="1626910" y="2952291"/>
+            <a:off x="947807" y="2228366"/>
             <a:ext cx="270504" cy="175523"/>
           </a:xfrm>
           <a:prstGeom prst="triangle">
@@ -3840,7 +3837,7 @@
         </p:nvCxnSpPr>
         <p:spPr>
           <a:xfrm>
-            <a:off x="2656370" y="3326536"/>
+            <a:off x="1977267" y="2602611"/>
             <a:ext cx="220810" cy="5284"/>
           </a:xfrm>
           <a:prstGeom prst="straightConnector1">
@@ -3870,23 +3867,149 @@
           </a:fontRef>
         </p:style>
       </p:cxnSp>
-      <p:sp>
-        <p:nvSpPr>
-          <p:cNvPr id="71" name="Isosceles Triangle 102"/>
+      <p:cxnSp>
+        <p:nvCxnSpPr>
+          <p:cNvPr id="75" name="Elbow Connector 122"/>
+          <p:cNvCxnSpPr/>
+          <p:nvPr/>
+        </p:nvCxnSpPr>
+        <p:spPr>
+          <a:xfrm>
+            <a:off x="230988" y="2316128"/>
+            <a:ext cx="419548" cy="2860"/>
+          </a:xfrm>
+          <a:prstGeom prst="bentConnector3">
+            <a:avLst>
+              <a:gd name="adj1" fmla="val 50000"/>
+            </a:avLst>
+          </a:prstGeom>
+          <a:ln w="19050">
+            <a:solidFill>
+              <a:schemeClr val="bg1">
+                <a:lumMod val="75000"/>
+              </a:schemeClr>
+            </a:solidFill>
+            <a:prstDash val="sysDot"/>
+            <a:headEnd type="none" w="med" len="med"/>
+            <a:tailEnd type="arrow" w="med" len="med"/>
+          </a:ln>
+          <a:effectLst/>
+        </p:spPr>
+        <p:style>
+          <a:lnRef idx="1">
+            <a:schemeClr val="accent2"/>
+          </a:lnRef>
+          <a:fillRef idx="2">
+            <a:schemeClr val="accent2"/>
+          </a:fillRef>
+          <a:effectRef idx="1">
+            <a:schemeClr val="accent2"/>
+          </a:effectRef>
+          <a:fontRef idx="minor">
+            <a:schemeClr val="dk1"/>
+          </a:fontRef>
+        </p:style>
+      </p:cxnSp>
+      <p:cxnSp>
+        <p:nvCxnSpPr>
+          <p:cNvPr id="21" name="Straight Connector 20"/>
+          <p:cNvCxnSpPr>
+            <a:stCxn id="120" idx="3"/>
+          </p:cNvCxnSpPr>
+          <p:nvPr/>
+        </p:nvCxnSpPr>
+        <p:spPr>
+          <a:xfrm flipV="1">
+            <a:off x="1170821" y="2316127"/>
+            <a:ext cx="216105" cy="1"/>
+          </a:xfrm>
+          <a:prstGeom prst="line">
+            <a:avLst/>
+          </a:prstGeom>
+          <a:ln w="19050">
+            <a:solidFill>
+              <a:srgbClr val="7030A0"/>
+            </a:solidFill>
+            <a:prstDash val="sysDot"/>
+            <a:headEnd type="none" w="med" len="med"/>
+            <a:tailEnd type="none" w="med" len="med"/>
+          </a:ln>
+          <a:effectLst/>
+        </p:spPr>
+        <p:style>
+          <a:lnRef idx="1">
+            <a:schemeClr val="accent2"/>
+          </a:lnRef>
+          <a:fillRef idx="2">
+            <a:schemeClr val="accent2"/>
+          </a:fillRef>
+          <a:effectRef idx="1">
+            <a:schemeClr val="accent2"/>
+          </a:effectRef>
+          <a:fontRef idx="minor">
+            <a:schemeClr val="dk1"/>
+          </a:fontRef>
+        </p:style>
+      </p:cxnSp>
+      <p:sp>
+        <p:nvSpPr>
+          <p:cNvPr id="42" name="Flowchart: Decision 96"/>
           <p:cNvSpPr/>
           <p:nvPr/>
         </p:nvSpPr>
         <p:spPr>
-          <a:xfrm rot="5400000" flipV="1">
-            <a:off x="6253986" y="3522883"/>
-            <a:ext cx="270504" cy="175523"/>
-          </a:xfrm>
-          <a:prstGeom prst="triangle">
+          <a:xfrm>
+            <a:off x="1741219" y="2515921"/>
+            <a:ext cx="236048" cy="173380"/>
+          </a:xfrm>
+          <a:prstGeom prst="flowChartDecision">
             <a:avLst/>
           </a:prstGeom>
-          <a:solidFill>
-            <a:srgbClr val="7030A0"/>
-          </a:solidFill>
+          <a:noFill/>
+          <a:ln w="19050">
+            <a:solidFill>
+              <a:srgbClr val="7030A0"/>
+            </a:solidFill>
+          </a:ln>
+          <a:effectLst/>
+        </p:spPr>
+        <p:style>
+          <a:lnRef idx="1">
+            <a:schemeClr val="accent6"/>
+          </a:lnRef>
+          <a:fillRef idx="2">
+            <a:schemeClr val="accent6"/>
+          </a:fillRef>
+          <a:effectRef idx="1">
+            <a:schemeClr val="accent6"/>
+          </a:effectRef>
+          <a:fontRef idx="minor">
+            <a:schemeClr val="dk1"/>
+          </a:fontRef>
+        </p:style>
+        <p:txBody>
+          <a:bodyPr rtlCol="0" anchor="ctr"/>
+          <a:lstStyle/>
+          <a:p>
+            <a:pPr algn="ctr"/>
+            <a:endParaRPr lang="en-US" sz="1050"/>
+          </a:p>
+        </p:txBody>
+      </p:sp>
+      <p:sp>
+        <p:nvSpPr>
+          <p:cNvPr id="46" name="Rectangle 8"/>
+          <p:cNvSpPr/>
+          <p:nvPr/>
+        </p:nvSpPr>
+        <p:spPr>
+          <a:xfrm>
+            <a:off x="2200387" y="1903495"/>
+            <a:ext cx="1093635" cy="346760"/>
+          </a:xfrm>
+          <a:prstGeom prst="rect">
+            <a:avLst/>
+          </a:prstGeom>
           <a:ln w="19050">
             <a:solidFill>
               <a:srgbClr val="7030A0"/>
@@ -3913,9 +4036,17 @@
           <a:lstStyle/>
           <a:p>
             <a:pPr algn="ctr"/>
-            <a:endParaRPr lang="en-SG" sz="1050" b="1">
+            <a:r>
+              <a:rPr lang="en-US" sz="1050" dirty="0" err="1">
+                <a:solidFill>
+                  <a:srgbClr val="7030A0"/>
+                </a:solidFill>
+              </a:rPr>
+              <a:t>UserInbox</a:t>
+            </a:r>
+            <a:endParaRPr lang="en-SG" sz="1050" dirty="0">
               <a:solidFill>
-                <a:srgbClr val="92D050"/>
+                <a:srgbClr val="7030A0"/>
               </a:solidFill>
             </a:endParaRPr>
           </a:p>
@@ -3923,27 +4054,25 @@
       </p:sp>
       <p:cxnSp>
         <p:nvCxnSpPr>
-          <p:cNvPr id="75" name="Elbow Connector 122"/>
-          <p:cNvCxnSpPr/>
+          <p:cNvPr id="47" name="Straight Arrow Connector 46"/>
+          <p:cNvCxnSpPr>
+            <a:stCxn id="48" idx="3"/>
+            <a:endCxn id="46" idx="1"/>
+          </p:cNvCxnSpPr>
           <p:nvPr/>
         </p:nvCxnSpPr>
         <p:spPr>
           <a:xfrm>
-            <a:off x="910091" y="3040053"/>
-            <a:ext cx="419548" cy="2860"/>
-          </a:xfrm>
-          <a:prstGeom prst="bentConnector3">
-            <a:avLst>
-              <a:gd name="adj1" fmla="val 50000"/>
-            </a:avLst>
+            <a:off x="1979577" y="2071591"/>
+            <a:ext cx="220810" cy="5284"/>
+          </a:xfrm>
+          <a:prstGeom prst="straightConnector1">
+            <a:avLst/>
           </a:prstGeom>
           <a:ln w="19050">
             <a:solidFill>
-              <a:schemeClr val="bg1">
-                <a:lumMod val="75000"/>
-              </a:schemeClr>
+              <a:srgbClr val="7030A0"/>
             </a:solidFill>
-            <a:prstDash val="sysDot"/>
             <a:headEnd type="none" w="med" len="med"/>
             <a:tailEnd type="arrow" w="med" len="med"/>
           </a:ln>
@@ -3964,56 +4093,15 @@
           </a:fontRef>
         </p:style>
       </p:cxnSp>
-      <p:cxnSp>
-        <p:nvCxnSpPr>
-          <p:cNvPr id="21" name="Straight Connector 20"/>
-          <p:cNvCxnSpPr>
-            <a:stCxn id="120" idx="3"/>
-          </p:cNvCxnSpPr>
-          <p:nvPr/>
-        </p:nvCxnSpPr>
-        <p:spPr>
-          <a:xfrm flipV="1">
-            <a:off x="1849924" y="3040052"/>
-            <a:ext cx="216105" cy="1"/>
-          </a:xfrm>
-          <a:prstGeom prst="line">
-            <a:avLst/>
-          </a:prstGeom>
-          <a:ln w="19050">
-            <a:solidFill>
-              <a:srgbClr val="7030A0"/>
-            </a:solidFill>
-            <a:prstDash val="sysDot"/>
-            <a:headEnd type="none" w="med" len="med"/>
-            <a:tailEnd type="none" w="med" len="med"/>
-          </a:ln>
-          <a:effectLst/>
-        </p:spPr>
-        <p:style>
-          <a:lnRef idx="1">
-            <a:schemeClr val="accent2"/>
-          </a:lnRef>
-          <a:fillRef idx="2">
-            <a:schemeClr val="accent2"/>
-          </a:fillRef>
-          <a:effectRef idx="1">
-            <a:schemeClr val="accent2"/>
-          </a:effectRef>
-          <a:fontRef idx="minor">
-            <a:schemeClr val="dk1"/>
-          </a:fontRef>
-        </p:style>
-      </p:cxnSp>
-      <p:sp>
-        <p:nvSpPr>
-          <p:cNvPr id="42" name="Flowchart: Decision 96"/>
+      <p:sp>
+        <p:nvSpPr>
+          <p:cNvPr id="48" name="Flowchart: Decision 96"/>
           <p:cNvSpPr/>
           <p:nvPr/>
         </p:nvSpPr>
         <p:spPr>
           <a:xfrm>
-            <a:off x="2420322" y="3239846"/>
+            <a:off x="1743529" y="1984901"/>
             <a:ext cx="236048" cy="173380"/>
           </a:xfrm>
           <a:prstGeom prst="flowChartDecision">
@@ -4052,14 +4140,14 @@
       </p:sp>
       <p:sp>
         <p:nvSpPr>
-          <p:cNvPr id="46" name="Rectangle 8"/>
+          <p:cNvPr id="49" name="Rectangle 8"/>
           <p:cNvSpPr/>
           <p:nvPr/>
         </p:nvSpPr>
         <p:spPr>
           <a:xfrm>
-            <a:off x="2879490" y="2627420"/>
-            <a:ext cx="1093635" cy="346760"/>
+            <a:off x="3807914" y="2123446"/>
+            <a:ext cx="1156969" cy="346760"/>
           </a:xfrm>
           <a:prstGeom prst="rect">
             <a:avLst/>
@@ -4091,12 +4179,12 @@
           <a:p>
             <a:pPr algn="ctr"/>
             <a:r>
-              <a:rPr lang="en-US" sz="1050" dirty="0" err="1" smtClean="0">
+              <a:rPr lang="en-US" sz="1050" dirty="0" err="1">
                 <a:solidFill>
                   <a:srgbClr val="7030A0"/>
                 </a:solidFill>
               </a:rPr>
-              <a:t>AddressBook</a:t>
+              <a:t>UniqueTaskList</a:t>
             </a:r>
             <a:endParaRPr lang="en-SG" sz="1050" dirty="0">
               <a:solidFill>
@@ -4106,62 +4194,23 @@
           </a:p>
         </p:txBody>
       </p:sp>
-      <p:cxnSp>
-        <p:nvCxnSpPr>
-          <p:cNvPr id="47" name="Straight Arrow Connector 46"/>
-          <p:cNvCxnSpPr>
-            <a:stCxn id="48" idx="3"/>
-            <a:endCxn id="46" idx="1"/>
-          </p:cNvCxnSpPr>
-          <p:nvPr/>
-        </p:nvCxnSpPr>
-        <p:spPr>
-          <a:xfrm>
-            <a:off x="2658680" y="2795516"/>
-            <a:ext cx="220810" cy="5284"/>
-          </a:xfrm>
-          <a:prstGeom prst="straightConnector1">
-            <a:avLst/>
-          </a:prstGeom>
-          <a:ln w="19050">
-            <a:solidFill>
-              <a:srgbClr val="7030A0"/>
-            </a:solidFill>
-            <a:headEnd type="none" w="med" len="med"/>
-            <a:tailEnd type="arrow" w="med" len="med"/>
-          </a:ln>
-          <a:effectLst/>
-        </p:spPr>
-        <p:style>
-          <a:lnRef idx="1">
-            <a:schemeClr val="accent2"/>
-          </a:lnRef>
-          <a:fillRef idx="2">
-            <a:schemeClr val="accent2"/>
-          </a:fillRef>
-          <a:effectRef idx="1">
-            <a:schemeClr val="accent2"/>
-          </a:effectRef>
-          <a:fontRef idx="minor">
-            <a:schemeClr val="dk1"/>
-          </a:fontRef>
-        </p:style>
-      </p:cxnSp>
-      <p:sp>
-        <p:nvSpPr>
-          <p:cNvPr id="48" name="Flowchart: Decision 96"/>
+      <p:sp>
+        <p:nvSpPr>
+          <p:cNvPr id="51" name="Flowchart: Decision 96"/>
           <p:cNvSpPr/>
           <p:nvPr/>
         </p:nvSpPr>
         <p:spPr>
           <a:xfrm>
-            <a:off x="2422632" y="2708826"/>
+            <a:off x="3305200" y="1950066"/>
             <a:ext cx="236048" cy="173380"/>
           </a:xfrm>
           <a:prstGeom prst="flowChartDecision">
             <a:avLst/>
           </a:prstGeom>
-          <a:noFill/>
+          <a:solidFill>
+            <a:srgbClr val="7030A0"/>
+          </a:solidFill>
           <a:ln w="19050">
             <a:solidFill>
               <a:srgbClr val="7030A0"/>
@@ -4192,15 +4241,56 @@
           </a:p>
         </p:txBody>
       </p:sp>
-      <p:sp>
-        <p:nvSpPr>
-          <p:cNvPr id="49" name="Rectangle 8"/>
+      <p:cxnSp>
+        <p:nvCxnSpPr>
+          <p:cNvPr id="30" name="Elbow Connector 29"/>
+          <p:cNvCxnSpPr>
+            <a:stCxn id="51" idx="3"/>
+            <a:endCxn id="49" idx="1"/>
+          </p:cNvCxnSpPr>
+          <p:nvPr/>
+        </p:nvCxnSpPr>
+        <p:spPr>
+          <a:xfrm>
+            <a:off x="3541248" y="2036756"/>
+            <a:ext cx="266666" cy="260070"/>
+          </a:xfrm>
+          <a:prstGeom prst="bentConnector3">
+            <a:avLst/>
+          </a:prstGeom>
+          <a:ln w="19050">
+            <a:solidFill>
+              <a:srgbClr val="7030A0"/>
+            </a:solidFill>
+            <a:headEnd type="none" w="med" len="med"/>
+            <a:tailEnd type="arrow" w="med" len="med"/>
+          </a:ln>
+          <a:effectLst/>
+        </p:spPr>
+        <p:style>
+          <a:lnRef idx="1">
+            <a:schemeClr val="accent2"/>
+          </a:lnRef>
+          <a:fillRef idx="2">
+            <a:schemeClr val="accent2"/>
+          </a:fillRef>
+          <a:effectRef idx="1">
+            <a:schemeClr val="accent2"/>
+          </a:effectRef>
+          <a:fontRef idx="minor">
+            <a:schemeClr val="dk1"/>
+          </a:fontRef>
+        </p:style>
+      </p:cxnSp>
+      <p:sp>
+        <p:nvSpPr>
+          <p:cNvPr id="57" name="Rectangle 8"/>
           <p:cNvSpPr/>
           <p:nvPr/>
         </p:nvSpPr>
         <p:spPr>
           <a:xfrm>
-            <a:off x="4487017" y="2847371"/>
+            <a:off x="3798225" y="1556644"/>
             <a:ext cx="1156969" cy="346760"/>
           </a:xfrm>
           <a:prstGeom prst="rect">
@@ -4233,12 +4323,12 @@
           <a:p>
             <a:pPr algn="ctr"/>
             <a:r>
-              <a:rPr lang="en-US" sz="1050" dirty="0" err="1" smtClean="0">
+              <a:rPr lang="en-US" sz="1050" dirty="0" err="1">
                 <a:solidFill>
                   <a:srgbClr val="7030A0"/>
                 </a:solidFill>
               </a:rPr>
-              <a:t>UniquePersonList</a:t>
+              <a:t>UniqueTagList</a:t>
             </a:r>
             <a:endParaRPr lang="en-SG" sz="1050" dirty="0">
               <a:solidFill>
@@ -4248,23 +4338,120 @@
           </a:p>
         </p:txBody>
       </p:sp>
-      <p:sp>
-        <p:nvSpPr>
-          <p:cNvPr id="51" name="Flowchart: Decision 96"/>
+      <p:cxnSp>
+        <p:nvCxnSpPr>
+          <p:cNvPr id="59" name="Elbow Connector 58"/>
+          <p:cNvCxnSpPr>
+            <a:stCxn id="51" idx="3"/>
+            <a:endCxn id="57" idx="1"/>
+          </p:cNvCxnSpPr>
+          <p:nvPr/>
+        </p:nvCxnSpPr>
+        <p:spPr>
+          <a:xfrm flipV="1">
+            <a:off x="3541248" y="1730024"/>
+            <a:ext cx="256977" cy="306732"/>
+          </a:xfrm>
+          <a:prstGeom prst="bentConnector3">
+            <a:avLst>
+              <a:gd name="adj1" fmla="val 50000"/>
+            </a:avLst>
+          </a:prstGeom>
+          <a:ln w="19050">
+            <a:solidFill>
+              <a:srgbClr val="7030A0"/>
+            </a:solidFill>
+            <a:headEnd type="none" w="med" len="med"/>
+            <a:tailEnd type="arrow" w="med" len="med"/>
+          </a:ln>
+          <a:effectLst/>
+        </p:spPr>
+        <p:style>
+          <a:lnRef idx="1">
+            <a:schemeClr val="accent2"/>
+          </a:lnRef>
+          <a:fillRef idx="2">
+            <a:schemeClr val="accent2"/>
+          </a:fillRef>
+          <a:effectRef idx="1">
+            <a:schemeClr val="accent2"/>
+          </a:effectRef>
+          <a:fontRef idx="minor">
+            <a:schemeClr val="dk1"/>
+          </a:fontRef>
+        </p:style>
+      </p:cxnSp>
+      <p:sp>
+        <p:nvSpPr>
+          <p:cNvPr id="62" name="Rectangle 8"/>
           <p:cNvSpPr/>
           <p:nvPr/>
         </p:nvSpPr>
         <p:spPr>
           <a:xfrm>
-            <a:off x="3984303" y="2673991"/>
+            <a:off x="5634574" y="1797714"/>
+            <a:ext cx="708186" cy="346760"/>
+          </a:xfrm>
+          <a:prstGeom prst="rect">
+            <a:avLst/>
+          </a:prstGeom>
+          <a:ln w="19050">
+            <a:solidFill>
+              <a:srgbClr val="7030A0"/>
+            </a:solidFill>
+          </a:ln>
+          <a:effectLst/>
+        </p:spPr>
+        <p:style>
+          <a:lnRef idx="1">
+            <a:schemeClr val="accent4"/>
+          </a:lnRef>
+          <a:fillRef idx="2">
+            <a:schemeClr val="accent4"/>
+          </a:fillRef>
+          <a:effectRef idx="1">
+            <a:schemeClr val="accent4"/>
+          </a:effectRef>
+          <a:fontRef idx="minor">
+            <a:schemeClr val="dk1"/>
+          </a:fontRef>
+        </p:style>
+        <p:txBody>
+          <a:bodyPr rtlCol="0" anchor="ctr"/>
+          <a:lstStyle/>
+          <a:p>
+            <a:pPr algn="ctr"/>
+            <a:r>
+              <a:rPr lang="en-US" sz="1050" dirty="0">
+                <a:solidFill>
+                  <a:srgbClr val="7030A0"/>
+                </a:solidFill>
+              </a:rPr>
+              <a:t>Task</a:t>
+            </a:r>
+            <a:endParaRPr lang="en-SG" sz="1050" dirty="0">
+              <a:solidFill>
+                <a:srgbClr val="7030A0"/>
+              </a:solidFill>
+            </a:endParaRPr>
+          </a:p>
+        </p:txBody>
+      </p:sp>
+      <p:sp>
+        <p:nvSpPr>
+          <p:cNvPr id="63" name="Flowchart: Decision 96"/>
+          <p:cNvSpPr/>
+          <p:nvPr/>
+        </p:nvSpPr>
+        <p:spPr>
+          <a:xfrm>
+            <a:off x="4964124" y="2220054"/>
             <a:ext cx="236048" cy="173380"/>
           </a:xfrm>
           <a:prstGeom prst="flowChartDecision">
             <a:avLst/>
           </a:prstGeom>
-          <a:solidFill>
-            <a:srgbClr val="7030A0"/>
-          </a:solidFill>
+          <a:noFill/>
           <a:ln w="19050">
             <a:solidFill>
               <a:srgbClr val="7030A0"/>
@@ -4291,23 +4478,23 @@
           <a:lstStyle/>
           <a:p>
             <a:pPr algn="ctr"/>
-            <a:endParaRPr lang="en-US" sz="1050"/>
+            <a:endParaRPr lang="en-US" sz="1050" dirty="0"/>
           </a:p>
         </p:txBody>
       </p:sp>
       <p:cxnSp>
         <p:nvCxnSpPr>
-          <p:cNvPr id="30" name="Elbow Connector 29"/>
+          <p:cNvPr id="64" name="Elbow Connector 63"/>
           <p:cNvCxnSpPr>
-            <a:stCxn id="51" idx="3"/>
-            <a:endCxn id="49" idx="1"/>
+            <a:stCxn id="63" idx="3"/>
+            <a:endCxn id="62" idx="1"/>
           </p:cNvCxnSpPr>
           <p:nvPr/>
         </p:nvCxnSpPr>
         <p:spPr>
-          <a:xfrm>
-            <a:off x="4220351" y="2760681"/>
-            <a:ext cx="266666" cy="260070"/>
+          <a:xfrm flipV="1">
+            <a:off x="5200172" y="1971094"/>
+            <a:ext cx="434402" cy="335650"/>
           </a:xfrm>
           <a:prstGeom prst="bentConnector3">
             <a:avLst/>
@@ -4338,14 +4525,14 @@
       </p:cxnSp>
       <p:sp>
         <p:nvSpPr>
-          <p:cNvPr id="57" name="Rectangle 8"/>
+          <p:cNvPr id="67" name="Rectangle 8"/>
           <p:cNvSpPr/>
           <p:nvPr/>
         </p:nvSpPr>
         <p:spPr>
           <a:xfrm>
-            <a:off x="4477328" y="2280569"/>
-            <a:ext cx="1156969" cy="346760"/>
+            <a:off x="4657002" y="1085407"/>
+            <a:ext cx="483700" cy="346760"/>
           </a:xfrm>
           <a:prstGeom prst="rect">
             <a:avLst/>
@@ -4377,12 +4564,12 @@
           <a:p>
             <a:pPr algn="ctr"/>
             <a:r>
-              <a:rPr lang="en-US" sz="1050" dirty="0" err="1" smtClean="0">
+              <a:rPr lang="en-US" sz="1050" dirty="0">
                 <a:solidFill>
                   <a:srgbClr val="7030A0"/>
                 </a:solidFill>
               </a:rPr>
-              <a:t>UniqueTagList</a:t>
+              <a:t>Tag</a:t>
             </a:r>
             <a:endParaRPr lang="en-SG" sz="1050" dirty="0">
               <a:solidFill>
@@ -4392,24 +4579,67 @@
           </a:p>
         </p:txBody>
       </p:sp>
+      <p:sp>
+        <p:nvSpPr>
+          <p:cNvPr id="68" name="Flowchart: Decision 96"/>
+          <p:cNvSpPr/>
+          <p:nvPr/>
+        </p:nvSpPr>
+        <p:spPr>
+          <a:xfrm rot="16200000">
+            <a:off x="4242563" y="1342615"/>
+            <a:ext cx="236048" cy="173380"/>
+          </a:xfrm>
+          <a:prstGeom prst="flowChartDecision">
+            <a:avLst/>
+          </a:prstGeom>
+          <a:noFill/>
+          <a:ln w="19050">
+            <a:solidFill>
+              <a:srgbClr val="7030A0"/>
+            </a:solidFill>
+          </a:ln>
+          <a:effectLst/>
+        </p:spPr>
+        <p:style>
+          <a:lnRef idx="1">
+            <a:schemeClr val="accent6"/>
+          </a:lnRef>
+          <a:fillRef idx="2">
+            <a:schemeClr val="accent6"/>
+          </a:fillRef>
+          <a:effectRef idx="1">
+            <a:schemeClr val="accent6"/>
+          </a:effectRef>
+          <a:fontRef idx="minor">
+            <a:schemeClr val="dk1"/>
+          </a:fontRef>
+        </p:style>
+        <p:txBody>
+          <a:bodyPr rtlCol="0" anchor="ctr"/>
+          <a:lstStyle/>
+          <a:p>
+            <a:pPr algn="ctr"/>
+            <a:endParaRPr lang="en-US" sz="1050"/>
+          </a:p>
+        </p:txBody>
+      </p:sp>
       <p:cxnSp>
         <p:nvCxnSpPr>
-          <p:cNvPr id="59" name="Elbow Connector 58"/>
+          <p:cNvPr id="69" name="Elbow Connector 68"/>
           <p:cNvCxnSpPr>
-            <a:stCxn id="51" idx="3"/>
-            <a:endCxn id="57" idx="1"/>
+            <a:stCxn id="68" idx="3"/>
+            <a:endCxn id="67" idx="1"/>
           </p:cNvCxnSpPr>
           <p:nvPr/>
         </p:nvCxnSpPr>
         <p:spPr>
-          <a:xfrm flipV="1">
-            <a:off x="4220351" y="2453949"/>
-            <a:ext cx="256977" cy="306732"/>
-          </a:xfrm>
-          <a:prstGeom prst="bentConnector3">
-            <a:avLst>
-              <a:gd name="adj1" fmla="val 50000"/>
-            </a:avLst>
+          <a:xfrm rot="5400000" flipH="1" flipV="1">
+            <a:off x="4482547" y="1136827"/>
+            <a:ext cx="52494" cy="296415"/>
+          </a:xfrm>
+          <a:prstGeom prst="bentConnector2">
+            <a:avLst/>
           </a:prstGeom>
           <a:ln w="19050">
             <a:solidFill>
@@ -4437,14 +4667,14 @@
       </p:cxnSp>
       <p:sp>
         <p:nvSpPr>
-          <p:cNvPr id="62" name="Rectangle 8"/>
+          <p:cNvPr id="72" name="Rectangle 8"/>
           <p:cNvSpPr/>
           <p:nvPr/>
         </p:nvSpPr>
         <p:spPr>
           <a:xfrm>
-            <a:off x="6313677" y="2858066"/>
-            <a:ext cx="708186" cy="346760"/>
+            <a:off x="5276018" y="890004"/>
+            <a:ext cx="1156969" cy="346760"/>
           </a:xfrm>
           <a:prstGeom prst="rect">
             <a:avLst/>
@@ -4476,12 +4706,27 @@
           <a:p>
             <a:pPr algn="ctr"/>
             <a:r>
-              <a:rPr lang="en-US" sz="1050" dirty="0" smtClean="0">
+              <a:rPr lang="en-US" sz="1050" dirty="0">
                 <a:solidFill>
                   <a:srgbClr val="7030A0"/>
                 </a:solidFill>
               </a:rPr>
-              <a:t>Person</a:t>
+              <a:t>&lt;&lt;interface&gt;&gt;</a:t>
+            </a:r>
+            <a:br>
+              <a:rPr lang="en-US" sz="1050" dirty="0">
+                <a:solidFill>
+                  <a:srgbClr val="7030A0"/>
+                </a:solidFill>
+              </a:rPr>
+            </a:br>
+            <a:r>
+              <a:rPr lang="en-US" sz="1050" dirty="0" err="1">
+                <a:solidFill>
+                  <a:srgbClr val="7030A0"/>
+                </a:solidFill>
+              </a:rPr>
+              <a:t>ReadOnlyTask</a:t>
             </a:r>
             <a:endParaRPr lang="en-SG" sz="1050" dirty="0">
               <a:solidFill>
@@ -4493,19 +4738,77 @@
       </p:sp>
       <p:sp>
         <p:nvSpPr>
-          <p:cNvPr id="63" name="Flowchart: Decision 96"/>
+          <p:cNvPr id="76" name="Rectangle 8"/>
           <p:cNvSpPr/>
           <p:nvPr/>
         </p:nvSpPr>
         <p:spPr>
           <a:xfrm>
-            <a:off x="5643227" y="2943979"/>
-            <a:ext cx="236048" cy="173380"/>
+            <a:off x="6977250" y="1131028"/>
+            <a:ext cx="846023" cy="257001"/>
+          </a:xfrm>
+          <a:prstGeom prst="rect">
+            <a:avLst/>
+          </a:prstGeom>
+          <a:ln w="19050">
+            <a:solidFill>
+              <a:srgbClr val="7030A0"/>
+            </a:solidFill>
+          </a:ln>
+          <a:effectLst/>
+        </p:spPr>
+        <p:style>
+          <a:lnRef idx="1">
+            <a:schemeClr val="accent4"/>
+          </a:lnRef>
+          <a:fillRef idx="2">
+            <a:schemeClr val="accent4"/>
+          </a:fillRef>
+          <a:effectRef idx="1">
+            <a:schemeClr val="accent4"/>
+          </a:effectRef>
+          <a:fontRef idx="minor">
+            <a:schemeClr val="dk1"/>
+          </a:fontRef>
+        </p:style>
+        <p:txBody>
+          <a:bodyPr rtlCol="0" anchor="ctr"/>
+          <a:lstStyle/>
+          <a:p>
+            <a:pPr algn="ctr"/>
+            <a:r>
+              <a:rPr lang="en-US" sz="1050" dirty="0">
+                <a:solidFill>
+                  <a:srgbClr val="7030A0"/>
+                </a:solidFill>
+              </a:rPr>
+              <a:t>Priority</a:t>
+            </a:r>
+            <a:endParaRPr lang="en-SG" sz="1050" dirty="0">
+              <a:solidFill>
+                <a:srgbClr val="7030A0"/>
+              </a:solidFill>
+            </a:endParaRPr>
+          </a:p>
+        </p:txBody>
+      </p:sp>
+      <p:sp>
+        <p:nvSpPr>
+          <p:cNvPr id="78" name="Flowchart: Decision 96"/>
+          <p:cNvSpPr/>
+          <p:nvPr/>
+        </p:nvSpPr>
+        <p:spPr>
+          <a:xfrm>
+            <a:off x="6345493" y="1904323"/>
+            <a:ext cx="246680" cy="137880"/>
           </a:xfrm>
           <a:prstGeom prst="flowChartDecision">
             <a:avLst/>
           </a:prstGeom>
-          <a:noFill/>
+          <a:solidFill>
+            <a:srgbClr val="7030A0"/>
+          </a:solidFill>
           <a:ln w="19050">
             <a:solidFill>
               <a:srgbClr val="7030A0"/>
@@ -4538,17 +4841,18 @@
       </p:sp>
       <p:cxnSp>
         <p:nvCxnSpPr>
-          <p:cNvPr id="64" name="Elbow Connector 63"/>
+          <p:cNvPr id="79" name="Elbow Connector 78"/>
           <p:cNvCxnSpPr>
-            <a:stCxn id="63" idx="3"/>
-            <a:endCxn id="62" idx="1"/>
+            <a:cxnSpLocks/>
+            <a:stCxn id="78" idx="3"/>
+            <a:endCxn id="76" idx="1"/>
           </p:cNvCxnSpPr>
           <p:nvPr/>
         </p:nvCxnSpPr>
         <p:spPr>
-          <a:xfrm>
-            <a:off x="5879275" y="3030669"/>
-            <a:ext cx="434402" cy="777"/>
+          <a:xfrm flipV="1">
+            <a:off x="6592173" y="1259529"/>
+            <a:ext cx="385077" cy="713734"/>
           </a:xfrm>
           <a:prstGeom prst="bentConnector3">
             <a:avLst/>
@@ -4579,14 +4883,14 @@
       </p:cxnSp>
       <p:sp>
         <p:nvSpPr>
-          <p:cNvPr id="67" name="Rectangle 8"/>
+          <p:cNvPr id="80" name="Rectangle 8"/>
           <p:cNvSpPr/>
           <p:nvPr/>
         </p:nvSpPr>
         <p:spPr>
           <a:xfrm>
-            <a:off x="5336105" y="1809332"/>
-            <a:ext cx="483700" cy="346760"/>
+            <a:off x="6977251" y="1467303"/>
+            <a:ext cx="846022" cy="243705"/>
           </a:xfrm>
           <a:prstGeom prst="rect">
             <a:avLst/>
@@ -4618,12 +4922,12 @@
           <a:p>
             <a:pPr algn="ctr"/>
             <a:r>
-              <a:rPr lang="en-US" sz="1050" dirty="0" smtClean="0">
+              <a:rPr lang="en-US" sz="1050" dirty="0">
                 <a:solidFill>
                   <a:srgbClr val="7030A0"/>
                 </a:solidFill>
               </a:rPr>
-              <a:t>Tag</a:t>
+              <a:t>Deadline</a:t>
             </a:r>
             <a:endParaRPr lang="en-SG" sz="1050" dirty="0">
               <a:solidFill>
@@ -4633,66 +4937,22 @@
           </a:p>
         </p:txBody>
       </p:sp>
-      <p:sp>
-        <p:nvSpPr>
-          <p:cNvPr id="68" name="Flowchart: Decision 96"/>
-          <p:cNvSpPr/>
-          <p:nvPr/>
-        </p:nvSpPr>
-        <p:spPr>
-          <a:xfrm rot="16200000">
-            <a:off x="4921666" y="2066540"/>
-            <a:ext cx="236048" cy="173380"/>
-          </a:xfrm>
-          <a:prstGeom prst="flowChartDecision">
-            <a:avLst/>
-          </a:prstGeom>
-          <a:noFill/>
-          <a:ln w="19050">
-            <a:solidFill>
-              <a:srgbClr val="7030A0"/>
-            </a:solidFill>
-          </a:ln>
-          <a:effectLst/>
-        </p:spPr>
-        <p:style>
-          <a:lnRef idx="1">
-            <a:schemeClr val="accent6"/>
-          </a:lnRef>
-          <a:fillRef idx="2">
-            <a:schemeClr val="accent6"/>
-          </a:fillRef>
-          <a:effectRef idx="1">
-            <a:schemeClr val="accent6"/>
-          </a:effectRef>
-          <a:fontRef idx="minor">
-            <a:schemeClr val="dk1"/>
-          </a:fontRef>
-        </p:style>
-        <p:txBody>
-          <a:bodyPr rtlCol="0" anchor="ctr"/>
-          <a:lstStyle/>
-          <a:p>
-            <a:pPr algn="ctr"/>
-            <a:endParaRPr lang="en-US" sz="1050"/>
-          </a:p>
-        </p:txBody>
-      </p:sp>
       <p:cxnSp>
         <p:nvCxnSpPr>
-          <p:cNvPr id="69" name="Elbow Connector 68"/>
+          <p:cNvPr id="81" name="Elbow Connector 80"/>
           <p:cNvCxnSpPr>
-            <a:stCxn id="68" idx="3"/>
-            <a:endCxn id="67" idx="1"/>
+            <a:cxnSpLocks/>
+            <a:stCxn id="78" idx="3"/>
+            <a:endCxn id="80" idx="1"/>
           </p:cNvCxnSpPr>
           <p:nvPr/>
         </p:nvCxnSpPr>
         <p:spPr>
-          <a:xfrm rot="5400000" flipH="1" flipV="1">
-            <a:off x="5161650" y="1860752"/>
-            <a:ext cx="52494" cy="296415"/>
-          </a:xfrm>
-          <a:prstGeom prst="bentConnector2">
+          <a:xfrm flipV="1">
+            <a:off x="6592173" y="1589156"/>
+            <a:ext cx="385078" cy="384107"/>
+          </a:xfrm>
+          <a:prstGeom prst="bentConnector3">
             <a:avLst/>
           </a:prstGeom>
           <a:ln w="19050">
@@ -4721,14 +4981,14 @@
       </p:cxnSp>
       <p:sp>
         <p:nvSpPr>
-          <p:cNvPr id="72" name="Rectangle 8"/>
+          <p:cNvPr id="83" name="Rectangle 8"/>
           <p:cNvSpPr/>
           <p:nvPr/>
         </p:nvSpPr>
         <p:spPr>
           <a:xfrm>
-            <a:off x="5128257" y="3429000"/>
-            <a:ext cx="1156969" cy="346760"/>
+            <a:off x="8162708" y="1937170"/>
+            <a:ext cx="846022" cy="243705"/>
           </a:xfrm>
           <a:prstGeom prst="rect">
             <a:avLst/>
@@ -4760,27 +5020,12 @@
           <a:p>
             <a:pPr algn="ctr"/>
             <a:r>
-              <a:rPr lang="en-US" sz="1050" dirty="0" smtClean="0">
+              <a:rPr lang="en-US" sz="1050" dirty="0">
                 <a:solidFill>
                   <a:srgbClr val="7030A0"/>
                 </a:solidFill>
               </a:rPr>
-              <a:t>&lt;&lt;interface&gt;&gt;</a:t>
-            </a:r>
-            <a:br>
-              <a:rPr lang="en-US" sz="1050" dirty="0" smtClean="0">
-                <a:solidFill>
-                  <a:srgbClr val="7030A0"/>
-                </a:solidFill>
-              </a:rPr>
-            </a:br>
-            <a:r>
-              <a:rPr lang="en-US" sz="1050" dirty="0" err="1" smtClean="0">
-                <a:solidFill>
-                  <a:srgbClr val="7030A0"/>
-                </a:solidFill>
-              </a:rPr>
-              <a:t>ReadOnlyPerson</a:t>
+              <a:t>Name</a:t>
             </a:r>
             <a:endParaRPr lang="en-SG" sz="1050" dirty="0">
               <a:solidFill>
@@ -4792,14 +5037,14 @@
       </p:sp>
       <p:sp>
         <p:nvSpPr>
-          <p:cNvPr id="76" name="Rectangle 8"/>
+          <p:cNvPr id="85" name="Rectangle 8"/>
           <p:cNvSpPr/>
           <p:nvPr/>
         </p:nvSpPr>
         <p:spPr>
           <a:xfrm>
-            <a:off x="7712397" y="2564238"/>
-            <a:ext cx="708186" cy="285783"/>
+            <a:off x="8142592" y="2445597"/>
+            <a:ext cx="846022" cy="243704"/>
           </a:xfrm>
           <a:prstGeom prst="rect">
             <a:avLst/>
@@ -4831,12 +5076,12 @@
           <a:p>
             <a:pPr algn="ctr"/>
             <a:r>
-              <a:rPr lang="en-US" sz="1050" dirty="0" smtClean="0">
+              <a:rPr lang="en-US" sz="1050" dirty="0">
                 <a:solidFill>
                   <a:srgbClr val="7030A0"/>
                 </a:solidFill>
               </a:rPr>
-              <a:t>Name</a:t>
+              <a:t>Description</a:t>
             </a:r>
             <a:endParaRPr lang="en-SG" sz="1050" dirty="0">
               <a:solidFill>
@@ -4846,76 +5091,31 @@
           </a:p>
         </p:txBody>
       </p:sp>
-      <p:sp>
-        <p:nvSpPr>
-          <p:cNvPr id="78" name="Flowchart: Decision 96"/>
-          <p:cNvSpPr/>
+      <p:cxnSp>
+        <p:nvCxnSpPr>
+          <p:cNvPr id="97" name="Elbow Connector 63"/>
+          <p:cNvCxnSpPr>
+            <a:stCxn id="99" idx="3"/>
+          </p:cNvCxnSpPr>
           <p:nvPr/>
-        </p:nvSpPr>
-        <p:spPr>
-          <a:xfrm>
-            <a:off x="7041947" y="2948201"/>
-            <a:ext cx="236048" cy="173380"/>
-          </a:xfrm>
-          <a:prstGeom prst="flowChartDecision">
-            <a:avLst/>
-          </a:prstGeom>
-          <a:solidFill>
-            <a:srgbClr val="7030A0"/>
-          </a:solidFill>
+        </p:nvCxnSpPr>
+        <p:spPr>
+          <a:xfrm rot="16200000" flipH="1">
+            <a:off x="2600218" y="1761506"/>
+            <a:ext cx="293825" cy="1"/>
+          </a:xfrm>
+          <a:prstGeom prst="bentConnector3">
+            <a:avLst>
+              <a:gd name="adj1" fmla="val 50000"/>
+            </a:avLst>
+          </a:prstGeom>
           <a:ln w="19050">
             <a:solidFill>
               <a:srgbClr val="7030A0"/>
             </a:solidFill>
-          </a:ln>
-          <a:effectLst/>
-        </p:spPr>
-        <p:style>
-          <a:lnRef idx="1">
-            <a:schemeClr val="accent6"/>
-          </a:lnRef>
-          <a:fillRef idx="2">
-            <a:schemeClr val="accent6"/>
-          </a:fillRef>
-          <a:effectRef idx="1">
-            <a:schemeClr val="accent6"/>
-          </a:effectRef>
-          <a:fontRef idx="minor">
-            <a:schemeClr val="dk1"/>
-          </a:fontRef>
-        </p:style>
-        <p:txBody>
-          <a:bodyPr rtlCol="0" anchor="ctr"/>
-          <a:lstStyle/>
-          <a:p>
-            <a:pPr algn="ctr"/>
-            <a:endParaRPr lang="en-US" sz="1050"/>
-          </a:p>
-        </p:txBody>
-      </p:sp>
-      <p:cxnSp>
-        <p:nvCxnSpPr>
-          <p:cNvPr id="79" name="Elbow Connector 78"/>
-          <p:cNvCxnSpPr>
-            <a:stCxn id="78" idx="3"/>
-            <a:endCxn id="76" idx="1"/>
-          </p:cNvCxnSpPr>
-          <p:nvPr/>
-        </p:nvCxnSpPr>
-        <p:spPr>
-          <a:xfrm flipV="1">
-            <a:off x="7277995" y="2707130"/>
-            <a:ext cx="434402" cy="327761"/>
-          </a:xfrm>
-          <a:prstGeom prst="bentConnector3">
-            <a:avLst/>
-          </a:prstGeom>
-          <a:ln w="19050">
-            <a:solidFill>
-              <a:srgbClr val="7030A0"/>
-            </a:solidFill>
+            <a:prstDash val="sysDot"/>
             <a:headEnd type="none" w="med" len="med"/>
-            <a:tailEnd type="arrow" w="med" len="med"/>
+            <a:tailEnd type="none" w="med" len="med"/>
           </a:ln>
           <a:effectLst/>
         </p:spPr>
@@ -4936,16 +5136,16 @@
       </p:cxnSp>
       <p:sp>
         <p:nvSpPr>
-          <p:cNvPr id="80" name="Rectangle 8"/>
+          <p:cNvPr id="99" name="Isosceles Triangle 102"/>
           <p:cNvSpPr/>
           <p:nvPr/>
         </p:nvSpPr>
         <p:spPr>
-          <a:xfrm>
-            <a:off x="7712397" y="2887216"/>
-            <a:ext cx="708186" cy="285783"/>
-          </a:xfrm>
-          <a:prstGeom prst="rect">
+          <a:xfrm rot="10800000" flipV="1">
+            <a:off x="2611878" y="1439072"/>
+            <a:ext cx="270504" cy="175523"/>
+          </a:xfrm>
+          <a:prstGeom prst="triangle">
             <a:avLst/>
           </a:prstGeom>
           <a:ln w="19050">
@@ -4974,73 +5174,24 @@
           <a:lstStyle/>
           <a:p>
             <a:pPr algn="ctr"/>
-            <a:r>
-              <a:rPr lang="en-US" sz="1050" dirty="0" smtClean="0">
-                <a:solidFill>
-                  <a:srgbClr val="7030A0"/>
-                </a:solidFill>
-              </a:rPr>
-              <a:t>Phone</a:t>
-            </a:r>
-            <a:endParaRPr lang="en-SG" sz="1050" dirty="0">
+            <a:endParaRPr lang="en-SG" sz="1050" b="1">
               <a:solidFill>
-                <a:srgbClr val="7030A0"/>
+                <a:srgbClr val="92D050"/>
               </a:solidFill>
             </a:endParaRPr>
           </a:p>
         </p:txBody>
       </p:sp>
-      <p:cxnSp>
-        <p:nvCxnSpPr>
-          <p:cNvPr id="81" name="Elbow Connector 80"/>
-          <p:cNvCxnSpPr>
-            <a:stCxn id="78" idx="3"/>
-            <a:endCxn id="80" idx="1"/>
-          </p:cNvCxnSpPr>
-          <p:nvPr/>
-        </p:nvCxnSpPr>
-        <p:spPr>
-          <a:xfrm flipV="1">
-            <a:off x="7277995" y="3030108"/>
-            <a:ext cx="434402" cy="4783"/>
-          </a:xfrm>
-          <a:prstGeom prst="bentConnector3">
-            <a:avLst/>
-          </a:prstGeom>
-          <a:ln w="19050">
-            <a:solidFill>
-              <a:srgbClr val="7030A0"/>
-            </a:solidFill>
-            <a:headEnd type="none" w="med" len="med"/>
-            <a:tailEnd type="arrow" w="med" len="med"/>
-          </a:ln>
-          <a:effectLst/>
-        </p:spPr>
-        <p:style>
-          <a:lnRef idx="1">
-            <a:schemeClr val="accent2"/>
-          </a:lnRef>
-          <a:fillRef idx="2">
-            <a:schemeClr val="accent2"/>
-          </a:fillRef>
-          <a:effectRef idx="1">
-            <a:schemeClr val="accent2"/>
-          </a:effectRef>
-          <a:fontRef idx="minor">
-            <a:schemeClr val="dk1"/>
-          </a:fontRef>
-        </p:style>
-      </p:cxnSp>
-      <p:sp>
-        <p:nvSpPr>
-          <p:cNvPr id="83" name="Rectangle 8"/>
+      <p:sp>
+        <p:nvSpPr>
+          <p:cNvPr id="100" name="Rectangle 8"/>
           <p:cNvSpPr/>
           <p:nvPr/>
         </p:nvSpPr>
         <p:spPr>
           <a:xfrm>
-            <a:off x="7712397" y="3210194"/>
-            <a:ext cx="708186" cy="285783"/>
+            <a:off x="1981200" y="1082545"/>
+            <a:ext cx="1539926" cy="346760"/>
           </a:xfrm>
           <a:prstGeom prst="rect">
             <a:avLst/>
@@ -5072,12 +5223,27 @@
           <a:p>
             <a:pPr algn="ctr"/>
             <a:r>
-              <a:rPr lang="en-US" sz="1050" dirty="0" smtClean="0">
+              <a:rPr lang="en-US" sz="1050" dirty="0">
                 <a:solidFill>
                   <a:srgbClr val="7030A0"/>
                 </a:solidFill>
               </a:rPr>
-              <a:t>Email</a:t>
+              <a:t>&lt;&lt;interface&gt;&gt;</a:t>
+            </a:r>
+            <a:br>
+              <a:rPr lang="en-US" sz="1050" dirty="0">
+                <a:solidFill>
+                  <a:srgbClr val="7030A0"/>
+                </a:solidFill>
+              </a:rPr>
+            </a:br>
+            <a:r>
+              <a:rPr lang="en-US" sz="1050" dirty="0" err="1">
+                <a:solidFill>
+                  <a:srgbClr val="7030A0"/>
+                </a:solidFill>
+              </a:rPr>
+              <a:t>ReadOnlyUserInbox</a:t>
             </a:r>
             <a:endParaRPr lang="en-SG" sz="1050" dirty="0">
               <a:solidFill>
@@ -5087,57 +5253,16 @@
           </a:p>
         </p:txBody>
       </p:sp>
-      <p:cxnSp>
-        <p:nvCxnSpPr>
-          <p:cNvPr id="84" name="Elbow Connector 83"/>
-          <p:cNvCxnSpPr>
-            <a:stCxn id="78" idx="3"/>
-            <a:endCxn id="83" idx="1"/>
-          </p:cNvCxnSpPr>
-          <p:nvPr/>
-        </p:nvCxnSpPr>
-        <p:spPr>
-          <a:xfrm>
-            <a:off x="7277995" y="3034891"/>
-            <a:ext cx="434402" cy="318195"/>
-          </a:xfrm>
-          <a:prstGeom prst="bentConnector3">
-            <a:avLst/>
-          </a:prstGeom>
-          <a:ln w="19050">
-            <a:solidFill>
-              <a:srgbClr val="7030A0"/>
-            </a:solidFill>
-            <a:headEnd type="none" w="med" len="med"/>
-            <a:tailEnd type="arrow" w="med" len="med"/>
-          </a:ln>
-          <a:effectLst/>
-        </p:spPr>
-        <p:style>
-          <a:lnRef idx="1">
-            <a:schemeClr val="accent2"/>
-          </a:lnRef>
-          <a:fillRef idx="2">
-            <a:schemeClr val="accent2"/>
-          </a:fillRef>
-          <a:effectRef idx="1">
-            <a:schemeClr val="accent2"/>
-          </a:effectRef>
-          <a:fontRef idx="minor">
-            <a:schemeClr val="dk1"/>
-          </a:fontRef>
-        </p:style>
-      </p:cxnSp>
-      <p:sp>
-        <p:nvSpPr>
-          <p:cNvPr id="85" name="Rectangle 8"/>
+      <p:sp>
+        <p:nvSpPr>
+          <p:cNvPr id="122" name="Rectangle 8"/>
           <p:cNvSpPr/>
           <p:nvPr/>
         </p:nvSpPr>
         <p:spPr>
           <a:xfrm>
-            <a:off x="7712397" y="3533171"/>
-            <a:ext cx="708186" cy="285783"/>
+            <a:off x="1378297" y="3515566"/>
+            <a:ext cx="1775949" cy="346760"/>
           </a:xfrm>
           <a:prstGeom prst="rect">
             <a:avLst/>
@@ -5169,318 +5294,12 @@
           <a:p>
             <a:pPr algn="ctr"/>
             <a:r>
-              <a:rPr lang="en-US" sz="1050" dirty="0" smtClean="0">
-                <a:solidFill>
-                  <a:srgbClr val="7030A0"/>
-                </a:solidFill>
-              </a:rPr>
-              <a:t>Address</a:t>
-            </a:r>
-            <a:endParaRPr lang="en-SG" sz="1050" dirty="0">
-              <a:solidFill>
-                <a:srgbClr val="7030A0"/>
-              </a:solidFill>
-            </a:endParaRPr>
-          </a:p>
-        </p:txBody>
-      </p:sp>
-      <p:cxnSp>
-        <p:nvCxnSpPr>
-          <p:cNvPr id="86" name="Elbow Connector 85"/>
-          <p:cNvCxnSpPr>
-            <a:stCxn id="78" idx="3"/>
-            <a:endCxn id="85" idx="1"/>
-          </p:cNvCxnSpPr>
-          <p:nvPr/>
-        </p:nvCxnSpPr>
-        <p:spPr>
-          <a:xfrm>
-            <a:off x="7277995" y="3034891"/>
-            <a:ext cx="434402" cy="641172"/>
-          </a:xfrm>
-          <a:prstGeom prst="bentConnector3">
-            <a:avLst/>
-          </a:prstGeom>
-          <a:ln w="19050">
-            <a:solidFill>
-              <a:srgbClr val="7030A0"/>
-            </a:solidFill>
-            <a:headEnd type="none" w="med" len="med"/>
-            <a:tailEnd type="arrow" w="med" len="med"/>
-          </a:ln>
-          <a:effectLst/>
-        </p:spPr>
-        <p:style>
-          <a:lnRef idx="1">
-            <a:schemeClr val="accent2"/>
-          </a:lnRef>
-          <a:fillRef idx="2">
-            <a:schemeClr val="accent2"/>
-          </a:fillRef>
-          <a:effectRef idx="1">
-            <a:schemeClr val="accent2"/>
-          </a:effectRef>
-          <a:fontRef idx="minor">
-            <a:schemeClr val="dk1"/>
-          </a:fontRef>
-        </p:style>
-      </p:cxnSp>
-      <p:cxnSp>
-        <p:nvCxnSpPr>
-          <p:cNvPr id="97" name="Elbow Connector 63"/>
-          <p:cNvCxnSpPr>
-            <a:stCxn id="99" idx="3"/>
-          </p:cNvCxnSpPr>
-          <p:nvPr/>
-        </p:nvCxnSpPr>
-        <p:spPr>
-          <a:xfrm rot="16200000" flipH="1">
-            <a:off x="3279321" y="2485431"/>
-            <a:ext cx="293825" cy="1"/>
-          </a:xfrm>
-          <a:prstGeom prst="bentConnector3">
-            <a:avLst>
-              <a:gd name="adj1" fmla="val 50000"/>
-            </a:avLst>
-          </a:prstGeom>
-          <a:ln w="19050">
-            <a:solidFill>
-              <a:srgbClr val="7030A0"/>
-            </a:solidFill>
-            <a:prstDash val="sysDot"/>
-            <a:headEnd type="none" w="med" len="med"/>
-            <a:tailEnd type="none" w="med" len="med"/>
-          </a:ln>
-          <a:effectLst/>
-        </p:spPr>
-        <p:style>
-          <a:lnRef idx="1">
-            <a:schemeClr val="accent2"/>
-          </a:lnRef>
-          <a:fillRef idx="2">
-            <a:schemeClr val="accent2"/>
-          </a:fillRef>
-          <a:effectRef idx="1">
-            <a:schemeClr val="accent2"/>
-          </a:effectRef>
-          <a:fontRef idx="minor">
-            <a:schemeClr val="dk1"/>
-          </a:fontRef>
-        </p:style>
-      </p:cxnSp>
-      <p:sp>
-        <p:nvSpPr>
-          <p:cNvPr id="99" name="Isosceles Triangle 102"/>
-          <p:cNvSpPr/>
-          <p:nvPr/>
-        </p:nvSpPr>
-        <p:spPr>
-          <a:xfrm rot="10800000" flipV="1">
-            <a:off x="3290981" y="2162997"/>
-            <a:ext cx="270504" cy="175523"/>
-          </a:xfrm>
-          <a:prstGeom prst="triangle">
-            <a:avLst/>
-          </a:prstGeom>
-          <a:ln w="19050">
-            <a:solidFill>
-              <a:srgbClr val="7030A0"/>
-            </a:solidFill>
-          </a:ln>
-          <a:effectLst/>
-        </p:spPr>
-        <p:style>
-          <a:lnRef idx="1">
-            <a:schemeClr val="accent4"/>
-          </a:lnRef>
-          <a:fillRef idx="2">
-            <a:schemeClr val="accent4"/>
-          </a:fillRef>
-          <a:effectRef idx="1">
-            <a:schemeClr val="accent4"/>
-          </a:effectRef>
-          <a:fontRef idx="minor">
-            <a:schemeClr val="dk1"/>
-          </a:fontRef>
-        </p:style>
-        <p:txBody>
-          <a:bodyPr rtlCol="0" anchor="ctr"/>
-          <a:lstStyle/>
-          <a:p>
-            <a:pPr algn="ctr"/>
-            <a:endParaRPr lang="en-SG" sz="1050" b="1">
-              <a:solidFill>
-                <a:srgbClr val="92D050"/>
-              </a:solidFill>
-            </a:endParaRPr>
-          </a:p>
-        </p:txBody>
-      </p:sp>
-      <p:sp>
-        <p:nvSpPr>
-          <p:cNvPr id="100" name="Rectangle 8"/>
-          <p:cNvSpPr/>
-          <p:nvPr/>
-        </p:nvSpPr>
-        <p:spPr>
-          <a:xfrm>
-            <a:off x="2660303" y="1806470"/>
-            <a:ext cx="1539926" cy="346760"/>
-          </a:xfrm>
-          <a:prstGeom prst="rect">
-            <a:avLst/>
-          </a:prstGeom>
-          <a:ln w="19050">
-            <a:solidFill>
-              <a:srgbClr val="7030A0"/>
-            </a:solidFill>
-          </a:ln>
-          <a:effectLst/>
-        </p:spPr>
-        <p:style>
-          <a:lnRef idx="1">
-            <a:schemeClr val="accent4"/>
-          </a:lnRef>
-          <a:fillRef idx="2">
-            <a:schemeClr val="accent4"/>
-          </a:fillRef>
-          <a:effectRef idx="1">
-            <a:schemeClr val="accent4"/>
-          </a:effectRef>
-          <a:fontRef idx="minor">
-            <a:schemeClr val="dk1"/>
-          </a:fontRef>
-        </p:style>
-        <p:txBody>
-          <a:bodyPr rtlCol="0" anchor="ctr"/>
-          <a:lstStyle/>
-          <a:p>
-            <a:pPr algn="ctr"/>
-            <a:r>
-              <a:rPr lang="en-US" sz="1050" dirty="0" smtClean="0">
+              <a:rPr lang="en-US" sz="1050" dirty="0">
                 <a:solidFill>
                   <a:srgbClr val="7030A0"/>
                 </a:solidFill>
               </a:rPr>
               <a:t>&lt;&lt;interface&gt;&gt;</a:t>
-            </a:r>
-            <a:br>
-              <a:rPr lang="en-US" sz="1050" dirty="0" smtClean="0">
-                <a:solidFill>
-                  <a:srgbClr val="7030A0"/>
-                </a:solidFill>
-              </a:rPr>
-            </a:br>
-            <a:r>
-              <a:rPr lang="en-US" sz="1050" dirty="0" err="1" smtClean="0">
-                <a:solidFill>
-                  <a:srgbClr val="7030A0"/>
-                </a:solidFill>
-              </a:rPr>
-              <a:t>ReadOnlyAddressBook</a:t>
-            </a:r>
-            <a:endParaRPr lang="en-SG" sz="1050" dirty="0">
-              <a:solidFill>
-                <a:srgbClr val="7030A0"/>
-              </a:solidFill>
-            </a:endParaRPr>
-          </a:p>
-        </p:txBody>
-      </p:sp>
-      <p:sp>
-        <p:nvSpPr>
-          <p:cNvPr id="114" name="TextBox 113"/>
-          <p:cNvSpPr txBox="1"/>
-          <p:nvPr/>
-        </p:nvSpPr>
-        <p:spPr>
-          <a:xfrm rot="16200000">
-            <a:off x="6527512" y="3586305"/>
-            <a:ext cx="881018" cy="261610"/>
-          </a:xfrm>
-          <a:prstGeom prst="rect">
-            <a:avLst/>
-          </a:prstGeom>
-          <a:noFill/>
-        </p:spPr>
-        <p:txBody>
-          <a:bodyPr wrap="square" rtlCol="0">
-            <a:spAutoFit/>
-          </a:bodyPr>
-          <a:lstStyle/>
-          <a:p>
-            <a:pPr algn="r"/>
-            <a:r>
-              <a:rPr lang="en-US" sz="1100" dirty="0" smtClean="0">
-                <a:solidFill>
-                  <a:srgbClr val="7030A0"/>
-                </a:solidFill>
-              </a:rPr>
-              <a:t>filtered list</a:t>
-            </a:r>
-            <a:endParaRPr lang="en-SG" sz="1100" dirty="0">
-              <a:solidFill>
-                <a:srgbClr val="7030A0"/>
-              </a:solidFill>
-            </a:endParaRPr>
-          </a:p>
-        </p:txBody>
-      </p:sp>
-      <p:sp>
-        <p:nvSpPr>
-          <p:cNvPr id="122" name="Rectangle 8"/>
-          <p:cNvSpPr/>
-          <p:nvPr/>
-        </p:nvSpPr>
-        <p:spPr>
-          <a:xfrm>
-            <a:off x="2057400" y="4239491"/>
-            <a:ext cx="1775949" cy="346760"/>
-          </a:xfrm>
-          <a:prstGeom prst="rect">
-            <a:avLst/>
-          </a:prstGeom>
-          <a:ln w="19050">
-            <a:solidFill>
-              <a:srgbClr val="7030A0"/>
-            </a:solidFill>
-          </a:ln>
-          <a:effectLst/>
-        </p:spPr>
-        <p:style>
-          <a:lnRef idx="1">
-            <a:schemeClr val="accent4"/>
-          </a:lnRef>
-          <a:fillRef idx="2">
-            <a:schemeClr val="accent4"/>
-          </a:fillRef>
-          <a:effectRef idx="1">
-            <a:schemeClr val="accent4"/>
-          </a:effectRef>
-          <a:fontRef idx="minor">
-            <a:schemeClr val="dk1"/>
-          </a:fontRef>
-        </p:style>
-        <p:txBody>
-          <a:bodyPr rtlCol="0" anchor="ctr"/>
-          <a:lstStyle/>
-          <a:p>
-            <a:pPr algn="ctr"/>
-            <a:r>
-              <a:rPr lang="en-US" sz="1050" dirty="0" smtClean="0">
-                <a:solidFill>
-                  <a:srgbClr val="7030A0"/>
-                </a:solidFill>
-              </a:rPr>
-              <a:t>&lt;&lt;interface&gt;&gt;</a:t>
-            </a:r>
-            <a:r>
-              <a:rPr lang="en-US" sz="1050" dirty="0">
-                <a:solidFill>
-                  <a:srgbClr val="7030A0"/>
-                </a:solidFill>
-              </a:rPr>
-              <a:t/>
             </a:r>
             <a:br>
               <a:rPr lang="en-US" sz="1050" dirty="0">
@@ -5490,7 +5309,7 @@
               </a:rPr>
             </a:br>
             <a:r>
-              <a:rPr lang="en-US" sz="1050" dirty="0" err="1" smtClean="0">
+              <a:rPr lang="en-US" sz="1050" dirty="0" err="1">
                 <a:solidFill>
                   <a:srgbClr val="7030A0"/>
                 </a:solidFill>
@@ -5516,7 +5335,7 @@
         </p:nvCxnSpPr>
         <p:spPr>
           <a:xfrm rot="16200000" flipH="1">
-            <a:off x="1364475" y="3719945"/>
+            <a:off x="685372" y="2996020"/>
             <a:ext cx="831471" cy="554380"/>
           </a:xfrm>
           <a:prstGeom prst="bentConnector2">
@@ -5558,8 +5377,8 @@
         </p:nvCxnSpPr>
         <p:spPr>
           <a:xfrm rot="16200000" flipV="1">
-            <a:off x="5948976" y="2139271"/>
-            <a:ext cx="404117" cy="1033473"/>
+            <a:off x="5438086" y="1247132"/>
+            <a:ext cx="67690" cy="1033473"/>
           </a:xfrm>
           <a:prstGeom prst="bentConnector2">
             <a:avLst/>
@@ -5596,7 +5415,7 @@
         </p:nvSpPr>
         <p:spPr>
           <a:xfrm>
-            <a:off x="4324972" y="2191228"/>
+            <a:off x="3645869" y="1467303"/>
             <a:ext cx="189257" cy="178683"/>
           </a:xfrm>
           <a:prstGeom prst="rect">
@@ -5612,7 +5431,7 @@
           <a:p>
             <a:pPr algn="ctr"/>
             <a:r>
-              <a:rPr lang="en-US" sz="1100" dirty="0" smtClean="0">
+              <a:rPr lang="en-US" sz="1100" dirty="0">
                 <a:solidFill>
                   <a:srgbClr val="7030A0"/>
                 </a:solidFill>
@@ -5635,7 +5454,7 @@
         </p:nvSpPr>
         <p:spPr>
           <a:xfrm>
-            <a:off x="4324972" y="3058864"/>
+            <a:off x="3645869" y="2334939"/>
             <a:ext cx="189257" cy="178683"/>
           </a:xfrm>
           <a:prstGeom prst="rect">
@@ -5651,7 +5470,7 @@
           <a:p>
             <a:pPr algn="ctr"/>
             <a:r>
-              <a:rPr lang="en-US" sz="1100" dirty="0" smtClean="0">
+              <a:rPr lang="en-US" sz="1100" dirty="0">
                 <a:solidFill>
                   <a:srgbClr val="7030A0"/>
                 </a:solidFill>
@@ -5674,7 +5493,7 @@
         </p:nvSpPr>
         <p:spPr>
           <a:xfrm>
-            <a:off x="5689761" y="2495413"/>
+            <a:off x="5010658" y="1771488"/>
             <a:ext cx="189257" cy="178683"/>
           </a:xfrm>
           <a:prstGeom prst="rect">
@@ -5690,7 +5509,7 @@
           <a:p>
             <a:pPr algn="ctr"/>
             <a:r>
-              <a:rPr lang="en-US" sz="1100" dirty="0" smtClean="0">
+              <a:rPr lang="en-US" sz="1100" dirty="0">
                 <a:solidFill>
                   <a:srgbClr val="7030A0"/>
                 </a:solidFill>
@@ -5713,7 +5532,7 @@
         </p:nvSpPr>
         <p:spPr>
           <a:xfrm>
-            <a:off x="5163172" y="1778919"/>
+            <a:off x="4484069" y="1054994"/>
             <a:ext cx="189257" cy="178683"/>
           </a:xfrm>
           <a:prstGeom prst="rect">
@@ -5729,7 +5548,7 @@
           <a:p>
             <a:pPr algn="ctr"/>
             <a:r>
-              <a:rPr lang="en-US" sz="1100" dirty="0" smtClean="0">
+              <a:rPr lang="en-US" sz="1100" dirty="0">
                 <a:solidFill>
                   <a:srgbClr val="7030A0"/>
                 </a:solidFill>
@@ -5752,7 +5571,7 @@
         </p:nvSpPr>
         <p:spPr>
           <a:xfrm>
-            <a:off x="6135256" y="3097917"/>
+            <a:off x="5475395" y="2018996"/>
             <a:ext cx="189257" cy="178683"/>
           </a:xfrm>
           <a:prstGeom prst="rect">
@@ -5768,7 +5587,7 @@
           <a:p>
             <a:pPr algn="ctr"/>
             <a:r>
-              <a:rPr lang="en-US" sz="1100" dirty="0" smtClean="0">
+              <a:rPr lang="en-US" sz="1100" dirty="0">
                 <a:solidFill>
                   <a:srgbClr val="7030A0"/>
                 </a:solidFill>
@@ -5791,7 +5610,7 @@
         </p:nvSpPr>
         <p:spPr>
           <a:xfrm>
-            <a:off x="2687923" y="2564238"/>
+            <a:off x="2008820" y="1840313"/>
             <a:ext cx="189257" cy="178683"/>
           </a:xfrm>
           <a:prstGeom prst="rect">
@@ -5807,7 +5626,7 @@
           <a:p>
             <a:pPr algn="ctr"/>
             <a:r>
-              <a:rPr lang="en-US" sz="1100" dirty="0" smtClean="0">
+              <a:rPr lang="en-US" sz="1100" dirty="0">
                 <a:solidFill>
                   <a:srgbClr val="7030A0"/>
                 </a:solidFill>
@@ -5830,7 +5649,7 @@
         </p:nvSpPr>
         <p:spPr>
           <a:xfrm>
-            <a:off x="2656370" y="3386050"/>
+            <a:off x="1977267" y="2662125"/>
             <a:ext cx="189257" cy="178683"/>
           </a:xfrm>
           <a:prstGeom prst="rect">
@@ -5846,7 +5665,7 @@
           <a:p>
             <a:pPr algn="ctr"/>
             <a:r>
-              <a:rPr lang="en-US" sz="1100" dirty="0" smtClean="0">
+              <a:rPr lang="en-US" sz="1100" dirty="0">
                 <a:solidFill>
                   <a:srgbClr val="7030A0"/>
                 </a:solidFill>
@@ -5869,7 +5688,7 @@
         </p:nvSpPr>
         <p:spPr>
           <a:xfrm>
-            <a:off x="6667770" y="3210194"/>
+            <a:off x="5791095" y="3035810"/>
             <a:ext cx="189257" cy="178683"/>
           </a:xfrm>
           <a:prstGeom prst="rect">
@@ -5885,7 +5704,7 @@
           <a:p>
             <a:pPr algn="ctr"/>
             <a:r>
-              <a:rPr lang="en-US" sz="1100" dirty="0" smtClean="0">
+              <a:rPr lang="en-US" sz="1100" dirty="0">
                 <a:solidFill>
                   <a:srgbClr val="7030A0"/>
                 </a:solidFill>
@@ -5900,6 +5719,1526 @@
           </a:p>
         </p:txBody>
       </p:sp>
+      <p:sp>
+        <p:nvSpPr>
+          <p:cNvPr id="55" name="Rectangle 8"/>
+          <p:cNvSpPr/>
+          <p:nvPr/>
+        </p:nvSpPr>
+        <p:spPr>
+          <a:xfrm>
+            <a:off x="3807155" y="2655470"/>
+            <a:ext cx="1156969" cy="346760"/>
+          </a:xfrm>
+          <a:prstGeom prst="rect">
+            <a:avLst/>
+          </a:prstGeom>
+          <a:ln w="19050">
+            <a:solidFill>
+              <a:srgbClr val="7030A0"/>
+            </a:solidFill>
+          </a:ln>
+          <a:effectLst/>
+        </p:spPr>
+        <p:style>
+          <a:lnRef idx="1">
+            <a:schemeClr val="accent4"/>
+          </a:lnRef>
+          <a:fillRef idx="2">
+            <a:schemeClr val="accent4"/>
+          </a:fillRef>
+          <a:effectRef idx="1">
+            <a:schemeClr val="accent4"/>
+          </a:effectRef>
+          <a:fontRef idx="minor">
+            <a:schemeClr val="dk1"/>
+          </a:fontRef>
+        </p:style>
+        <p:txBody>
+          <a:bodyPr rtlCol="0" anchor="ctr"/>
+          <a:lstStyle/>
+          <a:p>
+            <a:pPr algn="ctr"/>
+            <a:r>
+              <a:rPr lang="en-US" sz="1050" dirty="0" err="1">
+                <a:solidFill>
+                  <a:srgbClr val="7030A0"/>
+                </a:solidFill>
+              </a:rPr>
+              <a:t>UniqueEventList</a:t>
+            </a:r>
+            <a:endParaRPr lang="en-SG" sz="1050" dirty="0">
+              <a:solidFill>
+                <a:srgbClr val="7030A0"/>
+              </a:solidFill>
+            </a:endParaRPr>
+          </a:p>
+        </p:txBody>
+      </p:sp>
+      <p:cxnSp>
+        <p:nvCxnSpPr>
+          <p:cNvPr id="73" name="Elbow Connector 29"/>
+          <p:cNvCxnSpPr>
+            <a:cxnSpLocks/>
+            <a:endCxn id="55" idx="1"/>
+          </p:cNvCxnSpPr>
+          <p:nvPr/>
+        </p:nvCxnSpPr>
+        <p:spPr>
+          <a:xfrm rot="16200000" flipH="1">
+            <a:off x="3344746" y="2366441"/>
+            <a:ext cx="792094" cy="132723"/>
+          </a:xfrm>
+          <a:prstGeom prst="bentConnector2">
+            <a:avLst/>
+          </a:prstGeom>
+          <a:ln w="19050">
+            <a:solidFill>
+              <a:srgbClr val="7030A0"/>
+            </a:solidFill>
+            <a:headEnd type="none" w="med" len="med"/>
+            <a:tailEnd type="arrow" w="med" len="med"/>
+          </a:ln>
+          <a:effectLst/>
+        </p:spPr>
+        <p:style>
+          <a:lnRef idx="1">
+            <a:schemeClr val="accent2"/>
+          </a:lnRef>
+          <a:fillRef idx="2">
+            <a:schemeClr val="accent2"/>
+          </a:fillRef>
+          <a:effectRef idx="1">
+            <a:schemeClr val="accent2"/>
+          </a:effectRef>
+          <a:fontRef idx="minor">
+            <a:schemeClr val="dk1"/>
+          </a:fontRef>
+        </p:style>
+      </p:cxnSp>
+      <p:sp>
+        <p:nvSpPr>
+          <p:cNvPr id="74" name="TextBox 73"/>
+          <p:cNvSpPr txBox="1"/>
+          <p:nvPr/>
+        </p:nvSpPr>
+        <p:spPr>
+          <a:xfrm>
+            <a:off x="3645869" y="2892248"/>
+            <a:ext cx="189257" cy="178683"/>
+          </a:xfrm>
+          <a:prstGeom prst="rect">
+            <a:avLst/>
+          </a:prstGeom>
+          <a:noFill/>
+        </p:spPr>
+        <p:txBody>
+          <a:bodyPr wrap="square" lIns="0" tIns="0" rIns="0" bIns="0" rtlCol="0">
+            <a:noAutofit/>
+          </a:bodyPr>
+          <a:lstStyle/>
+          <a:p>
+            <a:pPr algn="ctr"/>
+            <a:r>
+              <a:rPr lang="en-US" sz="1100" dirty="0">
+                <a:solidFill>
+                  <a:srgbClr val="7030A0"/>
+                </a:solidFill>
+              </a:rPr>
+              <a:t>1</a:t>
+            </a:r>
+            <a:endParaRPr lang="en-SG" sz="1100" dirty="0">
+              <a:solidFill>
+                <a:srgbClr val="7030A0"/>
+              </a:solidFill>
+            </a:endParaRPr>
+          </a:p>
+        </p:txBody>
+      </p:sp>
+      <p:sp>
+        <p:nvSpPr>
+          <p:cNvPr id="77" name="Flowchart: Decision 96"/>
+          <p:cNvSpPr/>
+          <p:nvPr/>
+        </p:nvSpPr>
+        <p:spPr>
+          <a:xfrm>
+            <a:off x="4976371" y="2728053"/>
+            <a:ext cx="236048" cy="173380"/>
+          </a:xfrm>
+          <a:prstGeom prst="flowChartDecision">
+            <a:avLst/>
+          </a:prstGeom>
+          <a:noFill/>
+          <a:ln w="19050">
+            <a:solidFill>
+              <a:srgbClr val="7030A0"/>
+            </a:solidFill>
+          </a:ln>
+          <a:effectLst/>
+        </p:spPr>
+        <p:style>
+          <a:lnRef idx="1">
+            <a:schemeClr val="accent6"/>
+          </a:lnRef>
+          <a:fillRef idx="2">
+            <a:schemeClr val="accent6"/>
+          </a:fillRef>
+          <a:effectRef idx="1">
+            <a:schemeClr val="accent6"/>
+          </a:effectRef>
+          <a:fontRef idx="minor">
+            <a:schemeClr val="dk1"/>
+          </a:fontRef>
+        </p:style>
+        <p:txBody>
+          <a:bodyPr rtlCol="0" anchor="ctr"/>
+          <a:lstStyle/>
+          <a:p>
+            <a:pPr algn="ctr"/>
+            <a:endParaRPr lang="en-US" sz="1050" dirty="0"/>
+          </a:p>
+        </p:txBody>
+      </p:sp>
+      <p:cxnSp>
+        <p:nvCxnSpPr>
+          <p:cNvPr id="82" name="Elbow Connector 63"/>
+          <p:cNvCxnSpPr>
+            <a:stCxn id="77" idx="3"/>
+          </p:cNvCxnSpPr>
+          <p:nvPr/>
+        </p:nvCxnSpPr>
+        <p:spPr>
+          <a:xfrm>
+            <a:off x="5212419" y="2814743"/>
+            <a:ext cx="434402" cy="777"/>
+          </a:xfrm>
+          <a:prstGeom prst="bentConnector3">
+            <a:avLst/>
+          </a:prstGeom>
+          <a:ln w="19050">
+            <a:solidFill>
+              <a:srgbClr val="7030A0"/>
+            </a:solidFill>
+            <a:headEnd type="none" w="med" len="med"/>
+            <a:tailEnd type="arrow" w="med" len="med"/>
+          </a:ln>
+          <a:effectLst/>
+        </p:spPr>
+        <p:style>
+          <a:lnRef idx="1">
+            <a:schemeClr val="accent2"/>
+          </a:lnRef>
+          <a:fillRef idx="2">
+            <a:schemeClr val="accent2"/>
+          </a:fillRef>
+          <a:effectRef idx="1">
+            <a:schemeClr val="accent2"/>
+          </a:effectRef>
+          <a:fontRef idx="minor">
+            <a:schemeClr val="dk1"/>
+          </a:fontRef>
+        </p:style>
+      </p:cxnSp>
+      <p:sp>
+        <p:nvSpPr>
+          <p:cNvPr id="89" name="Rectangle 8"/>
+          <p:cNvSpPr/>
+          <p:nvPr/>
+        </p:nvSpPr>
+        <p:spPr>
+          <a:xfrm>
+            <a:off x="5634574" y="2655469"/>
+            <a:ext cx="708186" cy="346760"/>
+          </a:xfrm>
+          <a:prstGeom prst="rect">
+            <a:avLst/>
+          </a:prstGeom>
+          <a:ln w="19050">
+            <a:solidFill>
+              <a:srgbClr val="7030A0"/>
+            </a:solidFill>
+          </a:ln>
+          <a:effectLst/>
+        </p:spPr>
+        <p:style>
+          <a:lnRef idx="1">
+            <a:schemeClr val="accent4"/>
+          </a:lnRef>
+          <a:fillRef idx="2">
+            <a:schemeClr val="accent4"/>
+          </a:fillRef>
+          <a:effectRef idx="1">
+            <a:schemeClr val="accent4"/>
+          </a:effectRef>
+          <a:fontRef idx="minor">
+            <a:schemeClr val="dk1"/>
+          </a:fontRef>
+        </p:style>
+        <p:txBody>
+          <a:bodyPr rtlCol="0" anchor="ctr"/>
+          <a:lstStyle/>
+          <a:p>
+            <a:pPr algn="ctr"/>
+            <a:r>
+              <a:rPr lang="en-US" sz="1050" dirty="0">
+                <a:solidFill>
+                  <a:srgbClr val="7030A0"/>
+                </a:solidFill>
+              </a:rPr>
+              <a:t>Event</a:t>
+            </a:r>
+            <a:endParaRPr lang="en-SG" sz="1050" dirty="0">
+              <a:solidFill>
+                <a:srgbClr val="7030A0"/>
+              </a:solidFill>
+            </a:endParaRPr>
+          </a:p>
+        </p:txBody>
+      </p:sp>
+      <p:sp>
+        <p:nvSpPr>
+          <p:cNvPr id="90" name="Rectangle 8"/>
+          <p:cNvSpPr/>
+          <p:nvPr/>
+        </p:nvSpPr>
+        <p:spPr>
+          <a:xfrm>
+            <a:off x="3533213" y="478577"/>
+            <a:ext cx="1269625" cy="346760"/>
+          </a:xfrm>
+          <a:prstGeom prst="rect">
+            <a:avLst/>
+          </a:prstGeom>
+          <a:ln w="19050">
+            <a:solidFill>
+              <a:srgbClr val="7030A0"/>
+            </a:solidFill>
+          </a:ln>
+          <a:effectLst/>
+        </p:spPr>
+        <p:style>
+          <a:lnRef idx="1">
+            <a:schemeClr val="accent4"/>
+          </a:lnRef>
+          <a:fillRef idx="2">
+            <a:schemeClr val="accent4"/>
+          </a:fillRef>
+          <a:effectRef idx="1">
+            <a:schemeClr val="accent4"/>
+          </a:effectRef>
+          <a:fontRef idx="minor">
+            <a:schemeClr val="dk1"/>
+          </a:fontRef>
+        </p:style>
+        <p:txBody>
+          <a:bodyPr rtlCol="0" anchor="ctr"/>
+          <a:lstStyle/>
+          <a:p>
+            <a:pPr algn="ctr"/>
+            <a:r>
+              <a:rPr lang="en-US" sz="1050" dirty="0">
+                <a:solidFill>
+                  <a:srgbClr val="7030A0"/>
+                </a:solidFill>
+              </a:rPr>
+              <a:t>&lt;&lt;interface&gt;&gt;</a:t>
+            </a:r>
+            <a:br>
+              <a:rPr lang="en-US" sz="1050" dirty="0">
+                <a:solidFill>
+                  <a:srgbClr val="7030A0"/>
+                </a:solidFill>
+              </a:rPr>
+            </a:br>
+            <a:r>
+              <a:rPr lang="en-US" sz="1050" dirty="0" err="1">
+                <a:solidFill>
+                  <a:srgbClr val="7030A0"/>
+                </a:solidFill>
+              </a:rPr>
+              <a:t>ReadOnlyUserItem</a:t>
+            </a:r>
+            <a:endParaRPr lang="en-SG" sz="1050" dirty="0">
+              <a:solidFill>
+                <a:srgbClr val="7030A0"/>
+              </a:solidFill>
+            </a:endParaRPr>
+          </a:p>
+        </p:txBody>
+      </p:sp>
+      <p:sp>
+        <p:nvSpPr>
+          <p:cNvPr id="91" name="Isosceles Triangle 102"/>
+          <p:cNvSpPr/>
+          <p:nvPr/>
+        </p:nvSpPr>
+        <p:spPr>
+          <a:xfrm rot="5400000" flipV="1">
+            <a:off x="4754238" y="568168"/>
+            <a:ext cx="270504" cy="149272"/>
+          </a:xfrm>
+          <a:prstGeom prst="triangle">
+            <a:avLst/>
+          </a:prstGeom>
+          <a:solidFill>
+            <a:srgbClr val="7030A0"/>
+          </a:solidFill>
+          <a:ln w="19050">
+            <a:solidFill>
+              <a:srgbClr val="7030A0"/>
+            </a:solidFill>
+          </a:ln>
+          <a:effectLst/>
+        </p:spPr>
+        <p:style>
+          <a:lnRef idx="1">
+            <a:schemeClr val="accent4"/>
+          </a:lnRef>
+          <a:fillRef idx="2">
+            <a:schemeClr val="accent4"/>
+          </a:fillRef>
+          <a:effectRef idx="1">
+            <a:schemeClr val="accent4"/>
+          </a:effectRef>
+          <a:fontRef idx="minor">
+            <a:schemeClr val="dk1"/>
+          </a:fontRef>
+        </p:style>
+        <p:txBody>
+          <a:bodyPr rtlCol="0" anchor="ctr"/>
+          <a:lstStyle/>
+          <a:p>
+            <a:pPr algn="ctr"/>
+            <a:endParaRPr lang="en-SG" sz="1050" b="1">
+              <a:solidFill>
+                <a:srgbClr val="92D050"/>
+              </a:solidFill>
+            </a:endParaRPr>
+          </a:p>
+        </p:txBody>
+      </p:sp>
+      <p:cxnSp>
+        <p:nvCxnSpPr>
+          <p:cNvPr id="92" name="Elbow Connector 63"/>
+          <p:cNvCxnSpPr>
+            <a:cxnSpLocks/>
+            <a:stCxn id="91" idx="3"/>
+            <a:endCxn id="72" idx="0"/>
+          </p:cNvCxnSpPr>
+          <p:nvPr/>
+        </p:nvCxnSpPr>
+        <p:spPr>
+          <a:xfrm>
+            <a:off x="4964126" y="642804"/>
+            <a:ext cx="890377" cy="247200"/>
+          </a:xfrm>
+          <a:prstGeom prst="bentConnector2">
+            <a:avLst/>
+          </a:prstGeom>
+          <a:ln w="19050">
+            <a:solidFill>
+              <a:srgbClr val="7030A0"/>
+            </a:solidFill>
+            <a:prstDash val="sysDot"/>
+            <a:headEnd type="none" w="med" len="med"/>
+            <a:tailEnd type="none" w="med" len="med"/>
+          </a:ln>
+          <a:effectLst/>
+        </p:spPr>
+        <p:style>
+          <a:lnRef idx="1">
+            <a:schemeClr val="accent2"/>
+          </a:lnRef>
+          <a:fillRef idx="2">
+            <a:schemeClr val="accent2"/>
+          </a:fillRef>
+          <a:effectRef idx="1">
+            <a:schemeClr val="accent2"/>
+          </a:effectRef>
+          <a:fontRef idx="minor">
+            <a:schemeClr val="dk1"/>
+          </a:fontRef>
+        </p:style>
+      </p:cxnSp>
+      <p:sp>
+        <p:nvSpPr>
+          <p:cNvPr id="98" name="Isosceles Triangle 102"/>
+          <p:cNvSpPr/>
+          <p:nvPr/>
+        </p:nvSpPr>
+        <p:spPr>
+          <a:xfrm rot="10800000" flipV="1">
+            <a:off x="5986960" y="1249329"/>
+            <a:ext cx="270504" cy="136800"/>
+          </a:xfrm>
+          <a:prstGeom prst="triangle">
+            <a:avLst/>
+          </a:prstGeom>
+          <a:solidFill>
+            <a:srgbClr val="7030A0"/>
+          </a:solidFill>
+          <a:ln w="19050">
+            <a:solidFill>
+              <a:srgbClr val="7030A0"/>
+            </a:solidFill>
+          </a:ln>
+          <a:effectLst/>
+        </p:spPr>
+        <p:style>
+          <a:lnRef idx="1">
+            <a:schemeClr val="accent4"/>
+          </a:lnRef>
+          <a:fillRef idx="2">
+            <a:schemeClr val="accent4"/>
+          </a:fillRef>
+          <a:effectRef idx="1">
+            <a:schemeClr val="accent4"/>
+          </a:effectRef>
+          <a:fontRef idx="minor">
+            <a:schemeClr val="dk1"/>
+          </a:fontRef>
+        </p:style>
+        <p:txBody>
+          <a:bodyPr rtlCol="0" anchor="ctr"/>
+          <a:lstStyle/>
+          <a:p>
+            <a:pPr algn="ctr"/>
+            <a:endParaRPr lang="en-SG" sz="1050" b="1">
+              <a:solidFill>
+                <a:srgbClr val="92D050"/>
+              </a:solidFill>
+            </a:endParaRPr>
+          </a:p>
+        </p:txBody>
+      </p:sp>
+      <p:sp>
+        <p:nvSpPr>
+          <p:cNvPr id="101" name="TextBox 100"/>
+          <p:cNvSpPr txBox="1"/>
+          <p:nvPr/>
+        </p:nvSpPr>
+        <p:spPr>
+          <a:xfrm>
+            <a:off x="5471931" y="2896125"/>
+            <a:ext cx="189257" cy="178683"/>
+          </a:xfrm>
+          <a:prstGeom prst="rect">
+            <a:avLst/>
+          </a:prstGeom>
+          <a:noFill/>
+        </p:spPr>
+        <p:txBody>
+          <a:bodyPr wrap="square" lIns="0" tIns="0" rIns="0" bIns="0" rtlCol="0">
+            <a:noAutofit/>
+          </a:bodyPr>
+          <a:lstStyle/>
+          <a:p>
+            <a:pPr algn="ctr"/>
+            <a:r>
+              <a:rPr lang="en-US" sz="1100" dirty="0">
+                <a:solidFill>
+                  <a:srgbClr val="7030A0"/>
+                </a:solidFill>
+              </a:rPr>
+              <a:t>*</a:t>
+            </a:r>
+            <a:endParaRPr lang="en-SG" sz="1100" dirty="0">
+              <a:solidFill>
+                <a:srgbClr val="7030A0"/>
+              </a:solidFill>
+            </a:endParaRPr>
+          </a:p>
+        </p:txBody>
+      </p:sp>
+      <p:cxnSp>
+        <p:nvCxnSpPr>
+          <p:cNvPr id="103" name="Elbow Connector 49"/>
+          <p:cNvCxnSpPr>
+            <a:cxnSpLocks/>
+            <a:endCxn id="57" idx="3"/>
+          </p:cNvCxnSpPr>
+          <p:nvPr/>
+        </p:nvCxnSpPr>
+        <p:spPr>
+          <a:xfrm rot="10800000">
+            <a:off x="4955195" y="1730024"/>
+            <a:ext cx="1027047" cy="925444"/>
+          </a:xfrm>
+          <a:prstGeom prst="bentConnector3">
+            <a:avLst>
+              <a:gd name="adj1" fmla="val 47527"/>
+            </a:avLst>
+          </a:prstGeom>
+          <a:ln w="19050">
+            <a:solidFill>
+              <a:srgbClr val="7030A0"/>
+            </a:solidFill>
+            <a:headEnd type="none" w="med" len="med"/>
+            <a:tailEnd type="arrow" w="med" len="med"/>
+          </a:ln>
+          <a:effectLst/>
+        </p:spPr>
+        <p:style>
+          <a:lnRef idx="1">
+            <a:schemeClr val="accent2"/>
+          </a:lnRef>
+          <a:fillRef idx="2">
+            <a:schemeClr val="accent2"/>
+          </a:fillRef>
+          <a:effectRef idx="1">
+            <a:schemeClr val="accent2"/>
+          </a:effectRef>
+          <a:fontRef idx="minor">
+            <a:schemeClr val="dk1"/>
+          </a:fontRef>
+        </p:style>
+      </p:cxnSp>
+      <p:sp>
+        <p:nvSpPr>
+          <p:cNvPr id="127" name="Rectangle 8"/>
+          <p:cNvSpPr/>
+          <p:nvPr/>
+        </p:nvSpPr>
+        <p:spPr>
+          <a:xfrm>
+            <a:off x="5276017" y="3548320"/>
+            <a:ext cx="1156969" cy="346760"/>
+          </a:xfrm>
+          <a:prstGeom prst="rect">
+            <a:avLst/>
+          </a:prstGeom>
+          <a:ln w="19050">
+            <a:solidFill>
+              <a:srgbClr val="7030A0"/>
+            </a:solidFill>
+          </a:ln>
+          <a:effectLst/>
+        </p:spPr>
+        <p:style>
+          <a:lnRef idx="1">
+            <a:schemeClr val="accent4"/>
+          </a:lnRef>
+          <a:fillRef idx="2">
+            <a:schemeClr val="accent4"/>
+          </a:fillRef>
+          <a:effectRef idx="1">
+            <a:schemeClr val="accent4"/>
+          </a:effectRef>
+          <a:fontRef idx="minor">
+            <a:schemeClr val="dk1"/>
+          </a:fontRef>
+        </p:style>
+        <p:txBody>
+          <a:bodyPr rtlCol="0" anchor="ctr"/>
+          <a:lstStyle/>
+          <a:p>
+            <a:pPr algn="ctr"/>
+            <a:r>
+              <a:rPr lang="en-US" sz="1050" dirty="0">
+                <a:solidFill>
+                  <a:srgbClr val="7030A0"/>
+                </a:solidFill>
+              </a:rPr>
+              <a:t>&lt;&lt;interface&gt;&gt;</a:t>
+            </a:r>
+            <a:br>
+              <a:rPr lang="en-US" sz="1050" dirty="0">
+                <a:solidFill>
+                  <a:srgbClr val="7030A0"/>
+                </a:solidFill>
+              </a:rPr>
+            </a:br>
+            <a:r>
+              <a:rPr lang="en-US" sz="1050" dirty="0" err="1">
+                <a:solidFill>
+                  <a:srgbClr val="7030A0"/>
+                </a:solidFill>
+              </a:rPr>
+              <a:t>ReadOnlyEvent</a:t>
+            </a:r>
+            <a:endParaRPr lang="en-SG" sz="1050" dirty="0">
+              <a:solidFill>
+                <a:srgbClr val="7030A0"/>
+              </a:solidFill>
+            </a:endParaRPr>
+          </a:p>
+        </p:txBody>
+      </p:sp>
+      <p:cxnSp>
+        <p:nvCxnSpPr>
+          <p:cNvPr id="129" name="Elbow Connector 63"/>
+          <p:cNvCxnSpPr>
+            <a:cxnSpLocks/>
+          </p:cNvCxnSpPr>
+          <p:nvPr/>
+        </p:nvCxnSpPr>
+        <p:spPr>
+          <a:xfrm>
+            <a:off x="4999134" y="641427"/>
+            <a:ext cx="1468860" cy="3078896"/>
+          </a:xfrm>
+          <a:prstGeom prst="bentConnector3">
+            <a:avLst>
+              <a:gd name="adj1" fmla="val 111240"/>
+            </a:avLst>
+          </a:prstGeom>
+          <a:ln w="19050">
+            <a:solidFill>
+              <a:srgbClr val="7030A0"/>
+            </a:solidFill>
+            <a:prstDash val="sysDot"/>
+            <a:headEnd type="none" w="med" len="med"/>
+            <a:tailEnd type="none" w="med" len="med"/>
+          </a:ln>
+          <a:effectLst/>
+        </p:spPr>
+        <p:style>
+          <a:lnRef idx="1">
+            <a:schemeClr val="accent2"/>
+          </a:lnRef>
+          <a:fillRef idx="2">
+            <a:schemeClr val="accent2"/>
+          </a:fillRef>
+          <a:effectRef idx="1">
+            <a:schemeClr val="accent2"/>
+          </a:effectRef>
+          <a:fontRef idx="minor">
+            <a:schemeClr val="dk1"/>
+          </a:fontRef>
+        </p:style>
+      </p:cxnSp>
+      <p:sp>
+        <p:nvSpPr>
+          <p:cNvPr id="141" name="Flowchart: Decision 96"/>
+          <p:cNvSpPr/>
+          <p:nvPr/>
+        </p:nvSpPr>
+        <p:spPr>
+          <a:xfrm>
+            <a:off x="6351221" y="2754368"/>
+            <a:ext cx="246680" cy="137880"/>
+          </a:xfrm>
+          <a:prstGeom prst="flowChartDecision">
+            <a:avLst/>
+          </a:prstGeom>
+          <a:solidFill>
+            <a:srgbClr val="7030A0"/>
+          </a:solidFill>
+          <a:ln w="19050">
+            <a:solidFill>
+              <a:srgbClr val="7030A0"/>
+            </a:solidFill>
+          </a:ln>
+          <a:effectLst/>
+        </p:spPr>
+        <p:style>
+          <a:lnRef idx="1">
+            <a:schemeClr val="accent6"/>
+          </a:lnRef>
+          <a:fillRef idx="2">
+            <a:schemeClr val="accent6"/>
+          </a:fillRef>
+          <a:effectRef idx="1">
+            <a:schemeClr val="accent6"/>
+          </a:effectRef>
+          <a:fontRef idx="minor">
+            <a:schemeClr val="dk1"/>
+          </a:fontRef>
+        </p:style>
+        <p:txBody>
+          <a:bodyPr rtlCol="0" anchor="ctr"/>
+          <a:lstStyle/>
+          <a:p>
+            <a:pPr algn="ctr"/>
+            <a:endParaRPr lang="en-US" sz="1050"/>
+          </a:p>
+        </p:txBody>
+      </p:sp>
+      <p:sp>
+        <p:nvSpPr>
+          <p:cNvPr id="145" name="Rectangle 8"/>
+          <p:cNvSpPr/>
+          <p:nvPr/>
+        </p:nvSpPr>
+        <p:spPr>
+          <a:xfrm>
+            <a:off x="6978200" y="2946307"/>
+            <a:ext cx="846023" cy="257001"/>
+          </a:xfrm>
+          <a:prstGeom prst="rect">
+            <a:avLst/>
+          </a:prstGeom>
+          <a:ln w="19050">
+            <a:solidFill>
+              <a:srgbClr val="7030A0"/>
+            </a:solidFill>
+          </a:ln>
+          <a:effectLst/>
+        </p:spPr>
+        <p:style>
+          <a:lnRef idx="1">
+            <a:schemeClr val="accent4"/>
+          </a:lnRef>
+          <a:fillRef idx="2">
+            <a:schemeClr val="accent4"/>
+          </a:fillRef>
+          <a:effectRef idx="1">
+            <a:schemeClr val="accent4"/>
+          </a:effectRef>
+          <a:fontRef idx="minor">
+            <a:schemeClr val="dk1"/>
+          </a:fontRef>
+        </p:style>
+        <p:txBody>
+          <a:bodyPr rtlCol="0" anchor="ctr"/>
+          <a:lstStyle/>
+          <a:p>
+            <a:pPr algn="ctr"/>
+            <a:r>
+              <a:rPr lang="en-US" sz="1050" dirty="0">
+                <a:solidFill>
+                  <a:srgbClr val="7030A0"/>
+                </a:solidFill>
+              </a:rPr>
+              <a:t>Location</a:t>
+            </a:r>
+            <a:endParaRPr lang="en-SG" sz="1050" dirty="0">
+              <a:solidFill>
+                <a:srgbClr val="7030A0"/>
+              </a:solidFill>
+            </a:endParaRPr>
+          </a:p>
+        </p:txBody>
+      </p:sp>
+      <p:sp>
+        <p:nvSpPr>
+          <p:cNvPr id="146" name="Rectangle 8"/>
+          <p:cNvSpPr/>
+          <p:nvPr/>
+        </p:nvSpPr>
+        <p:spPr>
+          <a:xfrm>
+            <a:off x="6978200" y="3273210"/>
+            <a:ext cx="846022" cy="243705"/>
+          </a:xfrm>
+          <a:prstGeom prst="rect">
+            <a:avLst/>
+          </a:prstGeom>
+          <a:ln w="19050">
+            <a:solidFill>
+              <a:srgbClr val="7030A0"/>
+            </a:solidFill>
+          </a:ln>
+          <a:effectLst/>
+        </p:spPr>
+        <p:style>
+          <a:lnRef idx="1">
+            <a:schemeClr val="accent4"/>
+          </a:lnRef>
+          <a:fillRef idx="2">
+            <a:schemeClr val="accent4"/>
+          </a:fillRef>
+          <a:effectRef idx="1">
+            <a:schemeClr val="accent4"/>
+          </a:effectRef>
+          <a:fontRef idx="minor">
+            <a:schemeClr val="dk1"/>
+          </a:fontRef>
+        </p:style>
+        <p:txBody>
+          <a:bodyPr rtlCol="0" anchor="ctr"/>
+          <a:lstStyle/>
+          <a:p>
+            <a:pPr algn="ctr"/>
+            <a:r>
+              <a:rPr lang="en-US" sz="1050" dirty="0">
+                <a:solidFill>
+                  <a:srgbClr val="7030A0"/>
+                </a:solidFill>
+              </a:rPr>
+              <a:t>Timeslot</a:t>
+            </a:r>
+            <a:endParaRPr lang="en-SG" sz="1050" dirty="0">
+              <a:solidFill>
+                <a:srgbClr val="7030A0"/>
+              </a:solidFill>
+            </a:endParaRPr>
+          </a:p>
+        </p:txBody>
+      </p:sp>
+      <p:cxnSp>
+        <p:nvCxnSpPr>
+          <p:cNvPr id="151" name="Elbow Connector 80"/>
+          <p:cNvCxnSpPr>
+            <a:cxnSpLocks/>
+            <a:stCxn id="141" idx="3"/>
+            <a:endCxn id="145" idx="1"/>
+          </p:cNvCxnSpPr>
+          <p:nvPr/>
+        </p:nvCxnSpPr>
+        <p:spPr>
+          <a:xfrm>
+            <a:off x="6597901" y="2823308"/>
+            <a:ext cx="380299" cy="251500"/>
+          </a:xfrm>
+          <a:prstGeom prst="bentConnector3">
+            <a:avLst>
+              <a:gd name="adj1" fmla="val 50000"/>
+            </a:avLst>
+          </a:prstGeom>
+          <a:ln w="19050">
+            <a:solidFill>
+              <a:srgbClr val="7030A0"/>
+            </a:solidFill>
+            <a:headEnd type="none" w="med" len="med"/>
+            <a:tailEnd type="arrow" w="med" len="med"/>
+          </a:ln>
+          <a:effectLst/>
+        </p:spPr>
+        <p:style>
+          <a:lnRef idx="1">
+            <a:schemeClr val="accent2"/>
+          </a:lnRef>
+          <a:fillRef idx="2">
+            <a:schemeClr val="accent2"/>
+          </a:fillRef>
+          <a:effectRef idx="1">
+            <a:schemeClr val="accent2"/>
+          </a:effectRef>
+          <a:fontRef idx="minor">
+            <a:schemeClr val="dk1"/>
+          </a:fontRef>
+        </p:style>
+      </p:cxnSp>
+      <p:cxnSp>
+        <p:nvCxnSpPr>
+          <p:cNvPr id="157" name="Elbow Connector 80"/>
+          <p:cNvCxnSpPr>
+            <a:cxnSpLocks/>
+            <a:stCxn id="141" idx="3"/>
+            <a:endCxn id="146" idx="1"/>
+          </p:cNvCxnSpPr>
+          <p:nvPr/>
+        </p:nvCxnSpPr>
+        <p:spPr>
+          <a:xfrm>
+            <a:off x="6597901" y="2823308"/>
+            <a:ext cx="380299" cy="571755"/>
+          </a:xfrm>
+          <a:prstGeom prst="bentConnector3">
+            <a:avLst>
+              <a:gd name="adj1" fmla="val 50000"/>
+            </a:avLst>
+          </a:prstGeom>
+          <a:ln w="19050">
+            <a:solidFill>
+              <a:srgbClr val="7030A0"/>
+            </a:solidFill>
+            <a:headEnd type="none" w="med" len="med"/>
+            <a:tailEnd type="arrow" w="med" len="med"/>
+          </a:ln>
+          <a:effectLst/>
+        </p:spPr>
+        <p:style>
+          <a:lnRef idx="1">
+            <a:schemeClr val="accent2"/>
+          </a:lnRef>
+          <a:fillRef idx="2">
+            <a:schemeClr val="accent2"/>
+          </a:fillRef>
+          <a:effectRef idx="1">
+            <a:schemeClr val="accent2"/>
+          </a:effectRef>
+          <a:fontRef idx="minor">
+            <a:schemeClr val="dk1"/>
+          </a:fontRef>
+        </p:style>
+      </p:cxnSp>
+      <p:sp>
+        <p:nvSpPr>
+          <p:cNvPr id="159" name="Rectangle 8"/>
+          <p:cNvSpPr/>
+          <p:nvPr/>
+        </p:nvSpPr>
+        <p:spPr>
+          <a:xfrm>
+            <a:off x="6793802" y="2160647"/>
+            <a:ext cx="893892" cy="375642"/>
+          </a:xfrm>
+          <a:prstGeom prst="rect">
+            <a:avLst/>
+          </a:prstGeom>
+          <a:ln w="19050">
+            <a:solidFill>
+              <a:srgbClr val="7030A0"/>
+            </a:solidFill>
+          </a:ln>
+          <a:effectLst/>
+        </p:spPr>
+        <p:style>
+          <a:lnRef idx="1">
+            <a:schemeClr val="accent4"/>
+          </a:lnRef>
+          <a:fillRef idx="2">
+            <a:schemeClr val="accent4"/>
+          </a:fillRef>
+          <a:effectRef idx="1">
+            <a:schemeClr val="accent4"/>
+          </a:effectRef>
+          <a:fontRef idx="minor">
+            <a:schemeClr val="dk1"/>
+          </a:fontRef>
+        </p:style>
+        <p:txBody>
+          <a:bodyPr rtlCol="0" anchor="ctr"/>
+          <a:lstStyle/>
+          <a:p>
+            <a:pPr algn="ctr"/>
+            <a:r>
+              <a:rPr lang="en-US" sz="1050" dirty="0" err="1">
+                <a:solidFill>
+                  <a:srgbClr val="7030A0"/>
+                </a:solidFill>
+              </a:rPr>
+              <a:t>UserItem</a:t>
+            </a:r>
+            <a:endParaRPr lang="en-SG" sz="1050" dirty="0">
+              <a:solidFill>
+                <a:srgbClr val="7030A0"/>
+              </a:solidFill>
+            </a:endParaRPr>
+          </a:p>
+        </p:txBody>
+      </p:sp>
+      <p:cxnSp>
+        <p:nvCxnSpPr>
+          <p:cNvPr id="164" name="Elbow Connector 80"/>
+          <p:cNvCxnSpPr>
+            <a:cxnSpLocks/>
+            <a:stCxn id="167" idx="3"/>
+            <a:endCxn id="83" idx="1"/>
+          </p:cNvCxnSpPr>
+          <p:nvPr/>
+        </p:nvCxnSpPr>
+        <p:spPr>
+          <a:xfrm flipV="1">
+            <a:off x="7934374" y="2059023"/>
+            <a:ext cx="228334" cy="275916"/>
+          </a:xfrm>
+          <a:prstGeom prst="bentConnector3">
+            <a:avLst>
+              <a:gd name="adj1" fmla="val 22190"/>
+            </a:avLst>
+          </a:prstGeom>
+          <a:ln w="19050">
+            <a:solidFill>
+              <a:srgbClr val="7030A0"/>
+            </a:solidFill>
+            <a:headEnd type="none" w="med" len="med"/>
+            <a:tailEnd type="arrow" w="med" len="med"/>
+          </a:ln>
+          <a:effectLst/>
+        </p:spPr>
+        <p:style>
+          <a:lnRef idx="1">
+            <a:schemeClr val="accent2"/>
+          </a:lnRef>
+          <a:fillRef idx="2">
+            <a:schemeClr val="accent2"/>
+          </a:fillRef>
+          <a:effectRef idx="1">
+            <a:schemeClr val="accent2"/>
+          </a:effectRef>
+          <a:fontRef idx="minor">
+            <a:schemeClr val="dk1"/>
+          </a:fontRef>
+        </p:style>
+      </p:cxnSp>
+      <p:sp>
+        <p:nvSpPr>
+          <p:cNvPr id="167" name="Flowchart: Decision 96"/>
+          <p:cNvSpPr/>
+          <p:nvPr/>
+        </p:nvSpPr>
+        <p:spPr>
+          <a:xfrm>
+            <a:off x="7687694" y="2265999"/>
+            <a:ext cx="246680" cy="137880"/>
+          </a:xfrm>
+          <a:prstGeom prst="flowChartDecision">
+            <a:avLst/>
+          </a:prstGeom>
+          <a:solidFill>
+            <a:srgbClr val="7030A0"/>
+          </a:solidFill>
+          <a:ln w="19050">
+            <a:solidFill>
+              <a:srgbClr val="7030A0"/>
+            </a:solidFill>
+          </a:ln>
+          <a:effectLst/>
+        </p:spPr>
+        <p:style>
+          <a:lnRef idx="1">
+            <a:schemeClr val="accent6"/>
+          </a:lnRef>
+          <a:fillRef idx="2">
+            <a:schemeClr val="accent6"/>
+          </a:fillRef>
+          <a:effectRef idx="1">
+            <a:schemeClr val="accent6"/>
+          </a:effectRef>
+          <a:fontRef idx="minor">
+            <a:schemeClr val="dk1"/>
+          </a:fontRef>
+        </p:style>
+        <p:txBody>
+          <a:bodyPr rtlCol="0" anchor="ctr"/>
+          <a:lstStyle/>
+          <a:p>
+            <a:pPr algn="ctr"/>
+            <a:endParaRPr lang="en-US" sz="1050"/>
+          </a:p>
+        </p:txBody>
+      </p:sp>
+      <p:cxnSp>
+        <p:nvCxnSpPr>
+          <p:cNvPr id="179" name="Elbow Connector 80"/>
+          <p:cNvCxnSpPr>
+            <a:cxnSpLocks/>
+            <a:stCxn id="167" idx="3"/>
+            <a:endCxn id="85" idx="1"/>
+          </p:cNvCxnSpPr>
+          <p:nvPr/>
+        </p:nvCxnSpPr>
+        <p:spPr>
+          <a:xfrm>
+            <a:off x="7934374" y="2334939"/>
+            <a:ext cx="208218" cy="232510"/>
+          </a:xfrm>
+          <a:prstGeom prst="bentConnector3">
+            <a:avLst>
+              <a:gd name="adj1" fmla="val 22553"/>
+            </a:avLst>
+          </a:prstGeom>
+          <a:ln w="19050">
+            <a:solidFill>
+              <a:srgbClr val="7030A0"/>
+            </a:solidFill>
+            <a:headEnd type="none" w="med" len="med"/>
+            <a:tailEnd type="arrow" w="med" len="med"/>
+          </a:ln>
+          <a:effectLst/>
+        </p:spPr>
+        <p:style>
+          <a:lnRef idx="1">
+            <a:schemeClr val="accent2"/>
+          </a:lnRef>
+          <a:fillRef idx="2">
+            <a:schemeClr val="accent2"/>
+          </a:fillRef>
+          <a:effectRef idx="1">
+            <a:schemeClr val="accent2"/>
+          </a:effectRef>
+          <a:fontRef idx="minor">
+            <a:schemeClr val="dk1"/>
+          </a:fontRef>
+        </p:style>
+      </p:cxnSp>
+      <p:sp>
+        <p:nvSpPr>
+          <p:cNvPr id="200" name="TextBox 199"/>
+          <p:cNvSpPr txBox="1"/>
+          <p:nvPr/>
+        </p:nvSpPr>
+        <p:spPr>
+          <a:xfrm>
+            <a:off x="3732498" y="3312748"/>
+            <a:ext cx="871599" cy="261610"/>
+          </a:xfrm>
+          <a:prstGeom prst="rect">
+            <a:avLst/>
+          </a:prstGeom>
+          <a:noFill/>
+        </p:spPr>
+        <p:txBody>
+          <a:bodyPr wrap="square" rtlCol="0">
+            <a:spAutoFit/>
+          </a:bodyPr>
+          <a:lstStyle/>
+          <a:p>
+            <a:pPr algn="r"/>
+            <a:r>
+              <a:rPr lang="en-US" sz="1100" dirty="0">
+                <a:solidFill>
+                  <a:srgbClr val="7030A0"/>
+                </a:solidFill>
+              </a:rPr>
+              <a:t>filtered list</a:t>
+            </a:r>
+            <a:endParaRPr lang="en-SG" sz="1100" dirty="0">
+              <a:solidFill>
+                <a:srgbClr val="7030A0"/>
+              </a:solidFill>
+            </a:endParaRPr>
+          </a:p>
+        </p:txBody>
+      </p:sp>
+      <p:grpSp>
+        <p:nvGrpSpPr>
+          <p:cNvPr id="245" name="Group 244"/>
+          <p:cNvGrpSpPr/>
+          <p:nvPr/>
+        </p:nvGrpSpPr>
+        <p:grpSpPr>
+          <a:xfrm>
+            <a:off x="5382002" y="2144474"/>
+            <a:ext cx="606665" cy="1173288"/>
+            <a:chOff x="5382002" y="2144474"/>
+            <a:chExt cx="606665" cy="1173288"/>
+          </a:xfrm>
+        </p:grpSpPr>
+        <p:cxnSp>
+          <p:nvCxnSpPr>
+            <p:cNvPr id="201" name="Elbow Connector 106"/>
+            <p:cNvCxnSpPr>
+              <a:cxnSpLocks/>
+              <a:endCxn id="62" idx="2"/>
+            </p:cNvCxnSpPr>
+            <p:nvPr/>
+          </p:nvCxnSpPr>
+          <p:spPr>
+            <a:xfrm flipV="1">
+              <a:off x="5386562" y="2144474"/>
+              <a:ext cx="602105" cy="298731"/>
+            </a:xfrm>
+            <a:prstGeom prst="bentConnector2">
+              <a:avLst/>
+            </a:prstGeom>
+            <a:ln w="19050">
+              <a:solidFill>
+                <a:srgbClr val="7030A0"/>
+              </a:solidFill>
+              <a:prstDash val="solid"/>
+              <a:headEnd type="none" w="med" len="med"/>
+              <a:tailEnd type="arrow" w="med" len="med"/>
+            </a:ln>
+            <a:effectLst/>
+          </p:spPr>
+          <p:style>
+            <a:lnRef idx="1">
+              <a:schemeClr val="accent2"/>
+            </a:lnRef>
+            <a:fillRef idx="2">
+              <a:schemeClr val="accent2"/>
+            </a:fillRef>
+            <a:effectRef idx="1">
+              <a:schemeClr val="accent2"/>
+            </a:effectRef>
+            <a:fontRef idx="minor">
+              <a:schemeClr val="dk1"/>
+            </a:fontRef>
+          </p:style>
+        </p:cxnSp>
+        <p:cxnSp>
+          <p:nvCxnSpPr>
+            <p:cNvPr id="240" name="Straight Connector 239"/>
+            <p:cNvCxnSpPr>
+              <a:cxnSpLocks/>
+            </p:cNvCxnSpPr>
+            <p:nvPr/>
+          </p:nvCxnSpPr>
+          <p:spPr>
+            <a:xfrm flipH="1">
+              <a:off x="5382002" y="2443205"/>
+              <a:ext cx="4562" cy="874557"/>
+            </a:xfrm>
+            <a:prstGeom prst="line">
+              <a:avLst/>
+            </a:prstGeom>
+            <a:ln w="19050">
+              <a:solidFill>
+                <a:srgbClr val="7030A0"/>
+              </a:solidFill>
+            </a:ln>
+          </p:spPr>
+          <p:style>
+            <a:lnRef idx="1">
+              <a:schemeClr val="accent1"/>
+            </a:lnRef>
+            <a:fillRef idx="0">
+              <a:schemeClr val="accent1"/>
+            </a:fillRef>
+            <a:effectRef idx="0">
+              <a:schemeClr val="accent1"/>
+            </a:effectRef>
+            <a:fontRef idx="minor">
+              <a:schemeClr val="tx1"/>
+            </a:fontRef>
+          </p:style>
+        </p:cxnSp>
+      </p:grpSp>
+      <p:sp>
+        <p:nvSpPr>
+          <p:cNvPr id="243" name="TextBox 242"/>
+          <p:cNvSpPr txBox="1"/>
+          <p:nvPr/>
+        </p:nvSpPr>
+        <p:spPr>
+          <a:xfrm>
+            <a:off x="5787449" y="2247778"/>
+            <a:ext cx="189257" cy="178683"/>
+          </a:xfrm>
+          <a:prstGeom prst="rect">
+            <a:avLst/>
+          </a:prstGeom>
+          <a:noFill/>
+        </p:spPr>
+        <p:txBody>
+          <a:bodyPr wrap="square" lIns="0" tIns="0" rIns="0" bIns="0" rtlCol="0">
+            <a:noAutofit/>
+          </a:bodyPr>
+          <a:lstStyle/>
+          <a:p>
+            <a:pPr algn="ctr"/>
+            <a:r>
+              <a:rPr lang="en-US" sz="1100" dirty="0">
+                <a:solidFill>
+                  <a:srgbClr val="7030A0"/>
+                </a:solidFill>
+              </a:rPr>
+              <a:t>1</a:t>
+            </a:r>
+            <a:endParaRPr lang="en-SG" sz="1100" dirty="0">
+              <a:solidFill>
+                <a:srgbClr val="7030A0"/>
+              </a:solidFill>
+            </a:endParaRPr>
+          </a:p>
+        </p:txBody>
+      </p:sp>
+      <p:sp>
+        <p:nvSpPr>
+          <p:cNvPr id="246" name="Isosceles Triangle 102"/>
+          <p:cNvSpPr/>
+          <p:nvPr/>
+        </p:nvSpPr>
+        <p:spPr>
+          <a:xfrm rot="16200000" flipV="1">
+            <a:off x="6626078" y="2300578"/>
+            <a:ext cx="219945" cy="114345"/>
+          </a:xfrm>
+          <a:prstGeom prst="triangle">
+            <a:avLst/>
+          </a:prstGeom>
+          <a:solidFill>
+            <a:srgbClr val="7030A0"/>
+          </a:solidFill>
+          <a:ln w="19050">
+            <a:solidFill>
+              <a:srgbClr val="7030A0"/>
+            </a:solidFill>
+          </a:ln>
+          <a:effectLst/>
+        </p:spPr>
+        <p:style>
+          <a:lnRef idx="1">
+            <a:schemeClr val="accent4"/>
+          </a:lnRef>
+          <a:fillRef idx="2">
+            <a:schemeClr val="accent4"/>
+          </a:fillRef>
+          <a:effectRef idx="1">
+            <a:schemeClr val="accent4"/>
+          </a:effectRef>
+          <a:fontRef idx="minor">
+            <a:schemeClr val="dk1"/>
+          </a:fontRef>
+        </p:style>
+        <p:txBody>
+          <a:bodyPr rtlCol="0" anchor="ctr"/>
+          <a:lstStyle/>
+          <a:p>
+            <a:pPr algn="ctr"/>
+            <a:endParaRPr lang="en-SG" sz="1050" b="1">
+              <a:solidFill>
+                <a:srgbClr val="92D050"/>
+              </a:solidFill>
+            </a:endParaRPr>
+          </a:p>
+        </p:txBody>
+      </p:sp>
+      <p:cxnSp>
+        <p:nvCxnSpPr>
+          <p:cNvPr id="249" name="Elbow Connector 63"/>
+          <p:cNvCxnSpPr>
+            <a:cxnSpLocks/>
+            <a:stCxn id="246" idx="3"/>
+          </p:cNvCxnSpPr>
+          <p:nvPr/>
+        </p:nvCxnSpPr>
+        <p:spPr>
+          <a:xfrm rot="10800000">
+            <a:off x="6175058" y="2146802"/>
+            <a:ext cx="503821" cy="210949"/>
+          </a:xfrm>
+          <a:prstGeom prst="bentConnector3">
+            <a:avLst>
+              <a:gd name="adj1" fmla="val 110498"/>
+            </a:avLst>
+          </a:prstGeom>
+          <a:ln w="19050">
+            <a:solidFill>
+              <a:srgbClr val="7030A0"/>
+            </a:solidFill>
+            <a:prstDash val="sysDot"/>
+            <a:headEnd type="none" w="med" len="med"/>
+            <a:tailEnd type="none" w="med" len="med"/>
+          </a:ln>
+          <a:effectLst/>
+        </p:spPr>
+        <p:style>
+          <a:lnRef idx="1">
+            <a:schemeClr val="accent2"/>
+          </a:lnRef>
+          <a:fillRef idx="2">
+            <a:schemeClr val="accent2"/>
+          </a:fillRef>
+          <a:effectRef idx="1">
+            <a:schemeClr val="accent2"/>
+          </a:effectRef>
+          <a:fontRef idx="minor">
+            <a:schemeClr val="dk1"/>
+          </a:fontRef>
+        </p:style>
+      </p:cxnSp>
+      <p:cxnSp>
+        <p:nvCxnSpPr>
+          <p:cNvPr id="255" name="Elbow Connector 63"/>
+          <p:cNvCxnSpPr>
+            <a:cxnSpLocks/>
+            <a:stCxn id="246" idx="3"/>
+          </p:cNvCxnSpPr>
+          <p:nvPr/>
+        </p:nvCxnSpPr>
+        <p:spPr>
+          <a:xfrm rot="10800000" flipV="1">
+            <a:off x="6120996" y="2357749"/>
+            <a:ext cx="557883" cy="295553"/>
+          </a:xfrm>
+          <a:prstGeom prst="bentConnector3">
+            <a:avLst>
+              <a:gd name="adj1" fmla="val 101221"/>
+            </a:avLst>
+          </a:prstGeom>
+          <a:ln w="19050">
+            <a:solidFill>
+              <a:srgbClr val="7030A0"/>
+            </a:solidFill>
+            <a:prstDash val="sysDot"/>
+            <a:headEnd type="none" w="med" len="med"/>
+            <a:tailEnd type="none" w="med" len="med"/>
+          </a:ln>
+          <a:effectLst/>
+        </p:spPr>
+        <p:style>
+          <a:lnRef idx="1">
+            <a:schemeClr val="accent2"/>
+          </a:lnRef>
+          <a:fillRef idx="2">
+            <a:schemeClr val="accent2"/>
+          </a:fillRef>
+          <a:effectRef idx="1">
+            <a:schemeClr val="accent2"/>
+          </a:effectRef>
+          <a:fontRef idx="minor">
+            <a:schemeClr val="dk1"/>
+          </a:fontRef>
+        </p:style>
+      </p:cxnSp>
+      <p:sp>
+        <p:nvSpPr>
+          <p:cNvPr id="260" name="TextBox 259"/>
+          <p:cNvSpPr txBox="1"/>
+          <p:nvPr/>
+        </p:nvSpPr>
+        <p:spPr>
+          <a:xfrm>
+            <a:off x="6654464" y="3422889"/>
+            <a:ext cx="378989" cy="185353"/>
+          </a:xfrm>
+          <a:prstGeom prst="rect">
+            <a:avLst/>
+          </a:prstGeom>
+          <a:noFill/>
+        </p:spPr>
+        <p:txBody>
+          <a:bodyPr wrap="square" lIns="0" tIns="0" rIns="0" bIns="0" rtlCol="0">
+            <a:noAutofit/>
+          </a:bodyPr>
+          <a:lstStyle/>
+          <a:p>
+            <a:pPr algn="ctr"/>
+            <a:r>
+              <a:rPr lang="en-US" sz="1100" dirty="0">
+                <a:solidFill>
+                  <a:srgbClr val="7030A0"/>
+                </a:solidFill>
+              </a:rPr>
+              <a:t>1..*</a:t>
+            </a:r>
+            <a:endParaRPr lang="en-SG" sz="1100" dirty="0">
+              <a:solidFill>
+                <a:srgbClr val="7030A0"/>
+              </a:solidFill>
+            </a:endParaRPr>
+          </a:p>
+        </p:txBody>
+      </p:sp>
+      <p:cxnSp>
+        <p:nvCxnSpPr>
+          <p:cNvPr id="261" name="Elbow Connector 63"/>
+          <p:cNvCxnSpPr>
+            <a:cxnSpLocks/>
+          </p:cNvCxnSpPr>
+          <p:nvPr/>
+        </p:nvCxnSpPr>
+        <p:spPr>
+          <a:xfrm>
+            <a:off x="4972437" y="640886"/>
+            <a:ext cx="2089214" cy="1517395"/>
+          </a:xfrm>
+          <a:prstGeom prst="bentConnector3">
+            <a:avLst>
+              <a:gd name="adj1" fmla="val 83738"/>
+            </a:avLst>
+          </a:prstGeom>
+          <a:ln w="19050">
+            <a:solidFill>
+              <a:srgbClr val="7030A0"/>
+            </a:solidFill>
+            <a:prstDash val="sysDot"/>
+            <a:headEnd type="none" w="med" len="med"/>
+            <a:tailEnd type="none" w="med" len="med"/>
+          </a:ln>
+          <a:effectLst/>
+        </p:spPr>
+        <p:style>
+          <a:lnRef idx="1">
+            <a:schemeClr val="accent2"/>
+          </a:lnRef>
+          <a:fillRef idx="2">
+            <a:schemeClr val="accent2"/>
+          </a:fillRef>
+          <a:effectRef idx="1">
+            <a:schemeClr val="accent2"/>
+          </a:effectRef>
+          <a:fontRef idx="minor">
+            <a:schemeClr val="dk1"/>
+          </a:fontRef>
+        </p:style>
+      </p:cxnSp>
     </p:spTree>
     <p:extLst>
       <p:ext uri="{BB962C8B-B14F-4D97-AF65-F5344CB8AC3E}">
@@ -5910,13 +7249,6 @@
   <p:clrMapOvr>
     <a:masterClrMapping/>
   </p:clrMapOvr>
-  <p:timing>
-    <p:tnLst>
-      <p:par>
-        <p:cTn id="1" dur="indefinite" restart="never" nodeType="tmRoot"/>
-      </p:par>
-    </p:tnLst>
-  </p:timing>
 </p:sld>
 </file>
 

</xml_diff>

<commit_message>
udpate ppt file and png file for the diagrams of Storage component and Model component
</commit_message>
<xml_diff>
--- a/docs/diagrams/ModelComponentClassDiagram.pptx
+++ b/docs/diagrams/ModelComponentClassDiagram.pptx
@@ -208,7 +208,7 @@
           <a:p>
             <a:fld id="{F5CC4B3F-88C1-4FFA-B1B6-F41C21DC6924}" type="datetimeFigureOut">
               <a:rPr lang="en-US" smtClean="0"/>
-              <a:t>3/15/2017</a:t>
+              <a:t>3/23/2017</a:t>
             </a:fld>
             <a:endParaRPr lang="en-US"/>
           </a:p>
@@ -657,7 +657,7 @@
           <a:p>
             <a:fld id="{78C97017-6FC3-485B-9764-EAC9E56C1D49}" type="datetimeFigureOut">
               <a:rPr lang="en-US" smtClean="0"/>
-              <a:t>3/15/2017</a:t>
+              <a:t>3/23/2017</a:t>
             </a:fld>
             <a:endParaRPr lang="en-US"/>
           </a:p>
@@ -827,7 +827,7 @@
           <a:p>
             <a:fld id="{78C97017-6FC3-485B-9764-EAC9E56C1D49}" type="datetimeFigureOut">
               <a:rPr lang="en-US" smtClean="0"/>
-              <a:t>3/15/2017</a:t>
+              <a:t>3/23/2017</a:t>
             </a:fld>
             <a:endParaRPr lang="en-US"/>
           </a:p>
@@ -1007,7 +1007,7 @@
           <a:p>
             <a:fld id="{78C97017-6FC3-485B-9764-EAC9E56C1D49}" type="datetimeFigureOut">
               <a:rPr lang="en-US" smtClean="0"/>
-              <a:t>3/15/2017</a:t>
+              <a:t>3/23/2017</a:t>
             </a:fld>
             <a:endParaRPr lang="en-US"/>
           </a:p>
@@ -1177,7 +1177,7 @@
           <a:p>
             <a:fld id="{78C97017-6FC3-485B-9764-EAC9E56C1D49}" type="datetimeFigureOut">
               <a:rPr lang="en-US" smtClean="0"/>
-              <a:t>3/15/2017</a:t>
+              <a:t>3/23/2017</a:t>
             </a:fld>
             <a:endParaRPr lang="en-US"/>
           </a:p>
@@ -1423,7 +1423,7 @@
           <a:p>
             <a:fld id="{78C97017-6FC3-485B-9764-EAC9E56C1D49}" type="datetimeFigureOut">
               <a:rPr lang="en-US" smtClean="0"/>
-              <a:t>3/15/2017</a:t>
+              <a:t>3/23/2017</a:t>
             </a:fld>
             <a:endParaRPr lang="en-US"/>
           </a:p>
@@ -1711,7 +1711,7 @@
           <a:p>
             <a:fld id="{78C97017-6FC3-485B-9764-EAC9E56C1D49}" type="datetimeFigureOut">
               <a:rPr lang="en-US" smtClean="0"/>
-              <a:t>3/15/2017</a:t>
+              <a:t>3/23/2017</a:t>
             </a:fld>
             <a:endParaRPr lang="en-US"/>
           </a:p>
@@ -2133,7 +2133,7 @@
           <a:p>
             <a:fld id="{78C97017-6FC3-485B-9764-EAC9E56C1D49}" type="datetimeFigureOut">
               <a:rPr lang="en-US" smtClean="0"/>
-              <a:t>3/15/2017</a:t>
+              <a:t>3/23/2017</a:t>
             </a:fld>
             <a:endParaRPr lang="en-US"/>
           </a:p>
@@ -2251,7 +2251,7 @@
           <a:p>
             <a:fld id="{78C97017-6FC3-485B-9764-EAC9E56C1D49}" type="datetimeFigureOut">
               <a:rPr lang="en-US" smtClean="0"/>
-              <a:t>3/15/2017</a:t>
+              <a:t>3/23/2017</a:t>
             </a:fld>
             <a:endParaRPr lang="en-US"/>
           </a:p>
@@ -2346,7 +2346,7 @@
           <a:p>
             <a:fld id="{78C97017-6FC3-485B-9764-EAC9E56C1D49}" type="datetimeFigureOut">
               <a:rPr lang="en-US" smtClean="0"/>
-              <a:t>3/15/2017</a:t>
+              <a:t>3/23/2017</a:t>
             </a:fld>
             <a:endParaRPr lang="en-US"/>
           </a:p>
@@ -2623,7 +2623,7 @@
           <a:p>
             <a:fld id="{78C97017-6FC3-485B-9764-EAC9E56C1D49}" type="datetimeFigureOut">
               <a:rPr lang="en-US" smtClean="0"/>
-              <a:t>3/15/2017</a:t>
+              <a:t>3/23/2017</a:t>
             </a:fld>
             <a:endParaRPr lang="en-US"/>
           </a:p>
@@ -2876,7 +2876,7 @@
           <a:p>
             <a:fld id="{78C97017-6FC3-485B-9764-EAC9E56C1D49}" type="datetimeFigureOut">
               <a:rPr lang="en-US" smtClean="0"/>
-              <a:t>3/15/2017</a:t>
+              <a:t>3/23/2017</a:t>
             </a:fld>
             <a:endParaRPr lang="en-US"/>
           </a:p>
@@ -3089,7 +3089,7 @@
           <a:p>
             <a:fld id="{78C97017-6FC3-485B-9764-EAC9E56C1D49}" type="datetimeFigureOut">
               <a:rPr lang="en-US" smtClean="0"/>
-              <a:t>3/15/2017</a:t>
+              <a:t>3/23/2017</a:t>
             </a:fld>
             <a:endParaRPr lang="en-US"/>
           </a:p>
@@ -3472,8 +3472,8 @@
         </p:nvSpPr>
         <p:spPr>
           <a:xfrm>
-            <a:off x="1119865" y="1727200"/>
-            <a:ext cx="7719335" cy="2997200"/>
+            <a:off x="1093332" y="1371600"/>
+            <a:ext cx="7719335" cy="5130800"/>
           </a:xfrm>
           <a:prstGeom prst="roundRect">
             <a:avLst>
@@ -3533,7 +3533,7 @@
         </p:nvSpPr>
         <p:spPr>
           <a:xfrm>
-            <a:off x="2877180" y="3158440"/>
+            <a:off x="2886583" y="4648200"/>
             <a:ext cx="1093635" cy="346760"/>
           </a:xfrm>
           <a:prstGeom prst="rect">
@@ -3592,8 +3592,8 @@
         </p:nvSpPr>
         <p:spPr>
           <a:xfrm rot="16200000">
-            <a:off x="1683963" y="2868687"/>
-            <a:ext cx="1093635" cy="346760"/>
+            <a:off x="887605" y="3665044"/>
+            <a:ext cx="2686351" cy="346760"/>
           </a:xfrm>
           <a:prstGeom prst="rect">
             <a:avLst/>
@@ -3694,13 +3694,13 @@
         </p:nvCxnSpPr>
         <p:spPr>
           <a:xfrm rot="5400000" flipH="1" flipV="1">
-            <a:off x="4360065" y="1080909"/>
-            <a:ext cx="378691" cy="4637261"/>
+            <a:off x="3563709" y="1877268"/>
+            <a:ext cx="1971404" cy="4637260"/>
           </a:xfrm>
           <a:prstGeom prst="bentConnector4">
             <a:avLst>
-              <a:gd name="adj1" fmla="val -101829"/>
-              <a:gd name="adj2" fmla="val 99976"/>
+              <a:gd name="adj1" fmla="val -11596"/>
+              <a:gd name="adj2" fmla="val 100005"/>
             </a:avLst>
           </a:prstGeom>
           <a:ln w="19050">
@@ -3736,8 +3736,8 @@
         </p:nvSpPr>
         <p:spPr>
           <a:xfrm rot="16200000">
-            <a:off x="956202" y="2861202"/>
-            <a:ext cx="1093635" cy="346760"/>
+            <a:off x="156102" y="3661302"/>
+            <a:ext cx="2693835" cy="346760"/>
           </a:xfrm>
           <a:prstGeom prst="rect">
             <a:avLst/>
@@ -3849,14 +3849,13 @@
         <p:nvCxnSpPr>
           <p:cNvPr id="58" name="Straight Arrow Connector 57"/>
           <p:cNvCxnSpPr>
-            <a:stCxn id="42" idx="3"/>
             <a:endCxn id="2" idx="1"/>
           </p:cNvCxnSpPr>
           <p:nvPr/>
         </p:nvCxnSpPr>
         <p:spPr>
           <a:xfrm>
-            <a:off x="2656370" y="3326536"/>
+            <a:off x="2665773" y="4816296"/>
             <a:ext cx="220810" cy="5284"/>
           </a:xfrm>
           <a:prstGeom prst="straightConnector1">
@@ -4029,7 +4028,7 @@
         </p:nvSpPr>
         <p:spPr>
           <a:xfrm>
-            <a:off x="2420322" y="3239846"/>
+            <a:off x="2424255" y="4732248"/>
             <a:ext cx="236048" cy="173380"/>
           </a:xfrm>
           <a:prstGeom prst="flowChartDecision">
@@ -5361,7 +5360,7 @@
         </p:nvSpPr>
         <p:spPr>
           <a:xfrm>
-            <a:off x="2057400" y="4239491"/>
+            <a:off x="2057401" y="5638800"/>
             <a:ext cx="1775949" cy="346760"/>
           </a:xfrm>
           <a:prstGeom prst="rect">
@@ -5443,8 +5442,8 @@
         </p:nvCxnSpPr>
         <p:spPr>
           <a:xfrm rot="16200000" flipH="1">
-            <a:off x="1364475" y="3719945"/>
-            <a:ext cx="831471" cy="554380"/>
+            <a:off x="1464920" y="5219699"/>
+            <a:ext cx="630580" cy="554381"/>
           </a:xfrm>
           <a:prstGeom prst="bentConnector2">
             <a:avLst/>
@@ -5757,7 +5756,7 @@
         </p:nvSpPr>
         <p:spPr>
           <a:xfrm>
-            <a:off x="2656370" y="3386050"/>
+            <a:off x="2665773" y="4875810"/>
             <a:ext cx="189257" cy="178683"/>
           </a:xfrm>
           <a:prstGeom prst="rect">
@@ -5827,6 +5826,458 @@
           </a:p>
         </p:txBody>
       </p:sp>
+      <p:sp>
+        <p:nvSpPr>
+          <p:cNvPr id="74" name="Rectangle 8"/>
+          <p:cNvSpPr/>
+          <p:nvPr/>
+        </p:nvSpPr>
+        <p:spPr>
+          <a:xfrm>
+            <a:off x="2881789" y="3384110"/>
+            <a:ext cx="1093635" cy="346760"/>
+          </a:xfrm>
+          <a:prstGeom prst="rect">
+            <a:avLst/>
+          </a:prstGeom>
+          <a:ln w="19050">
+            <a:solidFill>
+              <a:srgbClr val="7030A0"/>
+            </a:solidFill>
+          </a:ln>
+          <a:effectLst/>
+        </p:spPr>
+        <p:style>
+          <a:lnRef idx="1">
+            <a:schemeClr val="accent4"/>
+          </a:lnRef>
+          <a:fillRef idx="2">
+            <a:schemeClr val="accent4"/>
+          </a:fillRef>
+          <a:effectRef idx="1">
+            <a:schemeClr val="accent4"/>
+          </a:effectRef>
+          <a:fontRef idx="minor">
+            <a:schemeClr val="dk1"/>
+          </a:fontRef>
+        </p:style>
+        <p:txBody>
+          <a:bodyPr rtlCol="0" anchor="ctr"/>
+          <a:lstStyle/>
+          <a:p>
+            <a:pPr algn="ctr"/>
+            <a:r>
+              <a:rPr lang="en-US" sz="800" smtClean="0">
+                <a:solidFill>
+                  <a:srgbClr val="7030A0"/>
+                </a:solidFill>
+              </a:rPr>
+              <a:t>H</a:t>
+            </a:r>
+            <a:r>
+              <a:rPr lang="en-US" altLang="zh-CN" sz="800" smtClean="0">
+                <a:solidFill>
+                  <a:srgbClr val="7030A0"/>
+                </a:solidFill>
+              </a:rPr>
+              <a:t>istory&lt;TodoList&gt;</a:t>
+            </a:r>
+            <a:endParaRPr lang="en-SG" sz="800" dirty="0">
+              <a:solidFill>
+                <a:srgbClr val="7030A0"/>
+              </a:solidFill>
+            </a:endParaRPr>
+          </a:p>
+        </p:txBody>
+      </p:sp>
+      <p:sp>
+        <p:nvSpPr>
+          <p:cNvPr id="77" name="Rectangle 8"/>
+          <p:cNvSpPr/>
+          <p:nvPr/>
+        </p:nvSpPr>
+        <p:spPr>
+          <a:xfrm>
+            <a:off x="2879490" y="4022518"/>
+            <a:ext cx="1093635" cy="346760"/>
+          </a:xfrm>
+          <a:prstGeom prst="rect">
+            <a:avLst/>
+          </a:prstGeom>
+          <a:ln w="19050">
+            <a:solidFill>
+              <a:srgbClr val="7030A0"/>
+            </a:solidFill>
+          </a:ln>
+          <a:effectLst/>
+        </p:spPr>
+        <p:style>
+          <a:lnRef idx="1">
+            <a:schemeClr val="accent4"/>
+          </a:lnRef>
+          <a:fillRef idx="2">
+            <a:schemeClr val="accent4"/>
+          </a:fillRef>
+          <a:effectRef idx="1">
+            <a:schemeClr val="accent4"/>
+          </a:effectRef>
+          <a:fontRef idx="minor">
+            <a:schemeClr val="dk1"/>
+          </a:fontRef>
+        </p:style>
+        <p:txBody>
+          <a:bodyPr rtlCol="0" anchor="ctr"/>
+          <a:lstStyle/>
+          <a:p>
+            <a:pPr algn="ctr"/>
+            <a:r>
+              <a:rPr lang="en-US" sz="1050">
+                <a:solidFill>
+                  <a:srgbClr val="7030A0"/>
+                </a:solidFill>
+              </a:rPr>
+              <a:t>AliasListMap</a:t>
+            </a:r>
+            <a:endParaRPr lang="en-SG" sz="1050" dirty="0">
+              <a:solidFill>
+                <a:srgbClr val="7030A0"/>
+              </a:solidFill>
+            </a:endParaRPr>
+          </a:p>
+        </p:txBody>
+      </p:sp>
+      <p:cxnSp>
+        <p:nvCxnSpPr>
+          <p:cNvPr id="82" name="Straight Arrow Connector 81"/>
+          <p:cNvCxnSpPr/>
+          <p:nvPr/>
+        </p:nvCxnSpPr>
+        <p:spPr>
+          <a:xfrm>
+            <a:off x="2656652" y="3559440"/>
+            <a:ext cx="220810" cy="5284"/>
+          </a:xfrm>
+          <a:prstGeom prst="straightConnector1">
+            <a:avLst/>
+          </a:prstGeom>
+          <a:ln w="19050">
+            <a:solidFill>
+              <a:srgbClr val="7030A0"/>
+            </a:solidFill>
+            <a:headEnd type="none" w="med" len="med"/>
+            <a:tailEnd type="arrow" w="med" len="med"/>
+          </a:ln>
+          <a:effectLst/>
+        </p:spPr>
+        <p:style>
+          <a:lnRef idx="1">
+            <a:schemeClr val="accent2"/>
+          </a:lnRef>
+          <a:fillRef idx="2">
+            <a:schemeClr val="accent2"/>
+          </a:fillRef>
+          <a:effectRef idx="1">
+            <a:schemeClr val="accent2"/>
+          </a:effectRef>
+          <a:fontRef idx="minor">
+            <a:schemeClr val="dk1"/>
+          </a:fontRef>
+        </p:style>
+      </p:cxnSp>
+      <p:sp>
+        <p:nvSpPr>
+          <p:cNvPr id="85" name="Flowchart: Decision 96"/>
+          <p:cNvSpPr/>
+          <p:nvPr/>
+        </p:nvSpPr>
+        <p:spPr>
+          <a:xfrm>
+            <a:off x="2415134" y="3475392"/>
+            <a:ext cx="236048" cy="173380"/>
+          </a:xfrm>
+          <a:prstGeom prst="flowChartDecision">
+            <a:avLst/>
+          </a:prstGeom>
+          <a:noFill/>
+          <a:ln w="19050">
+            <a:solidFill>
+              <a:srgbClr val="7030A0"/>
+            </a:solidFill>
+          </a:ln>
+          <a:effectLst/>
+        </p:spPr>
+        <p:style>
+          <a:lnRef idx="1">
+            <a:schemeClr val="accent6"/>
+          </a:lnRef>
+          <a:fillRef idx="2">
+            <a:schemeClr val="accent6"/>
+          </a:fillRef>
+          <a:effectRef idx="1">
+            <a:schemeClr val="accent6"/>
+          </a:effectRef>
+          <a:fontRef idx="minor">
+            <a:schemeClr val="dk1"/>
+          </a:fontRef>
+        </p:style>
+        <p:txBody>
+          <a:bodyPr rtlCol="0" anchor="ctr"/>
+          <a:lstStyle/>
+          <a:p>
+            <a:pPr algn="ctr"/>
+            <a:endParaRPr lang="en-US" sz="1050"/>
+          </a:p>
+        </p:txBody>
+      </p:sp>
+      <p:sp>
+        <p:nvSpPr>
+          <p:cNvPr id="86" name="TextBox 85"/>
+          <p:cNvSpPr txBox="1"/>
+          <p:nvPr/>
+        </p:nvSpPr>
+        <p:spPr>
+          <a:xfrm>
+            <a:off x="2656652" y="3618954"/>
+            <a:ext cx="189257" cy="178683"/>
+          </a:xfrm>
+          <a:prstGeom prst="rect">
+            <a:avLst/>
+          </a:prstGeom>
+          <a:noFill/>
+        </p:spPr>
+        <p:txBody>
+          <a:bodyPr wrap="square" lIns="0" tIns="0" rIns="0" bIns="0" rtlCol="0">
+            <a:noAutofit/>
+          </a:bodyPr>
+          <a:lstStyle/>
+          <a:p>
+            <a:pPr algn="ctr"/>
+            <a:r>
+              <a:rPr lang="en-US" sz="1100" dirty="0" smtClean="0">
+                <a:solidFill>
+                  <a:srgbClr val="7030A0"/>
+                </a:solidFill>
+              </a:rPr>
+              <a:t>1</a:t>
+            </a:r>
+            <a:endParaRPr lang="en-SG" sz="1100" dirty="0">
+              <a:solidFill>
+                <a:srgbClr val="7030A0"/>
+              </a:solidFill>
+            </a:endParaRPr>
+          </a:p>
+        </p:txBody>
+      </p:sp>
+      <p:cxnSp>
+        <p:nvCxnSpPr>
+          <p:cNvPr id="93" name="Straight Arrow Connector 92"/>
+          <p:cNvCxnSpPr/>
+          <p:nvPr/>
+        </p:nvCxnSpPr>
+        <p:spPr>
+          <a:xfrm>
+            <a:off x="2652179" y="4112901"/>
+            <a:ext cx="220810" cy="5284"/>
+          </a:xfrm>
+          <a:prstGeom prst="straightConnector1">
+            <a:avLst/>
+          </a:prstGeom>
+          <a:ln w="19050">
+            <a:solidFill>
+              <a:srgbClr val="7030A0"/>
+            </a:solidFill>
+            <a:headEnd type="none" w="med" len="med"/>
+            <a:tailEnd type="arrow" w="med" len="med"/>
+          </a:ln>
+          <a:effectLst/>
+        </p:spPr>
+        <p:style>
+          <a:lnRef idx="1">
+            <a:schemeClr val="accent2"/>
+          </a:lnRef>
+          <a:fillRef idx="2">
+            <a:schemeClr val="accent2"/>
+          </a:fillRef>
+          <a:effectRef idx="1">
+            <a:schemeClr val="accent2"/>
+          </a:effectRef>
+          <a:fontRef idx="minor">
+            <a:schemeClr val="dk1"/>
+          </a:fontRef>
+        </p:style>
+      </p:cxnSp>
+      <p:sp>
+        <p:nvSpPr>
+          <p:cNvPr id="94" name="Flowchart: Decision 96"/>
+          <p:cNvSpPr/>
+          <p:nvPr/>
+        </p:nvSpPr>
+        <p:spPr>
+          <a:xfrm>
+            <a:off x="2410661" y="4028853"/>
+            <a:ext cx="236048" cy="173380"/>
+          </a:xfrm>
+          <a:prstGeom prst="flowChartDecision">
+            <a:avLst/>
+          </a:prstGeom>
+          <a:noFill/>
+          <a:ln w="19050">
+            <a:solidFill>
+              <a:srgbClr val="7030A0"/>
+            </a:solidFill>
+          </a:ln>
+          <a:effectLst/>
+        </p:spPr>
+        <p:style>
+          <a:lnRef idx="1">
+            <a:schemeClr val="accent6"/>
+          </a:lnRef>
+          <a:fillRef idx="2">
+            <a:schemeClr val="accent6"/>
+          </a:fillRef>
+          <a:effectRef idx="1">
+            <a:schemeClr val="accent6"/>
+          </a:effectRef>
+          <a:fontRef idx="minor">
+            <a:schemeClr val="dk1"/>
+          </a:fontRef>
+        </p:style>
+        <p:txBody>
+          <a:bodyPr rtlCol="0" anchor="ctr"/>
+          <a:lstStyle/>
+          <a:p>
+            <a:pPr algn="ctr"/>
+            <a:endParaRPr lang="en-US" sz="1050"/>
+          </a:p>
+        </p:txBody>
+      </p:sp>
+      <p:sp>
+        <p:nvSpPr>
+          <p:cNvPr id="95" name="TextBox 94"/>
+          <p:cNvSpPr txBox="1"/>
+          <p:nvPr/>
+        </p:nvSpPr>
+        <p:spPr>
+          <a:xfrm>
+            <a:off x="2652179" y="4172415"/>
+            <a:ext cx="189257" cy="178683"/>
+          </a:xfrm>
+          <a:prstGeom prst="rect">
+            <a:avLst/>
+          </a:prstGeom>
+          <a:noFill/>
+        </p:spPr>
+        <p:txBody>
+          <a:bodyPr wrap="square" lIns="0" tIns="0" rIns="0" bIns="0" rtlCol="0">
+            <a:noAutofit/>
+          </a:bodyPr>
+          <a:lstStyle/>
+          <a:p>
+            <a:pPr algn="ctr"/>
+            <a:r>
+              <a:rPr lang="en-US" sz="1100" dirty="0" smtClean="0">
+                <a:solidFill>
+                  <a:srgbClr val="7030A0"/>
+                </a:solidFill>
+              </a:rPr>
+              <a:t>1</a:t>
+            </a:r>
+            <a:endParaRPr lang="en-SG" sz="1100" dirty="0">
+              <a:solidFill>
+                <a:srgbClr val="7030A0"/>
+              </a:solidFill>
+            </a:endParaRPr>
+          </a:p>
+        </p:txBody>
+      </p:sp>
+      <p:sp>
+        <p:nvSpPr>
+          <p:cNvPr id="96" name="Flowchart: Decision 96"/>
+          <p:cNvSpPr/>
+          <p:nvPr/>
+        </p:nvSpPr>
+        <p:spPr>
+          <a:xfrm rot="16200000">
+            <a:off x="3346249" y="3236926"/>
+            <a:ext cx="168034" cy="103834"/>
+          </a:xfrm>
+          <a:prstGeom prst="flowChartDecision">
+            <a:avLst/>
+          </a:prstGeom>
+          <a:solidFill>
+            <a:srgbClr val="7030A0"/>
+          </a:solidFill>
+          <a:ln w="19050">
+            <a:solidFill>
+              <a:srgbClr val="7030A0"/>
+            </a:solidFill>
+          </a:ln>
+          <a:effectLst/>
+        </p:spPr>
+        <p:style>
+          <a:lnRef idx="1">
+            <a:schemeClr val="accent6"/>
+          </a:lnRef>
+          <a:fillRef idx="2">
+            <a:schemeClr val="accent6"/>
+          </a:fillRef>
+          <a:effectRef idx="1">
+            <a:schemeClr val="accent6"/>
+          </a:effectRef>
+          <a:fontRef idx="minor">
+            <a:schemeClr val="dk1"/>
+          </a:fontRef>
+        </p:style>
+        <p:txBody>
+          <a:bodyPr rtlCol="0" anchor="ctr"/>
+          <a:lstStyle/>
+          <a:p>
+            <a:pPr algn="ctr"/>
+            <a:endParaRPr lang="en-US" sz="1050"/>
+          </a:p>
+        </p:txBody>
+      </p:sp>
+      <p:cxnSp>
+        <p:nvCxnSpPr>
+          <p:cNvPr id="102" name="Straight Arrow Connector 101"/>
+          <p:cNvCxnSpPr>
+            <a:stCxn id="96" idx="3"/>
+            <a:endCxn id="46" idx="2"/>
+          </p:cNvCxnSpPr>
+          <p:nvPr/>
+        </p:nvCxnSpPr>
+        <p:spPr>
+          <a:xfrm flipH="1" flipV="1">
+            <a:off x="3426308" y="2974180"/>
+            <a:ext cx="3958" cy="230646"/>
+          </a:xfrm>
+          <a:prstGeom prst="straightConnector1">
+            <a:avLst/>
+          </a:prstGeom>
+          <a:ln w="19050">
+            <a:solidFill>
+              <a:srgbClr val="7030A0"/>
+            </a:solidFill>
+            <a:headEnd type="none" w="med" len="med"/>
+            <a:tailEnd type="arrow" w="med" len="med"/>
+          </a:ln>
+          <a:effectLst/>
+        </p:spPr>
+        <p:style>
+          <a:lnRef idx="1">
+            <a:schemeClr val="accent2"/>
+          </a:lnRef>
+          <a:fillRef idx="2">
+            <a:schemeClr val="accent2"/>
+          </a:fillRef>
+          <a:effectRef idx="1">
+            <a:schemeClr val="accent2"/>
+          </a:effectRef>
+          <a:fontRef idx="minor">
+            <a:schemeClr val="dk1"/>
+          </a:fontRef>
+        </p:style>
+      </p:cxnSp>
     </p:spTree>
     <p:extLst>
       <p:ext uri="{BB962C8B-B14F-4D97-AF65-F5344CB8AC3E}">

</xml_diff>

<commit_message>
updated model component class diagram
</commit_message>
<xml_diff>
--- a/docs/diagrams/ModelComponentClassDiagram.pptx
+++ b/docs/diagrams/ModelComponentClassDiagram.pptx
@@ -107,6 +107,22 @@
       </a:defRPr>
     </a:lvl9pPr>
   </p:defaultTextStyle>
+  <p:extLst>
+    <p:ext uri="{EFAFB233-063F-42B5-8137-9DF3F51BA10A}">
+      <p15:sldGuideLst xmlns:p15="http://schemas.microsoft.com/office/powerpoint/2012/main">
+        <p15:guide id="1" orient="horz" pos="1488">
+          <p15:clr>
+            <a:srgbClr val="A4A3A4"/>
+          </p15:clr>
+        </p15:guide>
+        <p15:guide id="2" pos="2880">
+          <p15:clr>
+            <a:srgbClr val="A4A3A4"/>
+          </p15:clr>
+        </p15:guide>
+      </p15:sldGuideLst>
+    </p:ext>
+  </p:extLst>
 </p:presentation>
 </file>
 
@@ -159,7 +175,7 @@
             </a:lvl1pPr>
           </a:lstStyle>
           <a:p>
-            <a:endParaRPr lang="en-US"/>
+            <a:endParaRPr lang="en-US" dirty="0"/>
           </a:p>
         </p:txBody>
       </p:sp>
@@ -192,9 +208,9 @@
           <a:p>
             <a:fld id="{F5CC4B3F-88C1-4FFA-B1B6-F41C21DC6924}" type="datetimeFigureOut">
               <a:rPr lang="en-US" smtClean="0"/>
-              <a:t>11/19/2016</a:t>
+              <a:t>03/24/17</a:t>
             </a:fld>
-            <a:endParaRPr lang="en-US"/>
+            <a:endParaRPr lang="en-US" dirty="0"/>
           </a:p>
         </p:txBody>
       </p:sp>
@@ -227,7 +243,7 @@
           <a:bodyPr vert="horz" lIns="91440" tIns="45720" rIns="91440" bIns="45720" rtlCol="0" anchor="ctr"/>
           <a:lstStyle/>
           <a:p>
-            <a:endParaRPr lang="en-US"/>
+            <a:endParaRPr lang="en-US" dirty="0"/>
           </a:p>
         </p:txBody>
       </p:sp>
@@ -256,38 +272,37 @@
           <a:p>
             <a:pPr lvl="0"/>
             <a:r>
-              <a:rPr lang="en-US" smtClean="0"/>
+              <a:rPr lang="en-US"/>
               <a:t>Click to edit Master text styles</a:t>
             </a:r>
           </a:p>
           <a:p>
             <a:pPr lvl="1"/>
             <a:r>
-              <a:rPr lang="en-US" smtClean="0"/>
+              <a:rPr lang="en-US"/>
               <a:t>Second level</a:t>
             </a:r>
           </a:p>
           <a:p>
             <a:pPr lvl="2"/>
             <a:r>
-              <a:rPr lang="en-US" smtClean="0"/>
+              <a:rPr lang="en-US"/>
               <a:t>Third level</a:t>
             </a:r>
           </a:p>
           <a:p>
             <a:pPr lvl="3"/>
             <a:r>
-              <a:rPr lang="en-US" smtClean="0"/>
+              <a:rPr lang="en-US"/>
               <a:t>Fourth level</a:t>
             </a:r>
           </a:p>
           <a:p>
             <a:pPr lvl="4"/>
             <a:r>
-              <a:rPr lang="en-US" smtClean="0"/>
+              <a:rPr lang="en-US"/>
               <a:t>Fifth level</a:t>
             </a:r>
-            <a:endParaRPr lang="en-US"/>
           </a:p>
         </p:txBody>
       </p:sp>
@@ -318,7 +333,7 @@
             </a:lvl1pPr>
           </a:lstStyle>
           <a:p>
-            <a:endParaRPr lang="en-US"/>
+            <a:endParaRPr lang="en-US" dirty="0"/>
           </a:p>
         </p:txBody>
       </p:sp>
@@ -353,7 +368,7 @@
               <a:rPr lang="en-US" smtClean="0"/>
               <a:t>‹#›</a:t>
             </a:fld>
-            <a:endParaRPr lang="en-US"/>
+            <a:endParaRPr lang="en-US" dirty="0"/>
           </a:p>
         </p:txBody>
       </p:sp>
@@ -498,10 +513,9 @@
           <a:lstStyle/>
           <a:p>
             <a:r>
-              <a:rPr lang="en-US" smtClean="0"/>
+              <a:rPr lang="en-US"/>
               <a:t>Click to edit Master title style</a:t>
             </a:r>
-            <a:endParaRPr lang="en-US"/>
           </a:p>
         </p:txBody>
       </p:sp>
@@ -617,10 +631,9 @@
           </a:lstStyle>
           <a:p>
             <a:r>
-              <a:rPr lang="en-US" smtClean="0"/>
+              <a:rPr lang="en-US"/>
               <a:t>Click to edit Master subtitle style</a:t>
             </a:r>
-            <a:endParaRPr lang="en-US"/>
           </a:p>
         </p:txBody>
       </p:sp>
@@ -641,9 +654,9 @@
           <a:p>
             <a:fld id="{78C97017-6FC3-485B-9764-EAC9E56C1D49}" type="datetimeFigureOut">
               <a:rPr lang="en-US" smtClean="0"/>
-              <a:t>11/19/2016</a:t>
+              <a:t>03/24/17</a:t>
             </a:fld>
-            <a:endParaRPr lang="en-US"/>
+            <a:endParaRPr lang="en-US" dirty="0"/>
           </a:p>
         </p:txBody>
       </p:sp>
@@ -662,7 +675,7 @@
           <a:bodyPr/>
           <a:lstStyle/>
           <a:p>
-            <a:endParaRPr lang="en-US"/>
+            <a:endParaRPr lang="en-US" dirty="0"/>
           </a:p>
         </p:txBody>
       </p:sp>
@@ -685,7 +698,7 @@
               <a:rPr lang="en-US" smtClean="0"/>
               <a:t>‹#›</a:t>
             </a:fld>
-            <a:endParaRPr lang="en-US"/>
+            <a:endParaRPr lang="en-US" dirty="0"/>
           </a:p>
         </p:txBody>
       </p:sp>
@@ -735,10 +748,9 @@
           <a:lstStyle/>
           <a:p>
             <a:r>
-              <a:rPr lang="en-US" smtClean="0"/>
+              <a:rPr lang="en-US"/>
               <a:t>Click to edit Master title style</a:t>
             </a:r>
-            <a:endParaRPr lang="en-US"/>
           </a:p>
         </p:txBody>
       </p:sp>
@@ -759,38 +771,37 @@
           <a:p>
             <a:pPr lvl="0"/>
             <a:r>
-              <a:rPr lang="en-US" smtClean="0"/>
+              <a:rPr lang="en-US"/>
               <a:t>Click to edit Master text styles</a:t>
             </a:r>
           </a:p>
           <a:p>
             <a:pPr lvl="1"/>
             <a:r>
-              <a:rPr lang="en-US" smtClean="0"/>
+              <a:rPr lang="en-US"/>
               <a:t>Second level</a:t>
             </a:r>
           </a:p>
           <a:p>
             <a:pPr lvl="2"/>
             <a:r>
-              <a:rPr lang="en-US" smtClean="0"/>
+              <a:rPr lang="en-US"/>
               <a:t>Third level</a:t>
             </a:r>
           </a:p>
           <a:p>
             <a:pPr lvl="3"/>
             <a:r>
-              <a:rPr lang="en-US" smtClean="0"/>
+              <a:rPr lang="en-US"/>
               <a:t>Fourth level</a:t>
             </a:r>
           </a:p>
           <a:p>
             <a:pPr lvl="4"/>
             <a:r>
-              <a:rPr lang="en-US" smtClean="0"/>
+              <a:rPr lang="en-US"/>
               <a:t>Fifth level</a:t>
             </a:r>
-            <a:endParaRPr lang="en-US"/>
           </a:p>
         </p:txBody>
       </p:sp>
@@ -811,9 +822,9 @@
           <a:p>
             <a:fld id="{78C97017-6FC3-485B-9764-EAC9E56C1D49}" type="datetimeFigureOut">
               <a:rPr lang="en-US" smtClean="0"/>
-              <a:t>11/19/2016</a:t>
+              <a:t>03/24/17</a:t>
             </a:fld>
-            <a:endParaRPr lang="en-US"/>
+            <a:endParaRPr lang="en-US" dirty="0"/>
           </a:p>
         </p:txBody>
       </p:sp>
@@ -832,7 +843,7 @@
           <a:bodyPr/>
           <a:lstStyle/>
           <a:p>
-            <a:endParaRPr lang="en-US"/>
+            <a:endParaRPr lang="en-US" dirty="0"/>
           </a:p>
         </p:txBody>
       </p:sp>
@@ -855,7 +866,7 @@
               <a:rPr lang="en-US" smtClean="0"/>
               <a:t>‹#›</a:t>
             </a:fld>
-            <a:endParaRPr lang="en-US"/>
+            <a:endParaRPr lang="en-US" dirty="0"/>
           </a:p>
         </p:txBody>
       </p:sp>
@@ -910,10 +921,9 @@
           <a:lstStyle/>
           <a:p>
             <a:r>
-              <a:rPr lang="en-US" smtClean="0"/>
+              <a:rPr lang="en-US"/>
               <a:t>Click to edit Master title style</a:t>
             </a:r>
-            <a:endParaRPr lang="en-US"/>
           </a:p>
         </p:txBody>
       </p:sp>
@@ -939,38 +949,37 @@
           <a:p>
             <a:pPr lvl="0"/>
             <a:r>
-              <a:rPr lang="en-US" smtClean="0"/>
+              <a:rPr lang="en-US"/>
               <a:t>Click to edit Master text styles</a:t>
             </a:r>
           </a:p>
           <a:p>
             <a:pPr lvl="1"/>
             <a:r>
-              <a:rPr lang="en-US" smtClean="0"/>
+              <a:rPr lang="en-US"/>
               <a:t>Second level</a:t>
             </a:r>
           </a:p>
           <a:p>
             <a:pPr lvl="2"/>
             <a:r>
-              <a:rPr lang="en-US" smtClean="0"/>
+              <a:rPr lang="en-US"/>
               <a:t>Third level</a:t>
             </a:r>
           </a:p>
           <a:p>
             <a:pPr lvl="3"/>
             <a:r>
-              <a:rPr lang="en-US" smtClean="0"/>
+              <a:rPr lang="en-US"/>
               <a:t>Fourth level</a:t>
             </a:r>
           </a:p>
           <a:p>
             <a:pPr lvl="4"/>
             <a:r>
-              <a:rPr lang="en-US" smtClean="0"/>
+              <a:rPr lang="en-US"/>
               <a:t>Fifth level</a:t>
             </a:r>
-            <a:endParaRPr lang="en-US"/>
           </a:p>
         </p:txBody>
       </p:sp>
@@ -991,9 +1000,9 @@
           <a:p>
             <a:fld id="{78C97017-6FC3-485B-9764-EAC9E56C1D49}" type="datetimeFigureOut">
               <a:rPr lang="en-US" smtClean="0"/>
-              <a:t>11/19/2016</a:t>
+              <a:t>03/24/17</a:t>
             </a:fld>
-            <a:endParaRPr lang="en-US"/>
+            <a:endParaRPr lang="en-US" dirty="0"/>
           </a:p>
         </p:txBody>
       </p:sp>
@@ -1012,7 +1021,7 @@
           <a:bodyPr/>
           <a:lstStyle/>
           <a:p>
-            <a:endParaRPr lang="en-US"/>
+            <a:endParaRPr lang="en-US" dirty="0"/>
           </a:p>
         </p:txBody>
       </p:sp>
@@ -1035,7 +1044,7 @@
               <a:rPr lang="en-US" smtClean="0"/>
               <a:t>‹#›</a:t>
             </a:fld>
-            <a:endParaRPr lang="en-US"/>
+            <a:endParaRPr lang="en-US" dirty="0"/>
           </a:p>
         </p:txBody>
       </p:sp>
@@ -1085,10 +1094,9 @@
           <a:lstStyle/>
           <a:p>
             <a:r>
-              <a:rPr lang="en-US" smtClean="0"/>
+              <a:rPr lang="en-US"/>
               <a:t>Click to edit Master title style</a:t>
             </a:r>
-            <a:endParaRPr lang="en-US"/>
           </a:p>
         </p:txBody>
       </p:sp>
@@ -1109,38 +1117,37 @@
           <a:p>
             <a:pPr lvl="0"/>
             <a:r>
-              <a:rPr lang="en-US" smtClean="0"/>
+              <a:rPr lang="en-US"/>
               <a:t>Click to edit Master text styles</a:t>
             </a:r>
           </a:p>
           <a:p>
             <a:pPr lvl="1"/>
             <a:r>
-              <a:rPr lang="en-US" smtClean="0"/>
+              <a:rPr lang="en-US"/>
               <a:t>Second level</a:t>
             </a:r>
           </a:p>
           <a:p>
             <a:pPr lvl="2"/>
             <a:r>
-              <a:rPr lang="en-US" smtClean="0"/>
+              <a:rPr lang="en-US"/>
               <a:t>Third level</a:t>
             </a:r>
           </a:p>
           <a:p>
             <a:pPr lvl="3"/>
             <a:r>
-              <a:rPr lang="en-US" smtClean="0"/>
+              <a:rPr lang="en-US"/>
               <a:t>Fourth level</a:t>
             </a:r>
           </a:p>
           <a:p>
             <a:pPr lvl="4"/>
             <a:r>
-              <a:rPr lang="en-US" smtClean="0"/>
+              <a:rPr lang="en-US"/>
               <a:t>Fifth level</a:t>
             </a:r>
-            <a:endParaRPr lang="en-US"/>
           </a:p>
         </p:txBody>
       </p:sp>
@@ -1161,9 +1168,9 @@
           <a:p>
             <a:fld id="{78C97017-6FC3-485B-9764-EAC9E56C1D49}" type="datetimeFigureOut">
               <a:rPr lang="en-US" smtClean="0"/>
-              <a:t>11/19/2016</a:t>
+              <a:t>03/24/17</a:t>
             </a:fld>
-            <a:endParaRPr lang="en-US"/>
+            <a:endParaRPr lang="en-US" dirty="0"/>
           </a:p>
         </p:txBody>
       </p:sp>
@@ -1182,7 +1189,7 @@
           <a:bodyPr/>
           <a:lstStyle/>
           <a:p>
-            <a:endParaRPr lang="en-US"/>
+            <a:endParaRPr lang="en-US" dirty="0"/>
           </a:p>
         </p:txBody>
       </p:sp>
@@ -1205,7 +1212,7 @@
               <a:rPr lang="en-US" smtClean="0"/>
               <a:t>‹#›</a:t>
             </a:fld>
-            <a:endParaRPr lang="en-US"/>
+            <a:endParaRPr lang="en-US" dirty="0"/>
           </a:p>
         </p:txBody>
       </p:sp>
@@ -1264,10 +1271,9 @@
           </a:lstStyle>
           <a:p>
             <a:r>
-              <a:rPr lang="en-US" smtClean="0"/>
+              <a:rPr lang="en-US"/>
               <a:t>Click to edit Master title style</a:t>
             </a:r>
-            <a:endParaRPr lang="en-US"/>
           </a:p>
         </p:txBody>
       </p:sp>
@@ -1384,7 +1390,7 @@
           <a:p>
             <a:pPr lvl="0"/>
             <a:r>
-              <a:rPr lang="en-US" smtClean="0"/>
+              <a:rPr lang="en-US"/>
               <a:t>Click to edit Master text styles</a:t>
             </a:r>
           </a:p>
@@ -1407,9 +1413,9 @@
           <a:p>
             <a:fld id="{78C97017-6FC3-485B-9764-EAC9E56C1D49}" type="datetimeFigureOut">
               <a:rPr lang="en-US" smtClean="0"/>
-              <a:t>11/19/2016</a:t>
+              <a:t>03/24/17</a:t>
             </a:fld>
-            <a:endParaRPr lang="en-US"/>
+            <a:endParaRPr lang="en-US" dirty="0"/>
           </a:p>
         </p:txBody>
       </p:sp>
@@ -1428,7 +1434,7 @@
           <a:bodyPr/>
           <a:lstStyle/>
           <a:p>
-            <a:endParaRPr lang="en-US"/>
+            <a:endParaRPr lang="en-US" dirty="0"/>
           </a:p>
         </p:txBody>
       </p:sp>
@@ -1451,7 +1457,7 @@
               <a:rPr lang="en-US" smtClean="0"/>
               <a:t>‹#›</a:t>
             </a:fld>
-            <a:endParaRPr lang="en-US"/>
+            <a:endParaRPr lang="en-US" dirty="0"/>
           </a:p>
         </p:txBody>
       </p:sp>
@@ -1501,10 +1507,9 @@
           <a:lstStyle/>
           <a:p>
             <a:r>
-              <a:rPr lang="en-US" smtClean="0"/>
+              <a:rPr lang="en-US"/>
               <a:t>Click to edit Master title style</a:t>
             </a:r>
-            <a:endParaRPr lang="en-US"/>
           </a:p>
         </p:txBody>
       </p:sp>
@@ -1558,38 +1563,37 @@
           <a:p>
             <a:pPr lvl="0"/>
             <a:r>
-              <a:rPr lang="en-US" smtClean="0"/>
+              <a:rPr lang="en-US"/>
               <a:t>Click to edit Master text styles</a:t>
             </a:r>
           </a:p>
           <a:p>
             <a:pPr lvl="1"/>
             <a:r>
-              <a:rPr lang="en-US" smtClean="0"/>
+              <a:rPr lang="en-US"/>
               <a:t>Second level</a:t>
             </a:r>
           </a:p>
           <a:p>
             <a:pPr lvl="2"/>
             <a:r>
-              <a:rPr lang="en-US" smtClean="0"/>
+              <a:rPr lang="en-US"/>
               <a:t>Third level</a:t>
             </a:r>
           </a:p>
           <a:p>
             <a:pPr lvl="3"/>
             <a:r>
-              <a:rPr lang="en-US" smtClean="0"/>
+              <a:rPr lang="en-US"/>
               <a:t>Fourth level</a:t>
             </a:r>
           </a:p>
           <a:p>
             <a:pPr lvl="4"/>
             <a:r>
-              <a:rPr lang="en-US" smtClean="0"/>
+              <a:rPr lang="en-US"/>
               <a:t>Fifth level</a:t>
             </a:r>
-            <a:endParaRPr lang="en-US"/>
           </a:p>
         </p:txBody>
       </p:sp>
@@ -1643,38 +1647,37 @@
           <a:p>
             <a:pPr lvl="0"/>
             <a:r>
-              <a:rPr lang="en-US" smtClean="0"/>
+              <a:rPr lang="en-US"/>
               <a:t>Click to edit Master text styles</a:t>
             </a:r>
           </a:p>
           <a:p>
             <a:pPr lvl="1"/>
             <a:r>
-              <a:rPr lang="en-US" smtClean="0"/>
+              <a:rPr lang="en-US"/>
               <a:t>Second level</a:t>
             </a:r>
           </a:p>
           <a:p>
             <a:pPr lvl="2"/>
             <a:r>
-              <a:rPr lang="en-US" smtClean="0"/>
+              <a:rPr lang="en-US"/>
               <a:t>Third level</a:t>
             </a:r>
           </a:p>
           <a:p>
             <a:pPr lvl="3"/>
             <a:r>
-              <a:rPr lang="en-US" smtClean="0"/>
+              <a:rPr lang="en-US"/>
               <a:t>Fourth level</a:t>
             </a:r>
           </a:p>
           <a:p>
             <a:pPr lvl="4"/>
             <a:r>
-              <a:rPr lang="en-US" smtClean="0"/>
+              <a:rPr lang="en-US"/>
               <a:t>Fifth level</a:t>
             </a:r>
-            <a:endParaRPr lang="en-US"/>
           </a:p>
         </p:txBody>
       </p:sp>
@@ -1695,9 +1698,9 @@
           <a:p>
             <a:fld id="{78C97017-6FC3-485B-9764-EAC9E56C1D49}" type="datetimeFigureOut">
               <a:rPr lang="en-US" smtClean="0"/>
-              <a:t>11/19/2016</a:t>
+              <a:t>03/24/17</a:t>
             </a:fld>
-            <a:endParaRPr lang="en-US"/>
+            <a:endParaRPr lang="en-US" dirty="0"/>
           </a:p>
         </p:txBody>
       </p:sp>
@@ -1716,7 +1719,7 @@
           <a:bodyPr/>
           <a:lstStyle/>
           <a:p>
-            <a:endParaRPr lang="en-US"/>
+            <a:endParaRPr lang="en-US" dirty="0"/>
           </a:p>
         </p:txBody>
       </p:sp>
@@ -1739,7 +1742,7 @@
               <a:rPr lang="en-US" smtClean="0"/>
               <a:t>‹#›</a:t>
             </a:fld>
-            <a:endParaRPr lang="en-US"/>
+            <a:endParaRPr lang="en-US" dirty="0"/>
           </a:p>
         </p:txBody>
       </p:sp>
@@ -1793,10 +1796,9 @@
           </a:lstStyle>
           <a:p>
             <a:r>
-              <a:rPr lang="en-US" smtClean="0"/>
+              <a:rPr lang="en-US"/>
               <a:t>Click to edit Master title style</a:t>
             </a:r>
-            <a:endParaRPr lang="en-US"/>
           </a:p>
         </p:txBody>
       </p:sp>
@@ -1859,7 +1861,7 @@
           <a:p>
             <a:pPr lvl="0"/>
             <a:r>
-              <a:rPr lang="en-US" smtClean="0"/>
+              <a:rPr lang="en-US"/>
               <a:t>Click to edit Master text styles</a:t>
             </a:r>
           </a:p>
@@ -1915,38 +1917,37 @@
           <a:p>
             <a:pPr lvl="0"/>
             <a:r>
-              <a:rPr lang="en-US" smtClean="0"/>
+              <a:rPr lang="en-US"/>
               <a:t>Click to edit Master text styles</a:t>
             </a:r>
           </a:p>
           <a:p>
             <a:pPr lvl="1"/>
             <a:r>
-              <a:rPr lang="en-US" smtClean="0"/>
+              <a:rPr lang="en-US"/>
               <a:t>Second level</a:t>
             </a:r>
           </a:p>
           <a:p>
             <a:pPr lvl="2"/>
             <a:r>
-              <a:rPr lang="en-US" smtClean="0"/>
+              <a:rPr lang="en-US"/>
               <a:t>Third level</a:t>
             </a:r>
           </a:p>
           <a:p>
             <a:pPr lvl="3"/>
             <a:r>
-              <a:rPr lang="en-US" smtClean="0"/>
+              <a:rPr lang="en-US"/>
               <a:t>Fourth level</a:t>
             </a:r>
           </a:p>
           <a:p>
             <a:pPr lvl="4"/>
             <a:r>
-              <a:rPr lang="en-US" smtClean="0"/>
+              <a:rPr lang="en-US"/>
               <a:t>Fifth level</a:t>
             </a:r>
-            <a:endParaRPr lang="en-US"/>
           </a:p>
         </p:txBody>
       </p:sp>
@@ -2009,7 +2010,7 @@
           <a:p>
             <a:pPr lvl="0"/>
             <a:r>
-              <a:rPr lang="en-US" smtClean="0"/>
+              <a:rPr lang="en-US"/>
               <a:t>Click to edit Master text styles</a:t>
             </a:r>
           </a:p>
@@ -2065,38 +2066,37 @@
           <a:p>
             <a:pPr lvl="0"/>
             <a:r>
-              <a:rPr lang="en-US" smtClean="0"/>
+              <a:rPr lang="en-US"/>
               <a:t>Click to edit Master text styles</a:t>
             </a:r>
           </a:p>
           <a:p>
             <a:pPr lvl="1"/>
             <a:r>
-              <a:rPr lang="en-US" smtClean="0"/>
+              <a:rPr lang="en-US"/>
               <a:t>Second level</a:t>
             </a:r>
           </a:p>
           <a:p>
             <a:pPr lvl="2"/>
             <a:r>
-              <a:rPr lang="en-US" smtClean="0"/>
+              <a:rPr lang="en-US"/>
               <a:t>Third level</a:t>
             </a:r>
           </a:p>
           <a:p>
             <a:pPr lvl="3"/>
             <a:r>
-              <a:rPr lang="en-US" smtClean="0"/>
+              <a:rPr lang="en-US"/>
               <a:t>Fourth level</a:t>
             </a:r>
           </a:p>
           <a:p>
             <a:pPr lvl="4"/>
             <a:r>
-              <a:rPr lang="en-US" smtClean="0"/>
+              <a:rPr lang="en-US"/>
               <a:t>Fifth level</a:t>
             </a:r>
-            <a:endParaRPr lang="en-US"/>
           </a:p>
         </p:txBody>
       </p:sp>
@@ -2117,9 +2117,9 @@
           <a:p>
             <a:fld id="{78C97017-6FC3-485B-9764-EAC9E56C1D49}" type="datetimeFigureOut">
               <a:rPr lang="en-US" smtClean="0"/>
-              <a:t>11/19/2016</a:t>
+              <a:t>03/24/17</a:t>
             </a:fld>
-            <a:endParaRPr lang="en-US"/>
+            <a:endParaRPr lang="en-US" dirty="0"/>
           </a:p>
         </p:txBody>
       </p:sp>
@@ -2138,7 +2138,7 @@
           <a:bodyPr/>
           <a:lstStyle/>
           <a:p>
-            <a:endParaRPr lang="en-US"/>
+            <a:endParaRPr lang="en-US" dirty="0"/>
           </a:p>
         </p:txBody>
       </p:sp>
@@ -2161,7 +2161,7 @@
               <a:rPr lang="en-US" smtClean="0"/>
               <a:t>‹#›</a:t>
             </a:fld>
-            <a:endParaRPr lang="en-US"/>
+            <a:endParaRPr lang="en-US" dirty="0"/>
           </a:p>
         </p:txBody>
       </p:sp>
@@ -2211,10 +2211,9 @@
           <a:lstStyle/>
           <a:p>
             <a:r>
-              <a:rPr lang="en-US" smtClean="0"/>
+              <a:rPr lang="en-US"/>
               <a:t>Click to edit Master title style</a:t>
             </a:r>
-            <a:endParaRPr lang="en-US"/>
           </a:p>
         </p:txBody>
       </p:sp>
@@ -2235,9 +2234,9 @@
           <a:p>
             <a:fld id="{78C97017-6FC3-485B-9764-EAC9E56C1D49}" type="datetimeFigureOut">
               <a:rPr lang="en-US" smtClean="0"/>
-              <a:t>11/19/2016</a:t>
+              <a:t>03/24/17</a:t>
             </a:fld>
-            <a:endParaRPr lang="en-US"/>
+            <a:endParaRPr lang="en-US" dirty="0"/>
           </a:p>
         </p:txBody>
       </p:sp>
@@ -2256,7 +2255,7 @@
           <a:bodyPr/>
           <a:lstStyle/>
           <a:p>
-            <a:endParaRPr lang="en-US"/>
+            <a:endParaRPr lang="en-US" dirty="0"/>
           </a:p>
         </p:txBody>
       </p:sp>
@@ -2279,7 +2278,7 @@
               <a:rPr lang="en-US" smtClean="0"/>
               <a:t>‹#›</a:t>
             </a:fld>
-            <a:endParaRPr lang="en-US"/>
+            <a:endParaRPr lang="en-US" dirty="0"/>
           </a:p>
         </p:txBody>
       </p:sp>
@@ -2330,9 +2329,9 @@
           <a:p>
             <a:fld id="{78C97017-6FC3-485B-9764-EAC9E56C1D49}" type="datetimeFigureOut">
               <a:rPr lang="en-US" smtClean="0"/>
-              <a:t>11/19/2016</a:t>
+              <a:t>03/24/17</a:t>
             </a:fld>
-            <a:endParaRPr lang="en-US"/>
+            <a:endParaRPr lang="en-US" dirty="0"/>
           </a:p>
         </p:txBody>
       </p:sp>
@@ -2351,7 +2350,7 @@
           <a:bodyPr/>
           <a:lstStyle/>
           <a:p>
-            <a:endParaRPr lang="en-US"/>
+            <a:endParaRPr lang="en-US" dirty="0"/>
           </a:p>
         </p:txBody>
       </p:sp>
@@ -2374,7 +2373,7 @@
               <a:rPr lang="en-US" smtClean="0"/>
               <a:t>‹#›</a:t>
             </a:fld>
-            <a:endParaRPr lang="en-US"/>
+            <a:endParaRPr lang="en-US" dirty="0"/>
           </a:p>
         </p:txBody>
       </p:sp>
@@ -2433,10 +2432,9 @@
           </a:lstStyle>
           <a:p>
             <a:r>
-              <a:rPr lang="en-US" smtClean="0"/>
+              <a:rPr lang="en-US"/>
               <a:t>Click to edit Master title style</a:t>
             </a:r>
-            <a:endParaRPr lang="en-US"/>
           </a:p>
         </p:txBody>
       </p:sp>
@@ -2490,38 +2488,37 @@
           <a:p>
             <a:pPr lvl="0"/>
             <a:r>
-              <a:rPr lang="en-US" smtClean="0"/>
+              <a:rPr lang="en-US"/>
               <a:t>Click to edit Master text styles</a:t>
             </a:r>
           </a:p>
           <a:p>
             <a:pPr lvl="1"/>
             <a:r>
-              <a:rPr lang="en-US" smtClean="0"/>
+              <a:rPr lang="en-US"/>
               <a:t>Second level</a:t>
             </a:r>
           </a:p>
           <a:p>
             <a:pPr lvl="2"/>
             <a:r>
-              <a:rPr lang="en-US" smtClean="0"/>
+              <a:rPr lang="en-US"/>
               <a:t>Third level</a:t>
             </a:r>
           </a:p>
           <a:p>
             <a:pPr lvl="3"/>
             <a:r>
-              <a:rPr lang="en-US" smtClean="0"/>
+              <a:rPr lang="en-US"/>
               <a:t>Fourth level</a:t>
             </a:r>
           </a:p>
           <a:p>
             <a:pPr lvl="4"/>
             <a:r>
-              <a:rPr lang="en-US" smtClean="0"/>
+              <a:rPr lang="en-US"/>
               <a:t>Fifth level</a:t>
             </a:r>
-            <a:endParaRPr lang="en-US"/>
           </a:p>
         </p:txBody>
       </p:sp>
@@ -2584,7 +2581,7 @@
           <a:p>
             <a:pPr lvl="0"/>
             <a:r>
-              <a:rPr lang="en-US" smtClean="0"/>
+              <a:rPr lang="en-US"/>
               <a:t>Click to edit Master text styles</a:t>
             </a:r>
           </a:p>
@@ -2607,9 +2604,9 @@
           <a:p>
             <a:fld id="{78C97017-6FC3-485B-9764-EAC9E56C1D49}" type="datetimeFigureOut">
               <a:rPr lang="en-US" smtClean="0"/>
-              <a:t>11/19/2016</a:t>
+              <a:t>03/24/17</a:t>
             </a:fld>
-            <a:endParaRPr lang="en-US"/>
+            <a:endParaRPr lang="en-US" dirty="0"/>
           </a:p>
         </p:txBody>
       </p:sp>
@@ -2628,7 +2625,7 @@
           <a:bodyPr/>
           <a:lstStyle/>
           <a:p>
-            <a:endParaRPr lang="en-US"/>
+            <a:endParaRPr lang="en-US" dirty="0"/>
           </a:p>
         </p:txBody>
       </p:sp>
@@ -2651,7 +2648,7 @@
               <a:rPr lang="en-US" smtClean="0"/>
               <a:t>‹#›</a:t>
             </a:fld>
-            <a:endParaRPr lang="en-US"/>
+            <a:endParaRPr lang="en-US" dirty="0"/>
           </a:p>
         </p:txBody>
       </p:sp>
@@ -2710,10 +2707,9 @@
           </a:lstStyle>
           <a:p>
             <a:r>
-              <a:rPr lang="en-US" smtClean="0"/>
+              <a:rPr lang="en-US"/>
               <a:t>Click to edit Master title style</a:t>
             </a:r>
-            <a:endParaRPr lang="en-US"/>
           </a:p>
         </p:txBody>
       </p:sp>
@@ -2774,7 +2770,7 @@
             </a:lvl9pPr>
           </a:lstStyle>
           <a:p>
-            <a:endParaRPr lang="en-US"/>
+            <a:endParaRPr lang="en-US" dirty="0"/>
           </a:p>
         </p:txBody>
       </p:sp>
@@ -2837,7 +2833,7 @@
           <a:p>
             <a:pPr lvl="0"/>
             <a:r>
-              <a:rPr lang="en-US" smtClean="0"/>
+              <a:rPr lang="en-US"/>
               <a:t>Click to edit Master text styles</a:t>
             </a:r>
           </a:p>
@@ -2860,9 +2856,9 @@
           <a:p>
             <a:fld id="{78C97017-6FC3-485B-9764-EAC9E56C1D49}" type="datetimeFigureOut">
               <a:rPr lang="en-US" smtClean="0"/>
-              <a:t>11/19/2016</a:t>
+              <a:t>03/24/17</a:t>
             </a:fld>
-            <a:endParaRPr lang="en-US"/>
+            <a:endParaRPr lang="en-US" dirty="0"/>
           </a:p>
         </p:txBody>
       </p:sp>
@@ -2881,7 +2877,7 @@
           <a:bodyPr/>
           <a:lstStyle/>
           <a:p>
-            <a:endParaRPr lang="en-US"/>
+            <a:endParaRPr lang="en-US" dirty="0"/>
           </a:p>
         </p:txBody>
       </p:sp>
@@ -2904,7 +2900,7 @@
               <a:rPr lang="en-US" smtClean="0"/>
               <a:t>‹#›</a:t>
             </a:fld>
-            <a:endParaRPr lang="en-US"/>
+            <a:endParaRPr lang="en-US" dirty="0"/>
           </a:p>
         </p:txBody>
       </p:sp>
@@ -2969,10 +2965,9 @@
           <a:lstStyle/>
           <a:p>
             <a:r>
-              <a:rPr lang="en-US" smtClean="0"/>
+              <a:rPr lang="en-US"/>
               <a:t>Click to edit Master title style</a:t>
             </a:r>
-            <a:endParaRPr lang="en-US"/>
           </a:p>
         </p:txBody>
       </p:sp>
@@ -3003,38 +2998,37 @@
           <a:p>
             <a:pPr lvl="0"/>
             <a:r>
-              <a:rPr lang="en-US" smtClean="0"/>
+              <a:rPr lang="en-US"/>
               <a:t>Click to edit Master text styles</a:t>
             </a:r>
           </a:p>
           <a:p>
             <a:pPr lvl="1"/>
             <a:r>
-              <a:rPr lang="en-US" smtClean="0"/>
+              <a:rPr lang="en-US"/>
               <a:t>Second level</a:t>
             </a:r>
           </a:p>
           <a:p>
             <a:pPr lvl="2"/>
             <a:r>
-              <a:rPr lang="en-US" smtClean="0"/>
+              <a:rPr lang="en-US"/>
               <a:t>Third level</a:t>
             </a:r>
           </a:p>
           <a:p>
             <a:pPr lvl="3"/>
             <a:r>
-              <a:rPr lang="en-US" smtClean="0"/>
+              <a:rPr lang="en-US"/>
               <a:t>Fourth level</a:t>
             </a:r>
           </a:p>
           <a:p>
             <a:pPr lvl="4"/>
             <a:r>
-              <a:rPr lang="en-US" smtClean="0"/>
+              <a:rPr lang="en-US"/>
               <a:t>Fifth level</a:t>
             </a:r>
-            <a:endParaRPr lang="en-US"/>
           </a:p>
         </p:txBody>
       </p:sp>
@@ -3073,9 +3067,9 @@
           <a:p>
             <a:fld id="{78C97017-6FC3-485B-9764-EAC9E56C1D49}" type="datetimeFigureOut">
               <a:rPr lang="en-US" smtClean="0"/>
-              <a:t>11/19/2016</a:t>
+              <a:t>03/24/17</a:t>
             </a:fld>
-            <a:endParaRPr lang="en-US"/>
+            <a:endParaRPr lang="en-US" dirty="0"/>
           </a:p>
         </p:txBody>
       </p:sp>
@@ -3112,7 +3106,7 @@
             </a:lvl1pPr>
           </a:lstStyle>
           <a:p>
-            <a:endParaRPr lang="en-US"/>
+            <a:endParaRPr lang="en-US" dirty="0"/>
           </a:p>
         </p:txBody>
       </p:sp>
@@ -3153,7 +3147,7 @@
               <a:rPr lang="en-US" smtClean="0"/>
               <a:t>‹#›</a:t>
             </a:fld>
-            <a:endParaRPr lang="en-US"/>
+            <a:endParaRPr lang="en-US" dirty="0"/>
           </a:p>
         </p:txBody>
       </p:sp>
@@ -3494,7 +3488,7 @@
           <a:lstStyle/>
           <a:p>
             <a:r>
-              <a:rPr lang="en-US" sz="1200" b="1" dirty="0" smtClean="0">
+              <a:rPr lang="en-US" sz="1200" b="1" dirty="0">
                 <a:solidFill>
                   <a:srgbClr val="7030A0"/>
                 </a:solidFill>
@@ -3553,7 +3547,7 @@
           <a:p>
             <a:pPr algn="ctr"/>
             <a:r>
-              <a:rPr lang="en-US" sz="1050" dirty="0" err="1" smtClean="0">
+              <a:rPr lang="en-US" sz="1050" dirty="0">
                 <a:solidFill>
                   <a:schemeClr val="bg1"/>
                 </a:solidFill>
@@ -3612,7 +3606,7 @@
           <a:p>
             <a:pPr algn="ctr"/>
             <a:r>
-              <a:rPr lang="en-US" sz="1050" dirty="0" err="1" smtClean="0">
+              <a:rPr lang="en-US" sz="1050" dirty="0">
                 <a:solidFill>
                   <a:schemeClr val="bg1"/>
                 </a:solidFill>
@@ -3767,7 +3761,7 @@
           <a:p>
             <a:pPr algn="ctr"/>
             <a:r>
-              <a:rPr lang="en-US" sz="1050" dirty="0" smtClean="0">
+              <a:rPr lang="en-US" sz="1050" dirty="0">
                 <a:solidFill>
                   <a:schemeClr val="bg1"/>
                 </a:solidFill>
@@ -3825,7 +3819,7 @@
           <a:lstStyle/>
           <a:p>
             <a:pPr algn="ctr"/>
-            <a:endParaRPr lang="en-SG" sz="1050"/>
+            <a:endParaRPr lang="en-SG" sz="1050" dirty="0"/>
           </a:p>
         </p:txBody>
       </p:sp>
@@ -3913,7 +3907,7 @@
           <a:lstStyle/>
           <a:p>
             <a:pPr algn="ctr"/>
-            <a:endParaRPr lang="en-SG" sz="1050" b="1">
+            <a:endParaRPr lang="en-SG" sz="1050" b="1" dirty="0">
               <a:solidFill>
                 <a:srgbClr val="92D050"/>
               </a:solidFill>
@@ -4046,7 +4040,7 @@
           <a:lstStyle/>
           <a:p>
             <a:pPr algn="ctr"/>
-            <a:endParaRPr lang="en-US" sz="1050"/>
+            <a:endParaRPr lang="en-US" sz="1050" dirty="0"/>
           </a:p>
         </p:txBody>
       </p:sp>
@@ -4091,12 +4085,12 @@
           <a:p>
             <a:pPr algn="ctr"/>
             <a:r>
-              <a:rPr lang="en-US" sz="1050" dirty="0" err="1" smtClean="0">
+              <a:rPr lang="en-US" sz="1050" dirty="0">
                 <a:solidFill>
                   <a:srgbClr val="7030A0"/>
                 </a:solidFill>
               </a:rPr>
-              <a:t>AddressBook</a:t>
+              <a:t>TaskManager</a:t>
             </a:r>
             <a:endParaRPr lang="en-SG" sz="1050" dirty="0">
               <a:solidFill>
@@ -4188,7 +4182,7 @@
           <a:lstStyle/>
           <a:p>
             <a:pPr algn="ctr"/>
-            <a:endParaRPr lang="en-US" sz="1050"/>
+            <a:endParaRPr lang="en-US" sz="1050" dirty="0"/>
           </a:p>
         </p:txBody>
       </p:sp>
@@ -4233,12 +4227,12 @@
           <a:p>
             <a:pPr algn="ctr"/>
             <a:r>
-              <a:rPr lang="en-US" sz="1050" dirty="0" err="1" smtClean="0">
+              <a:rPr lang="en-US" sz="1050" dirty="0">
                 <a:solidFill>
                   <a:srgbClr val="7030A0"/>
                 </a:solidFill>
               </a:rPr>
-              <a:t>UniquePersonList</a:t>
+              <a:t>UniqueTaskList</a:t>
             </a:r>
             <a:endParaRPr lang="en-SG" sz="1050" dirty="0">
               <a:solidFill>
@@ -4291,7 +4285,7 @@
           <a:lstStyle/>
           <a:p>
             <a:pPr algn="ctr"/>
-            <a:endParaRPr lang="en-US" sz="1050"/>
+            <a:endParaRPr lang="en-US" sz="1050" dirty="0"/>
           </a:p>
         </p:txBody>
       </p:sp>
@@ -4377,14 +4371,14 @@
           <a:p>
             <a:pPr algn="ctr"/>
             <a:r>
-              <a:rPr lang="en-US" sz="1050" dirty="0" err="1" smtClean="0">
+              <a:rPr lang="en-US" sz="900" dirty="0">
                 <a:solidFill>
                   <a:srgbClr val="7030A0"/>
                 </a:solidFill>
               </a:rPr>
-              <a:t>UniqueTagList</a:t>
-            </a:r>
-            <a:endParaRPr lang="en-SG" sz="1050" dirty="0">
+              <a:t>UniqueCategoryList</a:t>
+            </a:r>
+            <a:endParaRPr lang="en-SG" sz="900" dirty="0">
               <a:solidFill>
                 <a:srgbClr val="7030A0"/>
               </a:solidFill>
@@ -4476,12 +4470,12 @@
           <a:p>
             <a:pPr algn="ctr"/>
             <a:r>
-              <a:rPr lang="en-US" sz="1050" dirty="0" smtClean="0">
+              <a:rPr lang="en-US" sz="1050" dirty="0">
                 <a:solidFill>
                   <a:srgbClr val="7030A0"/>
                 </a:solidFill>
               </a:rPr>
-              <a:t>Person</a:t>
+              <a:t>Task</a:t>
             </a:r>
             <a:endParaRPr lang="en-SG" sz="1050" dirty="0">
               <a:solidFill>
@@ -4532,7 +4526,7 @@
           <a:lstStyle/>
           <a:p>
             <a:pPr algn="ctr"/>
-            <a:endParaRPr lang="en-US" sz="1050"/>
+            <a:endParaRPr lang="en-US" sz="1050" dirty="0"/>
           </a:p>
         </p:txBody>
       </p:sp>
@@ -4585,8 +4579,8 @@
         </p:nvSpPr>
         <p:spPr>
           <a:xfrm>
-            <a:off x="5336105" y="1809332"/>
-            <a:ext cx="483700" cy="346760"/>
+            <a:off x="5336104" y="1809332"/>
+            <a:ext cx="799151" cy="346760"/>
           </a:xfrm>
           <a:prstGeom prst="rect">
             <a:avLst/>
@@ -4618,12 +4612,12 @@
           <a:p>
             <a:pPr algn="ctr"/>
             <a:r>
-              <a:rPr lang="en-US" sz="1050" dirty="0" smtClean="0">
+              <a:rPr lang="en-US" sz="1050" dirty="0">
                 <a:solidFill>
                   <a:srgbClr val="7030A0"/>
                 </a:solidFill>
               </a:rPr>
-              <a:t>Tag</a:t>
+              <a:t>Category</a:t>
             </a:r>
             <a:endParaRPr lang="en-SG" sz="1050" dirty="0">
               <a:solidFill>
@@ -4674,7 +4668,7 @@
           <a:lstStyle/>
           <a:p>
             <a:pPr algn="ctr"/>
-            <a:endParaRPr lang="en-US" sz="1050"/>
+            <a:endParaRPr lang="en-US" sz="1050" dirty="0"/>
           </a:p>
         </p:txBody>
       </p:sp>
@@ -4682,6 +4676,7 @@
         <p:nvCxnSpPr>
           <p:cNvPr id="69" name="Elbow Connector 68"/>
           <p:cNvCxnSpPr>
+            <a:cxnSpLocks/>
             <a:stCxn id="68" idx="3"/>
             <a:endCxn id="67" idx="1"/>
           </p:cNvCxnSpPr>
@@ -4690,7 +4685,7 @@
         <p:spPr>
           <a:xfrm rot="5400000" flipH="1" flipV="1">
             <a:off x="5161650" y="1860752"/>
-            <a:ext cx="52494" cy="296415"/>
+            <a:ext cx="52494" cy="296414"/>
           </a:xfrm>
           <a:prstGeom prst="bentConnector2">
             <a:avLst/>
@@ -4760,7 +4755,7 @@
           <a:p>
             <a:pPr algn="ctr"/>
             <a:r>
-              <a:rPr lang="en-US" sz="1050" dirty="0" smtClean="0">
+              <a:rPr lang="en-US" sz="1050" dirty="0">
                 <a:solidFill>
                   <a:srgbClr val="7030A0"/>
                 </a:solidFill>
@@ -4768,19 +4763,19 @@
               <a:t>&lt;&lt;interface&gt;&gt;</a:t>
             </a:r>
             <a:br>
-              <a:rPr lang="en-US" sz="1050" dirty="0" smtClean="0">
+              <a:rPr lang="en-US" sz="1050" dirty="0">
                 <a:solidFill>
                   <a:srgbClr val="7030A0"/>
                 </a:solidFill>
               </a:rPr>
             </a:br>
             <a:r>
-              <a:rPr lang="en-US" sz="1050" dirty="0" err="1" smtClean="0">
+              <a:rPr lang="en-US" sz="1050" dirty="0">
                 <a:solidFill>
                   <a:srgbClr val="7030A0"/>
                 </a:solidFill>
               </a:rPr>
-              <a:t>ReadOnlyPerson</a:t>
+              <a:t>ReadOnlyTask</a:t>
             </a:r>
             <a:endParaRPr lang="en-SG" sz="1050" dirty="0">
               <a:solidFill>
@@ -4798,8 +4793,8 @@
         </p:nvSpPr>
         <p:spPr>
           <a:xfrm>
-            <a:off x="7712397" y="2564238"/>
-            <a:ext cx="708186" cy="285783"/>
+            <a:off x="7712396" y="2564238"/>
+            <a:ext cx="776557" cy="285783"/>
           </a:xfrm>
           <a:prstGeom prst="rect">
             <a:avLst/>
@@ -4831,12 +4826,12 @@
           <a:p>
             <a:pPr algn="ctr"/>
             <a:r>
-              <a:rPr lang="en-US" sz="1050" dirty="0" smtClean="0">
+              <a:rPr lang="en-US" sz="1050" dirty="0">
                 <a:solidFill>
                   <a:srgbClr val="7030A0"/>
                 </a:solidFill>
               </a:rPr>
-              <a:t>Name</a:t>
+              <a:t>Priority</a:t>
             </a:r>
             <a:endParaRPr lang="en-SG" sz="1050" dirty="0">
               <a:solidFill>
@@ -4889,7 +4884,7 @@
           <a:lstStyle/>
           <a:p>
             <a:pPr algn="ctr"/>
-            <a:endParaRPr lang="en-US" sz="1050"/>
+            <a:endParaRPr lang="en-US" sz="1050" dirty="0"/>
           </a:p>
         </p:txBody>
       </p:sp>
@@ -4897,6 +4892,7 @@
         <p:nvCxnSpPr>
           <p:cNvPr id="79" name="Elbow Connector 78"/>
           <p:cNvCxnSpPr>
+            <a:cxnSpLocks/>
             <a:stCxn id="78" idx="3"/>
             <a:endCxn id="76" idx="1"/>
           </p:cNvCxnSpPr>
@@ -4905,7 +4901,7 @@
         <p:spPr>
           <a:xfrm flipV="1">
             <a:off x="7277995" y="2707130"/>
-            <a:ext cx="434402" cy="327761"/>
+            <a:ext cx="434401" cy="327761"/>
           </a:xfrm>
           <a:prstGeom prst="bentConnector3">
             <a:avLst/>
@@ -4942,8 +4938,8 @@
         </p:nvSpPr>
         <p:spPr>
           <a:xfrm>
-            <a:off x="7712397" y="2887216"/>
-            <a:ext cx="708186" cy="285783"/>
+            <a:off x="7712396" y="2887216"/>
+            <a:ext cx="776557" cy="285783"/>
           </a:xfrm>
           <a:prstGeom prst="rect">
             <a:avLst/>
@@ -4975,12 +4971,12 @@
           <a:p>
             <a:pPr algn="ctr"/>
             <a:r>
-              <a:rPr lang="en-US" sz="1050" dirty="0" smtClean="0">
+              <a:rPr lang="en-US" sz="1050" dirty="0">
                 <a:solidFill>
                   <a:srgbClr val="7030A0"/>
                 </a:solidFill>
               </a:rPr>
-              <a:t>Phone</a:t>
+              <a:t>Location</a:t>
             </a:r>
             <a:endParaRPr lang="en-SG" sz="1050" dirty="0">
               <a:solidFill>
@@ -4994,6 +4990,7 @@
         <p:nvCxnSpPr>
           <p:cNvPr id="81" name="Elbow Connector 80"/>
           <p:cNvCxnSpPr>
+            <a:cxnSpLocks/>
             <a:stCxn id="78" idx="3"/>
             <a:endCxn id="80" idx="1"/>
           </p:cNvCxnSpPr>
@@ -5002,7 +4999,7 @@
         <p:spPr>
           <a:xfrm flipV="1">
             <a:off x="7277995" y="3030108"/>
-            <a:ext cx="434402" cy="4783"/>
+            <a:ext cx="434401" cy="4783"/>
           </a:xfrm>
           <a:prstGeom prst="bentConnector3">
             <a:avLst/>
@@ -5039,8 +5036,8 @@
         </p:nvSpPr>
         <p:spPr>
           <a:xfrm>
-            <a:off x="7712397" y="3210194"/>
-            <a:ext cx="708186" cy="285783"/>
+            <a:off x="7712396" y="3210194"/>
+            <a:ext cx="776557" cy="285783"/>
           </a:xfrm>
           <a:prstGeom prst="rect">
             <a:avLst/>
@@ -5072,14 +5069,14 @@
           <a:p>
             <a:pPr algn="ctr"/>
             <a:r>
-              <a:rPr lang="en-US" sz="1050" dirty="0" smtClean="0">
+              <a:rPr lang="en-US" sz="1000" dirty="0">
                 <a:solidFill>
                   <a:srgbClr val="7030A0"/>
                 </a:solidFill>
               </a:rPr>
-              <a:t>Email</a:t>
-            </a:r>
-            <a:endParaRPr lang="en-SG" sz="1050" dirty="0">
+              <a:t>Description</a:t>
+            </a:r>
+            <a:endParaRPr lang="en-SG" sz="1000" dirty="0">
               <a:solidFill>
                 <a:srgbClr val="7030A0"/>
               </a:solidFill>
@@ -5091,6 +5088,7 @@
         <p:nvCxnSpPr>
           <p:cNvPr id="84" name="Elbow Connector 83"/>
           <p:cNvCxnSpPr>
+            <a:cxnSpLocks/>
             <a:stCxn id="78" idx="3"/>
             <a:endCxn id="83" idx="1"/>
           </p:cNvCxnSpPr>
@@ -5099,7 +5097,7 @@
         <p:spPr>
           <a:xfrm>
             <a:off x="7277995" y="3034891"/>
-            <a:ext cx="434402" cy="318195"/>
+            <a:ext cx="434401" cy="318195"/>
           </a:xfrm>
           <a:prstGeom prst="bentConnector3">
             <a:avLst/>
@@ -5136,8 +5134,8 @@
         </p:nvSpPr>
         <p:spPr>
           <a:xfrm>
-            <a:off x="7712397" y="3533171"/>
-            <a:ext cx="708186" cy="285783"/>
+            <a:off x="7712396" y="3533171"/>
+            <a:ext cx="776557" cy="285783"/>
           </a:xfrm>
           <a:prstGeom prst="rect">
             <a:avLst/>
@@ -5169,12 +5167,12 @@
           <a:p>
             <a:pPr algn="ctr"/>
             <a:r>
-              <a:rPr lang="en-US" sz="1050" dirty="0" smtClean="0">
+              <a:rPr lang="en-US" sz="1050" dirty="0">
                 <a:solidFill>
                   <a:srgbClr val="7030A0"/>
                 </a:solidFill>
               </a:rPr>
-              <a:t>Address</a:t>
+              <a:t>DateTime</a:t>
             </a:r>
             <a:endParaRPr lang="en-SG" sz="1050" dirty="0">
               <a:solidFill>
@@ -5188,6 +5186,7 @@
         <p:nvCxnSpPr>
           <p:cNvPr id="86" name="Elbow Connector 85"/>
           <p:cNvCxnSpPr>
+            <a:cxnSpLocks/>
             <a:stCxn id="78" idx="3"/>
             <a:endCxn id="85" idx="1"/>
           </p:cNvCxnSpPr>
@@ -5196,7 +5195,7 @@
         <p:spPr>
           <a:xfrm>
             <a:off x="7277995" y="3034891"/>
-            <a:ext cx="434402" cy="641172"/>
+            <a:ext cx="434401" cy="641172"/>
           </a:xfrm>
           <a:prstGeom prst="bentConnector3">
             <a:avLst/>
@@ -5308,7 +5307,7 @@
           <a:lstStyle/>
           <a:p>
             <a:pPr algn="ctr"/>
-            <a:endParaRPr lang="en-SG" sz="1050" b="1">
+            <a:endParaRPr lang="en-SG" sz="1050" b="1" dirty="0">
               <a:solidFill>
                 <a:srgbClr val="92D050"/>
               </a:solidFill>
@@ -5357,7 +5356,7 @@
           <a:p>
             <a:pPr algn="ctr"/>
             <a:r>
-              <a:rPr lang="en-US" sz="1050" dirty="0" smtClean="0">
+              <a:rPr lang="en-US" sz="1050" dirty="0">
                 <a:solidFill>
                   <a:srgbClr val="7030A0"/>
                 </a:solidFill>
@@ -5365,19 +5364,19 @@
               <a:t>&lt;&lt;interface&gt;&gt;</a:t>
             </a:r>
             <a:br>
-              <a:rPr lang="en-US" sz="1050" dirty="0" smtClean="0">
+              <a:rPr lang="en-US" sz="1050" dirty="0">
                 <a:solidFill>
                   <a:srgbClr val="7030A0"/>
                 </a:solidFill>
               </a:rPr>
             </a:br>
             <a:r>
-              <a:rPr lang="en-US" sz="1050" dirty="0" err="1" smtClean="0">
+              <a:rPr lang="en-US" sz="1050" dirty="0">
                 <a:solidFill>
                   <a:srgbClr val="7030A0"/>
                 </a:solidFill>
               </a:rPr>
-              <a:t>ReadOnlyAddressBook</a:t>
+              <a:t>ReadOnlyTaskManager</a:t>
             </a:r>
             <a:endParaRPr lang="en-SG" sz="1050" dirty="0">
               <a:solidFill>
@@ -5411,7 +5410,7 @@
           <a:p>
             <a:pPr algn="r"/>
             <a:r>
-              <a:rPr lang="en-US" sz="1100" dirty="0" smtClean="0">
+              <a:rPr lang="en-US" sz="1100" dirty="0">
                 <a:solidFill>
                   <a:srgbClr val="7030A0"/>
                 </a:solidFill>
@@ -5467,20 +5466,12 @@
           <a:p>
             <a:pPr algn="ctr"/>
             <a:r>
-              <a:rPr lang="en-US" sz="1050" dirty="0" smtClean="0">
+              <a:rPr lang="en-US" sz="1050" dirty="0">
                 <a:solidFill>
                   <a:srgbClr val="7030A0"/>
                 </a:solidFill>
               </a:rPr>
               <a:t>&lt;&lt;interface&gt;&gt;</a:t>
-            </a:r>
-            <a:r>
-              <a:rPr lang="en-US" sz="1050" dirty="0">
-                <a:solidFill>
-                  <a:srgbClr val="7030A0"/>
-                </a:solidFill>
-              </a:rPr>
-              <a:t/>
             </a:r>
             <a:br>
               <a:rPr lang="en-US" sz="1050" dirty="0">
@@ -5490,7 +5481,7 @@
               </a:rPr>
             </a:br>
             <a:r>
-              <a:rPr lang="en-US" sz="1050" dirty="0" err="1" smtClean="0">
+              <a:rPr lang="en-US" sz="1050" dirty="0">
                 <a:solidFill>
                   <a:srgbClr val="7030A0"/>
                 </a:solidFill>
@@ -5612,7 +5603,7 @@
           <a:p>
             <a:pPr algn="ctr"/>
             <a:r>
-              <a:rPr lang="en-US" sz="1100" dirty="0" smtClean="0">
+              <a:rPr lang="en-US" sz="1100" dirty="0">
                 <a:solidFill>
                   <a:srgbClr val="7030A0"/>
                 </a:solidFill>
@@ -5651,7 +5642,7 @@
           <a:p>
             <a:pPr algn="ctr"/>
             <a:r>
-              <a:rPr lang="en-US" sz="1100" dirty="0" smtClean="0">
+              <a:rPr lang="en-US" sz="1100" dirty="0">
                 <a:solidFill>
                   <a:srgbClr val="7030A0"/>
                 </a:solidFill>
@@ -5690,7 +5681,7 @@
           <a:p>
             <a:pPr algn="ctr"/>
             <a:r>
-              <a:rPr lang="en-US" sz="1100" dirty="0" smtClean="0">
+              <a:rPr lang="en-US" sz="1100" dirty="0">
                 <a:solidFill>
                   <a:srgbClr val="7030A0"/>
                 </a:solidFill>
@@ -5729,7 +5720,7 @@
           <a:p>
             <a:pPr algn="ctr"/>
             <a:r>
-              <a:rPr lang="en-US" sz="1100" dirty="0" smtClean="0">
+              <a:rPr lang="en-US" sz="1100" dirty="0">
                 <a:solidFill>
                   <a:srgbClr val="7030A0"/>
                 </a:solidFill>
@@ -5768,7 +5759,7 @@
           <a:p>
             <a:pPr algn="ctr"/>
             <a:r>
-              <a:rPr lang="en-US" sz="1100" dirty="0" smtClean="0">
+              <a:rPr lang="en-US" sz="1100" dirty="0">
                 <a:solidFill>
                   <a:srgbClr val="7030A0"/>
                 </a:solidFill>
@@ -5807,7 +5798,7 @@
           <a:p>
             <a:pPr algn="ctr"/>
             <a:r>
-              <a:rPr lang="en-US" sz="1100" dirty="0" smtClean="0">
+              <a:rPr lang="en-US" sz="1100" dirty="0">
                 <a:solidFill>
                   <a:srgbClr val="7030A0"/>
                 </a:solidFill>
@@ -5846,7 +5837,7 @@
           <a:p>
             <a:pPr algn="ctr"/>
             <a:r>
-              <a:rPr lang="en-US" sz="1100" dirty="0" smtClean="0">
+              <a:rPr lang="en-US" sz="1100" dirty="0">
                 <a:solidFill>
                   <a:srgbClr val="7030A0"/>
                 </a:solidFill>
@@ -5885,7 +5876,7 @@
           <a:p>
             <a:pPr algn="ctr"/>
             <a:r>
-              <a:rPr lang="en-US" sz="1100" dirty="0" smtClean="0">
+              <a:rPr lang="en-US" sz="1100" dirty="0">
                 <a:solidFill>
                   <a:srgbClr val="7030A0"/>
                 </a:solidFill>
@@ -5900,6 +5891,290 @@
           </a:p>
         </p:txBody>
       </p:sp>
+      <p:sp>
+        <p:nvSpPr>
+          <p:cNvPr id="73" name="Rectangle 8"/>
+          <p:cNvSpPr/>
+          <p:nvPr/>
+        </p:nvSpPr>
+        <p:spPr>
+          <a:xfrm>
+            <a:off x="7713955" y="3851528"/>
+            <a:ext cx="776557" cy="285783"/>
+          </a:xfrm>
+          <a:prstGeom prst="rect">
+            <a:avLst/>
+          </a:prstGeom>
+          <a:ln w="19050">
+            <a:solidFill>
+              <a:srgbClr val="7030A0"/>
+            </a:solidFill>
+          </a:ln>
+          <a:effectLst/>
+        </p:spPr>
+        <p:style>
+          <a:lnRef idx="1">
+            <a:schemeClr val="accent4"/>
+          </a:lnRef>
+          <a:fillRef idx="2">
+            <a:schemeClr val="accent4"/>
+          </a:fillRef>
+          <a:effectRef idx="1">
+            <a:schemeClr val="accent4"/>
+          </a:effectRef>
+          <a:fontRef idx="minor">
+            <a:schemeClr val="dk1"/>
+          </a:fontRef>
+        </p:style>
+        <p:txBody>
+          <a:bodyPr rtlCol="0" anchor="ctr"/>
+          <a:lstStyle/>
+          <a:p>
+            <a:pPr algn="ctr"/>
+            <a:r>
+              <a:rPr lang="en-US" sz="1000" dirty="0">
+                <a:solidFill>
+                  <a:srgbClr val="7030A0"/>
+                </a:solidFill>
+              </a:rPr>
+              <a:t>Recurrence</a:t>
+            </a:r>
+            <a:endParaRPr lang="en-SG" sz="1000" dirty="0">
+              <a:solidFill>
+                <a:srgbClr val="7030A0"/>
+              </a:solidFill>
+            </a:endParaRPr>
+          </a:p>
+        </p:txBody>
+      </p:sp>
+      <p:sp>
+        <p:nvSpPr>
+          <p:cNvPr id="77" name="Rectangle 8"/>
+          <p:cNvSpPr/>
+          <p:nvPr/>
+        </p:nvSpPr>
+        <p:spPr>
+          <a:xfrm>
+            <a:off x="7710786" y="1925054"/>
+            <a:ext cx="776557" cy="285783"/>
+          </a:xfrm>
+          <a:prstGeom prst="rect">
+            <a:avLst/>
+          </a:prstGeom>
+          <a:ln w="19050">
+            <a:solidFill>
+              <a:srgbClr val="7030A0"/>
+            </a:solidFill>
+          </a:ln>
+          <a:effectLst/>
+        </p:spPr>
+        <p:style>
+          <a:lnRef idx="1">
+            <a:schemeClr val="accent4"/>
+          </a:lnRef>
+          <a:fillRef idx="2">
+            <a:schemeClr val="accent4"/>
+          </a:fillRef>
+          <a:effectRef idx="1">
+            <a:schemeClr val="accent4"/>
+          </a:effectRef>
+          <a:fontRef idx="minor">
+            <a:schemeClr val="dk1"/>
+          </a:fontRef>
+        </p:style>
+        <p:txBody>
+          <a:bodyPr rtlCol="0" anchor="ctr"/>
+          <a:lstStyle/>
+          <a:p>
+            <a:pPr algn="ctr"/>
+            <a:r>
+              <a:rPr lang="en-US" sz="1050" dirty="0">
+                <a:solidFill>
+                  <a:srgbClr val="7030A0"/>
+                </a:solidFill>
+              </a:rPr>
+              <a:t>Name</a:t>
+            </a:r>
+            <a:endParaRPr lang="en-SG" sz="1050" dirty="0">
+              <a:solidFill>
+                <a:srgbClr val="7030A0"/>
+              </a:solidFill>
+            </a:endParaRPr>
+          </a:p>
+        </p:txBody>
+      </p:sp>
+      <p:sp>
+        <p:nvSpPr>
+          <p:cNvPr id="82" name="Rectangle 8"/>
+          <p:cNvSpPr/>
+          <p:nvPr/>
+        </p:nvSpPr>
+        <p:spPr>
+          <a:xfrm>
+            <a:off x="7710786" y="2248031"/>
+            <a:ext cx="776557" cy="285783"/>
+          </a:xfrm>
+          <a:prstGeom prst="rect">
+            <a:avLst/>
+          </a:prstGeom>
+          <a:ln w="19050">
+            <a:solidFill>
+              <a:srgbClr val="7030A0"/>
+            </a:solidFill>
+          </a:ln>
+          <a:effectLst/>
+        </p:spPr>
+        <p:style>
+          <a:lnRef idx="1">
+            <a:schemeClr val="accent4"/>
+          </a:lnRef>
+          <a:fillRef idx="2">
+            <a:schemeClr val="accent4"/>
+          </a:fillRef>
+          <a:effectRef idx="1">
+            <a:schemeClr val="accent4"/>
+          </a:effectRef>
+          <a:fontRef idx="minor">
+            <a:schemeClr val="dk1"/>
+          </a:fontRef>
+        </p:style>
+        <p:txBody>
+          <a:bodyPr rtlCol="0" anchor="ctr"/>
+          <a:lstStyle/>
+          <a:p>
+            <a:pPr algn="ctr"/>
+            <a:r>
+              <a:rPr lang="en-US" sz="1050" dirty="0">
+                <a:solidFill>
+                  <a:srgbClr val="7030A0"/>
+                </a:solidFill>
+              </a:rPr>
+              <a:t>Status</a:t>
+            </a:r>
+            <a:endParaRPr lang="en-SG" sz="1050" dirty="0">
+              <a:solidFill>
+                <a:srgbClr val="7030A0"/>
+              </a:solidFill>
+            </a:endParaRPr>
+          </a:p>
+        </p:txBody>
+      </p:sp>
+      <p:cxnSp>
+        <p:nvCxnSpPr>
+          <p:cNvPr id="16" name="Connector: Elbow 15"/>
+          <p:cNvCxnSpPr>
+            <a:endCxn id="77" idx="1"/>
+          </p:cNvCxnSpPr>
+          <p:nvPr/>
+        </p:nvCxnSpPr>
+        <p:spPr>
+          <a:xfrm rot="5400000" flipH="1" flipV="1">
+            <a:off x="7278615" y="2284526"/>
+            <a:ext cx="648750" cy="215591"/>
+          </a:xfrm>
+          <a:prstGeom prst="bentConnector2">
+            <a:avLst/>
+          </a:prstGeom>
+          <a:ln w="19050">
+            <a:solidFill>
+              <a:srgbClr val="7030A0"/>
+            </a:solidFill>
+            <a:tailEnd type="arrow"/>
+          </a:ln>
+        </p:spPr>
+        <p:style>
+          <a:lnRef idx="1">
+            <a:schemeClr val="accent1"/>
+          </a:lnRef>
+          <a:fillRef idx="0">
+            <a:schemeClr val="accent1"/>
+          </a:fillRef>
+          <a:effectRef idx="0">
+            <a:schemeClr val="accent1"/>
+          </a:effectRef>
+          <a:fontRef idx="minor">
+            <a:schemeClr val="tx1"/>
+          </a:fontRef>
+        </p:style>
+      </p:cxnSp>
+      <p:cxnSp>
+        <p:nvCxnSpPr>
+          <p:cNvPr id="18" name="Connector: Elbow 17"/>
+          <p:cNvCxnSpPr>
+            <a:cxnSpLocks/>
+            <a:endCxn id="82" idx="1"/>
+          </p:cNvCxnSpPr>
+          <p:nvPr/>
+        </p:nvCxnSpPr>
+        <p:spPr>
+          <a:xfrm rot="5400000" flipH="1" flipV="1">
+            <a:off x="7294626" y="2591491"/>
+            <a:ext cx="616727" cy="215593"/>
+          </a:xfrm>
+          <a:prstGeom prst="bentConnector2">
+            <a:avLst/>
+          </a:prstGeom>
+          <a:ln w="19050">
+            <a:solidFill>
+              <a:srgbClr val="7030A0"/>
+            </a:solidFill>
+            <a:tailEnd type="arrow"/>
+          </a:ln>
+        </p:spPr>
+        <p:style>
+          <a:lnRef idx="1">
+            <a:schemeClr val="accent1"/>
+          </a:lnRef>
+          <a:fillRef idx="0">
+            <a:schemeClr val="accent1"/>
+          </a:fillRef>
+          <a:effectRef idx="0">
+            <a:schemeClr val="accent1"/>
+          </a:effectRef>
+          <a:fontRef idx="minor">
+            <a:schemeClr val="tx1"/>
+          </a:fontRef>
+        </p:style>
+      </p:cxnSp>
+      <p:cxnSp>
+        <p:nvCxnSpPr>
+          <p:cNvPr id="20" name="Connector: Elbow 19"/>
+          <p:cNvCxnSpPr>
+            <a:cxnSpLocks/>
+            <a:endCxn id="73" idx="1"/>
+          </p:cNvCxnSpPr>
+          <p:nvPr/>
+        </p:nvCxnSpPr>
+        <p:spPr>
+          <a:xfrm rot="16200000" flipH="1">
+            <a:off x="7257134" y="3537598"/>
+            <a:ext cx="694883" cy="218760"/>
+          </a:xfrm>
+          <a:prstGeom prst="bentConnector2">
+            <a:avLst/>
+          </a:prstGeom>
+          <a:ln w="19050">
+            <a:solidFill>
+              <a:srgbClr val="7030A0"/>
+            </a:solidFill>
+            <a:tailEnd type="arrow"/>
+          </a:ln>
+        </p:spPr>
+        <p:style>
+          <a:lnRef idx="1">
+            <a:schemeClr val="accent1"/>
+          </a:lnRef>
+          <a:fillRef idx="0">
+            <a:schemeClr val="accent1"/>
+          </a:fillRef>
+          <a:effectRef idx="0">
+            <a:schemeClr val="accent1"/>
+          </a:effectRef>
+          <a:fontRef idx="minor">
+            <a:schemeClr val="tx1"/>
+          </a:fontRef>
+        </p:style>
+      </p:cxnSp>
     </p:spTree>
     <p:extLst>
       <p:ext uri="{BB962C8B-B14F-4D97-AF65-F5344CB8AC3E}">
@@ -5910,13 +6185,6 @@
   <p:clrMapOvr>
     <a:masterClrMapping/>
   </p:clrMapOvr>
-  <p:timing>
-    <p:tnLst>
-      <p:par>
-        <p:cTn id="1" dur="indefinite" restart="never" nodeType="tmRoot"/>
-      </p:par>
-    </p:tnLst>
-  </p:timing>
 </p:sld>
 </file>
 

</xml_diff>

<commit_message>
change "1" to "2" in ModelClassDiagram.png
</commit_message>
<xml_diff>
--- a/docs/diagrams/ModelComponentClassDiagram.pptx
+++ b/docs/diagrams/ModelComponentClassDiagram.pptx
@@ -208,7 +208,7 @@
           <a:p>
             <a:fld id="{F5CC4B3F-88C1-4FFA-B1B6-F41C21DC6924}" type="datetimeFigureOut">
               <a:rPr lang="en-US" smtClean="0"/>
-              <a:t>3/22/2017</a:t>
+              <a:t>3/28/2017</a:t>
             </a:fld>
             <a:endParaRPr lang="en-US"/>
           </a:p>
@@ -657,7 +657,7 @@
           <a:p>
             <a:fld id="{78C97017-6FC3-485B-9764-EAC9E56C1D49}" type="datetimeFigureOut">
               <a:rPr lang="en-US" smtClean="0"/>
-              <a:t>3/22/2017</a:t>
+              <a:t>3/28/2017</a:t>
             </a:fld>
             <a:endParaRPr lang="en-US"/>
           </a:p>
@@ -827,7 +827,7 @@
           <a:p>
             <a:fld id="{78C97017-6FC3-485B-9764-EAC9E56C1D49}" type="datetimeFigureOut">
               <a:rPr lang="en-US" smtClean="0"/>
-              <a:t>3/22/2017</a:t>
+              <a:t>3/28/2017</a:t>
             </a:fld>
             <a:endParaRPr lang="en-US"/>
           </a:p>
@@ -1007,7 +1007,7 @@
           <a:p>
             <a:fld id="{78C97017-6FC3-485B-9764-EAC9E56C1D49}" type="datetimeFigureOut">
               <a:rPr lang="en-US" smtClean="0"/>
-              <a:t>3/22/2017</a:t>
+              <a:t>3/28/2017</a:t>
             </a:fld>
             <a:endParaRPr lang="en-US"/>
           </a:p>
@@ -1177,7 +1177,7 @@
           <a:p>
             <a:fld id="{78C97017-6FC3-485B-9764-EAC9E56C1D49}" type="datetimeFigureOut">
               <a:rPr lang="en-US" smtClean="0"/>
-              <a:t>3/22/2017</a:t>
+              <a:t>3/28/2017</a:t>
             </a:fld>
             <a:endParaRPr lang="en-US"/>
           </a:p>
@@ -1423,7 +1423,7 @@
           <a:p>
             <a:fld id="{78C97017-6FC3-485B-9764-EAC9E56C1D49}" type="datetimeFigureOut">
               <a:rPr lang="en-US" smtClean="0"/>
-              <a:t>3/22/2017</a:t>
+              <a:t>3/28/2017</a:t>
             </a:fld>
             <a:endParaRPr lang="en-US"/>
           </a:p>
@@ -1711,7 +1711,7 @@
           <a:p>
             <a:fld id="{78C97017-6FC3-485B-9764-EAC9E56C1D49}" type="datetimeFigureOut">
               <a:rPr lang="en-US" smtClean="0"/>
-              <a:t>3/22/2017</a:t>
+              <a:t>3/28/2017</a:t>
             </a:fld>
             <a:endParaRPr lang="en-US"/>
           </a:p>
@@ -2133,7 +2133,7 @@
           <a:p>
             <a:fld id="{78C97017-6FC3-485B-9764-EAC9E56C1D49}" type="datetimeFigureOut">
               <a:rPr lang="en-US" smtClean="0"/>
-              <a:t>3/22/2017</a:t>
+              <a:t>3/28/2017</a:t>
             </a:fld>
             <a:endParaRPr lang="en-US"/>
           </a:p>
@@ -2251,7 +2251,7 @@
           <a:p>
             <a:fld id="{78C97017-6FC3-485B-9764-EAC9E56C1D49}" type="datetimeFigureOut">
               <a:rPr lang="en-US" smtClean="0"/>
-              <a:t>3/22/2017</a:t>
+              <a:t>3/28/2017</a:t>
             </a:fld>
             <a:endParaRPr lang="en-US"/>
           </a:p>
@@ -2346,7 +2346,7 @@
           <a:p>
             <a:fld id="{78C97017-6FC3-485B-9764-EAC9E56C1D49}" type="datetimeFigureOut">
               <a:rPr lang="en-US" smtClean="0"/>
-              <a:t>3/22/2017</a:t>
+              <a:t>3/28/2017</a:t>
             </a:fld>
             <a:endParaRPr lang="en-US"/>
           </a:p>
@@ -2623,7 +2623,7 @@
           <a:p>
             <a:fld id="{78C97017-6FC3-485B-9764-EAC9E56C1D49}" type="datetimeFigureOut">
               <a:rPr lang="en-US" smtClean="0"/>
-              <a:t>3/22/2017</a:t>
+              <a:t>3/28/2017</a:t>
             </a:fld>
             <a:endParaRPr lang="en-US"/>
           </a:p>
@@ -2876,7 +2876,7 @@
           <a:p>
             <a:fld id="{78C97017-6FC3-485B-9764-EAC9E56C1D49}" type="datetimeFigureOut">
               <a:rPr lang="en-US" smtClean="0"/>
-              <a:t>3/22/2017</a:t>
+              <a:t>3/28/2017</a:t>
             </a:fld>
             <a:endParaRPr lang="en-US"/>
           </a:p>
@@ -3089,7 +3089,7 @@
           <a:p>
             <a:fld id="{78C97017-6FC3-485B-9764-EAC9E56C1D49}" type="datetimeFigureOut">
               <a:rPr lang="en-US" smtClean="0"/>
-              <a:t>3/22/2017</a:t>
+              <a:t>3/28/2017</a:t>
             </a:fld>
             <a:endParaRPr lang="en-US"/>
           </a:p>
@@ -5823,12 +5823,12 @@
           <a:p>
             <a:pPr algn="ctr"/>
             <a:r>
-              <a:rPr lang="en-US" sz="1100" dirty="0" smtClean="0">
+              <a:rPr lang="en-SG" sz="1100" dirty="0" smtClean="0">
                 <a:solidFill>
                   <a:srgbClr val="7030A0"/>
                 </a:solidFill>
               </a:rPr>
-              <a:t>1</a:t>
+              <a:t>2</a:t>
             </a:r>
             <a:endParaRPr lang="en-SG" sz="1100" dirty="0">
               <a:solidFill>

</xml_diff>

<commit_message>
update aboutUs and modelClassDiagram
</commit_message>
<xml_diff>
--- a/docs/diagrams/ModelComponentClassDiagram.pptx
+++ b/docs/diagrams/ModelComponentClassDiagram.pptx
@@ -208,7 +208,7 @@
           <a:p>
             <a:fld id="{F5CC4B3F-88C1-4FFA-B1B6-F41C21DC6924}" type="datetimeFigureOut">
               <a:rPr lang="en-US" smtClean="0"/>
-              <a:t>3/9/17</a:t>
+              <a:t>4/6/17</a:t>
             </a:fld>
             <a:endParaRPr lang="en-US"/>
           </a:p>
@@ -657,7 +657,7 @@
           <a:p>
             <a:fld id="{78C97017-6FC3-485B-9764-EAC9E56C1D49}" type="datetimeFigureOut">
               <a:rPr lang="en-US" smtClean="0"/>
-              <a:t>3/9/17</a:t>
+              <a:t>4/6/17</a:t>
             </a:fld>
             <a:endParaRPr lang="en-US"/>
           </a:p>
@@ -827,7 +827,7 @@
           <a:p>
             <a:fld id="{78C97017-6FC3-485B-9764-EAC9E56C1D49}" type="datetimeFigureOut">
               <a:rPr lang="en-US" smtClean="0"/>
-              <a:t>3/9/17</a:t>
+              <a:t>4/6/17</a:t>
             </a:fld>
             <a:endParaRPr lang="en-US"/>
           </a:p>
@@ -1007,7 +1007,7 @@
           <a:p>
             <a:fld id="{78C97017-6FC3-485B-9764-EAC9E56C1D49}" type="datetimeFigureOut">
               <a:rPr lang="en-US" smtClean="0"/>
-              <a:t>3/9/17</a:t>
+              <a:t>4/6/17</a:t>
             </a:fld>
             <a:endParaRPr lang="en-US"/>
           </a:p>
@@ -1177,7 +1177,7 @@
           <a:p>
             <a:fld id="{78C97017-6FC3-485B-9764-EAC9E56C1D49}" type="datetimeFigureOut">
               <a:rPr lang="en-US" smtClean="0"/>
-              <a:t>3/9/17</a:t>
+              <a:t>4/6/17</a:t>
             </a:fld>
             <a:endParaRPr lang="en-US"/>
           </a:p>
@@ -1423,7 +1423,7 @@
           <a:p>
             <a:fld id="{78C97017-6FC3-485B-9764-EAC9E56C1D49}" type="datetimeFigureOut">
               <a:rPr lang="en-US" smtClean="0"/>
-              <a:t>3/9/17</a:t>
+              <a:t>4/6/17</a:t>
             </a:fld>
             <a:endParaRPr lang="en-US"/>
           </a:p>
@@ -1711,7 +1711,7 @@
           <a:p>
             <a:fld id="{78C97017-6FC3-485B-9764-EAC9E56C1D49}" type="datetimeFigureOut">
               <a:rPr lang="en-US" smtClean="0"/>
-              <a:t>3/9/17</a:t>
+              <a:t>4/6/17</a:t>
             </a:fld>
             <a:endParaRPr lang="en-US"/>
           </a:p>
@@ -2133,7 +2133,7 @@
           <a:p>
             <a:fld id="{78C97017-6FC3-485B-9764-EAC9E56C1D49}" type="datetimeFigureOut">
               <a:rPr lang="en-US" smtClean="0"/>
-              <a:t>3/9/17</a:t>
+              <a:t>4/6/17</a:t>
             </a:fld>
             <a:endParaRPr lang="en-US"/>
           </a:p>
@@ -2251,7 +2251,7 @@
           <a:p>
             <a:fld id="{78C97017-6FC3-485B-9764-EAC9E56C1D49}" type="datetimeFigureOut">
               <a:rPr lang="en-US" smtClean="0"/>
-              <a:t>3/9/17</a:t>
+              <a:t>4/6/17</a:t>
             </a:fld>
             <a:endParaRPr lang="en-US"/>
           </a:p>
@@ -2346,7 +2346,7 @@
           <a:p>
             <a:fld id="{78C97017-6FC3-485B-9764-EAC9E56C1D49}" type="datetimeFigureOut">
               <a:rPr lang="en-US" smtClean="0"/>
-              <a:t>3/9/17</a:t>
+              <a:t>4/6/17</a:t>
             </a:fld>
             <a:endParaRPr lang="en-US"/>
           </a:p>
@@ -2623,7 +2623,7 @@
           <a:p>
             <a:fld id="{78C97017-6FC3-485B-9764-EAC9E56C1D49}" type="datetimeFigureOut">
               <a:rPr lang="en-US" smtClean="0"/>
-              <a:t>3/9/17</a:t>
+              <a:t>4/6/17</a:t>
             </a:fld>
             <a:endParaRPr lang="en-US"/>
           </a:p>
@@ -2876,7 +2876,7 @@
           <a:p>
             <a:fld id="{78C97017-6FC3-485B-9764-EAC9E56C1D49}" type="datetimeFigureOut">
               <a:rPr lang="en-US" smtClean="0"/>
-              <a:t>3/9/17</a:t>
+              <a:t>4/6/17</a:t>
             </a:fld>
             <a:endParaRPr lang="en-US"/>
           </a:p>
@@ -3089,7 +3089,7 @@
           <a:p>
             <a:fld id="{78C97017-6FC3-485B-9764-EAC9E56C1D49}" type="datetimeFigureOut">
               <a:rPr lang="en-US" smtClean="0"/>
-              <a:t>3/9/17</a:t>
+              <a:t>4/6/17</a:t>
             </a:fld>
             <a:endParaRPr lang="en-US"/>
           </a:p>
@@ -4611,62 +4611,6 @@
       </p:cxnSp>
       <p:sp>
         <p:nvSpPr>
-          <p:cNvPr id="67" name="Rectangle 8"/>
-          <p:cNvSpPr/>
-          <p:nvPr/>
-        </p:nvSpPr>
-        <p:spPr>
-          <a:xfrm>
-            <a:off x="5336105" y="1809332"/>
-            <a:ext cx="483700" cy="346760"/>
-          </a:xfrm>
-          <a:prstGeom prst="rect">
-            <a:avLst/>
-          </a:prstGeom>
-          <a:ln w="19050">
-            <a:solidFill>
-              <a:srgbClr val="7030A0"/>
-            </a:solidFill>
-          </a:ln>
-          <a:effectLst/>
-        </p:spPr>
-        <p:style>
-          <a:lnRef idx="1">
-            <a:schemeClr val="accent4"/>
-          </a:lnRef>
-          <a:fillRef idx="2">
-            <a:schemeClr val="accent4"/>
-          </a:fillRef>
-          <a:effectRef idx="1">
-            <a:schemeClr val="accent4"/>
-          </a:effectRef>
-          <a:fontRef idx="minor">
-            <a:schemeClr val="dk1"/>
-          </a:fontRef>
-        </p:style>
-        <p:txBody>
-          <a:bodyPr rtlCol="0" anchor="ctr"/>
-          <a:lstStyle/>
-          <a:p>
-            <a:pPr algn="ctr"/>
-            <a:r>
-              <a:rPr lang="en-US" sz="1050" dirty="0" smtClean="0">
-                <a:solidFill>
-                  <a:srgbClr val="7030A0"/>
-                </a:solidFill>
-              </a:rPr>
-              <a:t>Tag</a:t>
-            </a:r>
-            <a:endParaRPr lang="en-SG" sz="1050" dirty="0">
-              <a:solidFill>
-                <a:srgbClr val="7030A0"/>
-              </a:solidFill>
-            </a:endParaRPr>
-          </a:p>
-        </p:txBody>
-      </p:sp>
-      <p:sp>
-        <p:nvSpPr>
           <p:cNvPr id="68" name="Flowchart: Decision 96"/>
           <p:cNvSpPr/>
           <p:nvPr/>
@@ -4722,7 +4666,7 @@
         <p:spPr>
           <a:xfrm rot="5400000" flipH="1" flipV="1">
             <a:off x="5161650" y="1860752"/>
-            <a:ext cx="52494" cy="296415"/>
+            <a:ext cx="52494" cy="296414"/>
           </a:xfrm>
           <a:prstGeom prst="bentConnector2">
             <a:avLst/>
@@ -5055,12 +4999,12 @@
           <a:p>
             <a:pPr algn="ctr"/>
             <a:r>
-              <a:rPr lang="en-US" altLang="zh-CN" sz="1050" dirty="0" err="1" smtClean="0">
+              <a:rPr lang="en-US" altLang="zh-CN" sz="1050" dirty="0" smtClean="0">
                 <a:solidFill>
                   <a:srgbClr val="7030A0"/>
                 </a:solidFill>
               </a:rPr>
-              <a:t>EndTime</a:t>
+              <a:t>Priority</a:t>
             </a:r>
             <a:endParaRPr lang="en-SG" sz="1050" dirty="0">
               <a:solidFill>
@@ -5152,12 +5096,12 @@
           <a:p>
             <a:pPr algn="ctr"/>
             <a:r>
-              <a:rPr lang="en-US" altLang="zh-CN" sz="1050" smtClean="0">
+              <a:rPr lang="en-US" altLang="zh-CN" sz="1050" dirty="0" smtClean="0">
                 <a:solidFill>
                   <a:srgbClr val="7030A0"/>
                 </a:solidFill>
               </a:rPr>
-              <a:t>StartTime</a:t>
+              <a:t>Date</a:t>
             </a:r>
             <a:endParaRPr lang="en-SG" sz="1050" dirty="0">
               <a:solidFill>
@@ -5843,6 +5787,156 @@
               <a:t>1</a:t>
             </a:r>
             <a:endParaRPr lang="en-SG" sz="1100" dirty="0">
+              <a:solidFill>
+                <a:srgbClr val="7030A0"/>
+              </a:solidFill>
+            </a:endParaRPr>
+          </a:p>
+        </p:txBody>
+      </p:sp>
+      <p:sp>
+        <p:nvSpPr>
+          <p:cNvPr id="74" name="Rectangle 8"/>
+          <p:cNvSpPr/>
+          <p:nvPr/>
+        </p:nvSpPr>
+        <p:spPr>
+          <a:xfrm>
+            <a:off x="6088893" y="1810226"/>
+            <a:ext cx="667105" cy="346760"/>
+          </a:xfrm>
+          <a:prstGeom prst="rect">
+            <a:avLst/>
+          </a:prstGeom>
+          <a:ln w="19050">
+            <a:solidFill>
+              <a:srgbClr val="7030A0"/>
+            </a:solidFill>
+          </a:ln>
+          <a:effectLst/>
+        </p:spPr>
+        <p:style>
+          <a:lnRef idx="1">
+            <a:schemeClr val="accent4"/>
+          </a:lnRef>
+          <a:fillRef idx="2">
+            <a:schemeClr val="accent4"/>
+          </a:fillRef>
+          <a:effectRef idx="1">
+            <a:schemeClr val="accent4"/>
+          </a:effectRef>
+          <a:fontRef idx="minor">
+            <a:schemeClr val="dk1"/>
+          </a:fontRef>
+        </p:style>
+        <p:txBody>
+          <a:bodyPr rtlCol="0" anchor="ctr"/>
+          <a:lstStyle/>
+          <a:p>
+            <a:pPr algn="ctr"/>
+            <a:r>
+              <a:rPr lang="en-US" sz="1050" dirty="0" err="1" smtClean="0">
+                <a:solidFill>
+                  <a:srgbClr val="7030A0"/>
+                </a:solidFill>
+              </a:rPr>
+              <a:t>TagColor</a:t>
+            </a:r>
+            <a:endParaRPr lang="en-SG" sz="1050" dirty="0">
+              <a:solidFill>
+                <a:srgbClr val="7030A0"/>
+              </a:solidFill>
+            </a:endParaRPr>
+          </a:p>
+        </p:txBody>
+      </p:sp>
+      <p:cxnSp>
+        <p:nvCxnSpPr>
+          <p:cNvPr id="80" name="Elbow Connector 79"/>
+          <p:cNvCxnSpPr/>
+          <p:nvPr/>
+        </p:nvCxnSpPr>
+        <p:spPr>
+          <a:xfrm flipV="1">
+            <a:off x="5662074" y="1995339"/>
+            <a:ext cx="434402" cy="4783"/>
+          </a:xfrm>
+          <a:prstGeom prst="bentConnector3">
+            <a:avLst/>
+          </a:prstGeom>
+          <a:ln w="19050">
+            <a:solidFill>
+              <a:srgbClr val="7030A0"/>
+            </a:solidFill>
+            <a:headEnd type="none" w="med" len="med"/>
+            <a:tailEnd type="arrow" w="med" len="med"/>
+          </a:ln>
+          <a:effectLst/>
+        </p:spPr>
+        <p:style>
+          <a:lnRef idx="1">
+            <a:schemeClr val="accent2"/>
+          </a:lnRef>
+          <a:fillRef idx="2">
+            <a:schemeClr val="accent2"/>
+          </a:fillRef>
+          <a:effectRef idx="1">
+            <a:schemeClr val="accent2"/>
+          </a:effectRef>
+          <a:fontRef idx="minor">
+            <a:schemeClr val="dk1"/>
+          </a:fontRef>
+        </p:style>
+      </p:cxnSp>
+      <p:sp>
+        <p:nvSpPr>
+          <p:cNvPr id="67" name="Rectangle 8"/>
+          <p:cNvSpPr/>
+          <p:nvPr/>
+        </p:nvSpPr>
+        <p:spPr>
+          <a:xfrm>
+            <a:off x="5336104" y="1809332"/>
+            <a:ext cx="514055" cy="346760"/>
+          </a:xfrm>
+          <a:prstGeom prst="rect">
+            <a:avLst/>
+          </a:prstGeom>
+          <a:ln w="19050">
+            <a:solidFill>
+              <a:srgbClr val="7030A0"/>
+            </a:solidFill>
+          </a:ln>
+          <a:effectLst/>
+        </p:spPr>
+        <p:style>
+          <a:lnRef idx="1">
+            <a:schemeClr val="accent4"/>
+          </a:lnRef>
+          <a:fillRef idx="2">
+            <a:schemeClr val="accent4"/>
+          </a:fillRef>
+          <a:effectRef idx="1">
+            <a:schemeClr val="accent4"/>
+          </a:effectRef>
+          <a:fontRef idx="minor">
+            <a:schemeClr val="dk1"/>
+          </a:fontRef>
+        </p:style>
+        <p:txBody>
+          <a:bodyPr rtlCol="0" anchor="ctr"/>
+          <a:lstStyle/>
+          <a:p>
+            <a:pPr algn="ctr"/>
+            <a:r>
+              <a:rPr lang="en-US" sz="1050" dirty="0" smtClean="0">
+                <a:solidFill>
+                  <a:srgbClr val="7030A0"/>
+                </a:solidFill>
+              </a:rPr>
+              <a:t>Tag</a:t>
+            </a:r>
+            <a:endParaRPr lang="en-SG" sz="1050" dirty="0">
               <a:solidFill>
                 <a:srgbClr val="7030A0"/>
               </a:solidFill>

</xml_diff>

<commit_message>
update the image for model component (#169)
</commit_message>
<xml_diff>
--- a/docs/diagrams/ModelComponentClassDiagram.pptx
+++ b/docs/diagrams/ModelComponentClassDiagram.pptx
@@ -107,6 +107,22 @@
       </a:defRPr>
     </a:lvl9pPr>
   </p:defaultTextStyle>
+  <p:extLst>
+    <p:ext uri="{EFAFB233-063F-42B5-8137-9DF3F51BA10A}">
+      <p15:sldGuideLst xmlns:p15="http://schemas.microsoft.com/office/powerpoint/2012/main">
+        <p15:guide id="1" orient="horz" pos="1488">
+          <p15:clr>
+            <a:srgbClr val="A4A3A4"/>
+          </p15:clr>
+        </p15:guide>
+        <p15:guide id="2" pos="2880">
+          <p15:clr>
+            <a:srgbClr val="A4A3A4"/>
+          </p15:clr>
+        </p15:guide>
+      </p15:sldGuideLst>
+    </p:ext>
+  </p:extLst>
 </p:presentation>
 </file>
 
@@ -192,7 +208,7 @@
           <a:p>
             <a:fld id="{F5CC4B3F-88C1-4FFA-B1B6-F41C21DC6924}" type="datetimeFigureOut">
               <a:rPr lang="en-US" smtClean="0"/>
-              <a:t>11/19/2016</a:t>
+              <a:t>4/8/2017</a:t>
             </a:fld>
             <a:endParaRPr lang="en-US"/>
           </a:p>
@@ -256,38 +272,37 @@
           <a:p>
             <a:pPr lvl="0"/>
             <a:r>
-              <a:rPr lang="en-US" smtClean="0"/>
+              <a:rPr lang="en-US"/>
               <a:t>Click to edit Master text styles</a:t>
             </a:r>
           </a:p>
           <a:p>
             <a:pPr lvl="1"/>
             <a:r>
-              <a:rPr lang="en-US" smtClean="0"/>
+              <a:rPr lang="en-US"/>
               <a:t>Second level</a:t>
             </a:r>
           </a:p>
           <a:p>
             <a:pPr lvl="2"/>
             <a:r>
-              <a:rPr lang="en-US" smtClean="0"/>
+              <a:rPr lang="en-US"/>
               <a:t>Third level</a:t>
             </a:r>
           </a:p>
           <a:p>
             <a:pPr lvl="3"/>
             <a:r>
-              <a:rPr lang="en-US" smtClean="0"/>
+              <a:rPr lang="en-US"/>
               <a:t>Fourth level</a:t>
             </a:r>
           </a:p>
           <a:p>
             <a:pPr lvl="4"/>
             <a:r>
-              <a:rPr lang="en-US" smtClean="0"/>
+              <a:rPr lang="en-US"/>
               <a:t>Fifth level</a:t>
             </a:r>
-            <a:endParaRPr lang="en-US"/>
           </a:p>
         </p:txBody>
       </p:sp>
@@ -498,10 +513,9 @@
           <a:lstStyle/>
           <a:p>
             <a:r>
-              <a:rPr lang="en-US" smtClean="0"/>
+              <a:rPr lang="en-US"/>
               <a:t>Click to edit Master title style</a:t>
             </a:r>
-            <a:endParaRPr lang="en-US"/>
           </a:p>
         </p:txBody>
       </p:sp>
@@ -617,10 +631,9 @@
           </a:lstStyle>
           <a:p>
             <a:r>
-              <a:rPr lang="en-US" smtClean="0"/>
+              <a:rPr lang="en-US"/>
               <a:t>Click to edit Master subtitle style</a:t>
             </a:r>
-            <a:endParaRPr lang="en-US"/>
           </a:p>
         </p:txBody>
       </p:sp>
@@ -641,7 +654,7 @@
           <a:p>
             <a:fld id="{78C97017-6FC3-485B-9764-EAC9E56C1D49}" type="datetimeFigureOut">
               <a:rPr lang="en-US" smtClean="0"/>
-              <a:t>11/19/2016</a:t>
+              <a:t>4/8/2017</a:t>
             </a:fld>
             <a:endParaRPr lang="en-US"/>
           </a:p>
@@ -735,10 +748,9 @@
           <a:lstStyle/>
           <a:p>
             <a:r>
-              <a:rPr lang="en-US" smtClean="0"/>
+              <a:rPr lang="en-US"/>
               <a:t>Click to edit Master title style</a:t>
             </a:r>
-            <a:endParaRPr lang="en-US"/>
           </a:p>
         </p:txBody>
       </p:sp>
@@ -759,38 +771,37 @@
           <a:p>
             <a:pPr lvl="0"/>
             <a:r>
-              <a:rPr lang="en-US" smtClean="0"/>
+              <a:rPr lang="en-US"/>
               <a:t>Click to edit Master text styles</a:t>
             </a:r>
           </a:p>
           <a:p>
             <a:pPr lvl="1"/>
             <a:r>
-              <a:rPr lang="en-US" smtClean="0"/>
+              <a:rPr lang="en-US"/>
               <a:t>Second level</a:t>
             </a:r>
           </a:p>
           <a:p>
             <a:pPr lvl="2"/>
             <a:r>
-              <a:rPr lang="en-US" smtClean="0"/>
+              <a:rPr lang="en-US"/>
               <a:t>Third level</a:t>
             </a:r>
           </a:p>
           <a:p>
             <a:pPr lvl="3"/>
             <a:r>
-              <a:rPr lang="en-US" smtClean="0"/>
+              <a:rPr lang="en-US"/>
               <a:t>Fourth level</a:t>
             </a:r>
           </a:p>
           <a:p>
             <a:pPr lvl="4"/>
             <a:r>
-              <a:rPr lang="en-US" smtClean="0"/>
+              <a:rPr lang="en-US"/>
               <a:t>Fifth level</a:t>
             </a:r>
-            <a:endParaRPr lang="en-US"/>
           </a:p>
         </p:txBody>
       </p:sp>
@@ -811,7 +822,7 @@
           <a:p>
             <a:fld id="{78C97017-6FC3-485B-9764-EAC9E56C1D49}" type="datetimeFigureOut">
               <a:rPr lang="en-US" smtClean="0"/>
-              <a:t>11/19/2016</a:t>
+              <a:t>4/8/2017</a:t>
             </a:fld>
             <a:endParaRPr lang="en-US"/>
           </a:p>
@@ -910,10 +921,9 @@
           <a:lstStyle/>
           <a:p>
             <a:r>
-              <a:rPr lang="en-US" smtClean="0"/>
+              <a:rPr lang="en-US"/>
               <a:t>Click to edit Master title style</a:t>
             </a:r>
-            <a:endParaRPr lang="en-US"/>
           </a:p>
         </p:txBody>
       </p:sp>
@@ -939,38 +949,37 @@
           <a:p>
             <a:pPr lvl="0"/>
             <a:r>
-              <a:rPr lang="en-US" smtClean="0"/>
+              <a:rPr lang="en-US"/>
               <a:t>Click to edit Master text styles</a:t>
             </a:r>
           </a:p>
           <a:p>
             <a:pPr lvl="1"/>
             <a:r>
-              <a:rPr lang="en-US" smtClean="0"/>
+              <a:rPr lang="en-US"/>
               <a:t>Second level</a:t>
             </a:r>
           </a:p>
           <a:p>
             <a:pPr lvl="2"/>
             <a:r>
-              <a:rPr lang="en-US" smtClean="0"/>
+              <a:rPr lang="en-US"/>
               <a:t>Third level</a:t>
             </a:r>
           </a:p>
           <a:p>
             <a:pPr lvl="3"/>
             <a:r>
-              <a:rPr lang="en-US" smtClean="0"/>
+              <a:rPr lang="en-US"/>
               <a:t>Fourth level</a:t>
             </a:r>
           </a:p>
           <a:p>
             <a:pPr lvl="4"/>
             <a:r>
-              <a:rPr lang="en-US" smtClean="0"/>
+              <a:rPr lang="en-US"/>
               <a:t>Fifth level</a:t>
             </a:r>
-            <a:endParaRPr lang="en-US"/>
           </a:p>
         </p:txBody>
       </p:sp>
@@ -991,7 +1000,7 @@
           <a:p>
             <a:fld id="{78C97017-6FC3-485B-9764-EAC9E56C1D49}" type="datetimeFigureOut">
               <a:rPr lang="en-US" smtClean="0"/>
-              <a:t>11/19/2016</a:t>
+              <a:t>4/8/2017</a:t>
             </a:fld>
             <a:endParaRPr lang="en-US"/>
           </a:p>
@@ -1085,10 +1094,9 @@
           <a:lstStyle/>
           <a:p>
             <a:r>
-              <a:rPr lang="en-US" smtClean="0"/>
+              <a:rPr lang="en-US"/>
               <a:t>Click to edit Master title style</a:t>
             </a:r>
-            <a:endParaRPr lang="en-US"/>
           </a:p>
         </p:txBody>
       </p:sp>
@@ -1109,38 +1117,37 @@
           <a:p>
             <a:pPr lvl="0"/>
             <a:r>
-              <a:rPr lang="en-US" smtClean="0"/>
+              <a:rPr lang="en-US"/>
               <a:t>Click to edit Master text styles</a:t>
             </a:r>
           </a:p>
           <a:p>
             <a:pPr lvl="1"/>
             <a:r>
-              <a:rPr lang="en-US" smtClean="0"/>
+              <a:rPr lang="en-US"/>
               <a:t>Second level</a:t>
             </a:r>
           </a:p>
           <a:p>
             <a:pPr lvl="2"/>
             <a:r>
-              <a:rPr lang="en-US" smtClean="0"/>
+              <a:rPr lang="en-US"/>
               <a:t>Third level</a:t>
             </a:r>
           </a:p>
           <a:p>
             <a:pPr lvl="3"/>
             <a:r>
-              <a:rPr lang="en-US" smtClean="0"/>
+              <a:rPr lang="en-US"/>
               <a:t>Fourth level</a:t>
             </a:r>
           </a:p>
           <a:p>
             <a:pPr lvl="4"/>
             <a:r>
-              <a:rPr lang="en-US" smtClean="0"/>
+              <a:rPr lang="en-US"/>
               <a:t>Fifth level</a:t>
             </a:r>
-            <a:endParaRPr lang="en-US"/>
           </a:p>
         </p:txBody>
       </p:sp>
@@ -1161,7 +1168,7 @@
           <a:p>
             <a:fld id="{78C97017-6FC3-485B-9764-EAC9E56C1D49}" type="datetimeFigureOut">
               <a:rPr lang="en-US" smtClean="0"/>
-              <a:t>11/19/2016</a:t>
+              <a:t>4/8/2017</a:t>
             </a:fld>
             <a:endParaRPr lang="en-US"/>
           </a:p>
@@ -1264,10 +1271,9 @@
           </a:lstStyle>
           <a:p>
             <a:r>
-              <a:rPr lang="en-US" smtClean="0"/>
+              <a:rPr lang="en-US"/>
               <a:t>Click to edit Master title style</a:t>
             </a:r>
-            <a:endParaRPr lang="en-US"/>
           </a:p>
         </p:txBody>
       </p:sp>
@@ -1384,7 +1390,7 @@
           <a:p>
             <a:pPr lvl="0"/>
             <a:r>
-              <a:rPr lang="en-US" smtClean="0"/>
+              <a:rPr lang="en-US"/>
               <a:t>Click to edit Master text styles</a:t>
             </a:r>
           </a:p>
@@ -1407,7 +1413,7 @@
           <a:p>
             <a:fld id="{78C97017-6FC3-485B-9764-EAC9E56C1D49}" type="datetimeFigureOut">
               <a:rPr lang="en-US" smtClean="0"/>
-              <a:t>11/19/2016</a:t>
+              <a:t>4/8/2017</a:t>
             </a:fld>
             <a:endParaRPr lang="en-US"/>
           </a:p>
@@ -1501,10 +1507,9 @@
           <a:lstStyle/>
           <a:p>
             <a:r>
-              <a:rPr lang="en-US" smtClean="0"/>
+              <a:rPr lang="en-US"/>
               <a:t>Click to edit Master title style</a:t>
             </a:r>
-            <a:endParaRPr lang="en-US"/>
           </a:p>
         </p:txBody>
       </p:sp>
@@ -1558,38 +1563,37 @@
           <a:p>
             <a:pPr lvl="0"/>
             <a:r>
-              <a:rPr lang="en-US" smtClean="0"/>
+              <a:rPr lang="en-US"/>
               <a:t>Click to edit Master text styles</a:t>
             </a:r>
           </a:p>
           <a:p>
             <a:pPr lvl="1"/>
             <a:r>
-              <a:rPr lang="en-US" smtClean="0"/>
+              <a:rPr lang="en-US"/>
               <a:t>Second level</a:t>
             </a:r>
           </a:p>
           <a:p>
             <a:pPr lvl="2"/>
             <a:r>
-              <a:rPr lang="en-US" smtClean="0"/>
+              <a:rPr lang="en-US"/>
               <a:t>Third level</a:t>
             </a:r>
           </a:p>
           <a:p>
             <a:pPr lvl="3"/>
             <a:r>
-              <a:rPr lang="en-US" smtClean="0"/>
+              <a:rPr lang="en-US"/>
               <a:t>Fourth level</a:t>
             </a:r>
           </a:p>
           <a:p>
             <a:pPr lvl="4"/>
             <a:r>
-              <a:rPr lang="en-US" smtClean="0"/>
+              <a:rPr lang="en-US"/>
               <a:t>Fifth level</a:t>
             </a:r>
-            <a:endParaRPr lang="en-US"/>
           </a:p>
         </p:txBody>
       </p:sp>
@@ -1643,38 +1647,37 @@
           <a:p>
             <a:pPr lvl="0"/>
             <a:r>
-              <a:rPr lang="en-US" smtClean="0"/>
+              <a:rPr lang="en-US"/>
               <a:t>Click to edit Master text styles</a:t>
             </a:r>
           </a:p>
           <a:p>
             <a:pPr lvl="1"/>
             <a:r>
-              <a:rPr lang="en-US" smtClean="0"/>
+              <a:rPr lang="en-US"/>
               <a:t>Second level</a:t>
             </a:r>
           </a:p>
           <a:p>
             <a:pPr lvl="2"/>
             <a:r>
-              <a:rPr lang="en-US" smtClean="0"/>
+              <a:rPr lang="en-US"/>
               <a:t>Third level</a:t>
             </a:r>
           </a:p>
           <a:p>
             <a:pPr lvl="3"/>
             <a:r>
-              <a:rPr lang="en-US" smtClean="0"/>
+              <a:rPr lang="en-US"/>
               <a:t>Fourth level</a:t>
             </a:r>
           </a:p>
           <a:p>
             <a:pPr lvl="4"/>
             <a:r>
-              <a:rPr lang="en-US" smtClean="0"/>
+              <a:rPr lang="en-US"/>
               <a:t>Fifth level</a:t>
             </a:r>
-            <a:endParaRPr lang="en-US"/>
           </a:p>
         </p:txBody>
       </p:sp>
@@ -1695,7 +1698,7 @@
           <a:p>
             <a:fld id="{78C97017-6FC3-485B-9764-EAC9E56C1D49}" type="datetimeFigureOut">
               <a:rPr lang="en-US" smtClean="0"/>
-              <a:t>11/19/2016</a:t>
+              <a:t>4/8/2017</a:t>
             </a:fld>
             <a:endParaRPr lang="en-US"/>
           </a:p>
@@ -1793,10 +1796,9 @@
           </a:lstStyle>
           <a:p>
             <a:r>
-              <a:rPr lang="en-US" smtClean="0"/>
+              <a:rPr lang="en-US"/>
               <a:t>Click to edit Master title style</a:t>
             </a:r>
-            <a:endParaRPr lang="en-US"/>
           </a:p>
         </p:txBody>
       </p:sp>
@@ -1859,7 +1861,7 @@
           <a:p>
             <a:pPr lvl="0"/>
             <a:r>
-              <a:rPr lang="en-US" smtClean="0"/>
+              <a:rPr lang="en-US"/>
               <a:t>Click to edit Master text styles</a:t>
             </a:r>
           </a:p>
@@ -1915,38 +1917,37 @@
           <a:p>
             <a:pPr lvl="0"/>
             <a:r>
-              <a:rPr lang="en-US" smtClean="0"/>
+              <a:rPr lang="en-US"/>
               <a:t>Click to edit Master text styles</a:t>
             </a:r>
           </a:p>
           <a:p>
             <a:pPr lvl="1"/>
             <a:r>
-              <a:rPr lang="en-US" smtClean="0"/>
+              <a:rPr lang="en-US"/>
               <a:t>Second level</a:t>
             </a:r>
           </a:p>
           <a:p>
             <a:pPr lvl="2"/>
             <a:r>
-              <a:rPr lang="en-US" smtClean="0"/>
+              <a:rPr lang="en-US"/>
               <a:t>Third level</a:t>
             </a:r>
           </a:p>
           <a:p>
             <a:pPr lvl="3"/>
             <a:r>
-              <a:rPr lang="en-US" smtClean="0"/>
+              <a:rPr lang="en-US"/>
               <a:t>Fourth level</a:t>
             </a:r>
           </a:p>
           <a:p>
             <a:pPr lvl="4"/>
             <a:r>
-              <a:rPr lang="en-US" smtClean="0"/>
+              <a:rPr lang="en-US"/>
               <a:t>Fifth level</a:t>
             </a:r>
-            <a:endParaRPr lang="en-US"/>
           </a:p>
         </p:txBody>
       </p:sp>
@@ -2009,7 +2010,7 @@
           <a:p>
             <a:pPr lvl="0"/>
             <a:r>
-              <a:rPr lang="en-US" smtClean="0"/>
+              <a:rPr lang="en-US"/>
               <a:t>Click to edit Master text styles</a:t>
             </a:r>
           </a:p>
@@ -2065,38 +2066,37 @@
           <a:p>
             <a:pPr lvl="0"/>
             <a:r>
-              <a:rPr lang="en-US" smtClean="0"/>
+              <a:rPr lang="en-US"/>
               <a:t>Click to edit Master text styles</a:t>
             </a:r>
           </a:p>
           <a:p>
             <a:pPr lvl="1"/>
             <a:r>
-              <a:rPr lang="en-US" smtClean="0"/>
+              <a:rPr lang="en-US"/>
               <a:t>Second level</a:t>
             </a:r>
           </a:p>
           <a:p>
             <a:pPr lvl="2"/>
             <a:r>
-              <a:rPr lang="en-US" smtClean="0"/>
+              <a:rPr lang="en-US"/>
               <a:t>Third level</a:t>
             </a:r>
           </a:p>
           <a:p>
             <a:pPr lvl="3"/>
             <a:r>
-              <a:rPr lang="en-US" smtClean="0"/>
+              <a:rPr lang="en-US"/>
               <a:t>Fourth level</a:t>
             </a:r>
           </a:p>
           <a:p>
             <a:pPr lvl="4"/>
             <a:r>
-              <a:rPr lang="en-US" smtClean="0"/>
+              <a:rPr lang="en-US"/>
               <a:t>Fifth level</a:t>
             </a:r>
-            <a:endParaRPr lang="en-US"/>
           </a:p>
         </p:txBody>
       </p:sp>
@@ -2117,7 +2117,7 @@
           <a:p>
             <a:fld id="{78C97017-6FC3-485B-9764-EAC9E56C1D49}" type="datetimeFigureOut">
               <a:rPr lang="en-US" smtClean="0"/>
-              <a:t>11/19/2016</a:t>
+              <a:t>4/8/2017</a:t>
             </a:fld>
             <a:endParaRPr lang="en-US"/>
           </a:p>
@@ -2211,10 +2211,9 @@
           <a:lstStyle/>
           <a:p>
             <a:r>
-              <a:rPr lang="en-US" smtClean="0"/>
+              <a:rPr lang="en-US"/>
               <a:t>Click to edit Master title style</a:t>
             </a:r>
-            <a:endParaRPr lang="en-US"/>
           </a:p>
         </p:txBody>
       </p:sp>
@@ -2235,7 +2234,7 @@
           <a:p>
             <a:fld id="{78C97017-6FC3-485B-9764-EAC9E56C1D49}" type="datetimeFigureOut">
               <a:rPr lang="en-US" smtClean="0"/>
-              <a:t>11/19/2016</a:t>
+              <a:t>4/8/2017</a:t>
             </a:fld>
             <a:endParaRPr lang="en-US"/>
           </a:p>
@@ -2330,7 +2329,7 @@
           <a:p>
             <a:fld id="{78C97017-6FC3-485B-9764-EAC9E56C1D49}" type="datetimeFigureOut">
               <a:rPr lang="en-US" smtClean="0"/>
-              <a:t>11/19/2016</a:t>
+              <a:t>4/8/2017</a:t>
             </a:fld>
             <a:endParaRPr lang="en-US"/>
           </a:p>
@@ -2433,10 +2432,9 @@
           </a:lstStyle>
           <a:p>
             <a:r>
-              <a:rPr lang="en-US" smtClean="0"/>
+              <a:rPr lang="en-US"/>
               <a:t>Click to edit Master title style</a:t>
             </a:r>
-            <a:endParaRPr lang="en-US"/>
           </a:p>
         </p:txBody>
       </p:sp>
@@ -2490,38 +2488,37 @@
           <a:p>
             <a:pPr lvl="0"/>
             <a:r>
-              <a:rPr lang="en-US" smtClean="0"/>
+              <a:rPr lang="en-US"/>
               <a:t>Click to edit Master text styles</a:t>
             </a:r>
           </a:p>
           <a:p>
             <a:pPr lvl="1"/>
             <a:r>
-              <a:rPr lang="en-US" smtClean="0"/>
+              <a:rPr lang="en-US"/>
               <a:t>Second level</a:t>
             </a:r>
           </a:p>
           <a:p>
             <a:pPr lvl="2"/>
             <a:r>
-              <a:rPr lang="en-US" smtClean="0"/>
+              <a:rPr lang="en-US"/>
               <a:t>Third level</a:t>
             </a:r>
           </a:p>
           <a:p>
             <a:pPr lvl="3"/>
             <a:r>
-              <a:rPr lang="en-US" smtClean="0"/>
+              <a:rPr lang="en-US"/>
               <a:t>Fourth level</a:t>
             </a:r>
           </a:p>
           <a:p>
             <a:pPr lvl="4"/>
             <a:r>
-              <a:rPr lang="en-US" smtClean="0"/>
+              <a:rPr lang="en-US"/>
               <a:t>Fifth level</a:t>
             </a:r>
-            <a:endParaRPr lang="en-US"/>
           </a:p>
         </p:txBody>
       </p:sp>
@@ -2584,7 +2581,7 @@
           <a:p>
             <a:pPr lvl="0"/>
             <a:r>
-              <a:rPr lang="en-US" smtClean="0"/>
+              <a:rPr lang="en-US"/>
               <a:t>Click to edit Master text styles</a:t>
             </a:r>
           </a:p>
@@ -2607,7 +2604,7 @@
           <a:p>
             <a:fld id="{78C97017-6FC3-485B-9764-EAC9E56C1D49}" type="datetimeFigureOut">
               <a:rPr lang="en-US" smtClean="0"/>
-              <a:t>11/19/2016</a:t>
+              <a:t>4/8/2017</a:t>
             </a:fld>
             <a:endParaRPr lang="en-US"/>
           </a:p>
@@ -2710,10 +2707,9 @@
           </a:lstStyle>
           <a:p>
             <a:r>
-              <a:rPr lang="en-US" smtClean="0"/>
+              <a:rPr lang="en-US"/>
               <a:t>Click to edit Master title style</a:t>
             </a:r>
-            <a:endParaRPr lang="en-US"/>
           </a:p>
         </p:txBody>
       </p:sp>
@@ -2837,7 +2833,7 @@
           <a:p>
             <a:pPr lvl="0"/>
             <a:r>
-              <a:rPr lang="en-US" smtClean="0"/>
+              <a:rPr lang="en-US"/>
               <a:t>Click to edit Master text styles</a:t>
             </a:r>
           </a:p>
@@ -2860,7 +2856,7 @@
           <a:p>
             <a:fld id="{78C97017-6FC3-485B-9764-EAC9E56C1D49}" type="datetimeFigureOut">
               <a:rPr lang="en-US" smtClean="0"/>
-              <a:t>11/19/2016</a:t>
+              <a:t>4/8/2017</a:t>
             </a:fld>
             <a:endParaRPr lang="en-US"/>
           </a:p>
@@ -2969,10 +2965,9 @@
           <a:lstStyle/>
           <a:p>
             <a:r>
-              <a:rPr lang="en-US" smtClean="0"/>
+              <a:rPr lang="en-US"/>
               <a:t>Click to edit Master title style</a:t>
             </a:r>
-            <a:endParaRPr lang="en-US"/>
           </a:p>
         </p:txBody>
       </p:sp>
@@ -3003,38 +2998,37 @@
           <a:p>
             <a:pPr lvl="0"/>
             <a:r>
-              <a:rPr lang="en-US" smtClean="0"/>
+              <a:rPr lang="en-US"/>
               <a:t>Click to edit Master text styles</a:t>
             </a:r>
           </a:p>
           <a:p>
             <a:pPr lvl="1"/>
             <a:r>
-              <a:rPr lang="en-US" smtClean="0"/>
+              <a:rPr lang="en-US"/>
               <a:t>Second level</a:t>
             </a:r>
           </a:p>
           <a:p>
             <a:pPr lvl="2"/>
             <a:r>
-              <a:rPr lang="en-US" smtClean="0"/>
+              <a:rPr lang="en-US"/>
               <a:t>Third level</a:t>
             </a:r>
           </a:p>
           <a:p>
             <a:pPr lvl="3"/>
             <a:r>
-              <a:rPr lang="en-US" smtClean="0"/>
+              <a:rPr lang="en-US"/>
               <a:t>Fourth level</a:t>
             </a:r>
           </a:p>
           <a:p>
             <a:pPr lvl="4"/>
             <a:r>
-              <a:rPr lang="en-US" smtClean="0"/>
+              <a:rPr lang="en-US"/>
               <a:t>Fifth level</a:t>
             </a:r>
-            <a:endParaRPr lang="en-US"/>
           </a:p>
         </p:txBody>
       </p:sp>
@@ -3073,7 +3067,7 @@
           <a:p>
             <a:fld id="{78C97017-6FC3-485B-9764-EAC9E56C1D49}" type="datetimeFigureOut">
               <a:rPr lang="en-US" smtClean="0"/>
-              <a:t>11/19/2016</a:t>
+              <a:t>4/8/2017</a:t>
             </a:fld>
             <a:endParaRPr lang="en-US"/>
           </a:p>
@@ -3456,7 +3450,7 @@
         </p:nvSpPr>
         <p:spPr>
           <a:xfrm>
-            <a:off x="1119865" y="1727200"/>
+            <a:off x="1143000" y="1695531"/>
             <a:ext cx="7490735" cy="2997200"/>
           </a:xfrm>
           <a:prstGeom prst="roundRect">
@@ -3494,7 +3488,7 @@
           <a:lstStyle/>
           <a:p>
             <a:r>
-              <a:rPr lang="en-US" sz="1200" b="1" dirty="0" smtClean="0">
+              <a:rPr lang="en-US" sz="1200" b="1" dirty="0">
                 <a:solidFill>
                   <a:srgbClr val="7030A0"/>
                 </a:solidFill>
@@ -3553,7 +3547,7 @@
           <a:p>
             <a:pPr algn="ctr"/>
             <a:r>
-              <a:rPr lang="en-US" sz="1050" dirty="0" err="1" smtClean="0">
+              <a:rPr lang="en-US" sz="1050" dirty="0" err="1">
                 <a:solidFill>
                   <a:schemeClr val="bg1"/>
                 </a:solidFill>
@@ -3612,7 +3606,7 @@
           <a:p>
             <a:pPr algn="ctr"/>
             <a:r>
-              <a:rPr lang="en-US" sz="1050" dirty="0" err="1" smtClean="0">
+              <a:rPr lang="en-US" sz="1050" dirty="0" err="1">
                 <a:solidFill>
                   <a:schemeClr val="bg1"/>
                 </a:solidFill>
@@ -3767,7 +3761,7 @@
           <a:p>
             <a:pPr algn="ctr"/>
             <a:r>
-              <a:rPr lang="en-US" sz="1050" dirty="0" smtClean="0">
+              <a:rPr lang="en-US" sz="1050" dirty="0">
                 <a:solidFill>
                   <a:schemeClr val="bg1"/>
                 </a:solidFill>
@@ -4091,12 +4085,12 @@
           <a:p>
             <a:pPr algn="ctr"/>
             <a:r>
-              <a:rPr lang="en-US" sz="1050" dirty="0" err="1" smtClean="0">
+              <a:rPr lang="en-US" altLang="zh-CN" sz="1050" dirty="0" err="1">
                 <a:solidFill>
                   <a:srgbClr val="7030A0"/>
                 </a:solidFill>
               </a:rPr>
-              <a:t>AddressBook</a:t>
+              <a:t>TaskList</a:t>
             </a:r>
             <a:endParaRPr lang="en-SG" sz="1050" dirty="0">
               <a:solidFill>
@@ -4233,12 +4227,12 @@
           <a:p>
             <a:pPr algn="ctr"/>
             <a:r>
-              <a:rPr lang="en-US" sz="1050" dirty="0" err="1" smtClean="0">
+              <a:rPr lang="en-US" sz="1050" dirty="0" err="1">
                 <a:solidFill>
                   <a:srgbClr val="7030A0"/>
                 </a:solidFill>
               </a:rPr>
-              <a:t>UniquePersonList</a:t>
+              <a:t>UniqueTaskList</a:t>
             </a:r>
             <a:endParaRPr lang="en-SG" sz="1050" dirty="0">
               <a:solidFill>
@@ -4377,7 +4371,7 @@
           <a:p>
             <a:pPr algn="ctr"/>
             <a:r>
-              <a:rPr lang="en-US" sz="1050" dirty="0" err="1" smtClean="0">
+              <a:rPr lang="en-US" sz="1050" dirty="0" err="1">
                 <a:solidFill>
                   <a:srgbClr val="7030A0"/>
                 </a:solidFill>
@@ -4476,12 +4470,12 @@
           <a:p>
             <a:pPr algn="ctr"/>
             <a:r>
-              <a:rPr lang="en-US" sz="1050" dirty="0" smtClean="0">
+              <a:rPr lang="en-US" sz="1050" dirty="0">
                 <a:solidFill>
                   <a:srgbClr val="7030A0"/>
                 </a:solidFill>
               </a:rPr>
-              <a:t>Person</a:t>
+              <a:t>Task</a:t>
             </a:r>
             <a:endParaRPr lang="en-SG" sz="1050" dirty="0">
               <a:solidFill>
@@ -4618,7 +4612,7 @@
           <a:p>
             <a:pPr algn="ctr"/>
             <a:r>
-              <a:rPr lang="en-US" sz="1050" dirty="0" smtClean="0">
+              <a:rPr lang="en-US" sz="1050" dirty="0">
                 <a:solidFill>
                   <a:srgbClr val="7030A0"/>
                 </a:solidFill>
@@ -4760,7 +4754,7 @@
           <a:p>
             <a:pPr algn="ctr"/>
             <a:r>
-              <a:rPr lang="en-US" sz="1050" dirty="0" smtClean="0">
+              <a:rPr lang="en-US" sz="1050" dirty="0">
                 <a:solidFill>
                   <a:srgbClr val="7030A0"/>
                 </a:solidFill>
@@ -4768,14 +4762,14 @@
               <a:t>&lt;&lt;interface&gt;&gt;</a:t>
             </a:r>
             <a:br>
-              <a:rPr lang="en-US" sz="1050" dirty="0" smtClean="0">
+              <a:rPr lang="en-US" sz="1050" dirty="0">
                 <a:solidFill>
                   <a:srgbClr val="7030A0"/>
                 </a:solidFill>
               </a:rPr>
             </a:br>
             <a:r>
-              <a:rPr lang="en-US" sz="1050" dirty="0" err="1" smtClean="0">
+              <a:rPr lang="en-US" sz="1050" dirty="0" err="1">
                 <a:solidFill>
                   <a:srgbClr val="7030A0"/>
                 </a:solidFill>
@@ -4798,8 +4792,8 @@
         </p:nvSpPr>
         <p:spPr>
           <a:xfrm>
-            <a:off x="7712397" y="2564238"/>
-            <a:ext cx="708186" cy="285783"/>
+            <a:off x="7712396" y="2564238"/>
+            <a:ext cx="921337" cy="285783"/>
           </a:xfrm>
           <a:prstGeom prst="rect">
             <a:avLst/>
@@ -4831,7 +4825,7 @@
           <a:p>
             <a:pPr algn="ctr"/>
             <a:r>
-              <a:rPr lang="en-US" sz="1050" dirty="0" smtClean="0">
+              <a:rPr lang="en-US" sz="1050" dirty="0">
                 <a:solidFill>
                   <a:srgbClr val="7030A0"/>
                 </a:solidFill>
@@ -4897,6 +4891,7 @@
         <p:nvCxnSpPr>
           <p:cNvPr id="79" name="Elbow Connector 78"/>
           <p:cNvCxnSpPr>
+            <a:cxnSpLocks/>
             <a:stCxn id="78" idx="3"/>
             <a:endCxn id="76" idx="1"/>
           </p:cNvCxnSpPr>
@@ -4905,7 +4900,7 @@
         <p:spPr>
           <a:xfrm flipV="1">
             <a:off x="7277995" y="2707130"/>
-            <a:ext cx="434402" cy="327761"/>
+            <a:ext cx="434401" cy="327761"/>
           </a:xfrm>
           <a:prstGeom prst="bentConnector3">
             <a:avLst/>
@@ -4942,8 +4937,8 @@
         </p:nvSpPr>
         <p:spPr>
           <a:xfrm>
-            <a:off x="7712397" y="2887216"/>
-            <a:ext cx="708186" cy="285783"/>
+            <a:off x="7712395" y="2887216"/>
+            <a:ext cx="921339" cy="285783"/>
           </a:xfrm>
           <a:prstGeom prst="rect">
             <a:avLst/>
@@ -4975,12 +4970,12 @@
           <a:p>
             <a:pPr algn="ctr"/>
             <a:r>
-              <a:rPr lang="en-US" sz="1050" dirty="0" smtClean="0">
+              <a:rPr lang="en-US" sz="1050" dirty="0">
                 <a:solidFill>
                   <a:srgbClr val="7030A0"/>
                 </a:solidFill>
               </a:rPr>
-              <a:t>Phone</a:t>
+              <a:t>Deadline</a:t>
             </a:r>
             <a:endParaRPr lang="en-SG" sz="1050" dirty="0">
               <a:solidFill>
@@ -4994,6 +4989,7 @@
         <p:nvCxnSpPr>
           <p:cNvPr id="81" name="Elbow Connector 80"/>
           <p:cNvCxnSpPr>
+            <a:cxnSpLocks/>
             <a:stCxn id="78" idx="3"/>
             <a:endCxn id="80" idx="1"/>
           </p:cNvCxnSpPr>
@@ -5002,7 +4998,7 @@
         <p:spPr>
           <a:xfrm flipV="1">
             <a:off x="7277995" y="3030108"/>
-            <a:ext cx="434402" cy="4783"/>
+            <a:ext cx="434400" cy="4783"/>
           </a:xfrm>
           <a:prstGeom prst="bentConnector3">
             <a:avLst/>
@@ -5039,8 +5035,8 @@
         </p:nvSpPr>
         <p:spPr>
           <a:xfrm>
-            <a:off x="7712397" y="3210194"/>
-            <a:ext cx="708186" cy="285783"/>
+            <a:off x="7712396" y="3214976"/>
+            <a:ext cx="921339" cy="671223"/>
           </a:xfrm>
           <a:prstGeom prst="rect">
             <a:avLst/>
@@ -5072,12 +5068,12 @@
           <a:p>
             <a:pPr algn="ctr"/>
             <a:r>
-              <a:rPr lang="en-US" sz="1050" dirty="0" smtClean="0">
+              <a:rPr lang="en-US" sz="1050" dirty="0" err="1">
                 <a:solidFill>
                   <a:srgbClr val="7030A0"/>
                 </a:solidFill>
               </a:rPr>
-              <a:t>Email</a:t>
+              <a:t>StartEndDateTime</a:t>
             </a:r>
             <a:endParaRPr lang="en-SG" sz="1050" dirty="0">
               <a:solidFill>
@@ -5091,6 +5087,7 @@
         <p:nvCxnSpPr>
           <p:cNvPr id="84" name="Elbow Connector 83"/>
           <p:cNvCxnSpPr>
+            <a:cxnSpLocks/>
             <a:stCxn id="78" idx="3"/>
             <a:endCxn id="83" idx="1"/>
           </p:cNvCxnSpPr>
@@ -5099,107 +5096,12 @@
         <p:spPr>
           <a:xfrm>
             <a:off x="7277995" y="3034891"/>
-            <a:ext cx="434402" cy="318195"/>
+            <a:ext cx="434401" cy="515697"/>
           </a:xfrm>
           <a:prstGeom prst="bentConnector3">
-            <a:avLst/>
-          </a:prstGeom>
-          <a:ln w="19050">
-            <a:solidFill>
-              <a:srgbClr val="7030A0"/>
-            </a:solidFill>
-            <a:headEnd type="none" w="med" len="med"/>
-            <a:tailEnd type="arrow" w="med" len="med"/>
-          </a:ln>
-          <a:effectLst/>
-        </p:spPr>
-        <p:style>
-          <a:lnRef idx="1">
-            <a:schemeClr val="accent2"/>
-          </a:lnRef>
-          <a:fillRef idx="2">
-            <a:schemeClr val="accent2"/>
-          </a:fillRef>
-          <a:effectRef idx="1">
-            <a:schemeClr val="accent2"/>
-          </a:effectRef>
-          <a:fontRef idx="minor">
-            <a:schemeClr val="dk1"/>
-          </a:fontRef>
-        </p:style>
-      </p:cxnSp>
-      <p:sp>
-        <p:nvSpPr>
-          <p:cNvPr id="85" name="Rectangle 8"/>
-          <p:cNvSpPr/>
-          <p:nvPr/>
-        </p:nvSpPr>
-        <p:spPr>
-          <a:xfrm>
-            <a:off x="7712397" y="3533171"/>
-            <a:ext cx="708186" cy="285783"/>
-          </a:xfrm>
-          <a:prstGeom prst="rect">
-            <a:avLst/>
-          </a:prstGeom>
-          <a:ln w="19050">
-            <a:solidFill>
-              <a:srgbClr val="7030A0"/>
-            </a:solidFill>
-          </a:ln>
-          <a:effectLst/>
-        </p:spPr>
-        <p:style>
-          <a:lnRef idx="1">
-            <a:schemeClr val="accent4"/>
-          </a:lnRef>
-          <a:fillRef idx="2">
-            <a:schemeClr val="accent4"/>
-          </a:fillRef>
-          <a:effectRef idx="1">
-            <a:schemeClr val="accent4"/>
-          </a:effectRef>
-          <a:fontRef idx="minor">
-            <a:schemeClr val="dk1"/>
-          </a:fontRef>
-        </p:style>
-        <p:txBody>
-          <a:bodyPr rtlCol="0" anchor="ctr"/>
-          <a:lstStyle/>
-          <a:p>
-            <a:pPr algn="ctr"/>
-            <a:r>
-              <a:rPr lang="en-US" sz="1050" dirty="0" smtClean="0">
-                <a:solidFill>
-                  <a:srgbClr val="7030A0"/>
-                </a:solidFill>
-              </a:rPr>
-              <a:t>Address</a:t>
-            </a:r>
-            <a:endParaRPr lang="en-SG" sz="1050" dirty="0">
-              <a:solidFill>
-                <a:srgbClr val="7030A0"/>
-              </a:solidFill>
-            </a:endParaRPr>
-          </a:p>
-        </p:txBody>
-      </p:sp>
-      <p:cxnSp>
-        <p:nvCxnSpPr>
-          <p:cNvPr id="86" name="Elbow Connector 85"/>
-          <p:cNvCxnSpPr>
-            <a:stCxn id="78" idx="3"/>
-            <a:endCxn id="85" idx="1"/>
-          </p:cNvCxnSpPr>
-          <p:nvPr/>
-        </p:nvCxnSpPr>
-        <p:spPr>
-          <a:xfrm>
-            <a:off x="7277995" y="3034891"/>
-            <a:ext cx="434402" cy="641172"/>
-          </a:xfrm>
-          <a:prstGeom prst="bentConnector3">
-            <a:avLst/>
+            <a:avLst>
+              <a:gd name="adj1" fmla="val 50000"/>
+            </a:avLst>
           </a:prstGeom>
           <a:ln w="19050">
             <a:solidFill>
@@ -5357,7 +5259,7 @@
           <a:p>
             <a:pPr algn="ctr"/>
             <a:r>
-              <a:rPr lang="en-US" sz="1050" dirty="0" smtClean="0">
+              <a:rPr lang="en-US" sz="1050" dirty="0">
                 <a:solidFill>
                   <a:srgbClr val="7030A0"/>
                 </a:solidFill>
@@ -5365,19 +5267,27 @@
               <a:t>&lt;&lt;interface&gt;&gt;</a:t>
             </a:r>
             <a:br>
-              <a:rPr lang="en-US" sz="1050" dirty="0" smtClean="0">
+              <a:rPr lang="en-US" sz="1050" dirty="0">
                 <a:solidFill>
                   <a:srgbClr val="7030A0"/>
                 </a:solidFill>
               </a:rPr>
             </a:br>
             <a:r>
-              <a:rPr lang="en-US" sz="1050" dirty="0" err="1" smtClean="0">
+              <a:rPr lang="en-US" sz="1050" dirty="0" err="1">
                 <a:solidFill>
                   <a:srgbClr val="7030A0"/>
                 </a:solidFill>
               </a:rPr>
-              <a:t>ReadOnlyAddressBook</a:t>
+              <a:t>ReadOnly</a:t>
+            </a:r>
+            <a:r>
+              <a:rPr lang="en-US" altLang="zh-CN" sz="1050" dirty="0" err="1">
+                <a:solidFill>
+                  <a:srgbClr val="7030A0"/>
+                </a:solidFill>
+              </a:rPr>
+              <a:t>TaskList</a:t>
             </a:r>
             <a:endParaRPr lang="en-SG" sz="1050" dirty="0">
               <a:solidFill>
@@ -5411,7 +5321,7 @@
           <a:p>
             <a:pPr algn="r"/>
             <a:r>
-              <a:rPr lang="en-US" sz="1100" dirty="0" smtClean="0">
+              <a:rPr lang="en-US" sz="1100" dirty="0">
                 <a:solidFill>
                   <a:srgbClr val="7030A0"/>
                 </a:solidFill>
@@ -5467,20 +5377,12 @@
           <a:p>
             <a:pPr algn="ctr"/>
             <a:r>
-              <a:rPr lang="en-US" sz="1050" dirty="0" smtClean="0">
+              <a:rPr lang="en-US" sz="1050" dirty="0">
                 <a:solidFill>
                   <a:srgbClr val="7030A0"/>
                 </a:solidFill>
               </a:rPr>
               <a:t>&lt;&lt;interface&gt;&gt;</a:t>
-            </a:r>
-            <a:r>
-              <a:rPr lang="en-US" sz="1050" dirty="0">
-                <a:solidFill>
-                  <a:srgbClr val="7030A0"/>
-                </a:solidFill>
-              </a:rPr>
-              <a:t/>
             </a:r>
             <a:br>
               <a:rPr lang="en-US" sz="1050" dirty="0">
@@ -5490,7 +5392,7 @@
               </a:rPr>
             </a:br>
             <a:r>
-              <a:rPr lang="en-US" sz="1050" dirty="0" err="1" smtClean="0">
+              <a:rPr lang="en-US" sz="1050" dirty="0" err="1">
                 <a:solidFill>
                   <a:srgbClr val="7030A0"/>
                 </a:solidFill>
@@ -5612,7 +5514,7 @@
           <a:p>
             <a:pPr algn="ctr"/>
             <a:r>
-              <a:rPr lang="en-US" sz="1100" dirty="0" smtClean="0">
+              <a:rPr lang="en-US" sz="1100" dirty="0">
                 <a:solidFill>
                   <a:srgbClr val="7030A0"/>
                 </a:solidFill>
@@ -5651,7 +5553,7 @@
           <a:p>
             <a:pPr algn="ctr"/>
             <a:r>
-              <a:rPr lang="en-US" sz="1100" dirty="0" smtClean="0">
+              <a:rPr lang="en-US" sz="1100" dirty="0">
                 <a:solidFill>
                   <a:srgbClr val="7030A0"/>
                 </a:solidFill>
@@ -5690,7 +5592,7 @@
           <a:p>
             <a:pPr algn="ctr"/>
             <a:r>
-              <a:rPr lang="en-US" sz="1100" dirty="0" smtClean="0">
+              <a:rPr lang="en-US" sz="1100" dirty="0">
                 <a:solidFill>
                   <a:srgbClr val="7030A0"/>
                 </a:solidFill>
@@ -5729,7 +5631,7 @@
           <a:p>
             <a:pPr algn="ctr"/>
             <a:r>
-              <a:rPr lang="en-US" sz="1100" dirty="0" smtClean="0">
+              <a:rPr lang="en-US" sz="1100" dirty="0">
                 <a:solidFill>
                   <a:srgbClr val="7030A0"/>
                 </a:solidFill>
@@ -5768,7 +5670,7 @@
           <a:p>
             <a:pPr algn="ctr"/>
             <a:r>
-              <a:rPr lang="en-US" sz="1100" dirty="0" smtClean="0">
+              <a:rPr lang="en-US" sz="1100" dirty="0">
                 <a:solidFill>
                   <a:srgbClr val="7030A0"/>
                 </a:solidFill>
@@ -5807,7 +5709,7 @@
           <a:p>
             <a:pPr algn="ctr"/>
             <a:r>
-              <a:rPr lang="en-US" sz="1100" dirty="0" smtClean="0">
+              <a:rPr lang="en-US" sz="1100" dirty="0">
                 <a:solidFill>
                   <a:srgbClr val="7030A0"/>
                 </a:solidFill>
@@ -5846,7 +5748,7 @@
           <a:p>
             <a:pPr algn="ctr"/>
             <a:r>
-              <a:rPr lang="en-US" sz="1100" dirty="0" smtClean="0">
+              <a:rPr lang="en-US" sz="1100" dirty="0">
                 <a:solidFill>
                   <a:srgbClr val="7030A0"/>
                 </a:solidFill>
@@ -5885,7 +5787,7 @@
           <a:p>
             <a:pPr algn="ctr"/>
             <a:r>
-              <a:rPr lang="en-US" sz="1100" dirty="0" smtClean="0">
+              <a:rPr lang="en-US" sz="1100" dirty="0">
                 <a:solidFill>
                   <a:srgbClr val="7030A0"/>
                 </a:solidFill>
@@ -5910,13 +5812,6 @@
   <p:clrMapOvr>
     <a:masterClrMapping/>
   </p:clrMapOvr>
-  <p:timing>
-    <p:tnLst>
-      <p:par>
-        <p:cTn id="1" dur="indefinite" restart="never" nodeType="tmRoot"/>
-      </p:par>
-    </p:tnLst>
-  </p:timing>
 </p:sld>
 </file>
 

</xml_diff>

<commit_message>
Modify Model diagram and add Sync diagram
</commit_message>
<xml_diff>
--- a/docs/diagrams/ModelComponentClassDiagram.pptx
+++ b/docs/diagrams/ModelComponentClassDiagram.pptx
@@ -208,7 +208,7 @@
           <a:p>
             <a:fld id="{F5CC4B3F-88C1-4FFA-B1B6-F41C21DC6924}" type="datetimeFigureOut">
               <a:rPr lang="en-US" smtClean="0"/>
-              <a:t>3/23/2017</a:t>
+              <a:t>4/9/2017</a:t>
             </a:fld>
             <a:endParaRPr lang="en-US"/>
           </a:p>
@@ -654,7 +654,7 @@
           <a:p>
             <a:fld id="{78C97017-6FC3-485B-9764-EAC9E56C1D49}" type="datetimeFigureOut">
               <a:rPr lang="en-US" smtClean="0"/>
-              <a:t>3/23/2017</a:t>
+              <a:t>4/9/2017</a:t>
             </a:fld>
             <a:endParaRPr lang="en-US"/>
           </a:p>
@@ -822,7 +822,7 @@
           <a:p>
             <a:fld id="{78C97017-6FC3-485B-9764-EAC9E56C1D49}" type="datetimeFigureOut">
               <a:rPr lang="en-US" smtClean="0"/>
-              <a:t>3/23/2017</a:t>
+              <a:t>4/9/2017</a:t>
             </a:fld>
             <a:endParaRPr lang="en-US"/>
           </a:p>
@@ -1000,7 +1000,7 @@
           <a:p>
             <a:fld id="{78C97017-6FC3-485B-9764-EAC9E56C1D49}" type="datetimeFigureOut">
               <a:rPr lang="en-US" smtClean="0"/>
-              <a:t>3/23/2017</a:t>
+              <a:t>4/9/2017</a:t>
             </a:fld>
             <a:endParaRPr lang="en-US"/>
           </a:p>
@@ -1168,7 +1168,7 @@
           <a:p>
             <a:fld id="{78C97017-6FC3-485B-9764-EAC9E56C1D49}" type="datetimeFigureOut">
               <a:rPr lang="en-US" smtClean="0"/>
-              <a:t>3/23/2017</a:t>
+              <a:t>4/9/2017</a:t>
             </a:fld>
             <a:endParaRPr lang="en-US"/>
           </a:p>
@@ -1413,7 +1413,7 @@
           <a:p>
             <a:fld id="{78C97017-6FC3-485B-9764-EAC9E56C1D49}" type="datetimeFigureOut">
               <a:rPr lang="en-US" smtClean="0"/>
-              <a:t>3/23/2017</a:t>
+              <a:t>4/9/2017</a:t>
             </a:fld>
             <a:endParaRPr lang="en-US"/>
           </a:p>
@@ -1698,7 +1698,7 @@
           <a:p>
             <a:fld id="{78C97017-6FC3-485B-9764-EAC9E56C1D49}" type="datetimeFigureOut">
               <a:rPr lang="en-US" smtClean="0"/>
-              <a:t>3/23/2017</a:t>
+              <a:t>4/9/2017</a:t>
             </a:fld>
             <a:endParaRPr lang="en-US"/>
           </a:p>
@@ -2117,7 +2117,7 @@
           <a:p>
             <a:fld id="{78C97017-6FC3-485B-9764-EAC9E56C1D49}" type="datetimeFigureOut">
               <a:rPr lang="en-US" smtClean="0"/>
-              <a:t>3/23/2017</a:t>
+              <a:t>4/9/2017</a:t>
             </a:fld>
             <a:endParaRPr lang="en-US"/>
           </a:p>
@@ -2234,7 +2234,7 @@
           <a:p>
             <a:fld id="{78C97017-6FC3-485B-9764-EAC9E56C1D49}" type="datetimeFigureOut">
               <a:rPr lang="en-US" smtClean="0"/>
-              <a:t>3/23/2017</a:t>
+              <a:t>4/9/2017</a:t>
             </a:fld>
             <a:endParaRPr lang="en-US"/>
           </a:p>
@@ -2329,7 +2329,7 @@
           <a:p>
             <a:fld id="{78C97017-6FC3-485B-9764-EAC9E56C1D49}" type="datetimeFigureOut">
               <a:rPr lang="en-US" smtClean="0"/>
-              <a:t>3/23/2017</a:t>
+              <a:t>4/9/2017</a:t>
             </a:fld>
             <a:endParaRPr lang="en-US"/>
           </a:p>
@@ -2604,7 +2604,7 @@
           <a:p>
             <a:fld id="{78C97017-6FC3-485B-9764-EAC9E56C1D49}" type="datetimeFigureOut">
               <a:rPr lang="en-US" smtClean="0"/>
-              <a:t>3/23/2017</a:t>
+              <a:t>4/9/2017</a:t>
             </a:fld>
             <a:endParaRPr lang="en-US"/>
           </a:p>
@@ -2856,7 +2856,7 @@
           <a:p>
             <a:fld id="{78C97017-6FC3-485B-9764-EAC9E56C1D49}" type="datetimeFigureOut">
               <a:rPr lang="en-US" smtClean="0"/>
-              <a:t>3/23/2017</a:t>
+              <a:t>4/9/2017</a:t>
             </a:fld>
             <a:endParaRPr lang="en-US"/>
           </a:p>
@@ -3072,7 +3072,7 @@
           <a:p>
             <a:fld id="{78C97017-6FC3-485B-9764-EAC9E56C1D49}" type="datetimeFigureOut">
               <a:rPr lang="en-US" smtClean="0"/>
-              <a:t>3/23/2017</a:t>
+              <a:t>4/9/2017</a:t>
             </a:fld>
             <a:endParaRPr lang="en-US"/>
           </a:p>
@@ -3455,8 +3455,8 @@
         </p:nvSpPr>
         <p:spPr>
           <a:xfrm>
-            <a:off x="775254" y="1676399"/>
-            <a:ext cx="7848600" cy="3436557"/>
+            <a:off x="741917" y="1066800"/>
+            <a:ext cx="7881937" cy="4046157"/>
           </a:xfrm>
           <a:prstGeom prst="roundRect">
             <a:avLst>
@@ -3575,8 +3575,8 @@
         </p:nvSpPr>
         <p:spPr>
           <a:xfrm rot="16200000">
-            <a:off x="1170456" y="3206875"/>
-            <a:ext cx="1773889" cy="346760"/>
+            <a:off x="650131" y="2841628"/>
+            <a:ext cx="2590798" cy="265103"/>
           </a:xfrm>
           <a:prstGeom prst="rect">
             <a:avLst/>
@@ -3679,12 +3679,12 @@
         </p:nvCxnSpPr>
         <p:spPr>
           <a:xfrm rot="5400000" flipH="1" flipV="1">
-            <a:off x="3831398" y="1430828"/>
-            <a:ext cx="1062374" cy="4610369"/>
+            <a:off x="3774273" y="1376083"/>
+            <a:ext cx="1064753" cy="4722239"/>
           </a:xfrm>
           <a:prstGeom prst="bentConnector3">
             <a:avLst>
-              <a:gd name="adj1" fmla="val -17560"/>
+              <a:gd name="adj1" fmla="val -15807"/>
             </a:avLst>
           </a:prstGeom>
           <a:ln w="19050">
@@ -3720,7 +3720,7 @@
         </p:nvSpPr>
         <p:spPr>
           <a:xfrm rot="16200000">
-            <a:off x="827220" y="2861202"/>
+            <a:off x="692369" y="2792865"/>
             <a:ext cx="1093635" cy="346760"/>
           </a:xfrm>
           <a:prstGeom prst="rect">
@@ -3790,7 +3790,7 @@
         </p:nvSpPr>
         <p:spPr>
           <a:xfrm rot="16200000">
-            <a:off x="1518640" y="2952291"/>
+            <a:off x="1372764" y="2886417"/>
             <a:ext cx="270504" cy="175523"/>
           </a:xfrm>
           <a:prstGeom prst="triangle">
@@ -3840,8 +3840,8 @@
         </p:nvCxnSpPr>
         <p:spPr>
           <a:xfrm>
-            <a:off x="2470722" y="4003873"/>
-            <a:ext cx="406458" cy="7583"/>
+            <a:off x="2318023" y="4006252"/>
+            <a:ext cx="559157" cy="5204"/>
           </a:xfrm>
           <a:prstGeom prst="straightConnector1">
             <a:avLst/>
@@ -3931,14 +3931,12 @@
           <p:nvPr/>
         </p:nvCxnSpPr>
         <p:spPr>
-          <a:xfrm flipV="1">
-            <a:off x="741917" y="3034582"/>
-            <a:ext cx="458741" cy="5471"/>
-          </a:xfrm>
-          <a:prstGeom prst="bentConnector3">
-            <a:avLst>
-              <a:gd name="adj1" fmla="val 50000"/>
-            </a:avLst>
+          <a:xfrm>
+            <a:off x="422994" y="2964068"/>
+            <a:ext cx="642813" cy="2177"/>
+          </a:xfrm>
+          <a:prstGeom prst="straightConnector1">
+            <a:avLst/>
           </a:prstGeom>
           <a:ln w="19050">
             <a:solidFill>
@@ -3973,13 +3971,14 @@
           <p:cNvCxnSpPr>
             <a:cxnSpLocks/>
             <a:stCxn id="120" idx="3"/>
+            <a:endCxn id="9" idx="0"/>
           </p:cNvCxnSpPr>
           <p:nvPr/>
         </p:nvCxnSpPr>
         <p:spPr>
           <a:xfrm>
-            <a:off x="1741654" y="3040053"/>
-            <a:ext cx="212845" cy="0"/>
+            <a:off x="1595778" y="2974179"/>
+            <a:ext cx="217201" cy="1"/>
           </a:xfrm>
           <a:prstGeom prst="line">
             <a:avLst/>
@@ -4017,7 +4016,7 @@
         </p:nvSpPr>
         <p:spPr>
           <a:xfrm>
-            <a:off x="2234674" y="3917183"/>
+            <a:off x="2081975" y="3919562"/>
             <a:ext cx="236048" cy="173380"/>
           </a:xfrm>
           <a:prstGeom prst="flowChartDecision">
@@ -4122,8 +4121,8 @@
         </p:nvCxnSpPr>
         <p:spPr>
           <a:xfrm flipV="1">
-            <a:off x="2470722" y="2800800"/>
-            <a:ext cx="408768" cy="2527"/>
+            <a:off x="2318023" y="2800800"/>
+            <a:ext cx="561467" cy="4906"/>
           </a:xfrm>
           <a:prstGeom prst="straightConnector1">
             <a:avLst/>
@@ -4160,7 +4159,7 @@
         </p:nvSpPr>
         <p:spPr>
           <a:xfrm>
-            <a:off x="2234674" y="2716637"/>
+            <a:off x="2081975" y="2719016"/>
             <a:ext cx="236048" cy="173380"/>
           </a:xfrm>
           <a:prstGeom prst="flowChartDecision">
@@ -5520,8 +5519,8 @@
         </p:nvCxnSpPr>
         <p:spPr>
           <a:xfrm rot="16200000" flipH="1">
-            <a:off x="1097770" y="3857668"/>
-            <a:ext cx="1204355" cy="651818"/>
+            <a:off x="996175" y="3756074"/>
+            <a:ext cx="1272692" cy="786669"/>
           </a:xfrm>
           <a:prstGeom prst="bentConnector2">
             <a:avLst/>
@@ -6049,8 +6048,8 @@
         </p:nvSpPr>
         <p:spPr>
           <a:xfrm>
-            <a:off x="2365564" y="1809332"/>
-            <a:ext cx="627468" cy="346760"/>
+            <a:off x="2611852" y="1830614"/>
+            <a:ext cx="1634682" cy="332924"/>
           </a:xfrm>
           <a:prstGeom prst="rect">
             <a:avLst/>
@@ -6082,12 +6081,12 @@
           <a:p>
             <a:pPr algn="ctr"/>
             <a:r>
-              <a:rPr lang="en-US" sz="1050" dirty="0">
+              <a:rPr lang="en-US" sz="1050" dirty="0" err="1">
                 <a:solidFill>
                   <a:srgbClr val="7030A0"/>
                 </a:solidFill>
               </a:rPr>
-              <a:t>History</a:t>
+              <a:t>TaskManagerStateHistory</a:t>
             </a:r>
             <a:endParaRPr lang="en-SG" sz="1050" dirty="0">
               <a:solidFill>
@@ -6105,7 +6104,7 @@
         </p:nvSpPr>
         <p:spPr>
           <a:xfrm>
-            <a:off x="2155839" y="2041480"/>
+            <a:off x="2408128" y="2079036"/>
             <a:ext cx="189257" cy="178683"/>
           </a:xfrm>
           <a:prstGeom prst="rect">
@@ -6143,8 +6142,8 @@
           <p:nvPr/>
         </p:nvSpPr>
         <p:spPr>
-          <a:xfrm>
-            <a:off x="2998834" y="1895833"/>
+          <a:xfrm rot="5400000">
+            <a:off x="3311982" y="2212645"/>
             <a:ext cx="236048" cy="173380"/>
           </a:xfrm>
           <a:prstGeom prst="flowChartDecision">
@@ -6181,22 +6180,61 @@
           </a:p>
         </p:txBody>
       </p:sp>
+      <p:sp>
+        <p:nvSpPr>
+          <p:cNvPr id="121" name="TextBox 120"/>
+          <p:cNvSpPr txBox="1"/>
+          <p:nvPr/>
+        </p:nvSpPr>
+        <p:spPr>
+          <a:xfrm>
+            <a:off x="3205106" y="2451066"/>
+            <a:ext cx="189257" cy="178683"/>
+          </a:xfrm>
+          <a:prstGeom prst="rect">
+            <a:avLst/>
+          </a:prstGeom>
+          <a:noFill/>
+        </p:spPr>
+        <p:txBody>
+          <a:bodyPr wrap="square" lIns="0" tIns="0" rIns="0" bIns="0" rtlCol="0">
+            <a:noAutofit/>
+          </a:bodyPr>
+          <a:lstStyle/>
+          <a:p>
+            <a:pPr algn="ctr"/>
+            <a:r>
+              <a:rPr lang="en-US" sz="1100" dirty="0">
+                <a:solidFill>
+                  <a:srgbClr val="7030A0"/>
+                </a:solidFill>
+              </a:rPr>
+              <a:t>*</a:t>
+            </a:r>
+            <a:endParaRPr lang="en-SG" sz="1100" dirty="0">
+              <a:solidFill>
+                <a:srgbClr val="7030A0"/>
+              </a:solidFill>
+            </a:endParaRPr>
+          </a:p>
+        </p:txBody>
+      </p:sp>
       <p:cxnSp>
         <p:nvCxnSpPr>
-          <p:cNvPr id="95" name="Elbow Connector 49"/>
+          <p:cNvPr id="82" name="Straight Arrow Connector 81"/>
           <p:cNvCxnSpPr>
             <a:cxnSpLocks/>
-            <a:stCxn id="9" idx="3"/>
-            <a:endCxn id="87" idx="1"/>
+            <a:stCxn id="93" idx="3"/>
+            <a:endCxn id="46" idx="0"/>
           </p:cNvCxnSpPr>
           <p:nvPr/>
         </p:nvCxnSpPr>
         <p:spPr>
-          <a:xfrm rot="5400000" flipH="1" flipV="1">
-            <a:off x="1956183" y="2083931"/>
-            <a:ext cx="510599" cy="308163"/>
-          </a:xfrm>
-          <a:prstGeom prst="bentConnector2">
+          <a:xfrm flipH="1">
+            <a:off x="3426308" y="2417359"/>
+            <a:ext cx="3698" cy="210061"/>
+          </a:xfrm>
+          <a:prstGeom prst="straightConnector1">
             <a:avLst/>
           </a:prstGeom>
           <a:ln w="19050">
@@ -6225,19 +6263,20 @@
       </p:cxnSp>
       <p:cxnSp>
         <p:nvCxnSpPr>
-          <p:cNvPr id="98" name="Elbow Connector 49"/>
+          <p:cNvPr id="88" name="Straight Arrow Connector 87"/>
           <p:cNvCxnSpPr>
             <a:cxnSpLocks/>
-            <a:stCxn id="93" idx="3"/>
+            <a:stCxn id="90" idx="3"/>
+            <a:endCxn id="87" idx="1"/>
           </p:cNvCxnSpPr>
           <p:nvPr/>
         </p:nvCxnSpPr>
         <p:spPr>
           <a:xfrm>
-            <a:off x="3234882" y="1982523"/>
-            <a:ext cx="192551" cy="647037"/>
-          </a:xfrm>
-          <a:prstGeom prst="bentConnector2">
+            <a:off x="2311770" y="1997076"/>
+            <a:ext cx="300082" cy="0"/>
+          </a:xfrm>
+          <a:prstGeom prst="straightConnector1">
             <a:avLst/>
           </a:prstGeom>
           <a:ln w="19050">
@@ -6266,13 +6305,100 @@
       </p:cxnSp>
       <p:sp>
         <p:nvSpPr>
-          <p:cNvPr id="121" name="TextBox 120"/>
+          <p:cNvPr id="90" name="Flowchart: Decision 96"/>
+          <p:cNvSpPr/>
+          <p:nvPr/>
+        </p:nvSpPr>
+        <p:spPr>
+          <a:xfrm>
+            <a:off x="2075722" y="1910386"/>
+            <a:ext cx="236048" cy="173380"/>
+          </a:xfrm>
+          <a:prstGeom prst="flowChartDecision">
+            <a:avLst/>
+          </a:prstGeom>
+          <a:noFill/>
+          <a:ln w="19050">
+            <a:solidFill>
+              <a:srgbClr val="7030A0"/>
+            </a:solidFill>
+          </a:ln>
+          <a:effectLst/>
+        </p:spPr>
+        <p:style>
+          <a:lnRef idx="1">
+            <a:schemeClr val="accent6"/>
+          </a:lnRef>
+          <a:fillRef idx="2">
+            <a:schemeClr val="accent6"/>
+          </a:fillRef>
+          <a:effectRef idx="1">
+            <a:schemeClr val="accent6"/>
+          </a:effectRef>
+          <a:fontRef idx="minor">
+            <a:schemeClr val="dk1"/>
+          </a:fontRef>
+        </p:style>
+        <p:txBody>
+          <a:bodyPr rtlCol="0" anchor="ctr"/>
+          <a:lstStyle/>
+          <a:p>
+            <a:pPr algn="ctr"/>
+            <a:endParaRPr lang="en-US" sz="1050"/>
+          </a:p>
+        </p:txBody>
+      </p:sp>
+      <p:cxnSp>
+        <p:nvCxnSpPr>
+          <p:cNvPr id="123" name="Elbow Connector 68"/>
+          <p:cNvCxnSpPr>
+            <a:cxnSpLocks/>
+            <a:stCxn id="9" idx="3"/>
+            <a:endCxn id="126" idx="1"/>
+          </p:cNvCxnSpPr>
+          <p:nvPr/>
+        </p:nvCxnSpPr>
+        <p:spPr>
+          <a:xfrm rot="5400000" flipH="1" flipV="1">
+            <a:off x="2166457" y="1222498"/>
+            <a:ext cx="235357" cy="677210"/>
+          </a:xfrm>
+          <a:prstGeom prst="bentConnector2">
+            <a:avLst/>
+          </a:prstGeom>
+          <a:ln w="19050">
+            <a:solidFill>
+              <a:srgbClr val="7030A0"/>
+            </a:solidFill>
+            <a:headEnd type="none" w="med" len="med"/>
+            <a:tailEnd type="arrow" w="med" len="med"/>
+          </a:ln>
+          <a:effectLst/>
+        </p:spPr>
+        <p:style>
+          <a:lnRef idx="1">
+            <a:schemeClr val="accent2"/>
+          </a:lnRef>
+          <a:fillRef idx="2">
+            <a:schemeClr val="accent2"/>
+          </a:fillRef>
+          <a:effectRef idx="1">
+            <a:schemeClr val="accent2"/>
+          </a:effectRef>
+          <a:fontRef idx="minor">
+            <a:schemeClr val="dk1"/>
+          </a:fontRef>
+        </p:style>
+      </p:cxnSp>
+      <p:sp>
+        <p:nvSpPr>
+          <p:cNvPr id="125" name="TextBox 124"/>
           <p:cNvSpPr txBox="1"/>
           <p:nvPr/>
         </p:nvSpPr>
         <p:spPr>
           <a:xfrm>
-            <a:off x="3205106" y="2451066"/>
+            <a:off x="2368650" y="1245442"/>
             <a:ext cx="189257" cy="178683"/>
           </a:xfrm>
           <a:prstGeom prst="rect">
@@ -6293,11 +6419,70 @@
                   <a:srgbClr val="7030A0"/>
                 </a:solidFill>
               </a:rPr>
-              <a:t>*</a:t>
+              <a:t>1</a:t>
             </a:r>
             <a:endParaRPr lang="en-SG" sz="1100" dirty="0">
               <a:solidFill>
                 <a:srgbClr val="7030A0"/>
+              </a:solidFill>
+            </a:endParaRPr>
+          </a:p>
+        </p:txBody>
+      </p:sp>
+      <p:sp>
+        <p:nvSpPr>
+          <p:cNvPr id="126" name="Rectangle 8"/>
+          <p:cNvSpPr/>
+          <p:nvPr/>
+        </p:nvSpPr>
+        <p:spPr>
+          <a:xfrm>
+            <a:off x="2622740" y="1270044"/>
+            <a:ext cx="1093635" cy="346760"/>
+          </a:xfrm>
+          <a:prstGeom prst="rect">
+            <a:avLst/>
+          </a:prstGeom>
+          <a:solidFill>
+            <a:srgbClr val="7030A0"/>
+          </a:solidFill>
+          <a:ln w="19050">
+            <a:solidFill>
+              <a:srgbClr val="7030A0"/>
+            </a:solidFill>
+          </a:ln>
+          <a:effectLst/>
+        </p:spPr>
+        <p:style>
+          <a:lnRef idx="1">
+            <a:schemeClr val="accent2"/>
+          </a:lnRef>
+          <a:fillRef idx="2">
+            <a:schemeClr val="accent2"/>
+          </a:fillRef>
+          <a:effectRef idx="1">
+            <a:schemeClr val="accent2"/>
+          </a:effectRef>
+          <a:fontRef idx="minor">
+            <a:schemeClr val="dk1"/>
+          </a:fontRef>
+        </p:style>
+        <p:txBody>
+          <a:bodyPr rtlCol="0" anchor="ctr"/>
+          <a:lstStyle/>
+          <a:p>
+            <a:pPr algn="ctr"/>
+            <a:r>
+              <a:rPr lang="en-US" sz="1050" dirty="0">
+                <a:solidFill>
+                  <a:schemeClr val="bg1"/>
+                </a:solidFill>
+              </a:rPr>
+              <a:t>Sync</a:t>
+            </a:r>
+            <a:endParaRPr lang="en-SG" sz="1050" dirty="0">
+              <a:solidFill>
+                <a:schemeClr val="bg1"/>
               </a:solidFill>
             </a:endParaRPr>
           </a:p>

</xml_diff>

<commit_message>
Update DeveloperGuide, adding Task diagram
</commit_message>
<xml_diff>
--- a/docs/diagrams/ModelComponentClassDiagram.pptx
+++ b/docs/diagrams/ModelComponentClassDiagram.pptx
@@ -208,7 +208,7 @@
           <a:p>
             <a:fld id="{F5CC4B3F-88C1-4FFA-B1B6-F41C21DC6924}" type="datetimeFigureOut">
               <a:rPr lang="en-US" smtClean="0"/>
-              <a:t>4/6/17</a:t>
+              <a:t>4/10/17</a:t>
             </a:fld>
             <a:endParaRPr lang="en-US"/>
           </a:p>
@@ -657,7 +657,7 @@
           <a:p>
             <a:fld id="{78C97017-6FC3-485B-9764-EAC9E56C1D49}" type="datetimeFigureOut">
               <a:rPr lang="en-US" smtClean="0"/>
-              <a:t>4/6/17</a:t>
+              <a:t>4/10/17</a:t>
             </a:fld>
             <a:endParaRPr lang="en-US"/>
           </a:p>
@@ -827,7 +827,7 @@
           <a:p>
             <a:fld id="{78C97017-6FC3-485B-9764-EAC9E56C1D49}" type="datetimeFigureOut">
               <a:rPr lang="en-US" smtClean="0"/>
-              <a:t>4/6/17</a:t>
+              <a:t>4/10/17</a:t>
             </a:fld>
             <a:endParaRPr lang="en-US"/>
           </a:p>
@@ -1007,7 +1007,7 @@
           <a:p>
             <a:fld id="{78C97017-6FC3-485B-9764-EAC9E56C1D49}" type="datetimeFigureOut">
               <a:rPr lang="en-US" smtClean="0"/>
-              <a:t>4/6/17</a:t>
+              <a:t>4/10/17</a:t>
             </a:fld>
             <a:endParaRPr lang="en-US"/>
           </a:p>
@@ -1177,7 +1177,7 @@
           <a:p>
             <a:fld id="{78C97017-6FC3-485B-9764-EAC9E56C1D49}" type="datetimeFigureOut">
               <a:rPr lang="en-US" smtClean="0"/>
-              <a:t>4/6/17</a:t>
+              <a:t>4/10/17</a:t>
             </a:fld>
             <a:endParaRPr lang="en-US"/>
           </a:p>
@@ -1423,7 +1423,7 @@
           <a:p>
             <a:fld id="{78C97017-6FC3-485B-9764-EAC9E56C1D49}" type="datetimeFigureOut">
               <a:rPr lang="en-US" smtClean="0"/>
-              <a:t>4/6/17</a:t>
+              <a:t>4/10/17</a:t>
             </a:fld>
             <a:endParaRPr lang="en-US"/>
           </a:p>
@@ -1711,7 +1711,7 @@
           <a:p>
             <a:fld id="{78C97017-6FC3-485B-9764-EAC9E56C1D49}" type="datetimeFigureOut">
               <a:rPr lang="en-US" smtClean="0"/>
-              <a:t>4/6/17</a:t>
+              <a:t>4/10/17</a:t>
             </a:fld>
             <a:endParaRPr lang="en-US"/>
           </a:p>
@@ -2133,7 +2133,7 @@
           <a:p>
             <a:fld id="{78C97017-6FC3-485B-9764-EAC9E56C1D49}" type="datetimeFigureOut">
               <a:rPr lang="en-US" smtClean="0"/>
-              <a:t>4/6/17</a:t>
+              <a:t>4/10/17</a:t>
             </a:fld>
             <a:endParaRPr lang="en-US"/>
           </a:p>
@@ -2251,7 +2251,7 @@
           <a:p>
             <a:fld id="{78C97017-6FC3-485B-9764-EAC9E56C1D49}" type="datetimeFigureOut">
               <a:rPr lang="en-US" smtClean="0"/>
-              <a:t>4/6/17</a:t>
+              <a:t>4/10/17</a:t>
             </a:fld>
             <a:endParaRPr lang="en-US"/>
           </a:p>
@@ -2346,7 +2346,7 @@
           <a:p>
             <a:fld id="{78C97017-6FC3-485B-9764-EAC9E56C1D49}" type="datetimeFigureOut">
               <a:rPr lang="en-US" smtClean="0"/>
-              <a:t>4/6/17</a:t>
+              <a:t>4/10/17</a:t>
             </a:fld>
             <a:endParaRPr lang="en-US"/>
           </a:p>
@@ -2623,7 +2623,7 @@
           <a:p>
             <a:fld id="{78C97017-6FC3-485B-9764-EAC9E56C1D49}" type="datetimeFigureOut">
               <a:rPr lang="en-US" smtClean="0"/>
-              <a:t>4/6/17</a:t>
+              <a:t>4/10/17</a:t>
             </a:fld>
             <a:endParaRPr lang="en-US"/>
           </a:p>
@@ -2876,7 +2876,7 @@
           <a:p>
             <a:fld id="{78C97017-6FC3-485B-9764-EAC9E56C1D49}" type="datetimeFigureOut">
               <a:rPr lang="en-US" smtClean="0"/>
-              <a:t>4/6/17</a:t>
+              <a:t>4/10/17</a:t>
             </a:fld>
             <a:endParaRPr lang="en-US"/>
           </a:p>
@@ -3089,7 +3089,7 @@
           <a:p>
             <a:fld id="{78C97017-6FC3-485B-9764-EAC9E56C1D49}" type="datetimeFigureOut">
               <a:rPr lang="en-US" smtClean="0"/>
-              <a:t>4/6/17</a:t>
+              <a:t>4/10/17</a:t>
             </a:fld>
             <a:endParaRPr lang="en-US"/>
           </a:p>
@@ -3472,8 +3472,8 @@
         </p:nvSpPr>
         <p:spPr>
           <a:xfrm>
-            <a:off x="1119865" y="1727200"/>
-            <a:ext cx="7490735" cy="2997200"/>
+            <a:off x="1143000" y="942371"/>
+            <a:ext cx="7490735" cy="3810000"/>
           </a:xfrm>
           <a:prstGeom prst="roundRect">
             <a:avLst>
@@ -5064,7 +5064,7 @@
         <p:spPr>
           <a:xfrm>
             <a:off x="7717386" y="2935345"/>
-            <a:ext cx="771567" cy="285783"/>
+            <a:ext cx="700621" cy="285783"/>
           </a:xfrm>
           <a:prstGeom prst="rect">
             <a:avLst/>
@@ -5796,14 +5796,14 @@
       </p:sp>
       <p:sp>
         <p:nvSpPr>
-          <p:cNvPr id="74" name="Rectangle 8"/>
+          <p:cNvPr id="67" name="Rectangle 8"/>
           <p:cNvSpPr/>
           <p:nvPr/>
         </p:nvSpPr>
         <p:spPr>
           <a:xfrm>
-            <a:off x="6088893" y="1810226"/>
-            <a:ext cx="667105" cy="346760"/>
+            <a:off x="5336104" y="1809332"/>
+            <a:ext cx="514055" cy="346760"/>
           </a:xfrm>
           <a:prstGeom prst="rect">
             <a:avLst/>
@@ -5835,12 +5835,12 @@
           <a:p>
             <a:pPr algn="ctr"/>
             <a:r>
-              <a:rPr lang="en-US" sz="1050" dirty="0" err="1" smtClean="0">
+              <a:rPr lang="en-US" sz="1050" dirty="0" smtClean="0">
                 <a:solidFill>
                   <a:srgbClr val="7030A0"/>
                 </a:solidFill>
               </a:rPr>
-              <a:t>TagColor</a:t>
+              <a:t>Tag</a:t>
             </a:r>
             <a:endParaRPr lang="en-SG" sz="1050" dirty="0">
               <a:solidFill>
@@ -5850,19 +5850,171 @@
           </a:p>
         </p:txBody>
       </p:sp>
+      <p:sp>
+        <p:nvSpPr>
+          <p:cNvPr id="55" name="Flowchart: Decision 96"/>
+          <p:cNvSpPr/>
+          <p:nvPr/>
+        </p:nvSpPr>
+        <p:spPr>
+          <a:xfrm>
+            <a:off x="2168019" y="2289273"/>
+            <a:ext cx="149535" cy="205976"/>
+          </a:xfrm>
+          <a:prstGeom prst="flowChartDecision">
+            <a:avLst/>
+          </a:prstGeom>
+          <a:solidFill>
+            <a:srgbClr val="7030A0"/>
+          </a:solidFill>
+          <a:ln w="19050">
+            <a:solidFill>
+              <a:srgbClr val="7030A0"/>
+            </a:solidFill>
+          </a:ln>
+          <a:effectLst/>
+        </p:spPr>
+        <p:style>
+          <a:lnRef idx="1">
+            <a:schemeClr val="accent6"/>
+          </a:lnRef>
+          <a:fillRef idx="2">
+            <a:schemeClr val="accent6"/>
+          </a:fillRef>
+          <a:effectRef idx="1">
+            <a:schemeClr val="accent6"/>
+          </a:effectRef>
+          <a:fontRef idx="minor">
+            <a:schemeClr val="dk1"/>
+          </a:fontRef>
+        </p:style>
+        <p:txBody>
+          <a:bodyPr rtlCol="0" anchor="ctr"/>
+          <a:lstStyle/>
+          <a:p>
+            <a:pPr algn="ctr"/>
+            <a:endParaRPr lang="en-US" sz="1050"/>
+          </a:p>
+        </p:txBody>
+      </p:sp>
+      <p:sp>
+        <p:nvSpPr>
+          <p:cNvPr id="77" name="Rectangle 8"/>
+          <p:cNvSpPr/>
+          <p:nvPr/>
+        </p:nvSpPr>
+        <p:spPr>
+          <a:xfrm>
+            <a:off x="2827113" y="992769"/>
+            <a:ext cx="1093635" cy="346760"/>
+          </a:xfrm>
+          <a:prstGeom prst="rect">
+            <a:avLst/>
+          </a:prstGeom>
+          <a:ln w="19050">
+            <a:solidFill>
+              <a:srgbClr val="7030A0"/>
+            </a:solidFill>
+          </a:ln>
+          <a:effectLst/>
+        </p:spPr>
+        <p:style>
+          <a:lnRef idx="1">
+            <a:schemeClr val="accent4"/>
+          </a:lnRef>
+          <a:fillRef idx="2">
+            <a:schemeClr val="accent4"/>
+          </a:fillRef>
+          <a:effectRef idx="1">
+            <a:schemeClr val="accent4"/>
+          </a:effectRef>
+          <a:fontRef idx="minor">
+            <a:schemeClr val="dk1"/>
+          </a:fontRef>
+        </p:style>
+        <p:txBody>
+          <a:bodyPr rtlCol="0" anchor="ctr"/>
+          <a:lstStyle/>
+          <a:p>
+            <a:pPr algn="ctr"/>
+            <a:r>
+              <a:rPr lang="en-US" altLang="zh-CN" sz="1050" dirty="0" smtClean="0">
+                <a:solidFill>
+                  <a:srgbClr val="7030A0"/>
+                </a:solidFill>
+              </a:rPr>
+              <a:t>State</a:t>
+            </a:r>
+            <a:endParaRPr lang="en-SG" sz="1050" dirty="0">
+              <a:solidFill>
+                <a:srgbClr val="7030A0"/>
+              </a:solidFill>
+            </a:endParaRPr>
+          </a:p>
+        </p:txBody>
+      </p:sp>
+      <p:sp>
+        <p:nvSpPr>
+          <p:cNvPr id="82" name="Flowchart: Decision 96"/>
+          <p:cNvSpPr/>
+          <p:nvPr/>
+        </p:nvSpPr>
+        <p:spPr>
+          <a:xfrm>
+            <a:off x="3271597" y="1347560"/>
+            <a:ext cx="152400" cy="230927"/>
+          </a:xfrm>
+          <a:prstGeom prst="flowChartDecision">
+            <a:avLst/>
+          </a:prstGeom>
+          <a:solidFill>
+            <a:srgbClr val="7030A0"/>
+          </a:solidFill>
+          <a:ln w="19050">
+            <a:solidFill>
+              <a:srgbClr val="7030A0"/>
+            </a:solidFill>
+          </a:ln>
+          <a:effectLst/>
+        </p:spPr>
+        <p:style>
+          <a:lnRef idx="1">
+            <a:schemeClr val="accent6"/>
+          </a:lnRef>
+          <a:fillRef idx="2">
+            <a:schemeClr val="accent6"/>
+          </a:fillRef>
+          <a:effectRef idx="1">
+            <a:schemeClr val="accent6"/>
+          </a:effectRef>
+          <a:fontRef idx="minor">
+            <a:schemeClr val="dk1"/>
+          </a:fontRef>
+        </p:style>
+        <p:txBody>
+          <a:bodyPr rtlCol="0" anchor="ctr"/>
+          <a:lstStyle/>
+          <a:p>
+            <a:pPr algn="ctr"/>
+            <a:endParaRPr lang="en-US" sz="1050"/>
+          </a:p>
+        </p:txBody>
+      </p:sp>
       <p:cxnSp>
         <p:nvCxnSpPr>
-          <p:cNvPr id="80" name="Elbow Connector 79"/>
+          <p:cNvPr id="86" name="Elbow Connector 85"/>
           <p:cNvCxnSpPr/>
           <p:nvPr/>
         </p:nvCxnSpPr>
         <p:spPr>
-          <a:xfrm flipV="1">
-            <a:off x="5662074" y="1995339"/>
-            <a:ext cx="434402" cy="4783"/>
+          <a:xfrm rot="5400000">
+            <a:off x="3235529" y="1696446"/>
+            <a:ext cx="227199" cy="7344"/>
           </a:xfrm>
           <a:prstGeom prst="bentConnector3">
-            <a:avLst/>
+            <a:avLst>
+              <a:gd name="adj1" fmla="val 50000"/>
+            </a:avLst>
           </a:prstGeom>
           <a:ln w="19050">
             <a:solidFill>
@@ -5888,62 +6040,48 @@
           </a:fontRef>
         </p:style>
       </p:cxnSp>
-      <p:sp>
-        <p:nvSpPr>
-          <p:cNvPr id="67" name="Rectangle 8"/>
-          <p:cNvSpPr/>
+      <p:cxnSp>
+        <p:nvCxnSpPr>
+          <p:cNvPr id="87" name="Elbow Connector 86"/>
+          <p:cNvCxnSpPr>
+            <a:stCxn id="55" idx="0"/>
+          </p:cNvCxnSpPr>
           <p:nvPr/>
-        </p:nvSpPr>
-        <p:spPr>
-          <a:xfrm>
-            <a:off x="5336104" y="1809332"/>
-            <a:ext cx="514055" cy="346760"/>
-          </a:xfrm>
-          <a:prstGeom prst="rect">
-            <a:avLst/>
+        </p:nvCxnSpPr>
+        <p:spPr>
+          <a:xfrm rot="5400000" flipH="1" flipV="1">
+            <a:off x="1984077" y="1446237"/>
+            <a:ext cx="1101747" cy="584326"/>
+          </a:xfrm>
+          <a:prstGeom prst="bentConnector3">
+            <a:avLst>
+              <a:gd name="adj1" fmla="val 99655"/>
+            </a:avLst>
           </a:prstGeom>
           <a:ln w="19050">
             <a:solidFill>
               <a:srgbClr val="7030A0"/>
             </a:solidFill>
+            <a:headEnd type="none" w="med" len="med"/>
+            <a:tailEnd type="arrow" w="med" len="med"/>
           </a:ln>
           <a:effectLst/>
         </p:spPr>
         <p:style>
           <a:lnRef idx="1">
-            <a:schemeClr val="accent4"/>
+            <a:schemeClr val="accent2"/>
           </a:lnRef>
           <a:fillRef idx="2">
-            <a:schemeClr val="accent4"/>
+            <a:schemeClr val="accent2"/>
           </a:fillRef>
           <a:effectRef idx="1">
-            <a:schemeClr val="accent4"/>
+            <a:schemeClr val="accent2"/>
           </a:effectRef>
           <a:fontRef idx="minor">
             <a:schemeClr val="dk1"/>
           </a:fontRef>
         </p:style>
-        <p:txBody>
-          <a:bodyPr rtlCol="0" anchor="ctr"/>
-          <a:lstStyle/>
-          <a:p>
-            <a:pPr algn="ctr"/>
-            <a:r>
-              <a:rPr lang="en-US" sz="1050" dirty="0" smtClean="0">
-                <a:solidFill>
-                  <a:srgbClr val="7030A0"/>
-                </a:solidFill>
-              </a:rPr>
-              <a:t>Tag</a:t>
-            </a:r>
-            <a:endParaRPr lang="en-SG" sz="1050" dirty="0">
-              <a:solidFill>
-                <a:srgbClr val="7030A0"/>
-              </a:solidFill>
-            </a:endParaRPr>
-          </a:p>
-        </p:txBody>
-      </p:sp>
+      </p:cxnSp>
     </p:spTree>
     <p:extLst>
       <p:ext uri="{BB962C8B-B14F-4D97-AF65-F5344CB8AC3E}">

</xml_diff>